<commit_message>
CSI1101 A2: v3 cut the fluff, added comparisons, todo: bib
</commit_message>
<xml_diff>
--- a/year_1/sem_2/CSI1101_computer_security/0b_assignment_2_[22MAY15_0900]/dev/CSI1101_PONCE_A2_v03.pptx
+++ b/year_1/sem_2/CSI1101_computer_security/0b_assignment_2_[22MAY15_0900]/dev/CSI1101_PONCE_A2_v03.pptx
@@ -27,36 +27,37 @@
     <p:sldId id="353" r:id="rId21"/>
     <p:sldId id="354" r:id="rId22"/>
     <p:sldId id="355" r:id="rId23"/>
-    <p:sldId id="365" r:id="rId24"/>
-    <p:sldId id="366" r:id="rId25"/>
-    <p:sldId id="367" r:id="rId26"/>
-    <p:sldId id="368" r:id="rId27"/>
-    <p:sldId id="369" r:id="rId28"/>
-    <p:sldId id="272" r:id="rId29"/>
-    <p:sldId id="380" r:id="rId30"/>
-    <p:sldId id="370" r:id="rId31"/>
+    <p:sldId id="389" r:id="rId24"/>
+    <p:sldId id="365" r:id="rId25"/>
+    <p:sldId id="366" r:id="rId26"/>
+    <p:sldId id="367" r:id="rId27"/>
+    <p:sldId id="368" r:id="rId28"/>
+    <p:sldId id="369" r:id="rId29"/>
+    <p:sldId id="272" r:id="rId30"/>
+    <p:sldId id="380" r:id="rId31"/>
+    <p:sldId id="370" r:id="rId32"/>
   </p:sldIdLst>
   <p:sldSz cx="12192000" cy="6858000"/>
   <p:notesSz cx="6858000" cy="9144000"/>
   <p:embeddedFontLst>
     <p:embeddedFont>
-      <p:font typeface="Calibri" panose="020F0502020204030204" pitchFamily="34" charset="0"/>
-      <p:regular r:id="rId32"/>
-      <p:bold r:id="rId33"/>
+      <p:font typeface="Calibri Light" panose="020F0302020204030204" pitchFamily="34" charset="0"/>
+      <p:regular r:id="rId33"/>
       <p:italic r:id="rId34"/>
-      <p:boldItalic r:id="rId35"/>
     </p:embeddedFont>
     <p:embeddedFont>
       <p:font typeface="Open Sans" panose="020B0606030504020204" pitchFamily="34" charset="0"/>
-      <p:regular r:id="rId36"/>
-      <p:bold r:id="rId37"/>
-      <p:italic r:id="rId38"/>
-      <p:boldItalic r:id="rId39"/>
+      <p:regular r:id="rId35"/>
+      <p:bold r:id="rId36"/>
+      <p:italic r:id="rId37"/>
+      <p:boldItalic r:id="rId38"/>
     </p:embeddedFont>
     <p:embeddedFont>
-      <p:font typeface="Calibri Light" panose="020F0302020204030204" pitchFamily="34" charset="0"/>
-      <p:regular r:id="rId40"/>
+      <p:font typeface="Calibri" panose="020F0502020204030204" pitchFamily="34" charset="0"/>
+      <p:regular r:id="rId39"/>
+      <p:bold r:id="rId40"/>
       <p:italic r:id="rId41"/>
+      <p:boldItalic r:id="rId42"/>
     </p:embeddedFont>
   </p:embeddedFontLst>
   <p:defaultTextStyle>
@@ -3263,13 +3264,24 @@
             <a:r>
               <a:rPr lang="en-AU" sz="3600" b="1" dirty="0" smtClean="0">
                 <a:solidFill>
-                  <a:srgbClr val="111111"/>
+                  <a:srgbClr val="FF0000"/>
                 </a:solidFill>
                 <a:latin typeface="Open Sans" panose="020B0606030504020204" pitchFamily="34" charset="0"/>
                 <a:ea typeface="Open Sans" panose="020B0606030504020204" pitchFamily="34" charset="0"/>
                 <a:cs typeface="Open Sans" panose="020B0606030504020204" pitchFamily="34" charset="0"/>
               </a:rPr>
               <a:t>Security issue:</a:t>
+            </a:r>
+            <a:r>
+              <a:rPr lang="en-AU" sz="3600" b="1" dirty="0" smtClean="0">
+                <a:solidFill>
+                  <a:srgbClr val="111111"/>
+                </a:solidFill>
+                <a:latin typeface="Open Sans" panose="020B0606030504020204" pitchFamily="34" charset="0"/>
+                <a:ea typeface="Open Sans" panose="020B0606030504020204" pitchFamily="34" charset="0"/>
+                <a:cs typeface="Open Sans" panose="020B0606030504020204" pitchFamily="34" charset="0"/>
+              </a:rPr>
+              <a:t/>
             </a:r>
             <a:br>
               <a:rPr lang="en-AU" sz="3600" b="1" dirty="0" smtClean="0">
@@ -3284,28 +3296,28 @@
             <a:r>
               <a:rPr lang="en-AU" sz="3600" b="1" dirty="0" smtClean="0">
                 <a:solidFill>
-                  <a:srgbClr val="111111"/>
-                </a:solidFill>
-                <a:latin typeface="Open Sans" panose="020B0606030504020204" pitchFamily="34" charset="0"/>
-                <a:ea typeface="Open Sans" panose="020B0606030504020204" pitchFamily="34" charset="0"/>
-                <a:cs typeface="Open Sans" panose="020B0606030504020204" pitchFamily="34" charset="0"/>
-              </a:rPr>
-              <a:t>OS </a:t>
+                  <a:srgbClr val="FF0000"/>
+                </a:solidFill>
+                <a:latin typeface="Open Sans" panose="020B0606030504020204" pitchFamily="34" charset="0"/>
+                <a:ea typeface="Open Sans" panose="020B0606030504020204" pitchFamily="34" charset="0"/>
+                <a:cs typeface="Open Sans" panose="020B0606030504020204" pitchFamily="34" charset="0"/>
+              </a:rPr>
+              <a:t>OS / application </a:t>
             </a:r>
             <a:r>
               <a:rPr lang="en-AU" sz="3600" b="1" dirty="0" smtClean="0">
                 <a:solidFill>
-                  <a:srgbClr val="111111"/>
-                </a:solidFill>
-                <a:latin typeface="Open Sans" panose="020B0606030504020204" pitchFamily="34" charset="0"/>
-                <a:ea typeface="Open Sans" panose="020B0606030504020204" pitchFamily="34" charset="0"/>
-                <a:cs typeface="Open Sans" panose="020B0606030504020204" pitchFamily="34" charset="0"/>
-              </a:rPr>
-              <a:t>/ application vulnerabilities:</a:t>
+                  <a:srgbClr val="FF0000"/>
+                </a:solidFill>
+                <a:latin typeface="Open Sans" panose="020B0606030504020204" pitchFamily="34" charset="0"/>
+                <a:ea typeface="Open Sans" panose="020B0606030504020204" pitchFamily="34" charset="0"/>
+                <a:cs typeface="Open Sans" panose="020B0606030504020204" pitchFamily="34" charset="0"/>
+              </a:rPr>
+              <a:t>vulnerabilities</a:t>
             </a:r>
             <a:endParaRPr lang="en-AU" sz="3600" dirty="0">
               <a:solidFill>
-                <a:srgbClr val="111111"/>
+                <a:srgbClr val="FF0000"/>
               </a:solidFill>
               <a:latin typeface="Open Sans" panose="020B0606030504020204" pitchFamily="34" charset="0"/>
               <a:ea typeface="Open Sans" panose="020B0606030504020204" pitchFamily="34" charset="0"/>
@@ -5147,13 +5159,24 @@
             <a:r>
               <a:rPr lang="en-AU" sz="3200" b="1" dirty="0">
                 <a:solidFill>
-                  <a:srgbClr val="111111"/>
+                  <a:srgbClr val="00B050"/>
                 </a:solidFill>
                 <a:latin typeface="Open Sans" panose="020B0606030504020204" pitchFamily="34" charset="0"/>
                 <a:ea typeface="Open Sans" panose="020B0606030504020204" pitchFamily="34" charset="0"/>
                 <a:cs typeface="Open Sans" panose="020B0606030504020204" pitchFamily="34" charset="0"/>
               </a:rPr>
               <a:t>Recommend:</a:t>
+            </a:r>
+            <a:r>
+              <a:rPr lang="en-AU" sz="3200" b="1" dirty="0">
+                <a:solidFill>
+                  <a:srgbClr val="111111"/>
+                </a:solidFill>
+                <a:latin typeface="Open Sans" panose="020B0606030504020204" pitchFamily="34" charset="0"/>
+                <a:ea typeface="Open Sans" panose="020B0606030504020204" pitchFamily="34" charset="0"/>
+                <a:cs typeface="Open Sans" panose="020B0606030504020204" pitchFamily="34" charset="0"/>
+              </a:rPr>
+              <a:t/>
             </a:r>
             <a:br>
               <a:rPr lang="en-AU" sz="3200" b="1" dirty="0">
@@ -7579,40 +7602,7 @@
                 <a:ea typeface="Open Sans" panose="020B0606030504020204" pitchFamily="34" charset="0"/>
                 <a:cs typeface="Open Sans" panose="020B0606030504020204" pitchFamily="34" charset="0"/>
               </a:rPr>
-              <a:t>One software package to </a:t>
-            </a:r>
-            <a:r>
-              <a:rPr lang="en-AU" sz="2600" dirty="0" smtClean="0">
-                <a:solidFill>
-                  <a:srgbClr val="111111"/>
-                </a:solidFill>
-                <a:latin typeface="Open Sans" panose="020B0606030504020204" pitchFamily="34" charset="0"/>
-                <a:ea typeface="Open Sans" panose="020B0606030504020204" pitchFamily="34" charset="0"/>
-                <a:cs typeface="Open Sans" panose="020B0606030504020204" pitchFamily="34" charset="0"/>
-              </a:rPr>
-              <a:t>address</a:t>
-            </a:r>
-            <a:r>
-              <a:rPr lang="en-AU" sz="2600" dirty="0" smtClean="0">
-                <a:solidFill>
-                  <a:srgbClr val="111111"/>
-                </a:solidFill>
-                <a:latin typeface="Open Sans" panose="020B0606030504020204" pitchFamily="34" charset="0"/>
-                <a:ea typeface="Open Sans" panose="020B0606030504020204" pitchFamily="34" charset="0"/>
-                <a:cs typeface="Open Sans" panose="020B0606030504020204" pitchFamily="34" charset="0"/>
-              </a:rPr>
-              <a:t> </a:t>
-            </a:r>
-            <a:r>
-              <a:rPr lang="en-AU" sz="2600" dirty="0" smtClean="0">
-                <a:solidFill>
-                  <a:srgbClr val="111111"/>
-                </a:solidFill>
-                <a:latin typeface="Open Sans" panose="020B0606030504020204" pitchFamily="34" charset="0"/>
-                <a:ea typeface="Open Sans" panose="020B0606030504020204" pitchFamily="34" charset="0"/>
-                <a:cs typeface="Open Sans" panose="020B0606030504020204" pitchFamily="34" charset="0"/>
-              </a:rPr>
-              <a:t>anti-virus and patch management needs</a:t>
+              <a:t>One software package to address anti-virus and patch management needs</a:t>
             </a:r>
           </a:p>
           <a:p>
@@ -7663,29 +7653,7 @@
                 <a:ea typeface="Open Sans" panose="020B0606030504020204" pitchFamily="34" charset="0"/>
                 <a:cs typeface="Open Sans" panose="020B0606030504020204" pitchFamily="34" charset="0"/>
               </a:rPr>
-              <a:t>Other </a:t>
-            </a:r>
-            <a:r>
-              <a:rPr lang="en-AU" sz="2600" dirty="0" smtClean="0">
-                <a:solidFill>
-                  <a:srgbClr val="111111"/>
-                </a:solidFill>
-                <a:latin typeface="Open Sans" panose="020B0606030504020204" pitchFamily="34" charset="0"/>
-                <a:ea typeface="Open Sans" panose="020B0606030504020204" pitchFamily="34" charset="0"/>
-                <a:cs typeface="Open Sans" panose="020B0606030504020204" pitchFamily="34" charset="0"/>
-              </a:rPr>
-              <a:t>anti-virus </a:t>
-            </a:r>
-            <a:r>
-              <a:rPr lang="en-AU" sz="2600" dirty="0" smtClean="0">
-                <a:solidFill>
-                  <a:srgbClr val="111111"/>
-                </a:solidFill>
-                <a:latin typeface="Open Sans" panose="020B0606030504020204" pitchFamily="34" charset="0"/>
-                <a:ea typeface="Open Sans" panose="020B0606030504020204" pitchFamily="34" charset="0"/>
-                <a:cs typeface="Open Sans" panose="020B0606030504020204" pitchFamily="34" charset="0"/>
-              </a:rPr>
-              <a:t>apps reviewed by AV-TEST do not include patch management features</a:t>
+              <a:t>Other anti-virus apps reviewed by AV-TEST do not include patch management features</a:t>
             </a:r>
           </a:p>
           <a:p>
@@ -8029,13 +7997,24 @@
             <a:r>
               <a:rPr lang="en-AU" sz="3600" b="1" dirty="0" smtClean="0">
                 <a:solidFill>
-                  <a:srgbClr val="111111"/>
+                  <a:srgbClr val="FF0000"/>
                 </a:solidFill>
                 <a:latin typeface="Open Sans" panose="020B0606030504020204" pitchFamily="34" charset="0"/>
                 <a:ea typeface="Open Sans" panose="020B0606030504020204" pitchFamily="34" charset="0"/>
                 <a:cs typeface="Open Sans" panose="020B0606030504020204" pitchFamily="34" charset="0"/>
               </a:rPr>
               <a:t>Security issue:</a:t>
+            </a:r>
+            <a:r>
+              <a:rPr lang="en-AU" sz="3600" b="1" dirty="0" smtClean="0">
+                <a:solidFill>
+                  <a:srgbClr val="111111"/>
+                </a:solidFill>
+                <a:latin typeface="Open Sans" panose="020B0606030504020204" pitchFamily="34" charset="0"/>
+                <a:ea typeface="Open Sans" panose="020B0606030504020204" pitchFamily="34" charset="0"/>
+                <a:cs typeface="Open Sans" panose="020B0606030504020204" pitchFamily="34" charset="0"/>
+              </a:rPr>
+              <a:t/>
             </a:r>
             <a:br>
               <a:rPr lang="en-AU" sz="3600" b="1" dirty="0" smtClean="0">
@@ -8050,7 +8029,7 @@
             <a:r>
               <a:rPr lang="en-AU" sz="3600" b="1" dirty="0" smtClean="0">
                 <a:solidFill>
-                  <a:srgbClr val="111111"/>
+                  <a:srgbClr val="FF0000"/>
                 </a:solidFill>
                 <a:latin typeface="Open Sans" panose="020B0606030504020204" pitchFamily="34" charset="0"/>
                 <a:ea typeface="Open Sans" panose="020B0606030504020204" pitchFamily="34" charset="0"/>
@@ -8060,7 +8039,7 @@
             </a:r>
             <a:endParaRPr lang="en-AU" sz="3600" dirty="0">
               <a:solidFill>
-                <a:srgbClr val="111111"/>
+                <a:srgbClr val="FF0000"/>
               </a:solidFill>
               <a:latin typeface="Open Sans" panose="020B0606030504020204" pitchFamily="34" charset="0"/>
               <a:ea typeface="Open Sans" panose="020B0606030504020204" pitchFamily="34" charset="0"/>
@@ -8157,14 +8136,6 @@
               </a:rPr>
               <a:t>User Access Control (UAC) disabled</a:t>
             </a:r>
-            <a:endParaRPr lang="en-AU" sz="2600" dirty="0" smtClean="0">
-              <a:solidFill>
-                <a:srgbClr val="111111"/>
-              </a:solidFill>
-              <a:latin typeface="Open Sans" panose="020B0606030504020204" pitchFamily="34" charset="0"/>
-              <a:ea typeface="Open Sans" panose="020B0606030504020204" pitchFamily="34" charset="0"/>
-              <a:cs typeface="Open Sans" panose="020B0606030504020204" pitchFamily="34" charset="0"/>
-            </a:endParaRPr>
           </a:p>
         </p:txBody>
       </p:sp>
@@ -8311,13 +8282,24 @@
             <a:r>
               <a:rPr lang="en-AU" sz="3200" b="1" dirty="0">
                 <a:solidFill>
-                  <a:srgbClr val="111111"/>
+                  <a:srgbClr val="00B050"/>
                 </a:solidFill>
                 <a:latin typeface="Open Sans" panose="020B0606030504020204" pitchFamily="34" charset="0"/>
                 <a:ea typeface="Open Sans" panose="020B0606030504020204" pitchFamily="34" charset="0"/>
                 <a:cs typeface="Open Sans" panose="020B0606030504020204" pitchFamily="34" charset="0"/>
               </a:rPr>
               <a:t>Recommend:</a:t>
+            </a:r>
+            <a:r>
+              <a:rPr lang="en-AU" sz="3200" b="1" dirty="0">
+                <a:solidFill>
+                  <a:srgbClr val="111111"/>
+                </a:solidFill>
+                <a:latin typeface="Open Sans" panose="020B0606030504020204" pitchFamily="34" charset="0"/>
+                <a:ea typeface="Open Sans" panose="020B0606030504020204" pitchFamily="34" charset="0"/>
+                <a:cs typeface="Open Sans" panose="020B0606030504020204" pitchFamily="34" charset="0"/>
+              </a:rPr>
+              <a:t/>
             </a:r>
             <a:br>
               <a:rPr lang="en-AU" sz="3200" b="1" dirty="0">
@@ -8504,8 +8486,39 @@
                 <a:ea typeface="Open Sans" panose="020B0606030504020204" pitchFamily="34" charset="0"/>
                 <a:cs typeface="Open Sans" panose="020B0606030504020204" pitchFamily="34" charset="0"/>
               </a:rPr>
-              <a:t>creenserver password protection</a:t>
-            </a:r>
+              <a:t>creenserver password </a:t>
+            </a:r>
+            <a:r>
+              <a:rPr lang="en-AU" sz="2600" dirty="0" smtClean="0">
+                <a:solidFill>
+                  <a:srgbClr val="111111"/>
+                </a:solidFill>
+                <a:latin typeface="Open Sans" panose="020B0606030504020204" pitchFamily="34" charset="0"/>
+                <a:ea typeface="Open Sans" panose="020B0606030504020204" pitchFamily="34" charset="0"/>
+                <a:cs typeface="Open Sans" panose="020B0606030504020204" pitchFamily="34" charset="0"/>
+              </a:rPr>
+              <a:t>protection </a:t>
+            </a:r>
+            <a:r>
+              <a:rPr lang="en-AU" sz="2600" dirty="0">
+                <a:solidFill>
+                  <a:srgbClr val="111111"/>
+                </a:solidFill>
+                <a:latin typeface="Open Sans" panose="020B0606030504020204" pitchFamily="34" charset="0"/>
+                <a:ea typeface="Open Sans" panose="020B0606030504020204" pitchFamily="34" charset="0"/>
+                <a:cs typeface="Open Sans" panose="020B0606030504020204" pitchFamily="34" charset="0"/>
+                <a:hlinkClick r:id="rId3"/>
+              </a:rPr>
+              <a:t>(Microsoft n.d.-a)</a:t>
+            </a:r>
+            <a:endParaRPr lang="en-AU" sz="2600" dirty="0" smtClean="0">
+              <a:solidFill>
+                <a:srgbClr val="111111"/>
+              </a:solidFill>
+              <a:latin typeface="Open Sans" panose="020B0606030504020204" pitchFamily="34" charset="0"/>
+              <a:ea typeface="Open Sans" panose="020B0606030504020204" pitchFamily="34" charset="0"/>
+              <a:cs typeface="Open Sans" panose="020B0606030504020204" pitchFamily="34" charset="0"/>
+            </a:endParaRPr>
           </a:p>
           <a:p>
             <a:pPr marL="742950" lvl="1" indent="-285750">
@@ -8521,8 +8534,39 @@
                 <a:ea typeface="Open Sans" panose="020B0606030504020204" pitchFamily="34" charset="0"/>
                 <a:cs typeface="Open Sans" panose="020B0606030504020204" pitchFamily="34" charset="0"/>
               </a:rPr>
-              <a:t>Enable UAC</a:t>
-            </a:r>
+              <a:t>Enable </a:t>
+            </a:r>
+            <a:r>
+              <a:rPr lang="en-AU" sz="2600" dirty="0" smtClean="0">
+                <a:solidFill>
+                  <a:srgbClr val="111111"/>
+                </a:solidFill>
+                <a:latin typeface="Open Sans" panose="020B0606030504020204" pitchFamily="34" charset="0"/>
+                <a:ea typeface="Open Sans" panose="020B0606030504020204" pitchFamily="34" charset="0"/>
+                <a:cs typeface="Open Sans" panose="020B0606030504020204" pitchFamily="34" charset="0"/>
+              </a:rPr>
+              <a:t>UAC </a:t>
+            </a:r>
+            <a:r>
+              <a:rPr lang="en-AU" sz="2600" dirty="0">
+                <a:solidFill>
+                  <a:srgbClr val="111111"/>
+                </a:solidFill>
+                <a:latin typeface="Open Sans" panose="020B0606030504020204" pitchFamily="34" charset="0"/>
+                <a:ea typeface="Open Sans" panose="020B0606030504020204" pitchFamily="34" charset="0"/>
+                <a:cs typeface="Open Sans" panose="020B0606030504020204" pitchFamily="34" charset="0"/>
+                <a:hlinkClick r:id="rId4"/>
+              </a:rPr>
+              <a:t>(Microsoft, 2007)</a:t>
+            </a:r>
+            <a:endParaRPr lang="en-AU" sz="2600" dirty="0" smtClean="0">
+              <a:solidFill>
+                <a:srgbClr val="111111"/>
+              </a:solidFill>
+              <a:latin typeface="Open Sans" panose="020B0606030504020204" pitchFamily="34" charset="0"/>
+              <a:ea typeface="Open Sans" panose="020B0606030504020204" pitchFamily="34" charset="0"/>
+              <a:cs typeface="Open Sans" panose="020B0606030504020204" pitchFamily="34" charset="0"/>
+            </a:endParaRPr>
           </a:p>
           <a:p>
             <a:pPr marL="742950" lvl="1" indent="-285750">
@@ -8538,8 +8582,39 @@
                 <a:ea typeface="Open Sans" panose="020B0606030504020204" pitchFamily="34" charset="0"/>
                 <a:cs typeface="Open Sans" panose="020B0606030504020204" pitchFamily="34" charset="0"/>
               </a:rPr>
-              <a:t>Password policies</a:t>
-            </a:r>
+              <a:t>Password </a:t>
+            </a:r>
+            <a:r>
+              <a:rPr lang="en-AU" sz="2600" dirty="0" smtClean="0">
+                <a:solidFill>
+                  <a:srgbClr val="111111"/>
+                </a:solidFill>
+                <a:latin typeface="Open Sans" panose="020B0606030504020204" pitchFamily="34" charset="0"/>
+                <a:ea typeface="Open Sans" panose="020B0606030504020204" pitchFamily="34" charset="0"/>
+                <a:cs typeface="Open Sans" panose="020B0606030504020204" pitchFamily="34" charset="0"/>
+              </a:rPr>
+              <a:t>strength policies </a:t>
+            </a:r>
+            <a:r>
+              <a:rPr lang="en-AU" sz="2600" dirty="0">
+                <a:solidFill>
+                  <a:srgbClr val="111111"/>
+                </a:solidFill>
+                <a:latin typeface="Open Sans" panose="020B0606030504020204" pitchFamily="34" charset="0"/>
+                <a:ea typeface="Open Sans" panose="020B0606030504020204" pitchFamily="34" charset="0"/>
+                <a:cs typeface="Open Sans" panose="020B0606030504020204" pitchFamily="34" charset="0"/>
+                <a:hlinkClick r:id="rId5"/>
+              </a:rPr>
+              <a:t>(Microsoft, 2012)</a:t>
+            </a:r>
+            <a:endParaRPr lang="en-AU" sz="2600" dirty="0" smtClean="0">
+              <a:solidFill>
+                <a:srgbClr val="111111"/>
+              </a:solidFill>
+              <a:latin typeface="Open Sans" panose="020B0606030504020204" pitchFamily="34" charset="0"/>
+              <a:ea typeface="Open Sans" panose="020B0606030504020204" pitchFamily="34" charset="0"/>
+              <a:cs typeface="Open Sans" panose="020B0606030504020204" pitchFamily="34" charset="0"/>
+            </a:endParaRPr>
           </a:p>
           <a:p>
             <a:pPr marL="742950" lvl="1" indent="-285750">
@@ -8555,8 +8630,50 @@
                 <a:ea typeface="Open Sans" panose="020B0606030504020204" pitchFamily="34" charset="0"/>
                 <a:cs typeface="Open Sans" panose="020B0606030504020204" pitchFamily="34" charset="0"/>
               </a:rPr>
-              <a:t>Account lockout after failed attempts</a:t>
-            </a:r>
+              <a:t>Lock account after </a:t>
+            </a:r>
+            <a:r>
+              <a:rPr lang="en-AU" sz="2600" dirty="0" smtClean="0">
+                <a:solidFill>
+                  <a:srgbClr val="111111"/>
+                </a:solidFill>
+                <a:latin typeface="Open Sans" panose="020B0606030504020204" pitchFamily="34" charset="0"/>
+                <a:ea typeface="Open Sans" panose="020B0606030504020204" pitchFamily="34" charset="0"/>
+                <a:cs typeface="Open Sans" panose="020B0606030504020204" pitchFamily="34" charset="0"/>
+              </a:rPr>
+              <a:t>failed </a:t>
+            </a:r>
+            <a:r>
+              <a:rPr lang="en-AU" sz="2600" dirty="0" smtClean="0">
+                <a:solidFill>
+                  <a:srgbClr val="111111"/>
+                </a:solidFill>
+                <a:latin typeface="Open Sans" panose="020B0606030504020204" pitchFamily="34" charset="0"/>
+                <a:ea typeface="Open Sans" panose="020B0606030504020204" pitchFamily="34" charset="0"/>
+                <a:cs typeface="Open Sans" panose="020B0606030504020204" pitchFamily="34" charset="0"/>
+              </a:rPr>
+              <a:t>attempts </a:t>
+            </a:r>
+            <a:r>
+              <a:rPr lang="en-AU" sz="2600" dirty="0">
+                <a:solidFill>
+                  <a:srgbClr val="111111"/>
+                </a:solidFill>
+                <a:latin typeface="Open Sans" panose="020B0606030504020204" pitchFamily="34" charset="0"/>
+                <a:ea typeface="Open Sans" panose="020B0606030504020204" pitchFamily="34" charset="0"/>
+                <a:cs typeface="Open Sans" panose="020B0606030504020204" pitchFamily="34" charset="0"/>
+                <a:hlinkClick r:id="rId6"/>
+              </a:rPr>
+              <a:t>(Microsoft, 2005b)</a:t>
+            </a:r>
+            <a:endParaRPr lang="en-AU" sz="2600" dirty="0" smtClean="0">
+              <a:solidFill>
+                <a:srgbClr val="111111"/>
+              </a:solidFill>
+              <a:latin typeface="Open Sans" panose="020B0606030504020204" pitchFamily="34" charset="0"/>
+              <a:ea typeface="Open Sans" panose="020B0606030504020204" pitchFamily="34" charset="0"/>
+              <a:cs typeface="Open Sans" panose="020B0606030504020204" pitchFamily="34" charset="0"/>
+            </a:endParaRPr>
           </a:p>
           <a:p>
             <a:pPr marL="285750" indent="-285750">
@@ -8658,7 +8775,43 @@
                 <a:cs typeface="Open Sans" panose="020B0606030504020204" pitchFamily="34" charset="0"/>
                 <a:hlinkClick r:id="rId2"/>
               </a:rPr>
-              <a:t>(conceptdraw.com, n.d.)</a:t>
+              <a:t>(</a:t>
+            </a:r>
+            <a:r>
+              <a:rPr lang="en-AU" sz="2800" b="1" dirty="0" smtClean="0">
+                <a:solidFill>
+                  <a:srgbClr val="111111"/>
+                </a:solidFill>
+                <a:latin typeface="Open Sans" panose="020B0606030504020204" pitchFamily="34" charset="0"/>
+                <a:ea typeface="Open Sans" panose="020B0606030504020204" pitchFamily="34" charset="0"/>
+                <a:cs typeface="Open Sans" panose="020B0606030504020204" pitchFamily="34" charset="0"/>
+                <a:hlinkClick r:id="rId2"/>
+              </a:rPr>
+              <a:t>Concept Draw</a:t>
+            </a:r>
+            <a:r>
+              <a:rPr lang="en-AU" sz="2800" b="1" dirty="0" smtClean="0">
+                <a:solidFill>
+                  <a:srgbClr val="111111"/>
+                </a:solidFill>
+                <a:latin typeface="Open Sans" panose="020B0606030504020204" pitchFamily="34" charset="0"/>
+                <a:ea typeface="Open Sans" panose="020B0606030504020204" pitchFamily="34" charset="0"/>
+                <a:cs typeface="Open Sans" panose="020B0606030504020204" pitchFamily="34" charset="0"/>
+                <a:hlinkClick r:id="rId2"/>
+              </a:rPr>
+              <a:t>, </a:t>
+            </a:r>
+            <a:r>
+              <a:rPr lang="en-AU" sz="2800" b="1" dirty="0" smtClean="0">
+                <a:solidFill>
+                  <a:srgbClr val="111111"/>
+                </a:solidFill>
+                <a:latin typeface="Open Sans" panose="020B0606030504020204" pitchFamily="34" charset="0"/>
+                <a:ea typeface="Open Sans" panose="020B0606030504020204" pitchFamily="34" charset="0"/>
+                <a:cs typeface="Open Sans" panose="020B0606030504020204" pitchFamily="34" charset="0"/>
+                <a:hlinkClick r:id="rId2"/>
+              </a:rPr>
+              <a:t>n.d.)</a:t>
             </a:r>
             <a:endParaRPr lang="en-AU" sz="2800" dirty="0">
               <a:solidFill>
@@ -8823,7 +8976,7 @@
         <p:spPr>
           <a:xfrm>
             <a:off x="1524000" y="1745483"/>
-            <a:ext cx="9144000" cy="4893647"/>
+            <a:ext cx="9144000" cy="2492990"/>
           </a:xfrm>
           <a:prstGeom prst="rect">
             <a:avLst/>
@@ -8866,7 +9019,7 @@
                 <a:ea typeface="Open Sans" panose="020B0606030504020204" pitchFamily="34" charset="0"/>
                 <a:cs typeface="Open Sans" panose="020B0606030504020204" pitchFamily="34" charset="0"/>
               </a:rPr>
-              <a:t>As opposed to Novell ZenWorks</a:t>
+              <a:t>As opposed to alternatives like Novell ZenWorks</a:t>
             </a:r>
           </a:p>
           <a:p>
@@ -8922,7 +9075,7 @@
                 <a:ea typeface="Open Sans" panose="020B0606030504020204" pitchFamily="34" charset="0"/>
                 <a:cs typeface="Open Sans" panose="020B0606030504020204" pitchFamily="34" charset="0"/>
               </a:rPr>
-              <a:t>to Domain Controller before </a:t>
+              <a:t>before </a:t>
             </a:r>
             <a:r>
               <a:rPr lang="en-AU" sz="2600" dirty="0">
@@ -8961,14 +9114,8 @@
                 <a:ea typeface="Open Sans" panose="020B0606030504020204" pitchFamily="34" charset="0"/>
                 <a:cs typeface="Open Sans" panose="020B0606030504020204" pitchFamily="34" charset="0"/>
               </a:rPr>
-              <a:t>Security settings for all devices enforced consistently</a:t>
-            </a:r>
-          </a:p>
-          <a:p>
-            <a:pPr marL="742950" lvl="1" indent="-285750">
-              <a:buFont typeface="Arial" panose="020B0604020202020204" pitchFamily="34" charset="0"/>
-              <a:buChar char="•"/>
-            </a:pPr>
+              <a:t>Security </a:t>
+            </a:r>
             <a:r>
               <a:rPr lang="en-AU" sz="2600" dirty="0" smtClean="0">
                 <a:solidFill>
@@ -8978,19 +9125,7 @@
                 <a:ea typeface="Open Sans" panose="020B0606030504020204" pitchFamily="34" charset="0"/>
                 <a:cs typeface="Open Sans" panose="020B0606030504020204" pitchFamily="34" charset="0"/>
               </a:rPr>
-              <a:t>Screensaver password protection </a:t>
-            </a:r>
-            <a:r>
-              <a:rPr lang="en-AU" sz="2600" dirty="0">
-                <a:solidFill>
-                  <a:srgbClr val="111111"/>
-                </a:solidFill>
-                <a:latin typeface="Open Sans" panose="020B0606030504020204" pitchFamily="34" charset="0"/>
-                <a:ea typeface="Open Sans" panose="020B0606030504020204" pitchFamily="34" charset="0"/>
-                <a:cs typeface="Open Sans" panose="020B0606030504020204" pitchFamily="34" charset="0"/>
-                <a:hlinkClick r:id="rId2"/>
-              </a:rPr>
-              <a:t>(Microsoft n.d.-a</a:t>
+              <a:t>settings </a:t>
             </a:r>
             <a:r>
               <a:rPr lang="en-AU" sz="2600" dirty="0" smtClean="0">
@@ -9000,9 +9135,19 @@
                 <a:latin typeface="Open Sans" panose="020B0606030504020204" pitchFamily="34" charset="0"/>
                 <a:ea typeface="Open Sans" panose="020B0606030504020204" pitchFamily="34" charset="0"/>
                 <a:cs typeface="Open Sans" panose="020B0606030504020204" pitchFamily="34" charset="0"/>
-                <a:hlinkClick r:id="rId2"/>
-              </a:rPr>
-              <a:t>)</a:t>
+              </a:rPr>
+              <a:t>enforced </a:t>
+            </a:r>
+            <a:r>
+              <a:rPr lang="en-AU" sz="2600" dirty="0" smtClean="0">
+                <a:solidFill>
+                  <a:srgbClr val="111111"/>
+                </a:solidFill>
+                <a:latin typeface="Open Sans" panose="020B0606030504020204" pitchFamily="34" charset="0"/>
+                <a:ea typeface="Open Sans" panose="020B0606030504020204" pitchFamily="34" charset="0"/>
+                <a:cs typeface="Open Sans" panose="020B0606030504020204" pitchFamily="34" charset="0"/>
+              </a:rPr>
+              <a:t>consistently across all devices</a:t>
             </a:r>
             <a:endParaRPr lang="en-AU" sz="2600" dirty="0" smtClean="0">
               <a:solidFill>
@@ -9013,182 +9158,107 @@
               <a:cs typeface="Open Sans" panose="020B0606030504020204" pitchFamily="34" charset="0"/>
             </a:endParaRPr>
           </a:p>
-          <a:p>
-            <a:pPr marL="742950" lvl="1" indent="-285750">
-              <a:buFont typeface="Arial" panose="020B0604020202020204" pitchFamily="34" charset="0"/>
-              <a:buChar char="•"/>
-            </a:pPr>
-            <a:r>
-              <a:rPr lang="en-AU" sz="2600" dirty="0" smtClean="0">
-                <a:solidFill>
-                  <a:srgbClr val="111111"/>
-                </a:solidFill>
-                <a:latin typeface="Open Sans" panose="020B0606030504020204" pitchFamily="34" charset="0"/>
-                <a:ea typeface="Open Sans" panose="020B0606030504020204" pitchFamily="34" charset="0"/>
-                <a:cs typeface="Open Sans" panose="020B0606030504020204" pitchFamily="34" charset="0"/>
-              </a:rPr>
-              <a:t>UAC enabled </a:t>
-            </a:r>
-            <a:r>
-              <a:rPr lang="en-AU" sz="2600" dirty="0">
-                <a:solidFill>
-                  <a:srgbClr val="111111"/>
-                </a:solidFill>
+        </p:txBody>
+      </p:sp>
+      <p:pic>
+        <p:nvPicPr>
+          <p:cNvPr id="1026" name="Picture 2" descr="http://cdn.morguefile.com/imageData/public/files/j/jppi/preview/fldr_2008_11_17/file0001992883775.jpg"/>
+          <p:cNvPicPr>
+            <a:picLocks noChangeAspect="1" noChangeArrowheads="1"/>
+          </p:cNvPicPr>
+          <p:nvPr/>
+        </p:nvPicPr>
+        <p:blipFill>
+          <a:blip r:embed="rId2" cstate="print">
+            <a:extLst>
+              <a:ext uri="{28A0092B-C50C-407E-A947-70E740481C1C}">
+                <a14:useLocalDpi xmlns:a14="http://schemas.microsoft.com/office/drawing/2010/main" val="0"/>
+              </a:ext>
+            </a:extLst>
+          </a:blip>
+          <a:srcRect/>
+          <a:stretch>
+            <a:fillRect/>
+          </a:stretch>
+        </p:blipFill>
+        <p:spPr bwMode="auto">
+          <a:xfrm>
+            <a:off x="4937410" y="4402402"/>
+            <a:ext cx="2317180" cy="1737886"/>
+          </a:xfrm>
+          <a:prstGeom prst="rect">
+            <a:avLst/>
+          </a:prstGeom>
+          <a:noFill/>
+          <a:effectLst>
+            <a:outerShdw blurRad="50800" dist="38100" dir="2700000" algn="tl" rotWithShape="0">
+              <a:prstClr val="black">
+                <a:alpha val="40000"/>
+              </a:prstClr>
+            </a:outerShdw>
+          </a:effectLst>
+          <a:extLst>
+            <a:ext uri="{909E8E84-426E-40DD-AFC4-6F175D3DCCD1}">
+              <a14:hiddenFill xmlns:a14="http://schemas.microsoft.com/office/drawing/2010/main">
+                <a:solidFill>
+                  <a:srgbClr val="FFFFFF"/>
+                </a:solidFill>
+              </a14:hiddenFill>
+            </a:ext>
+          </a:extLst>
+        </p:spPr>
+      </p:pic>
+      <p:sp>
+        <p:nvSpPr>
+          <p:cNvPr id="6" name="TextBox 5"/>
+          <p:cNvSpPr txBox="1"/>
+          <p:nvPr/>
+        </p:nvSpPr>
+        <p:spPr>
+          <a:xfrm>
+            <a:off x="4937411" y="6140288"/>
+            <a:ext cx="2317180" cy="401200"/>
+          </a:xfrm>
+          <a:prstGeom prst="rect">
+            <a:avLst/>
+          </a:prstGeom>
+          <a:noFill/>
+        </p:spPr>
+        <p:txBody>
+          <a:bodyPr wrap="square" tIns="46800" rtlCol="0">
+            <a:spAutoFit/>
+          </a:bodyPr>
+          <a:lstStyle/>
+          <a:p>
+            <a:pPr algn="ctr"/>
+            <a:r>
+              <a:rPr lang="en-AU" sz="2000" dirty="0" smtClean="0">
                 <a:latin typeface="Open Sans" panose="020B0606030504020204" pitchFamily="34" charset="0"/>
                 <a:ea typeface="Open Sans" panose="020B0606030504020204" pitchFamily="34" charset="0"/>
                 <a:cs typeface="Open Sans" panose="020B0606030504020204" pitchFamily="34" charset="0"/>
                 <a:hlinkClick r:id="rId3"/>
               </a:rPr>
-              <a:t>(Microsoft, </a:t>
-            </a:r>
-            <a:r>
-              <a:rPr lang="en-AU" sz="2600" dirty="0" smtClean="0">
-                <a:solidFill>
-                  <a:srgbClr val="111111"/>
-                </a:solidFill>
+              <a:t>(</a:t>
+            </a:r>
+            <a:r>
+              <a:rPr lang="en-AU" sz="2000" dirty="0" smtClean="0">
                 <a:latin typeface="Open Sans" panose="020B0606030504020204" pitchFamily="34" charset="0"/>
                 <a:ea typeface="Open Sans" panose="020B0606030504020204" pitchFamily="34" charset="0"/>
                 <a:cs typeface="Open Sans" panose="020B0606030504020204" pitchFamily="34" charset="0"/>
                 <a:hlinkClick r:id="rId3"/>
               </a:rPr>
-              <a:t>2007)</a:t>
-            </a:r>
-            <a:endParaRPr lang="en-AU" sz="2600" dirty="0">
-              <a:solidFill>
-                <a:srgbClr val="111111"/>
-              </a:solidFill>
-              <a:latin typeface="Open Sans" panose="020B0606030504020204" pitchFamily="34" charset="0"/>
-              <a:ea typeface="Open Sans" panose="020B0606030504020204" pitchFamily="34" charset="0"/>
-              <a:cs typeface="Open Sans" panose="020B0606030504020204" pitchFamily="34" charset="0"/>
-            </a:endParaRPr>
-          </a:p>
-          <a:p>
-            <a:pPr marL="742950" lvl="1" indent="-285750">
-              <a:buFont typeface="Arial" panose="020B0604020202020204" pitchFamily="34" charset="0"/>
-              <a:buChar char="•"/>
-            </a:pPr>
-            <a:r>
-              <a:rPr lang="en-AU" sz="2600" dirty="0" smtClean="0">
-                <a:solidFill>
-                  <a:srgbClr val="111111"/>
-                </a:solidFill>
-                <a:latin typeface="Open Sans" panose="020B0606030504020204" pitchFamily="34" charset="0"/>
-                <a:ea typeface="Open Sans" panose="020B0606030504020204" pitchFamily="34" charset="0"/>
-                <a:cs typeface="Open Sans" panose="020B0606030504020204" pitchFamily="34" charset="0"/>
-              </a:rPr>
-              <a:t>Enforce password strength policy </a:t>
-            </a:r>
-            <a:r>
-              <a:rPr lang="en-AU" sz="2600" dirty="0">
-                <a:solidFill>
-                  <a:srgbClr val="111111"/>
-                </a:solidFill>
-                <a:latin typeface="Open Sans" panose="020B0606030504020204" pitchFamily="34" charset="0"/>
-                <a:ea typeface="Open Sans" panose="020B0606030504020204" pitchFamily="34" charset="0"/>
-                <a:cs typeface="Open Sans" panose="020B0606030504020204" pitchFamily="34" charset="0"/>
-                <a:hlinkClick r:id="rId4"/>
-              </a:rPr>
-              <a:t>(Microsoft, 2012</a:t>
-            </a:r>
-            <a:r>
-              <a:rPr lang="en-AU" sz="2600" dirty="0" smtClean="0">
-                <a:solidFill>
-                  <a:srgbClr val="111111"/>
-                </a:solidFill>
-                <a:latin typeface="Open Sans" panose="020B0606030504020204" pitchFamily="34" charset="0"/>
-                <a:ea typeface="Open Sans" panose="020B0606030504020204" pitchFamily="34" charset="0"/>
-                <a:cs typeface="Open Sans" panose="020B0606030504020204" pitchFamily="34" charset="0"/>
-                <a:hlinkClick r:id="rId4"/>
-              </a:rPr>
-              <a:t>)</a:t>
-            </a:r>
-            <a:endParaRPr lang="en-AU" sz="2600" dirty="0" smtClean="0">
-              <a:solidFill>
-                <a:srgbClr val="111111"/>
-              </a:solidFill>
-              <a:latin typeface="Open Sans" panose="020B0606030504020204" pitchFamily="34" charset="0"/>
-              <a:ea typeface="Open Sans" panose="020B0606030504020204" pitchFamily="34" charset="0"/>
-              <a:cs typeface="Open Sans" panose="020B0606030504020204" pitchFamily="34" charset="0"/>
-            </a:endParaRPr>
-          </a:p>
-          <a:p>
-            <a:pPr marL="742950" lvl="1" indent="-285750">
-              <a:buFont typeface="Arial" panose="020B0604020202020204" pitchFamily="34" charset="0"/>
-              <a:buChar char="•"/>
-            </a:pPr>
-            <a:r>
-              <a:rPr lang="en-AU" sz="2600" dirty="0" smtClean="0">
-                <a:solidFill>
-                  <a:srgbClr val="111111"/>
-                </a:solidFill>
-                <a:latin typeface="Open Sans" panose="020B0606030504020204" pitchFamily="34" charset="0"/>
-                <a:ea typeface="Open Sans" panose="020B0606030504020204" pitchFamily="34" charset="0"/>
-                <a:cs typeface="Open Sans" panose="020B0606030504020204" pitchFamily="34" charset="0"/>
-              </a:rPr>
-              <a:t>Lock account after 3 failed attempts</a:t>
-            </a:r>
-          </a:p>
-          <a:p>
-            <a:pPr marL="1200150" lvl="2" indent="-285750">
-              <a:buFont typeface="Arial" panose="020B0604020202020204" pitchFamily="34" charset="0"/>
-              <a:buChar char="•"/>
-            </a:pPr>
-            <a:r>
-              <a:rPr lang="en-AU" sz="2600" dirty="0" smtClean="0">
-                <a:solidFill>
-                  <a:srgbClr val="111111"/>
-                </a:solidFill>
-                <a:latin typeface="Open Sans" panose="020B0606030504020204" pitchFamily="34" charset="0"/>
-                <a:ea typeface="Open Sans" panose="020B0606030504020204" pitchFamily="34" charset="0"/>
-                <a:cs typeface="Open Sans" panose="020B0606030504020204" pitchFamily="34" charset="0"/>
-              </a:rPr>
-              <a:t>Mitigate brute-force attack</a:t>
-            </a:r>
-          </a:p>
-          <a:p>
-            <a:pPr marL="285750" indent="-285750">
-              <a:buFont typeface="Arial" panose="020B0604020202020204" pitchFamily="34" charset="0"/>
-              <a:buChar char="•"/>
-            </a:pPr>
-            <a:r>
-              <a:rPr lang="en-AU" sz="2600" dirty="0" smtClean="0">
-                <a:solidFill>
-                  <a:srgbClr val="111111"/>
-                </a:solidFill>
-                <a:latin typeface="Open Sans" panose="020B0606030504020204" pitchFamily="34" charset="0"/>
-                <a:ea typeface="Open Sans" panose="020B0606030504020204" pitchFamily="34" charset="0"/>
-                <a:cs typeface="Open Sans" panose="020B0606030504020204" pitchFamily="34" charset="0"/>
-              </a:rPr>
-              <a:t>Enforce user rights </a:t>
-            </a:r>
-            <a:r>
-              <a:rPr lang="en-AU" sz="2600" dirty="0">
-                <a:solidFill>
-                  <a:srgbClr val="111111"/>
-                </a:solidFill>
-                <a:latin typeface="Open Sans" panose="020B0606030504020204" pitchFamily="34" charset="0"/>
-                <a:ea typeface="Open Sans" panose="020B0606030504020204" pitchFamily="34" charset="0"/>
-                <a:cs typeface="Open Sans" panose="020B0606030504020204" pitchFamily="34" charset="0"/>
-                <a:hlinkClick r:id="rId5"/>
-              </a:rPr>
-              <a:t>(Microsoft, 2005b</a:t>
-            </a:r>
-            <a:r>
-              <a:rPr lang="en-AU" sz="2600" dirty="0" smtClean="0">
-                <a:solidFill>
-                  <a:srgbClr val="111111"/>
-                </a:solidFill>
-                <a:latin typeface="Open Sans" panose="020B0606030504020204" pitchFamily="34" charset="0"/>
-                <a:ea typeface="Open Sans" panose="020B0606030504020204" pitchFamily="34" charset="0"/>
-                <a:cs typeface="Open Sans" panose="020B0606030504020204" pitchFamily="34" charset="0"/>
-                <a:hlinkClick r:id="rId5"/>
-              </a:rPr>
-              <a:t>)</a:t>
-            </a:r>
-            <a:endParaRPr lang="en-AU" sz="2600" dirty="0">
-              <a:solidFill>
-                <a:srgbClr val="111111"/>
-              </a:solidFill>
+              <a:t>jppi</a:t>
+            </a:r>
+            <a:r>
+              <a:rPr lang="en-AU" sz="2000" dirty="0" smtClean="0">
+                <a:latin typeface="Open Sans" panose="020B0606030504020204" pitchFamily="34" charset="0"/>
+                <a:ea typeface="Open Sans" panose="020B0606030504020204" pitchFamily="34" charset="0"/>
+                <a:cs typeface="Open Sans" panose="020B0606030504020204" pitchFamily="34" charset="0"/>
+                <a:hlinkClick r:id="rId3"/>
+              </a:rPr>
+              <a:t>, 2007)</a:t>
+            </a:r>
+            <a:endParaRPr lang="en-AU" sz="2000" dirty="0">
               <a:latin typeface="Open Sans" panose="020B0606030504020204" pitchFamily="34" charset="0"/>
               <a:ea typeface="Open Sans" panose="020B0606030504020204" pitchFamily="34" charset="0"/>
               <a:cs typeface="Open Sans" panose="020B0606030504020204" pitchFamily="34" charset="0"/>
@@ -9451,7 +9521,7 @@
             <a:r>
               <a:rPr lang="en-AU" sz="3200" b="1" dirty="0" smtClean="0">
                 <a:solidFill>
-                  <a:srgbClr val="111111"/>
+                  <a:srgbClr val="FF0000"/>
                 </a:solidFill>
                 <a:latin typeface="Open Sans" panose="020B0606030504020204" pitchFamily="34" charset="0"/>
                 <a:ea typeface="Open Sans" panose="020B0606030504020204" pitchFamily="34" charset="0"/>
@@ -9462,7 +9532,7 @@
             <a:br>
               <a:rPr lang="en-AU" sz="3200" b="1" dirty="0" smtClean="0">
                 <a:solidFill>
-                  <a:srgbClr val="111111"/>
+                  <a:srgbClr val="FF0000"/>
                 </a:solidFill>
                 <a:latin typeface="Open Sans" panose="020B0606030504020204" pitchFamily="34" charset="0"/>
                 <a:ea typeface="Open Sans" panose="020B0606030504020204" pitchFamily="34" charset="0"/>
@@ -9472,28 +9542,17 @@
             <a:r>
               <a:rPr lang="en-AU" sz="3200" b="1" dirty="0" smtClean="0">
                 <a:solidFill>
-                  <a:srgbClr val="111111"/>
-                </a:solidFill>
-                <a:latin typeface="Open Sans" panose="020B0606030504020204" pitchFamily="34" charset="0"/>
-                <a:ea typeface="Open Sans" panose="020B0606030504020204" pitchFamily="34" charset="0"/>
-                <a:cs typeface="Open Sans" panose="020B0606030504020204" pitchFamily="34" charset="0"/>
-              </a:rPr>
-              <a:t>Passwords </a:t>
-            </a:r>
-            <a:r>
-              <a:rPr lang="en-AU" sz="3200" b="1" dirty="0" smtClean="0">
-                <a:solidFill>
-                  <a:srgbClr val="111111"/>
-                </a:solidFill>
-                <a:latin typeface="Open Sans" panose="020B0606030504020204" pitchFamily="34" charset="0"/>
-                <a:ea typeface="Open Sans" panose="020B0606030504020204" pitchFamily="34" charset="0"/>
-                <a:cs typeface="Open Sans" panose="020B0606030504020204" pitchFamily="34" charset="0"/>
-              </a:rPr>
-              <a:t>in plaintext</a:t>
+                  <a:srgbClr val="FF0000"/>
+                </a:solidFill>
+                <a:latin typeface="Open Sans" panose="020B0606030504020204" pitchFamily="34" charset="0"/>
+                <a:ea typeface="Open Sans" panose="020B0606030504020204" pitchFamily="34" charset="0"/>
+                <a:cs typeface="Open Sans" panose="020B0606030504020204" pitchFamily="34" charset="0"/>
+              </a:rPr>
+              <a:t>Passwords in plaintext</a:t>
             </a:r>
             <a:endParaRPr lang="en-AU" sz="3200" dirty="0">
               <a:solidFill>
-                <a:srgbClr val="111111"/>
+                <a:srgbClr val="FF0000"/>
               </a:solidFill>
               <a:latin typeface="Open Sans" panose="020B0606030504020204" pitchFamily="34" charset="0"/>
               <a:ea typeface="Open Sans" panose="020B0606030504020204" pitchFamily="34" charset="0"/>
@@ -9662,13 +9721,24 @@
             <a:r>
               <a:rPr lang="en-AU" sz="3200" b="1" dirty="0" smtClean="0">
                 <a:solidFill>
-                  <a:srgbClr val="111111"/>
+                  <a:srgbClr val="00B050"/>
                 </a:solidFill>
                 <a:latin typeface="Open Sans" panose="020B0606030504020204" pitchFamily="34" charset="0"/>
                 <a:ea typeface="Open Sans" panose="020B0606030504020204" pitchFamily="34" charset="0"/>
                 <a:cs typeface="Open Sans" panose="020B0606030504020204" pitchFamily="34" charset="0"/>
               </a:rPr>
               <a:t>Recommend:</a:t>
+            </a:r>
+            <a:r>
+              <a:rPr lang="en-AU" sz="3200" b="1" dirty="0" smtClean="0">
+                <a:solidFill>
+                  <a:srgbClr val="111111"/>
+                </a:solidFill>
+                <a:latin typeface="Open Sans" panose="020B0606030504020204" pitchFamily="34" charset="0"/>
+                <a:ea typeface="Open Sans" panose="020B0606030504020204" pitchFamily="34" charset="0"/>
+                <a:cs typeface="Open Sans" panose="020B0606030504020204" pitchFamily="34" charset="0"/>
+              </a:rPr>
+              <a:t/>
             </a:r>
             <a:br>
               <a:rPr lang="en-AU" sz="3200" b="1" dirty="0" smtClean="0">
@@ -9711,7 +9781,7 @@
         <p:spPr>
           <a:xfrm>
             <a:off x="1524000" y="2241731"/>
-            <a:ext cx="9144000" cy="4093428"/>
+            <a:ext cx="9144000" cy="2893100"/>
           </a:xfrm>
           <a:prstGeom prst="rect">
             <a:avLst/>
@@ -9790,55 +9860,6 @@
               </a:rPr>
               <a:t>ie. Sticky notes</a:t>
             </a:r>
-          </a:p>
-          <a:p>
-            <a:pPr marL="742950" lvl="1" indent="-285750">
-              <a:buFont typeface="Arial" panose="020B0604020202020204" pitchFamily="34" charset="0"/>
-              <a:buChar char="•"/>
-            </a:pPr>
-            <a:r>
-              <a:rPr lang="en-AU" sz="2600" dirty="0" smtClean="0">
-                <a:solidFill>
-                  <a:srgbClr val="111111"/>
-                </a:solidFill>
-                <a:latin typeface="Open Sans" panose="020B0606030504020204" pitchFamily="34" charset="0"/>
-                <a:ea typeface="Open Sans" panose="020B0606030504020204" pitchFamily="34" charset="0"/>
-                <a:cs typeface="Open Sans" panose="020B0606030504020204" pitchFamily="34" charset="0"/>
-              </a:rPr>
-              <a:t>Recent disclosure of French TV social network passwords on YouTube via sticky notes behind a reporter during an interview </a:t>
-            </a:r>
-            <a:r>
-              <a:rPr lang="en-AU" sz="2600" dirty="0">
-                <a:solidFill>
-                  <a:srgbClr val="111111"/>
-                </a:solidFill>
-                <a:latin typeface="Open Sans" panose="020B0606030504020204" pitchFamily="34" charset="0"/>
-                <a:ea typeface="Open Sans" panose="020B0606030504020204" pitchFamily="34" charset="0"/>
-                <a:cs typeface="Open Sans" panose="020B0606030504020204" pitchFamily="34" charset="0"/>
-                <a:hlinkClick r:id="rId2"/>
-              </a:rPr>
-              <a:t>(Machkovech, 2015</a:t>
-            </a:r>
-            <a:r>
-              <a:rPr lang="en-AU" sz="2600" dirty="0" smtClean="0">
-                <a:solidFill>
-                  <a:srgbClr val="111111"/>
-                </a:solidFill>
-                <a:latin typeface="Open Sans" panose="020B0606030504020204" pitchFamily="34" charset="0"/>
-                <a:ea typeface="Open Sans" panose="020B0606030504020204" pitchFamily="34" charset="0"/>
-                <a:cs typeface="Open Sans" panose="020B0606030504020204" pitchFamily="34" charset="0"/>
-                <a:hlinkClick r:id="rId2"/>
-              </a:rPr>
-              <a:t>)</a:t>
-            </a:r>
-            <a:endParaRPr lang="en-AU" sz="2600" dirty="0" smtClean="0">
-              <a:solidFill>
-                <a:srgbClr val="111111"/>
-              </a:solidFill>
-              <a:latin typeface="Open Sans" panose="020B0606030504020204" pitchFamily="34" charset="0"/>
-              <a:ea typeface="Open Sans" panose="020B0606030504020204" pitchFamily="34" charset="0"/>
-              <a:cs typeface="Open Sans" panose="020B0606030504020204" pitchFamily="34" charset="0"/>
-            </a:endParaRPr>
           </a:p>
           <a:p>
             <a:pPr marL="742950" lvl="1" indent="-285750">
@@ -9928,30 +9949,30 @@
         </p:nvSpPr>
         <p:spPr>
           <a:xfrm>
-            <a:off x="1524000" y="-1470455"/>
-            <a:ext cx="9144000" cy="2917370"/>
+            <a:off x="1524000" y="0"/>
+            <a:ext cx="9144000" cy="1983545"/>
           </a:xfrm>
         </p:spPr>
         <p:txBody>
-          <a:bodyPr anchor="b">
-            <a:normAutofit/>
+          <a:bodyPr tIns="612000" bIns="612000" anchor="t">
+            <a:noAutofit/>
           </a:bodyPr>
           <a:lstStyle/>
           <a:p>
             <a:pPr algn="l"/>
             <a:r>
-              <a:rPr lang="en-AU" sz="3200" b="1" dirty="0" smtClean="0">
-                <a:solidFill>
-                  <a:srgbClr val="111111"/>
-                </a:solidFill>
-                <a:latin typeface="Open Sans" panose="020B0606030504020204" pitchFamily="34" charset="0"/>
-                <a:ea typeface="Open Sans" panose="020B0606030504020204" pitchFamily="34" charset="0"/>
-                <a:cs typeface="Open Sans" panose="020B0606030504020204" pitchFamily="34" charset="0"/>
-              </a:rPr>
-              <a:t/>
+              <a:rPr lang="en-AU" sz="2800" b="1" dirty="0" smtClean="0">
+                <a:solidFill>
+                  <a:srgbClr val="111111"/>
+                </a:solidFill>
+                <a:latin typeface="Open Sans" panose="020B0606030504020204" pitchFamily="34" charset="0"/>
+                <a:ea typeface="Open Sans" panose="020B0606030504020204" pitchFamily="34" charset="0"/>
+                <a:cs typeface="Open Sans" panose="020B0606030504020204" pitchFamily="34" charset="0"/>
+              </a:rPr>
+              <a:t>Sticky-note password disclosure on TV</a:t>
             </a:r>
             <a:br>
-              <a:rPr lang="en-AU" sz="3200" b="1" dirty="0" smtClean="0">
+              <a:rPr lang="en-AU" sz="2800" b="1" dirty="0" smtClean="0">
                 <a:solidFill>
                   <a:srgbClr val="111111"/>
                 </a:solidFill>
@@ -9961,49 +9982,18 @@
               </a:rPr>
             </a:br>
             <a:r>
-              <a:rPr lang="en-AU" sz="3200" b="1" dirty="0" smtClean="0">
-                <a:solidFill>
-                  <a:srgbClr val="111111"/>
-                </a:solidFill>
-                <a:latin typeface="Open Sans" panose="020B0606030504020204" pitchFamily="34" charset="0"/>
-                <a:ea typeface="Open Sans" panose="020B0606030504020204" pitchFamily="34" charset="0"/>
-                <a:cs typeface="Open Sans" panose="020B0606030504020204" pitchFamily="34" charset="0"/>
-              </a:rPr>
-              <a:t>Security issue:</a:t>
-            </a:r>
-            <a:br>
-              <a:rPr lang="en-AU" sz="3200" b="1" dirty="0" smtClean="0">
-                <a:solidFill>
-                  <a:srgbClr val="111111"/>
-                </a:solidFill>
-                <a:latin typeface="Open Sans" panose="020B0606030504020204" pitchFamily="34" charset="0"/>
-                <a:ea typeface="Open Sans" panose="020B0606030504020204" pitchFamily="34" charset="0"/>
-                <a:cs typeface="Open Sans" panose="020B0606030504020204" pitchFamily="34" charset="0"/>
-              </a:rPr>
-            </a:br>
-            <a:r>
-              <a:rPr lang="en-AU" sz="3200" b="1" dirty="0" smtClean="0">
-                <a:solidFill>
-                  <a:srgbClr val="111111"/>
-                </a:solidFill>
-                <a:latin typeface="Open Sans" panose="020B0606030504020204" pitchFamily="34" charset="0"/>
-                <a:ea typeface="Open Sans" panose="020B0606030504020204" pitchFamily="34" charset="0"/>
-                <a:cs typeface="Open Sans" panose="020B0606030504020204" pitchFamily="34" charset="0"/>
-              </a:rPr>
-              <a:t>mIRC </a:t>
-            </a:r>
-            <a:r>
-              <a:rPr lang="en-AU" sz="3200" b="1" dirty="0" smtClean="0">
-                <a:solidFill>
-                  <a:srgbClr val="111111"/>
-                </a:solidFill>
-                <a:latin typeface="Open Sans" panose="020B0606030504020204" pitchFamily="34" charset="0"/>
-                <a:ea typeface="Open Sans" panose="020B0606030504020204" pitchFamily="34" charset="0"/>
-                <a:cs typeface="Open Sans" panose="020B0606030504020204" pitchFamily="34" charset="0"/>
-              </a:rPr>
-              <a:t>Internet Relay Chat</a:t>
-            </a:r>
-            <a:endParaRPr lang="en-AU" sz="3200" dirty="0">
+              <a:rPr lang="en-AU" sz="2800" b="1" dirty="0" smtClean="0">
+                <a:solidFill>
+                  <a:srgbClr val="111111"/>
+                </a:solidFill>
+                <a:latin typeface="Open Sans" panose="020B0606030504020204" pitchFamily="34" charset="0"/>
+                <a:ea typeface="Open Sans" panose="020B0606030504020204" pitchFamily="34" charset="0"/>
+                <a:cs typeface="Open Sans" panose="020B0606030504020204" pitchFamily="34" charset="0"/>
+                <a:hlinkClick r:id="rId2"/>
+              </a:rPr>
+              <a:t>(@pent0thal, 2015)</a:t>
+            </a:r>
+            <a:endParaRPr lang="en-AU" sz="2800" dirty="0">
               <a:solidFill>
                 <a:srgbClr val="111111"/>
               </a:solidFill>
@@ -10014,126 +10004,51 @@
           </a:p>
         </p:txBody>
       </p:sp>
-      <p:sp>
-        <p:nvSpPr>
-          <p:cNvPr id="2" name="TextBox 1"/>
-          <p:cNvSpPr txBox="1"/>
+      <p:pic>
+        <p:nvPicPr>
+          <p:cNvPr id="1028" name="Picture 4" descr="https://pbs.twimg.com/media/CCKgoRMWMAAUyeO.jpg:large"/>
+          <p:cNvPicPr>
+            <a:picLocks noChangeAspect="1" noChangeArrowheads="1"/>
+          </p:cNvPicPr>
           <p:nvPr/>
-        </p:nvSpPr>
-        <p:spPr>
+        </p:nvPicPr>
+        <p:blipFill>
+          <a:blip r:embed="rId3">
+            <a:extLst>
+              <a:ext uri="{28A0092B-C50C-407E-A947-70E740481C1C}">
+                <a14:useLocalDpi xmlns:a14="http://schemas.microsoft.com/office/drawing/2010/main" val="0"/>
+              </a:ext>
+            </a:extLst>
+          </a:blip>
+          <a:srcRect/>
+          <a:stretch>
+            <a:fillRect/>
+          </a:stretch>
+        </p:blipFill>
+        <p:spPr bwMode="auto">
           <a:xfrm>
-            <a:off x="1524000" y="1958544"/>
-            <a:ext cx="9144000" cy="3293209"/>
+            <a:off x="1795974" y="1557008"/>
+            <a:ext cx="8600052" cy="4732972"/>
           </a:xfrm>
           <a:prstGeom prst="rect">
             <a:avLst/>
           </a:prstGeom>
           <a:noFill/>
+          <a:extLst>
+            <a:ext uri="{909E8E84-426E-40DD-AFC4-6F175D3DCCD1}">
+              <a14:hiddenFill xmlns:a14="http://schemas.microsoft.com/office/drawing/2010/main">
+                <a:solidFill>
+                  <a:srgbClr val="FFFFFF"/>
+                </a:solidFill>
+              </a14:hiddenFill>
+            </a:ext>
+          </a:extLst>
         </p:spPr>
-        <p:txBody>
-          <a:bodyPr wrap="square" rtlCol="0">
-            <a:spAutoFit/>
-          </a:bodyPr>
-          <a:lstStyle/>
-          <a:p>
-            <a:pPr marL="285750" indent="-285750">
-              <a:buFont typeface="Arial" panose="020B0604020202020204" pitchFamily="34" charset="0"/>
-              <a:buChar char="•"/>
-            </a:pPr>
-            <a:r>
-              <a:rPr lang="en-AU" sz="2600" dirty="0">
-                <a:solidFill>
-                  <a:srgbClr val="111111"/>
-                </a:solidFill>
-                <a:latin typeface="Open Sans" panose="020B0606030504020204" pitchFamily="34" charset="0"/>
-                <a:ea typeface="Open Sans" panose="020B0606030504020204" pitchFamily="34" charset="0"/>
-                <a:cs typeface="Open Sans" panose="020B0606030504020204" pitchFamily="34" charset="0"/>
-              </a:rPr>
-              <a:t>Internet Relay Chat (IRC) share similar risks of malware propagation as email</a:t>
-            </a:r>
-          </a:p>
-          <a:p>
-            <a:pPr marL="285750" indent="-285750">
-              <a:buFont typeface="Arial" panose="020B0604020202020204" pitchFamily="34" charset="0"/>
-              <a:buChar char="•"/>
-            </a:pPr>
-            <a:r>
-              <a:rPr lang="en-AU" sz="2600" dirty="0">
-                <a:solidFill>
-                  <a:srgbClr val="111111"/>
-                </a:solidFill>
-                <a:latin typeface="Open Sans" panose="020B0606030504020204" pitchFamily="34" charset="0"/>
-                <a:ea typeface="Open Sans" panose="020B0606030504020204" pitchFamily="34" charset="0"/>
-                <a:cs typeface="Open Sans" panose="020B0606030504020204" pitchFamily="34" charset="0"/>
-              </a:rPr>
-              <a:t>Attackers may use social engineering to</a:t>
-            </a:r>
-          </a:p>
-          <a:p>
-            <a:pPr marL="742950" lvl="1" indent="-285750">
-              <a:buFont typeface="Arial" panose="020B0604020202020204" pitchFamily="34" charset="0"/>
-              <a:buChar char="•"/>
-            </a:pPr>
-            <a:r>
-              <a:rPr lang="en-AU" sz="2600" dirty="0">
-                <a:solidFill>
-                  <a:srgbClr val="111111"/>
-                </a:solidFill>
-                <a:latin typeface="Open Sans" panose="020B0606030504020204" pitchFamily="34" charset="0"/>
-                <a:ea typeface="Open Sans" panose="020B0606030504020204" pitchFamily="34" charset="0"/>
-                <a:cs typeface="Open Sans" panose="020B0606030504020204" pitchFamily="34" charset="0"/>
-              </a:rPr>
-              <a:t>Convince victims to view links to malicious web pages or files</a:t>
-            </a:r>
-          </a:p>
-          <a:p>
-            <a:pPr marL="742950" lvl="1" indent="-285750">
-              <a:buFont typeface="Arial" panose="020B0604020202020204" pitchFamily="34" charset="0"/>
-              <a:buChar char="•"/>
-            </a:pPr>
-            <a:r>
-              <a:rPr lang="en-AU" sz="2600" dirty="0">
-                <a:solidFill>
-                  <a:srgbClr val="111111"/>
-                </a:solidFill>
-                <a:latin typeface="Open Sans" panose="020B0606030504020204" pitchFamily="34" charset="0"/>
-                <a:ea typeface="Open Sans" panose="020B0606030504020204" pitchFamily="34" charset="0"/>
-                <a:cs typeface="Open Sans" panose="020B0606030504020204" pitchFamily="34" charset="0"/>
-              </a:rPr>
-              <a:t>Convince victims to open malicious files sent directly through IRCs file-sharing protocol</a:t>
-            </a:r>
-          </a:p>
-          <a:p>
-            <a:pPr marL="285750" indent="-285750">
-              <a:buFont typeface="Arial" panose="020B0604020202020204" pitchFamily="34" charset="0"/>
-              <a:buChar char="•"/>
-            </a:pPr>
-            <a:r>
-              <a:rPr lang="en-AU" sz="2600" dirty="0" smtClean="0">
-                <a:solidFill>
-                  <a:srgbClr val="111111"/>
-                </a:solidFill>
-                <a:latin typeface="Open Sans" panose="020B0606030504020204" pitchFamily="34" charset="0"/>
-                <a:ea typeface="Open Sans" panose="020B0606030504020204" pitchFamily="34" charset="0"/>
-                <a:cs typeface="Open Sans" panose="020B0606030504020204" pitchFamily="34" charset="0"/>
-              </a:rPr>
-              <a:t>Removal of mIRC will mitigate these risks</a:t>
-            </a:r>
-            <a:endParaRPr lang="en-AU" sz="3600" b="1" dirty="0">
-              <a:solidFill>
-                <a:srgbClr val="111111"/>
-              </a:solidFill>
-              <a:latin typeface="Open Sans" panose="020B0606030504020204" pitchFamily="34" charset="0"/>
-              <a:ea typeface="Open Sans" panose="020B0606030504020204" pitchFamily="34" charset="0"/>
-              <a:cs typeface="Open Sans" panose="020B0606030504020204" pitchFamily="34" charset="0"/>
-            </a:endParaRPr>
-          </a:p>
-        </p:txBody>
-      </p:sp>
+      </p:pic>
     </p:spTree>
     <p:extLst>
       <p:ext uri="{BB962C8B-B14F-4D97-AF65-F5344CB8AC3E}">
-        <p14:creationId xmlns:p14="http://schemas.microsoft.com/office/powerpoint/2010/main" val="551019555"/>
+        <p14:creationId xmlns:p14="http://schemas.microsoft.com/office/powerpoint/2010/main" val="1126494993"/>
       </p:ext>
     </p:extLst>
   </p:cSld>
@@ -10182,28 +10097,71 @@
         </p:nvSpPr>
         <p:spPr>
           <a:xfrm>
-            <a:off x="1524000" y="0"/>
-            <a:ext cx="9144000" cy="6858000"/>
+            <a:off x="1524000" y="-1470455"/>
+            <a:ext cx="9144000" cy="2917370"/>
           </a:xfrm>
         </p:spPr>
         <p:txBody>
-          <a:bodyPr anchor="ctr">
+          <a:bodyPr anchor="b">
             <a:normAutofit/>
           </a:bodyPr>
           <a:lstStyle/>
           <a:p>
-            <a:r>
-              <a:rPr lang="en-AU" sz="4400" b="1" dirty="0" smtClean="0">
-                <a:solidFill>
-                  <a:srgbClr val="111111"/>
-                </a:solidFill>
-                <a:latin typeface="Open Sans" panose="020B0606030504020204" pitchFamily="34" charset="0"/>
-                <a:ea typeface="Open Sans" panose="020B0606030504020204" pitchFamily="34" charset="0"/>
-                <a:cs typeface="Open Sans" panose="020B0606030504020204" pitchFamily="34" charset="0"/>
-              </a:rPr>
-              <a:t>Summary</a:t>
-            </a:r>
-            <a:endParaRPr lang="en-AU" sz="4400" b="1" dirty="0">
+            <a:pPr algn="l"/>
+            <a:r>
+              <a:rPr lang="en-AU" sz="3200" b="1" dirty="0" smtClean="0">
+                <a:solidFill>
+                  <a:srgbClr val="111111"/>
+                </a:solidFill>
+                <a:latin typeface="Open Sans" panose="020B0606030504020204" pitchFamily="34" charset="0"/>
+                <a:ea typeface="Open Sans" panose="020B0606030504020204" pitchFamily="34" charset="0"/>
+                <a:cs typeface="Open Sans" panose="020B0606030504020204" pitchFamily="34" charset="0"/>
+              </a:rPr>
+              <a:t/>
+            </a:r>
+            <a:br>
+              <a:rPr lang="en-AU" sz="3200" b="1" dirty="0" smtClean="0">
+                <a:solidFill>
+                  <a:srgbClr val="111111"/>
+                </a:solidFill>
+                <a:latin typeface="Open Sans" panose="020B0606030504020204" pitchFamily="34" charset="0"/>
+                <a:ea typeface="Open Sans" panose="020B0606030504020204" pitchFamily="34" charset="0"/>
+                <a:cs typeface="Open Sans" panose="020B0606030504020204" pitchFamily="34" charset="0"/>
+              </a:rPr>
+            </a:br>
+            <a:r>
+              <a:rPr lang="en-AU" sz="3200" b="1" dirty="0" smtClean="0">
+                <a:solidFill>
+                  <a:srgbClr val="111111"/>
+                </a:solidFill>
+                <a:latin typeface="Open Sans" panose="020B0606030504020204" pitchFamily="34" charset="0"/>
+                <a:ea typeface="Open Sans" panose="020B0606030504020204" pitchFamily="34" charset="0"/>
+                <a:cs typeface="Open Sans" panose="020B0606030504020204" pitchFamily="34" charset="0"/>
+              </a:rPr>
+              <a:t>Security issue:</a:t>
+            </a:r>
+            <a:br>
+              <a:rPr lang="en-AU" sz="3200" b="1" dirty="0" smtClean="0">
+                <a:solidFill>
+                  <a:srgbClr val="111111"/>
+                </a:solidFill>
+                <a:latin typeface="Open Sans" panose="020B0606030504020204" pitchFamily="34" charset="0"/>
+                <a:ea typeface="Open Sans" panose="020B0606030504020204" pitchFamily="34" charset="0"/>
+                <a:cs typeface="Open Sans" panose="020B0606030504020204" pitchFamily="34" charset="0"/>
+              </a:rPr>
+            </a:br>
+            <a:r>
+              <a:rPr lang="en-AU" sz="3200" b="1" dirty="0" smtClean="0">
+                <a:solidFill>
+                  <a:srgbClr val="111111"/>
+                </a:solidFill>
+                <a:latin typeface="Open Sans" panose="020B0606030504020204" pitchFamily="34" charset="0"/>
+                <a:ea typeface="Open Sans" panose="020B0606030504020204" pitchFamily="34" charset="0"/>
+                <a:cs typeface="Open Sans" panose="020B0606030504020204" pitchFamily="34" charset="0"/>
+              </a:rPr>
+              <a:t>mIRC Internet Relay Chat</a:t>
+            </a:r>
+            <a:endParaRPr lang="en-AU" sz="3200" dirty="0">
               <a:solidFill>
                 <a:srgbClr val="111111"/>
               </a:solidFill>
@@ -10214,10 +10172,126 @@
           </a:p>
         </p:txBody>
       </p:sp>
+      <p:sp>
+        <p:nvSpPr>
+          <p:cNvPr id="2" name="TextBox 1"/>
+          <p:cNvSpPr txBox="1"/>
+          <p:nvPr/>
+        </p:nvSpPr>
+        <p:spPr>
+          <a:xfrm>
+            <a:off x="1524000" y="1958544"/>
+            <a:ext cx="9144000" cy="3293209"/>
+          </a:xfrm>
+          <a:prstGeom prst="rect">
+            <a:avLst/>
+          </a:prstGeom>
+          <a:noFill/>
+        </p:spPr>
+        <p:txBody>
+          <a:bodyPr wrap="square" rtlCol="0">
+            <a:spAutoFit/>
+          </a:bodyPr>
+          <a:lstStyle/>
+          <a:p>
+            <a:pPr marL="285750" indent="-285750">
+              <a:buFont typeface="Arial" panose="020B0604020202020204" pitchFamily="34" charset="0"/>
+              <a:buChar char="•"/>
+            </a:pPr>
+            <a:r>
+              <a:rPr lang="en-AU" sz="2600" dirty="0">
+                <a:solidFill>
+                  <a:srgbClr val="111111"/>
+                </a:solidFill>
+                <a:latin typeface="Open Sans" panose="020B0606030504020204" pitchFamily="34" charset="0"/>
+                <a:ea typeface="Open Sans" panose="020B0606030504020204" pitchFamily="34" charset="0"/>
+                <a:cs typeface="Open Sans" panose="020B0606030504020204" pitchFamily="34" charset="0"/>
+              </a:rPr>
+              <a:t>Internet Relay Chat (IRC) share similar risks of malware propagation as email</a:t>
+            </a:r>
+          </a:p>
+          <a:p>
+            <a:pPr marL="285750" indent="-285750">
+              <a:buFont typeface="Arial" panose="020B0604020202020204" pitchFamily="34" charset="0"/>
+              <a:buChar char="•"/>
+            </a:pPr>
+            <a:r>
+              <a:rPr lang="en-AU" sz="2600" dirty="0">
+                <a:solidFill>
+                  <a:srgbClr val="111111"/>
+                </a:solidFill>
+                <a:latin typeface="Open Sans" panose="020B0606030504020204" pitchFamily="34" charset="0"/>
+                <a:ea typeface="Open Sans" panose="020B0606030504020204" pitchFamily="34" charset="0"/>
+                <a:cs typeface="Open Sans" panose="020B0606030504020204" pitchFamily="34" charset="0"/>
+              </a:rPr>
+              <a:t>Attackers may use social engineering to</a:t>
+            </a:r>
+          </a:p>
+          <a:p>
+            <a:pPr marL="742950" lvl="1" indent="-285750">
+              <a:buFont typeface="Arial" panose="020B0604020202020204" pitchFamily="34" charset="0"/>
+              <a:buChar char="•"/>
+            </a:pPr>
+            <a:r>
+              <a:rPr lang="en-AU" sz="2600" dirty="0">
+                <a:solidFill>
+                  <a:srgbClr val="111111"/>
+                </a:solidFill>
+                <a:latin typeface="Open Sans" panose="020B0606030504020204" pitchFamily="34" charset="0"/>
+                <a:ea typeface="Open Sans" panose="020B0606030504020204" pitchFamily="34" charset="0"/>
+                <a:cs typeface="Open Sans" panose="020B0606030504020204" pitchFamily="34" charset="0"/>
+              </a:rPr>
+              <a:t>Convince victims to view links to malicious web pages or files</a:t>
+            </a:r>
+          </a:p>
+          <a:p>
+            <a:pPr marL="742950" lvl="1" indent="-285750">
+              <a:buFont typeface="Arial" panose="020B0604020202020204" pitchFamily="34" charset="0"/>
+              <a:buChar char="•"/>
+            </a:pPr>
+            <a:r>
+              <a:rPr lang="en-AU" sz="2600" dirty="0">
+                <a:solidFill>
+                  <a:srgbClr val="111111"/>
+                </a:solidFill>
+                <a:latin typeface="Open Sans" panose="020B0606030504020204" pitchFamily="34" charset="0"/>
+                <a:ea typeface="Open Sans" panose="020B0606030504020204" pitchFamily="34" charset="0"/>
+                <a:cs typeface="Open Sans" panose="020B0606030504020204" pitchFamily="34" charset="0"/>
+              </a:rPr>
+              <a:t>Convince victims to open malicious files sent directly through IRCs file-sharing protocol</a:t>
+            </a:r>
+          </a:p>
+          <a:p>
+            <a:pPr marL="285750" indent="-285750">
+              <a:buFont typeface="Arial" panose="020B0604020202020204" pitchFamily="34" charset="0"/>
+              <a:buChar char="•"/>
+            </a:pPr>
+            <a:r>
+              <a:rPr lang="en-AU" sz="2600" dirty="0" smtClean="0">
+                <a:solidFill>
+                  <a:srgbClr val="111111"/>
+                </a:solidFill>
+                <a:latin typeface="Open Sans" panose="020B0606030504020204" pitchFamily="34" charset="0"/>
+                <a:ea typeface="Open Sans" panose="020B0606030504020204" pitchFamily="34" charset="0"/>
+                <a:cs typeface="Open Sans" panose="020B0606030504020204" pitchFamily="34" charset="0"/>
+              </a:rPr>
+              <a:t>Removal of mIRC will mitigate these risks</a:t>
+            </a:r>
+            <a:endParaRPr lang="en-AU" sz="3600" b="1" dirty="0">
+              <a:solidFill>
+                <a:srgbClr val="111111"/>
+              </a:solidFill>
+              <a:latin typeface="Open Sans" panose="020B0606030504020204" pitchFamily="34" charset="0"/>
+              <a:ea typeface="Open Sans" panose="020B0606030504020204" pitchFamily="34" charset="0"/>
+              <a:cs typeface="Open Sans" panose="020B0606030504020204" pitchFamily="34" charset="0"/>
+            </a:endParaRPr>
+          </a:p>
+        </p:txBody>
+      </p:sp>
     </p:spTree>
     <p:extLst>
       <p:ext uri="{BB962C8B-B14F-4D97-AF65-F5344CB8AC3E}">
-        <p14:creationId xmlns:p14="http://schemas.microsoft.com/office/powerpoint/2010/main" val="4049782558"/>
+        <p14:creationId xmlns:p14="http://schemas.microsoft.com/office/powerpoint/2010/main" val="551019555"/>
       </p:ext>
     </p:extLst>
   </p:cSld>
@@ -10266,29 +10340,28 @@
         </p:nvSpPr>
         <p:spPr>
           <a:xfrm>
-            <a:off x="1524000" y="-506438"/>
-            <a:ext cx="9144000" cy="1446915"/>
+            <a:off x="1524000" y="0"/>
+            <a:ext cx="9144000" cy="6858000"/>
           </a:xfrm>
         </p:spPr>
         <p:txBody>
-          <a:bodyPr anchor="b">
+          <a:bodyPr anchor="ctr">
             <a:normAutofit/>
           </a:bodyPr>
           <a:lstStyle/>
           <a:p>
-            <a:pPr algn="l"/>
-            <a:r>
-              <a:rPr lang="en-AU" sz="3200" b="1" dirty="0" smtClean="0">
-                <a:solidFill>
-                  <a:srgbClr val="111111"/>
-                </a:solidFill>
-                <a:latin typeface="Open Sans" panose="020B0606030504020204" pitchFamily="34" charset="0"/>
-                <a:ea typeface="Open Sans" panose="020B0606030504020204" pitchFamily="34" charset="0"/>
-                <a:cs typeface="Open Sans" panose="020B0606030504020204" pitchFamily="34" charset="0"/>
-              </a:rPr>
-              <a:t>Patch management</a:t>
-            </a:r>
-            <a:endParaRPr lang="en-AU" sz="3200" dirty="0">
+            <a:r>
+              <a:rPr lang="en-AU" sz="4400" b="1" dirty="0" smtClean="0">
+                <a:solidFill>
+                  <a:srgbClr val="111111"/>
+                </a:solidFill>
+                <a:latin typeface="Open Sans" panose="020B0606030504020204" pitchFamily="34" charset="0"/>
+                <a:ea typeface="Open Sans" panose="020B0606030504020204" pitchFamily="34" charset="0"/>
+                <a:cs typeface="Open Sans" panose="020B0606030504020204" pitchFamily="34" charset="0"/>
+              </a:rPr>
+              <a:t>Summary</a:t>
+            </a:r>
+            <a:endParaRPr lang="en-AU" sz="4400" b="1" dirty="0">
               <a:solidFill>
                 <a:srgbClr val="111111"/>
               </a:solidFill>
@@ -10299,284 +10372,10 @@
           </a:p>
         </p:txBody>
       </p:sp>
-      <p:sp>
-        <p:nvSpPr>
-          <p:cNvPr id="2" name="TextBox 1"/>
-          <p:cNvSpPr txBox="1"/>
-          <p:nvPr/>
-        </p:nvSpPr>
-        <p:spPr>
-          <a:xfrm>
-            <a:off x="1524000" y="1452107"/>
-            <a:ext cx="9144000" cy="1692771"/>
-          </a:xfrm>
-          <a:prstGeom prst="rect">
-            <a:avLst/>
-          </a:prstGeom>
-          <a:noFill/>
-        </p:spPr>
-        <p:txBody>
-          <a:bodyPr wrap="square" rtlCol="0">
-            <a:spAutoFit/>
-          </a:bodyPr>
-          <a:lstStyle/>
-          <a:p>
-            <a:pPr marL="285750" indent="-285750">
-              <a:buFont typeface="Arial" panose="020B0604020202020204" pitchFamily="34" charset="0"/>
-              <a:buChar char="•"/>
-            </a:pPr>
-            <a:r>
-              <a:rPr lang="en-AU" sz="2600" dirty="0" smtClean="0">
-                <a:solidFill>
-                  <a:srgbClr val="111111"/>
-                </a:solidFill>
-                <a:latin typeface="Open Sans" panose="020B0606030504020204" pitchFamily="34" charset="0"/>
-                <a:ea typeface="Open Sans" panose="020B0606030504020204" pitchFamily="34" charset="0"/>
-                <a:cs typeface="Open Sans" panose="020B0606030504020204" pitchFamily="34" charset="0"/>
-              </a:rPr>
-              <a:t>Use proactive patch management strategy</a:t>
-            </a:r>
-          </a:p>
-          <a:p>
-            <a:pPr marL="742950" lvl="1" indent="-285750">
-              <a:buFont typeface="Arial" panose="020B0604020202020204" pitchFamily="34" charset="0"/>
-              <a:buChar char="•"/>
-            </a:pPr>
-            <a:r>
-              <a:rPr lang="en-AU" sz="2600" dirty="0" smtClean="0">
-                <a:solidFill>
-                  <a:srgbClr val="111111"/>
-                </a:solidFill>
-                <a:latin typeface="Open Sans" panose="020B0606030504020204" pitchFamily="34" charset="0"/>
-                <a:ea typeface="Open Sans" panose="020B0606030504020204" pitchFamily="34" charset="0"/>
-                <a:cs typeface="Open Sans" panose="020B0606030504020204" pitchFamily="34" charset="0"/>
-              </a:rPr>
-              <a:t>Mitigate vulnerabilities in software</a:t>
-            </a:r>
-          </a:p>
-          <a:p>
-            <a:pPr marL="285750" indent="-285750">
-              <a:buFont typeface="Arial" panose="020B0604020202020204" pitchFamily="34" charset="0"/>
-              <a:buChar char="•"/>
-            </a:pPr>
-            <a:r>
-              <a:rPr lang="en-AU" sz="2600" dirty="0" smtClean="0">
-                <a:solidFill>
-                  <a:srgbClr val="111111"/>
-                </a:solidFill>
-                <a:latin typeface="Open Sans" panose="020B0606030504020204" pitchFamily="34" charset="0"/>
-                <a:ea typeface="Open Sans" panose="020B0606030504020204" pitchFamily="34" charset="0"/>
-                <a:cs typeface="Open Sans" panose="020B0606030504020204" pitchFamily="34" charset="0"/>
-              </a:rPr>
-              <a:t>Recommend </a:t>
-            </a:r>
-            <a:r>
-              <a:rPr lang="en-AU" sz="2600" dirty="0" smtClean="0">
-                <a:solidFill>
-                  <a:srgbClr val="111111"/>
-                </a:solidFill>
-                <a:latin typeface="Open Sans" panose="020B0606030504020204" pitchFamily="34" charset="0"/>
-                <a:ea typeface="Open Sans" panose="020B0606030504020204" pitchFamily="34" charset="0"/>
-                <a:cs typeface="Open Sans" panose="020B0606030504020204" pitchFamily="34" charset="0"/>
-                <a:hlinkClick r:id="rId2"/>
-              </a:rPr>
-              <a:t>SolarWinds Patch Manager 2.1</a:t>
-            </a:r>
-            <a:endParaRPr lang="en-AU" sz="3600" dirty="0" smtClean="0">
-              <a:solidFill>
-                <a:srgbClr val="111111"/>
-              </a:solidFill>
-              <a:latin typeface="Open Sans" panose="020B0606030504020204" pitchFamily="34" charset="0"/>
-              <a:ea typeface="Open Sans" panose="020B0606030504020204" pitchFamily="34" charset="0"/>
-              <a:cs typeface="Open Sans" panose="020B0606030504020204" pitchFamily="34" charset="0"/>
-            </a:endParaRPr>
-          </a:p>
-          <a:p>
-            <a:pPr marL="742950" lvl="1" indent="-285750">
-              <a:buFont typeface="Arial" panose="020B0604020202020204" pitchFamily="34" charset="0"/>
-              <a:buChar char="•"/>
-            </a:pPr>
-            <a:r>
-              <a:rPr lang="en-AU" sz="2600" dirty="0" smtClean="0">
-                <a:solidFill>
-                  <a:srgbClr val="111111"/>
-                </a:solidFill>
-                <a:latin typeface="Open Sans" panose="020B0606030504020204" pitchFamily="34" charset="0"/>
-                <a:ea typeface="Open Sans" panose="020B0606030504020204" pitchFamily="34" charset="0"/>
-                <a:cs typeface="Open Sans" panose="020B0606030504020204" pitchFamily="34" charset="0"/>
-              </a:rPr>
-              <a:t>Manage patching in large computer network</a:t>
-            </a:r>
-          </a:p>
-        </p:txBody>
-      </p:sp>
-      <p:sp>
-        <p:nvSpPr>
-          <p:cNvPr id="5" name="Title 3"/>
-          <p:cNvSpPr txBox="1">
-            <a:spLocks/>
-          </p:cNvSpPr>
-          <p:nvPr/>
-        </p:nvSpPr>
-        <p:spPr>
-          <a:xfrm>
-            <a:off x="1524000" y="2344659"/>
-            <a:ext cx="9144000" cy="1446915"/>
-          </a:xfrm>
-          <a:prstGeom prst="rect">
-            <a:avLst/>
-          </a:prstGeom>
-        </p:spPr>
-        <p:txBody>
-          <a:bodyPr vert="horz" lIns="91440" tIns="45720" rIns="91440" bIns="45720" rtlCol="0" anchor="b">
-            <a:normAutofit/>
-          </a:bodyPr>
-          <a:lstStyle>
-            <a:lvl1pPr algn="ctr" defTabSz="914400" rtl="0" eaLnBrk="1" latinLnBrk="0" hangingPunct="1">
-              <a:lnSpc>
-                <a:spcPct val="90000"/>
-              </a:lnSpc>
-              <a:spcBef>
-                <a:spcPct val="0"/>
-              </a:spcBef>
-              <a:buNone/>
-              <a:defRPr sz="6000" kern="1200">
-                <a:solidFill>
-                  <a:schemeClr val="tx1"/>
-                </a:solidFill>
-                <a:latin typeface="+mj-lt"/>
-                <a:ea typeface="+mj-ea"/>
-                <a:cs typeface="+mj-cs"/>
-              </a:defRPr>
-            </a:lvl1pPr>
-          </a:lstStyle>
-          <a:p>
-            <a:pPr algn="l"/>
-            <a:r>
-              <a:rPr lang="en-AU" sz="3200" b="1" dirty="0" smtClean="0">
-                <a:solidFill>
-                  <a:srgbClr val="111111"/>
-                </a:solidFill>
-                <a:latin typeface="Open Sans" panose="020B0606030504020204" pitchFamily="34" charset="0"/>
-                <a:ea typeface="Open Sans" panose="020B0606030504020204" pitchFamily="34" charset="0"/>
-                <a:cs typeface="Open Sans" panose="020B0606030504020204" pitchFamily="34" charset="0"/>
-              </a:rPr>
-              <a:t>Passwords</a:t>
-            </a:r>
-            <a:endParaRPr lang="en-AU" sz="3200" dirty="0">
-              <a:solidFill>
-                <a:srgbClr val="111111"/>
-              </a:solidFill>
-              <a:latin typeface="Open Sans" panose="020B0606030504020204" pitchFamily="34" charset="0"/>
-              <a:ea typeface="Open Sans" panose="020B0606030504020204" pitchFamily="34" charset="0"/>
-              <a:cs typeface="Open Sans" panose="020B0606030504020204" pitchFamily="34" charset="0"/>
-            </a:endParaRPr>
-          </a:p>
-        </p:txBody>
-      </p:sp>
-      <p:sp>
-        <p:nvSpPr>
-          <p:cNvPr id="6" name="TextBox 5"/>
-          <p:cNvSpPr txBox="1"/>
-          <p:nvPr/>
-        </p:nvSpPr>
-        <p:spPr>
-          <a:xfrm>
-            <a:off x="1524000" y="4303204"/>
-            <a:ext cx="9144000" cy="2092881"/>
-          </a:xfrm>
-          <a:prstGeom prst="rect">
-            <a:avLst/>
-          </a:prstGeom>
-          <a:noFill/>
-        </p:spPr>
-        <p:txBody>
-          <a:bodyPr wrap="square" rtlCol="0">
-            <a:spAutoFit/>
-          </a:bodyPr>
-          <a:lstStyle/>
-          <a:p>
-            <a:pPr marL="285750" indent="-285750">
-              <a:buFont typeface="Arial" panose="020B0604020202020204" pitchFamily="34" charset="0"/>
-              <a:buChar char="•"/>
-            </a:pPr>
-            <a:r>
-              <a:rPr lang="en-AU" sz="2600" dirty="0" smtClean="0">
-                <a:solidFill>
-                  <a:srgbClr val="111111"/>
-                </a:solidFill>
-                <a:latin typeface="Open Sans" panose="020B0606030504020204" pitchFamily="34" charset="0"/>
-                <a:ea typeface="Open Sans" panose="020B0606030504020204" pitchFamily="34" charset="0"/>
-                <a:cs typeface="Open Sans" panose="020B0606030504020204" pitchFamily="34" charset="0"/>
-              </a:rPr>
-              <a:t>Configure users/groups with Active Directory</a:t>
-            </a:r>
-          </a:p>
-          <a:p>
-            <a:pPr marL="742950" lvl="1" indent="-285750">
-              <a:buFont typeface="Arial" panose="020B0604020202020204" pitchFamily="34" charset="0"/>
-              <a:buChar char="•"/>
-            </a:pPr>
-            <a:r>
-              <a:rPr lang="en-AU" sz="2600" dirty="0" smtClean="0">
-                <a:solidFill>
-                  <a:srgbClr val="111111"/>
-                </a:solidFill>
-                <a:latin typeface="Open Sans" panose="020B0606030504020204" pitchFamily="34" charset="0"/>
-                <a:ea typeface="Open Sans" panose="020B0606030504020204" pitchFamily="34" charset="0"/>
-                <a:cs typeface="Open Sans" panose="020B0606030504020204" pitchFamily="34" charset="0"/>
-              </a:rPr>
-              <a:t>Enforce passwords, password policy, screensaver lock, and account lockout after failed attempts</a:t>
-            </a:r>
-          </a:p>
-          <a:p>
-            <a:pPr marL="285750" indent="-285750">
-              <a:buFont typeface="Arial" panose="020B0604020202020204" pitchFamily="34" charset="0"/>
-              <a:buChar char="•"/>
-            </a:pPr>
-            <a:r>
-              <a:rPr lang="en-AU" sz="2600" dirty="0" smtClean="0">
-                <a:solidFill>
-                  <a:srgbClr val="111111"/>
-                </a:solidFill>
-                <a:latin typeface="Open Sans" panose="020B0606030504020204" pitchFamily="34" charset="0"/>
-                <a:ea typeface="Open Sans" panose="020B0606030504020204" pitchFamily="34" charset="0"/>
-                <a:cs typeface="Open Sans" panose="020B0606030504020204" pitchFamily="34" charset="0"/>
-              </a:rPr>
-              <a:t>Use passphrases for password policies</a:t>
-            </a:r>
-            <a:endParaRPr lang="en-AU" sz="3600" dirty="0" smtClean="0">
-              <a:solidFill>
-                <a:srgbClr val="111111"/>
-              </a:solidFill>
-              <a:latin typeface="Open Sans" panose="020B0606030504020204" pitchFamily="34" charset="0"/>
-              <a:ea typeface="Open Sans" panose="020B0606030504020204" pitchFamily="34" charset="0"/>
-              <a:cs typeface="Open Sans" panose="020B0606030504020204" pitchFamily="34" charset="0"/>
-            </a:endParaRPr>
-          </a:p>
-          <a:p>
-            <a:pPr marL="742950" lvl="1" indent="-285750">
-              <a:buFont typeface="Arial" panose="020B0604020202020204" pitchFamily="34" charset="0"/>
-              <a:buChar char="•"/>
-            </a:pPr>
-            <a:r>
-              <a:rPr lang="en-AU" sz="2600" dirty="0" smtClean="0">
-                <a:solidFill>
-                  <a:srgbClr val="111111"/>
-                </a:solidFill>
-                <a:latin typeface="Open Sans" panose="020B0606030504020204" pitchFamily="34" charset="0"/>
-                <a:ea typeface="Open Sans" panose="020B0606030504020204" pitchFamily="34" charset="0"/>
-                <a:cs typeface="Open Sans" panose="020B0606030504020204" pitchFamily="34" charset="0"/>
-              </a:rPr>
-              <a:t>Prevent users from writing passwords down</a:t>
-            </a:r>
-          </a:p>
-        </p:txBody>
-      </p:sp>
     </p:spTree>
     <p:extLst>
       <p:ext uri="{BB962C8B-B14F-4D97-AF65-F5344CB8AC3E}">
-        <p14:creationId xmlns:p14="http://schemas.microsoft.com/office/powerpoint/2010/main" val="587882714"/>
+        <p14:creationId xmlns:p14="http://schemas.microsoft.com/office/powerpoint/2010/main" val="4049782558"/>
       </p:ext>
     </p:extLst>
   </p:cSld>
@@ -10625,7 +10424,7 @@
         </p:nvSpPr>
         <p:spPr>
           <a:xfrm>
-            <a:off x="1524000" y="-1"/>
+            <a:off x="1524000" y="-506438"/>
             <a:ext cx="9144000" cy="1446915"/>
           </a:xfrm>
         </p:spPr>
@@ -10645,7 +10444,7 @@
                 <a:ea typeface="Open Sans" panose="020B0606030504020204" pitchFamily="34" charset="0"/>
                 <a:cs typeface="Open Sans" panose="020B0606030504020204" pitchFamily="34" charset="0"/>
               </a:rPr>
-              <a:t>User practices</a:t>
+              <a:t>Patch management</a:t>
             </a:r>
             <a:endParaRPr lang="en-AU" sz="3200" dirty="0">
               <a:solidFill>
@@ -10666,8 +10465,8 @@
         </p:nvSpPr>
         <p:spPr>
           <a:xfrm>
-            <a:off x="1524000" y="1958544"/>
-            <a:ext cx="9144000" cy="1292662"/>
+            <a:off x="1524000" y="1452107"/>
+            <a:ext cx="9144000" cy="1692771"/>
           </a:xfrm>
           <a:prstGeom prst="rect">
             <a:avLst/>
@@ -10693,7 +10492,24 @@
                 <a:ea typeface="Open Sans" panose="020B0606030504020204" pitchFamily="34" charset="0"/>
                 <a:cs typeface="Open Sans" panose="020B0606030504020204" pitchFamily="34" charset="0"/>
               </a:rPr>
-              <a:t>Do not store passwords in plaintext files or handwritten notes</a:t>
+              <a:t>Use proactive patch management strategy</a:t>
+            </a:r>
+          </a:p>
+          <a:p>
+            <a:pPr marL="742950" lvl="1" indent="-285750">
+              <a:buFont typeface="Arial" panose="020B0604020202020204" pitchFamily="34" charset="0"/>
+              <a:buChar char="•"/>
+            </a:pPr>
+            <a:r>
+              <a:rPr lang="en-AU" sz="2600" dirty="0" smtClean="0">
+                <a:solidFill>
+                  <a:srgbClr val="111111"/>
+                </a:solidFill>
+                <a:latin typeface="Open Sans" panose="020B0606030504020204" pitchFamily="34" charset="0"/>
+                <a:ea typeface="Open Sans" panose="020B0606030504020204" pitchFamily="34" charset="0"/>
+                <a:cs typeface="Open Sans" panose="020B0606030504020204" pitchFamily="34" charset="0"/>
+              </a:rPr>
+              <a:t>Mitigate vulnerabilities in software</a:t>
             </a:r>
           </a:p>
           <a:p>
@@ -10710,9 +10526,21 @@
                 <a:ea typeface="Open Sans" panose="020B0606030504020204" pitchFamily="34" charset="0"/>
                 <a:cs typeface="Open Sans" panose="020B0606030504020204" pitchFamily="34" charset="0"/>
               </a:rPr>
-              <a:t>Remove mIRC to prevent malware propagation</a:t>
-            </a:r>
-            <a:endParaRPr lang="en-AU" sz="3600" dirty="0">
+              <a:t>Recommend </a:t>
+            </a:r>
+            <a:r>
+              <a:rPr lang="en-AU" sz="2600" dirty="0" smtClean="0">
+                <a:solidFill>
+                  <a:srgbClr val="111111"/>
+                </a:solidFill>
+                <a:latin typeface="Open Sans" panose="020B0606030504020204" pitchFamily="34" charset="0"/>
+                <a:ea typeface="Open Sans" panose="020B0606030504020204" pitchFamily="34" charset="0"/>
+                <a:cs typeface="Open Sans" panose="020B0606030504020204" pitchFamily="34" charset="0"/>
+                <a:hlinkClick r:id="rId2"/>
+              </a:rPr>
+              <a:t>SolarWinds Patch Manager 2.1</a:t>
+            </a:r>
+            <a:endParaRPr lang="en-AU" sz="3600" dirty="0" smtClean="0">
               <a:solidFill>
                 <a:srgbClr val="111111"/>
               </a:solidFill>
@@ -10720,6 +10548,23 @@
               <a:ea typeface="Open Sans" panose="020B0606030504020204" pitchFamily="34" charset="0"/>
               <a:cs typeface="Open Sans" panose="020B0606030504020204" pitchFamily="34" charset="0"/>
             </a:endParaRPr>
+          </a:p>
+          <a:p>
+            <a:pPr marL="742950" lvl="1" indent="-285750">
+              <a:buFont typeface="Arial" panose="020B0604020202020204" pitchFamily="34" charset="0"/>
+              <a:buChar char="•"/>
+            </a:pPr>
+            <a:r>
+              <a:rPr lang="en-AU" sz="2600" dirty="0" smtClean="0">
+                <a:solidFill>
+                  <a:srgbClr val="111111"/>
+                </a:solidFill>
+                <a:latin typeface="Open Sans" panose="020B0606030504020204" pitchFamily="34" charset="0"/>
+                <a:ea typeface="Open Sans" panose="020B0606030504020204" pitchFamily="34" charset="0"/>
+                <a:cs typeface="Open Sans" panose="020B0606030504020204" pitchFamily="34" charset="0"/>
+              </a:rPr>
+              <a:t>Manage patching in large computer network</a:t>
+            </a:r>
           </a:p>
         </p:txBody>
       </p:sp>
@@ -10733,7 +10578,7 @@
         </p:nvSpPr>
         <p:spPr>
           <a:xfrm>
-            <a:off x="1524000" y="2851096"/>
+            <a:off x="1524000" y="2344659"/>
             <a:ext cx="9144000" cy="1446915"/>
           </a:xfrm>
           <a:prstGeom prst="rect">
@@ -10774,7 +10619,7 @@
                 <a:ea typeface="Open Sans" panose="020B0606030504020204" pitchFamily="34" charset="0"/>
                 <a:cs typeface="Open Sans" panose="020B0606030504020204" pitchFamily="34" charset="0"/>
               </a:rPr>
-              <a:t>User rights</a:t>
+              <a:t>Passwords</a:t>
             </a:r>
             <a:endParaRPr lang="en-AU" sz="3200" dirty="0">
               <a:solidFill>
@@ -10795,8 +10640,8 @@
         </p:nvSpPr>
         <p:spPr>
           <a:xfrm>
-            <a:off x="1524000" y="4809641"/>
-            <a:ext cx="9144000" cy="1692771"/>
+            <a:off x="1524000" y="4303204"/>
+            <a:ext cx="9144000" cy="2092881"/>
           </a:xfrm>
           <a:prstGeom prst="rect">
             <a:avLst/>
@@ -10822,7 +10667,41 @@
                 <a:ea typeface="Open Sans" panose="020B0606030504020204" pitchFamily="34" charset="0"/>
                 <a:cs typeface="Open Sans" panose="020B0606030504020204" pitchFamily="34" charset="0"/>
               </a:rPr>
-              <a:t>Configure Active Directory user groups with appropriate user rights</a:t>
+              <a:t>Configure users/groups with Active Directory</a:t>
+            </a:r>
+          </a:p>
+          <a:p>
+            <a:pPr marL="742950" lvl="1" indent="-285750">
+              <a:buFont typeface="Arial" panose="020B0604020202020204" pitchFamily="34" charset="0"/>
+              <a:buChar char="•"/>
+            </a:pPr>
+            <a:r>
+              <a:rPr lang="en-AU" sz="2600" dirty="0" smtClean="0">
+                <a:solidFill>
+                  <a:srgbClr val="111111"/>
+                </a:solidFill>
+                <a:latin typeface="Open Sans" panose="020B0606030504020204" pitchFamily="34" charset="0"/>
+                <a:ea typeface="Open Sans" panose="020B0606030504020204" pitchFamily="34" charset="0"/>
+                <a:cs typeface="Open Sans" panose="020B0606030504020204" pitchFamily="34" charset="0"/>
+              </a:rPr>
+              <a:t>Enforce passwords, password policy, screensaver lock, and account lockout after failed attempts</a:t>
+            </a:r>
+          </a:p>
+          <a:p>
+            <a:pPr marL="285750" indent="-285750">
+              <a:buFont typeface="Arial" panose="020B0604020202020204" pitchFamily="34" charset="0"/>
+              <a:buChar char="•"/>
+            </a:pPr>
+            <a:r>
+              <a:rPr lang="en-AU" sz="2600" dirty="0" smtClean="0">
+                <a:solidFill>
+                  <a:srgbClr val="111111"/>
+                </a:solidFill>
+                <a:latin typeface="Open Sans" panose="020B0606030504020204" pitchFamily="34" charset="0"/>
+                <a:ea typeface="Open Sans" panose="020B0606030504020204" pitchFamily="34" charset="0"/>
+                <a:cs typeface="Open Sans" panose="020B0606030504020204" pitchFamily="34" charset="0"/>
+              </a:rPr>
+              <a:t>Use passphrases for password policies</a:t>
             </a:r>
             <a:endParaRPr lang="en-AU" sz="3600" dirty="0" smtClean="0">
               <a:solidFill>
@@ -10847,24 +10726,7 @@
                 <a:ea typeface="Open Sans" panose="020B0606030504020204" pitchFamily="34" charset="0"/>
                 <a:cs typeface="Open Sans" panose="020B0606030504020204" pitchFamily="34" charset="0"/>
               </a:rPr>
-              <a:t>Reserve admin rights for IT support staff</a:t>
-            </a:r>
-          </a:p>
-          <a:p>
-            <a:pPr marL="285750" indent="-285750">
-              <a:buFont typeface="Arial" panose="020B0604020202020204" pitchFamily="34" charset="0"/>
-              <a:buChar char="•"/>
-            </a:pPr>
-            <a:r>
-              <a:rPr lang="en-AU" sz="2600" dirty="0" smtClean="0">
-                <a:solidFill>
-                  <a:srgbClr val="111111"/>
-                </a:solidFill>
-                <a:latin typeface="Open Sans" panose="020B0606030504020204" pitchFamily="34" charset="0"/>
-                <a:ea typeface="Open Sans" panose="020B0606030504020204" pitchFamily="34" charset="0"/>
-                <a:cs typeface="Open Sans" panose="020B0606030504020204" pitchFamily="34" charset="0"/>
-              </a:rPr>
-              <a:t>Enforce UAC through Active Directory group policy</a:t>
+              <a:t>Prevent users from writing passwords down</a:t>
             </a:r>
           </a:p>
         </p:txBody>
@@ -10872,7 +10734,7 @@
     </p:spTree>
     <p:extLst>
       <p:ext uri="{BB962C8B-B14F-4D97-AF65-F5344CB8AC3E}">
-        <p14:creationId xmlns:p14="http://schemas.microsoft.com/office/powerpoint/2010/main" val="2924220329"/>
+        <p14:creationId xmlns:p14="http://schemas.microsoft.com/office/powerpoint/2010/main" val="587882714"/>
       </p:ext>
     </p:extLst>
   </p:cSld>
@@ -10941,7 +10803,7 @@
                 <a:ea typeface="Open Sans" panose="020B0606030504020204" pitchFamily="34" charset="0"/>
                 <a:cs typeface="Open Sans" panose="020B0606030504020204" pitchFamily="34" charset="0"/>
               </a:rPr>
-              <a:t>Anti-virus and network security</a:t>
+              <a:t>User practices</a:t>
             </a:r>
             <a:endParaRPr lang="en-AU" sz="3200" dirty="0">
               <a:solidFill>
@@ -10963,7 +10825,7 @@
         <p:spPr>
           <a:xfrm>
             <a:off x="1524000" y="1958544"/>
-            <a:ext cx="9144000" cy="2893100"/>
+            <a:ext cx="9144000" cy="1292662"/>
           </a:xfrm>
           <a:prstGeom prst="rect">
             <a:avLst/>
@@ -10989,9 +10851,26 @@
                 <a:ea typeface="Open Sans" panose="020B0606030504020204" pitchFamily="34" charset="0"/>
                 <a:cs typeface="Open Sans" panose="020B0606030504020204" pitchFamily="34" charset="0"/>
               </a:rPr>
-              <a:t>Remove fake anti-virus</a:t>
-            </a:r>
-            <a:endParaRPr lang="en-AU" sz="2600" dirty="0">
+              <a:t>Do not store passwords in plaintext files or handwritten notes</a:t>
+            </a:r>
+          </a:p>
+          <a:p>
+            <a:pPr marL="285750" indent="-285750">
+              <a:buFont typeface="Arial" panose="020B0604020202020204" pitchFamily="34" charset="0"/>
+              <a:buChar char="•"/>
+            </a:pPr>
+            <a:r>
+              <a:rPr lang="en-AU" sz="2600" dirty="0" smtClean="0">
+                <a:solidFill>
+                  <a:srgbClr val="111111"/>
+                </a:solidFill>
+                <a:latin typeface="Open Sans" panose="020B0606030504020204" pitchFamily="34" charset="0"/>
+                <a:ea typeface="Open Sans" panose="020B0606030504020204" pitchFamily="34" charset="0"/>
+                <a:cs typeface="Open Sans" panose="020B0606030504020204" pitchFamily="34" charset="0"/>
+              </a:rPr>
+              <a:t>Remove mIRC to prevent malware propagation</a:t>
+            </a:r>
+            <a:endParaRPr lang="en-AU" sz="3600" dirty="0">
               <a:solidFill>
                 <a:srgbClr val="111111"/>
               </a:solidFill>
@@ -11000,35 +10879,62 @@
               <a:cs typeface="Open Sans" panose="020B0606030504020204" pitchFamily="34" charset="0"/>
             </a:endParaRPr>
           </a:p>
-          <a:p>
-            <a:pPr marL="285750" indent="-285750">
-              <a:buFont typeface="Arial" panose="020B0604020202020204" pitchFamily="34" charset="0"/>
-              <a:buChar char="•"/>
-            </a:pPr>
-            <a:r>
-              <a:rPr lang="en-AU" sz="2600" dirty="0" smtClean="0">
-                <a:solidFill>
-                  <a:srgbClr val="111111"/>
-                </a:solidFill>
-                <a:latin typeface="Open Sans" panose="020B0606030504020204" pitchFamily="34" charset="0"/>
-                <a:ea typeface="Open Sans" panose="020B0606030504020204" pitchFamily="34" charset="0"/>
-                <a:cs typeface="Open Sans" panose="020B0606030504020204" pitchFamily="34" charset="0"/>
-              </a:rPr>
-              <a:t>Recommend </a:t>
-            </a:r>
-            <a:r>
-              <a:rPr lang="en-AU" sz="2600" dirty="0" smtClean="0">
-                <a:solidFill>
-                  <a:srgbClr val="111111"/>
-                </a:solidFill>
-                <a:latin typeface="Open Sans" panose="020B0606030504020204" pitchFamily="34" charset="0"/>
-                <a:ea typeface="Open Sans" panose="020B0606030504020204" pitchFamily="34" charset="0"/>
-                <a:cs typeface="Open Sans" panose="020B0606030504020204" pitchFamily="34" charset="0"/>
-                <a:hlinkClick r:id="rId2"/>
-              </a:rPr>
-              <a:t>Kaspersky End Point Security Select</a:t>
-            </a:r>
-            <a:endParaRPr lang="en-AU" sz="2600" dirty="0" smtClean="0">
+        </p:txBody>
+      </p:sp>
+      <p:sp>
+        <p:nvSpPr>
+          <p:cNvPr id="5" name="Title 3"/>
+          <p:cNvSpPr txBox="1">
+            <a:spLocks/>
+          </p:cNvSpPr>
+          <p:nvPr/>
+        </p:nvSpPr>
+        <p:spPr>
+          <a:xfrm>
+            <a:off x="1524000" y="2851096"/>
+            <a:ext cx="9144000" cy="1446915"/>
+          </a:xfrm>
+          <a:prstGeom prst="rect">
+            <a:avLst/>
+          </a:prstGeom>
+        </p:spPr>
+        <p:txBody>
+          <a:bodyPr vert="horz" lIns="91440" tIns="45720" rIns="91440" bIns="45720" rtlCol="0" anchor="b">
+            <a:normAutofit/>
+          </a:bodyPr>
+          <a:lstStyle>
+            <a:lvl1pPr algn="ctr" defTabSz="914400" rtl="0" eaLnBrk="1" latinLnBrk="0" hangingPunct="1">
+              <a:lnSpc>
+                <a:spcPct val="90000"/>
+              </a:lnSpc>
+              <a:spcBef>
+                <a:spcPct val="0"/>
+              </a:spcBef>
+              <a:buNone/>
+              <a:defRPr sz="6000" kern="1200">
+                <a:solidFill>
+                  <a:schemeClr val="tx1"/>
+                </a:solidFill>
+                <a:latin typeface="+mj-lt"/>
+                <a:ea typeface="+mj-ea"/>
+                <a:cs typeface="+mj-cs"/>
+              </a:defRPr>
+            </a:lvl1pPr>
+          </a:lstStyle>
+          <a:p>
+            <a:pPr algn="l"/>
+            <a:r>
+              <a:rPr lang="en-AU" sz="3200" b="1" dirty="0" smtClean="0">
+                <a:solidFill>
+                  <a:srgbClr val="111111"/>
+                </a:solidFill>
+                <a:latin typeface="Open Sans" panose="020B0606030504020204" pitchFamily="34" charset="0"/>
+                <a:ea typeface="Open Sans" panose="020B0606030504020204" pitchFamily="34" charset="0"/>
+                <a:cs typeface="Open Sans" panose="020B0606030504020204" pitchFamily="34" charset="0"/>
+              </a:rPr>
+              <a:t>User rights</a:t>
+            </a:r>
+            <a:endParaRPr lang="en-AU" sz="3200" dirty="0">
               <a:solidFill>
                 <a:srgbClr val="111111"/>
               </a:solidFill>
@@ -11037,6 +10943,29 @@
               <a:cs typeface="Open Sans" panose="020B0606030504020204" pitchFamily="34" charset="0"/>
             </a:endParaRPr>
           </a:p>
+        </p:txBody>
+      </p:sp>
+      <p:sp>
+        <p:nvSpPr>
+          <p:cNvPr id="6" name="TextBox 5"/>
+          <p:cNvSpPr txBox="1"/>
+          <p:nvPr/>
+        </p:nvSpPr>
+        <p:spPr>
+          <a:xfrm>
+            <a:off x="1524000" y="4809641"/>
+            <a:ext cx="9144000" cy="1692771"/>
+          </a:xfrm>
+          <a:prstGeom prst="rect">
+            <a:avLst/>
+          </a:prstGeom>
+          <a:noFill/>
+        </p:spPr>
+        <p:txBody>
+          <a:bodyPr wrap="square" rtlCol="0">
+            <a:spAutoFit/>
+          </a:bodyPr>
+          <a:lstStyle/>
           <a:p>
             <a:pPr marL="285750" indent="-285750">
               <a:buFont typeface="Arial" panose="020B0604020202020204" pitchFamily="34" charset="0"/>
@@ -11051,21 +10980,9 @@
                 <a:ea typeface="Open Sans" panose="020B0606030504020204" pitchFamily="34" charset="0"/>
                 <a:cs typeface="Open Sans" panose="020B0606030504020204" pitchFamily="34" charset="0"/>
               </a:rPr>
-              <a:t>Recommend </a:t>
-            </a:r>
-            <a:r>
-              <a:rPr lang="en-AU" sz="2600" dirty="0" smtClean="0">
-                <a:solidFill>
-                  <a:srgbClr val="111111"/>
-                </a:solidFill>
-                <a:latin typeface="Open Sans" panose="020B0606030504020204" pitchFamily="34" charset="0"/>
-                <a:ea typeface="Open Sans" panose="020B0606030504020204" pitchFamily="34" charset="0"/>
-                <a:cs typeface="Open Sans" panose="020B0606030504020204" pitchFamily="34" charset="0"/>
-                <a:hlinkClick r:id="rId3"/>
-              </a:rPr>
-              <a:t>KFSensor honeypot system</a:t>
-            </a:r>
-            <a:endParaRPr lang="en-AU" sz="2600" dirty="0" smtClean="0">
+              <a:t>Configure Active Directory user groups with appropriate user rights</a:t>
+            </a:r>
+            <a:endParaRPr lang="en-AU" sz="3600" dirty="0" smtClean="0">
               <a:solidFill>
                 <a:srgbClr val="111111"/>
               </a:solidFill>
@@ -11080,17 +10997,6 @@
               <a:buChar char="•"/>
             </a:pPr>
             <a:r>
-              <a:rPr lang="en-AU" sz="2600" dirty="0">
-                <a:solidFill>
-                  <a:srgbClr val="111111"/>
-                </a:solidFill>
-                <a:latin typeface="Open Sans" panose="020B0606030504020204" pitchFamily="34" charset="0"/>
-                <a:ea typeface="Open Sans" panose="020B0606030504020204" pitchFamily="34" charset="0"/>
-                <a:cs typeface="Open Sans" panose="020B0606030504020204" pitchFamily="34" charset="0"/>
-              </a:rPr>
-              <a:t>Simulates vulnerable services to entice </a:t>
-            </a:r>
-            <a:r>
               <a:rPr lang="en-AU" sz="2600" dirty="0" smtClean="0">
                 <a:solidFill>
                   <a:srgbClr val="111111"/>
@@ -11099,11 +11005,11 @@
                 <a:ea typeface="Open Sans" panose="020B0606030504020204" pitchFamily="34" charset="0"/>
                 <a:cs typeface="Open Sans" panose="020B0606030504020204" pitchFamily="34" charset="0"/>
               </a:rPr>
-              <a:t>attacker</a:t>
-            </a:r>
-          </a:p>
-          <a:p>
-            <a:pPr marL="742950" lvl="1" indent="-285750">
+              <a:t>Reserve admin rights for IT support staff</a:t>
+            </a:r>
+          </a:p>
+          <a:p>
+            <a:pPr marL="285750" indent="-285750">
               <a:buFont typeface="Arial" panose="020B0604020202020204" pitchFamily="34" charset="0"/>
               <a:buChar char="•"/>
             </a:pPr>
@@ -11116,24 +11022,7 @@
                 <a:ea typeface="Open Sans" panose="020B0606030504020204" pitchFamily="34" charset="0"/>
                 <a:cs typeface="Open Sans" panose="020B0606030504020204" pitchFamily="34" charset="0"/>
               </a:rPr>
-              <a:t>Diverts attackers away from critical systems in the event an attacker compromises network</a:t>
-            </a:r>
-          </a:p>
-          <a:p>
-            <a:pPr marL="742950" lvl="1" indent="-285750">
-              <a:buFont typeface="Arial" panose="020B0604020202020204" pitchFamily="34" charset="0"/>
-              <a:buChar char="•"/>
-            </a:pPr>
-            <a:r>
-              <a:rPr lang="en-AU" sz="2600" dirty="0" smtClean="0">
-                <a:solidFill>
-                  <a:srgbClr val="111111"/>
-                </a:solidFill>
-                <a:latin typeface="Open Sans" panose="020B0606030504020204" pitchFamily="34" charset="0"/>
-                <a:ea typeface="Open Sans" panose="020B0606030504020204" pitchFamily="34" charset="0"/>
-                <a:cs typeface="Open Sans" panose="020B0606030504020204" pitchFamily="34" charset="0"/>
-              </a:rPr>
-              <a:t>Logs events</a:t>
+              <a:t>Enforce UAC through Active Directory group policy</a:t>
             </a:r>
           </a:p>
         </p:txBody>
@@ -11141,7 +11030,7 @@
     </p:spTree>
     <p:extLst>
       <p:ext uri="{BB962C8B-B14F-4D97-AF65-F5344CB8AC3E}">
-        <p14:creationId xmlns:p14="http://schemas.microsoft.com/office/powerpoint/2010/main" val="402785050"/>
+        <p14:creationId xmlns:p14="http://schemas.microsoft.com/office/powerpoint/2010/main" val="2924220329"/>
       </p:ext>
     </p:extLst>
   </p:cSld>
@@ -11190,8 +11079,8 @@
         </p:nvSpPr>
         <p:spPr>
           <a:xfrm>
-            <a:off x="338667" y="1"/>
-            <a:ext cx="9144000" cy="970843"/>
+            <a:off x="1524000" y="-1"/>
+            <a:ext cx="9144000" cy="1446915"/>
           </a:xfrm>
         </p:spPr>
         <p:txBody>
@@ -11202,17 +11091,17 @@
           <a:p>
             <a:pPr algn="l"/>
             <a:r>
-              <a:rPr lang="en-AU" sz="3600" b="1" dirty="0" smtClean="0">
-                <a:solidFill>
-                  <a:srgbClr val="111111"/>
-                </a:solidFill>
-                <a:latin typeface="Open Sans" panose="020B0606030504020204" pitchFamily="34" charset="0"/>
-                <a:ea typeface="Open Sans" panose="020B0606030504020204" pitchFamily="34" charset="0"/>
-                <a:cs typeface="Open Sans" panose="020B0606030504020204" pitchFamily="34" charset="0"/>
-              </a:rPr>
-              <a:t>References</a:t>
-            </a:r>
-            <a:endParaRPr lang="en-AU" sz="3600" dirty="0">
+              <a:rPr lang="en-AU" sz="3200" b="1" dirty="0" smtClean="0">
+                <a:solidFill>
+                  <a:srgbClr val="111111"/>
+                </a:solidFill>
+                <a:latin typeface="Open Sans" panose="020B0606030504020204" pitchFamily="34" charset="0"/>
+                <a:ea typeface="Open Sans" panose="020B0606030504020204" pitchFamily="34" charset="0"/>
+                <a:cs typeface="Open Sans" panose="020B0606030504020204" pitchFamily="34" charset="0"/>
+              </a:rPr>
+              <a:t>Anti-virus and network security</a:t>
+            </a:r>
+            <a:endParaRPr lang="en-AU" sz="3200" dirty="0">
               <a:solidFill>
                 <a:srgbClr val="111111"/>
               </a:solidFill>
@@ -11225,119 +11114,42 @@
       </p:sp>
       <p:sp>
         <p:nvSpPr>
-          <p:cNvPr id="5" name="Title 3"/>
-          <p:cNvSpPr txBox="1">
-            <a:spLocks/>
-          </p:cNvSpPr>
+          <p:cNvPr id="2" name="TextBox 1"/>
+          <p:cNvSpPr txBox="1"/>
           <p:nvPr/>
         </p:nvSpPr>
         <p:spPr>
           <a:xfrm>
-            <a:off x="338667" y="1196622"/>
-            <a:ext cx="11514666" cy="5113867"/>
+            <a:off x="1524000" y="1958544"/>
+            <a:ext cx="9144000" cy="2893100"/>
           </a:xfrm>
           <a:prstGeom prst="rect">
             <a:avLst/>
           </a:prstGeom>
+          <a:noFill/>
         </p:spPr>
         <p:txBody>
-          <a:bodyPr vert="horz" lIns="91440" tIns="45720" rIns="91440" bIns="45720" rtlCol="0" anchor="t">
-            <a:normAutofit lnSpcReduction="10000"/>
+          <a:bodyPr wrap="square" rtlCol="0">
+            <a:spAutoFit/>
           </a:bodyPr>
-          <a:lstStyle>
-            <a:lvl1pPr algn="ctr" defTabSz="914400" rtl="0" eaLnBrk="1" latinLnBrk="0" hangingPunct="1">
-              <a:lnSpc>
-                <a:spcPct val="90000"/>
-              </a:lnSpc>
-              <a:spcBef>
-                <a:spcPct val="0"/>
-              </a:spcBef>
-              <a:buNone/>
-              <a:defRPr sz="6000" kern="1200">
-                <a:solidFill>
-                  <a:schemeClr val="tx1"/>
-                </a:solidFill>
-                <a:latin typeface="+mj-lt"/>
-                <a:ea typeface="+mj-ea"/>
-                <a:cs typeface="+mj-cs"/>
-              </a:defRPr>
-            </a:lvl1pPr>
-          </a:lstStyle>
-          <a:p>
-            <a:pPr marL="457200" indent="-457200" algn="l">
-              <a:lnSpc>
-                <a:spcPct val="100000"/>
-              </a:lnSpc>
+          <a:lstStyle/>
+          <a:p>
+            <a:pPr marL="285750" indent="-285750">
               <a:buFont typeface="Arial" panose="020B0604020202020204" pitchFamily="34" charset="0"/>
               <a:buChar char="•"/>
             </a:pPr>
             <a:r>
-              <a:rPr lang="en-AU" sz="1400" dirty="0">
-                <a:solidFill>
-                  <a:srgbClr val="111111"/>
-                </a:solidFill>
-                <a:latin typeface="Open Sans" panose="020B0606030504020204" pitchFamily="34" charset="0"/>
-                <a:ea typeface="Open Sans" panose="020B0606030504020204" pitchFamily="34" charset="0"/>
-                <a:cs typeface="Open Sans" panose="020B0606030504020204" pitchFamily="34" charset="0"/>
-              </a:rPr>
-              <a:t>Baker, W. H., Hylender, C. D., &amp; Valentine, J. A. (2008). 2008 Data Breach Investigations Report, 1–29</a:t>
-            </a:r>
-            <a:r>
-              <a:rPr lang="en-AU" sz="1400" dirty="0" smtClean="0">
-                <a:solidFill>
-                  <a:srgbClr val="111111"/>
-                </a:solidFill>
-                <a:latin typeface="Open Sans" panose="020B0606030504020204" pitchFamily="34" charset="0"/>
-                <a:ea typeface="Open Sans" panose="020B0606030504020204" pitchFamily="34" charset="0"/>
-                <a:cs typeface="Open Sans" panose="020B0606030504020204" pitchFamily="34" charset="0"/>
-              </a:rPr>
-              <a:t>.</a:t>
-            </a:r>
-          </a:p>
-          <a:p>
-            <a:pPr marL="457200" indent="-457200" algn="l">
-              <a:lnSpc>
-                <a:spcPct val="100000"/>
-              </a:lnSpc>
-              <a:buFont typeface="Arial" panose="020B0604020202020204" pitchFamily="34" charset="0"/>
-              <a:buChar char="•"/>
-            </a:pPr>
-            <a:r>
-              <a:rPr lang="en-AU" sz="1400" dirty="0">
-                <a:solidFill>
-                  <a:srgbClr val="111111"/>
-                </a:solidFill>
-                <a:latin typeface="Open Sans" panose="020B0606030504020204" pitchFamily="34" charset="0"/>
-                <a:ea typeface="Open Sans" panose="020B0606030504020204" pitchFamily="34" charset="0"/>
-                <a:cs typeface="Open Sans" panose="020B0606030504020204" pitchFamily="34" charset="0"/>
-              </a:rPr>
-              <a:t>Goodin, D. (2014). Stanford’s password policy shuns one-size-fits-all security | Ars Technica. Ars Technica. Retrieved April 30, 2015, from </a:t>
-            </a:r>
-            <a:r>
-              <a:rPr lang="en-AU" sz="1400" dirty="0">
-                <a:solidFill>
-                  <a:srgbClr val="111111"/>
-                </a:solidFill>
-                <a:latin typeface="Open Sans" panose="020B0606030504020204" pitchFamily="34" charset="0"/>
-                <a:ea typeface="Open Sans" panose="020B0606030504020204" pitchFamily="34" charset="0"/>
-                <a:cs typeface="Open Sans" panose="020B0606030504020204" pitchFamily="34" charset="0"/>
-                <a:hlinkClick r:id="rId2"/>
-              </a:rPr>
-              <a:t>http://arstechnica.com/security/2014/04/25/stanfords-password-policy-shuns-one-size-fits-all-security</a:t>
-            </a:r>
-            <a:r>
-              <a:rPr lang="en-AU" sz="1400" dirty="0" smtClean="0">
-                <a:solidFill>
-                  <a:srgbClr val="111111"/>
-                </a:solidFill>
-                <a:latin typeface="Open Sans" panose="020B0606030504020204" pitchFamily="34" charset="0"/>
-                <a:ea typeface="Open Sans" panose="020B0606030504020204" pitchFamily="34" charset="0"/>
-                <a:cs typeface="Open Sans" panose="020B0606030504020204" pitchFamily="34" charset="0"/>
-                <a:hlinkClick r:id="rId2"/>
-              </a:rPr>
-              <a:t>/</a:t>
-            </a:r>
-            <a:endParaRPr lang="en-AU" sz="1400" dirty="0" smtClean="0">
+              <a:rPr lang="en-AU" sz="2600" dirty="0" smtClean="0">
+                <a:solidFill>
+                  <a:srgbClr val="111111"/>
+                </a:solidFill>
+                <a:latin typeface="Open Sans" panose="020B0606030504020204" pitchFamily="34" charset="0"/>
+                <a:ea typeface="Open Sans" panose="020B0606030504020204" pitchFamily="34" charset="0"/>
+                <a:cs typeface="Open Sans" panose="020B0606030504020204" pitchFamily="34" charset="0"/>
+              </a:rPr>
+              <a:t>Remove fake anti-virus</a:t>
+            </a:r>
+            <a:endParaRPr lang="en-AU" sz="2600" dirty="0">
               <a:solidFill>
                 <a:srgbClr val="111111"/>
               </a:solidFill>
@@ -11347,49 +11159,34 @@
             </a:endParaRPr>
           </a:p>
           <a:p>
-            <a:pPr marL="457200" indent="-457200" algn="l">
-              <a:lnSpc>
-                <a:spcPct val="100000"/>
-              </a:lnSpc>
+            <a:pPr marL="285750" indent="-285750">
               <a:buFont typeface="Arial" panose="020B0604020202020204" pitchFamily="34" charset="0"/>
               <a:buChar char="•"/>
             </a:pPr>
             <a:r>
-              <a:rPr lang="en-AU" sz="1400" dirty="0">
-                <a:solidFill>
-                  <a:srgbClr val="111111"/>
-                </a:solidFill>
-                <a:latin typeface="Open Sans" panose="020B0606030504020204" pitchFamily="34" charset="0"/>
-                <a:ea typeface="Open Sans" panose="020B0606030504020204" pitchFamily="34" charset="0"/>
-                <a:cs typeface="Open Sans" panose="020B0606030504020204" pitchFamily="34" charset="0"/>
-              </a:rPr>
-              <a:t>Machkovech, S. (2015). Hacked French network exposed its own passwords during TV interview | Ars Technica. Ars Technica. Retrieved May 6, 2015, from </a:t>
-            </a:r>
-            <a:r>
-              <a:rPr lang="en-AU" sz="1400" dirty="0">
-                <a:solidFill>
-                  <a:srgbClr val="111111"/>
-                </a:solidFill>
-                <a:latin typeface="Open Sans" panose="020B0606030504020204" pitchFamily="34" charset="0"/>
-                <a:ea typeface="Open Sans" panose="020B0606030504020204" pitchFamily="34" charset="0"/>
-                <a:cs typeface="Open Sans" panose="020B0606030504020204" pitchFamily="34" charset="0"/>
-                <a:hlinkClick r:id="rId3"/>
-              </a:rPr>
-              <a:t>http://arstechnica.com/security/2015/04/09/hacked-french-network-exposed-its-own-passwords-during-tv-interview</a:t>
-            </a:r>
-            <a:r>
-              <a:rPr lang="en-AU" sz="1400" dirty="0" smtClean="0">
-                <a:solidFill>
-                  <a:srgbClr val="111111"/>
-                </a:solidFill>
-                <a:latin typeface="Open Sans" panose="020B0606030504020204" pitchFamily="34" charset="0"/>
-                <a:ea typeface="Open Sans" panose="020B0606030504020204" pitchFamily="34" charset="0"/>
-                <a:cs typeface="Open Sans" panose="020B0606030504020204" pitchFamily="34" charset="0"/>
-                <a:hlinkClick r:id="rId3"/>
-              </a:rPr>
-              <a:t>/</a:t>
-            </a:r>
-            <a:endParaRPr lang="en-AU" sz="1400" dirty="0" smtClean="0">
+              <a:rPr lang="en-AU" sz="2600" dirty="0" smtClean="0">
+                <a:solidFill>
+                  <a:srgbClr val="111111"/>
+                </a:solidFill>
+                <a:latin typeface="Open Sans" panose="020B0606030504020204" pitchFamily="34" charset="0"/>
+                <a:ea typeface="Open Sans" panose="020B0606030504020204" pitchFamily="34" charset="0"/>
+                <a:cs typeface="Open Sans" panose="020B0606030504020204" pitchFamily="34" charset="0"/>
+              </a:rPr>
+              <a:t>Recommend </a:t>
+            </a:r>
+            <a:r>
+              <a:rPr lang="en-AU" sz="2600" dirty="0" smtClean="0">
+                <a:solidFill>
+                  <a:srgbClr val="111111"/>
+                </a:solidFill>
+                <a:latin typeface="Open Sans" panose="020B0606030504020204" pitchFamily="34" charset="0"/>
+                <a:ea typeface="Open Sans" panose="020B0606030504020204" pitchFamily="34" charset="0"/>
+                <a:cs typeface="Open Sans" panose="020B0606030504020204" pitchFamily="34" charset="0"/>
+                <a:hlinkClick r:id="rId2"/>
+              </a:rPr>
+              <a:t>Kaspersky End Point Security Select</a:t>
+            </a:r>
+            <a:endParaRPr lang="en-AU" sz="2600" dirty="0" smtClean="0">
               <a:solidFill>
                 <a:srgbClr val="111111"/>
               </a:solidFill>
@@ -11399,71 +11196,34 @@
             </a:endParaRPr>
           </a:p>
           <a:p>
-            <a:pPr marL="457200" indent="-457200" algn="l">
-              <a:lnSpc>
-                <a:spcPct val="100000"/>
-              </a:lnSpc>
+            <a:pPr marL="285750" indent="-285750">
               <a:buFont typeface="Arial" panose="020B0604020202020204" pitchFamily="34" charset="0"/>
               <a:buChar char="•"/>
             </a:pPr>
             <a:r>
-              <a:rPr lang="en-AU" sz="1400" dirty="0">
-                <a:solidFill>
-                  <a:srgbClr val="111111"/>
-                </a:solidFill>
-                <a:latin typeface="Open Sans" panose="020B0606030504020204" pitchFamily="34" charset="0"/>
-                <a:ea typeface="Open Sans" panose="020B0606030504020204" pitchFamily="34" charset="0"/>
-                <a:cs typeface="Open Sans" panose="020B0606030504020204" pitchFamily="34" charset="0"/>
-              </a:rPr>
-              <a:t>Microsoft. (</a:t>
-            </a:r>
-            <a:r>
-              <a:rPr lang="en-AU" sz="1400" dirty="0" smtClean="0">
-                <a:solidFill>
-                  <a:srgbClr val="111111"/>
-                </a:solidFill>
-                <a:latin typeface="Open Sans" panose="020B0606030504020204" pitchFamily="34" charset="0"/>
-                <a:ea typeface="Open Sans" panose="020B0606030504020204" pitchFamily="34" charset="0"/>
-                <a:cs typeface="Open Sans" panose="020B0606030504020204" pitchFamily="34" charset="0"/>
-              </a:rPr>
-              <a:t>2005a). </a:t>
-            </a:r>
-            <a:r>
-              <a:rPr lang="en-AU" sz="1400" dirty="0">
-                <a:solidFill>
-                  <a:srgbClr val="111111"/>
-                </a:solidFill>
-                <a:latin typeface="Open Sans" panose="020B0606030504020204" pitchFamily="34" charset="0"/>
-                <a:ea typeface="Open Sans" panose="020B0606030504020204" pitchFamily="34" charset="0"/>
-                <a:cs typeface="Open Sans" panose="020B0606030504020204" pitchFamily="34" charset="0"/>
-              </a:rPr>
-              <a:t>Apply or modify password policy: Logon and Authentication. Retrieved May 14, 2015, from </a:t>
-            </a:r>
-            <a:r>
-              <a:rPr lang="en-AU" sz="1400" dirty="0">
-                <a:solidFill>
-                  <a:srgbClr val="111111"/>
-                </a:solidFill>
-                <a:latin typeface="Open Sans" panose="020B0606030504020204" pitchFamily="34" charset="0"/>
-                <a:ea typeface="Open Sans" panose="020B0606030504020204" pitchFamily="34" charset="0"/>
-                <a:cs typeface="Open Sans" panose="020B0606030504020204" pitchFamily="34" charset="0"/>
-                <a:hlinkClick r:id="rId4"/>
-              </a:rPr>
-              <a:t>https://technet.microsoft.com/en-au/library/cc781633(v=ws.10).aspx?f=255&amp;MSPPError=-</a:t>
-            </a:r>
-            <a:r>
-              <a:rPr lang="en-AU" sz="1400" dirty="0" smtClean="0">
-                <a:solidFill>
-                  <a:srgbClr val="111111"/>
-                </a:solidFill>
-                <a:latin typeface="Open Sans" panose="020B0606030504020204" pitchFamily="34" charset="0"/>
-                <a:ea typeface="Open Sans" panose="020B0606030504020204" pitchFamily="34" charset="0"/>
-                <a:cs typeface="Open Sans" panose="020B0606030504020204" pitchFamily="34" charset="0"/>
-                <a:hlinkClick r:id="rId4"/>
-              </a:rPr>
-              <a:t>2147217396#BKMK_3</a:t>
-            </a:r>
-            <a:endParaRPr lang="en-AU" sz="1400" dirty="0" smtClean="0">
+              <a:rPr lang="en-AU" sz="2600" dirty="0" smtClean="0">
+                <a:solidFill>
+                  <a:srgbClr val="111111"/>
+                </a:solidFill>
+                <a:latin typeface="Open Sans" panose="020B0606030504020204" pitchFamily="34" charset="0"/>
+                <a:ea typeface="Open Sans" panose="020B0606030504020204" pitchFamily="34" charset="0"/>
+                <a:cs typeface="Open Sans" panose="020B0606030504020204" pitchFamily="34" charset="0"/>
+              </a:rPr>
+              <a:t>Recommend </a:t>
+            </a:r>
+            <a:r>
+              <a:rPr lang="en-AU" sz="2600" dirty="0" smtClean="0">
+                <a:solidFill>
+                  <a:srgbClr val="111111"/>
+                </a:solidFill>
+                <a:latin typeface="Open Sans" panose="020B0606030504020204" pitchFamily="34" charset="0"/>
+                <a:ea typeface="Open Sans" panose="020B0606030504020204" pitchFamily="34" charset="0"/>
+                <a:cs typeface="Open Sans" panose="020B0606030504020204" pitchFamily="34" charset="0"/>
+                <a:hlinkClick r:id="rId3"/>
+              </a:rPr>
+              <a:t>KFSensor honeypot system</a:t>
+            </a:r>
+            <a:endParaRPr lang="en-AU" sz="2600" dirty="0" smtClean="0">
               <a:solidFill>
                 <a:srgbClr val="111111"/>
               </a:solidFill>
@@ -11473,508 +11233,73 @@
             </a:endParaRPr>
           </a:p>
           <a:p>
-            <a:pPr marL="457200" indent="-457200" algn="l">
-              <a:lnSpc>
-                <a:spcPct val="100000"/>
-              </a:lnSpc>
+            <a:pPr marL="742950" lvl="1" indent="-285750">
               <a:buFont typeface="Arial" panose="020B0604020202020204" pitchFamily="34" charset="0"/>
               <a:buChar char="•"/>
             </a:pPr>
             <a:r>
-              <a:rPr lang="en-AU" sz="1400" dirty="0">
-                <a:solidFill>
-                  <a:srgbClr val="111111"/>
-                </a:solidFill>
-                <a:latin typeface="Open Sans" panose="020B0606030504020204" pitchFamily="34" charset="0"/>
-                <a:ea typeface="Open Sans" panose="020B0606030504020204" pitchFamily="34" charset="0"/>
-                <a:cs typeface="Open Sans" panose="020B0606030504020204" pitchFamily="34" charset="0"/>
-              </a:rPr>
-              <a:t>Microsoft. (</a:t>
-            </a:r>
-            <a:r>
-              <a:rPr lang="en-AU" sz="1400" dirty="0" smtClean="0">
-                <a:solidFill>
-                  <a:srgbClr val="111111"/>
-                </a:solidFill>
-                <a:latin typeface="Open Sans" panose="020B0606030504020204" pitchFamily="34" charset="0"/>
-                <a:ea typeface="Open Sans" panose="020B0606030504020204" pitchFamily="34" charset="0"/>
-                <a:cs typeface="Open Sans" panose="020B0606030504020204" pitchFamily="34" charset="0"/>
-              </a:rPr>
-              <a:t>2005b). </a:t>
-            </a:r>
-            <a:r>
-              <a:rPr lang="en-AU" sz="1400" dirty="0">
-                <a:solidFill>
-                  <a:srgbClr val="111111"/>
-                </a:solidFill>
-                <a:latin typeface="Open Sans" panose="020B0606030504020204" pitchFamily="34" charset="0"/>
-                <a:ea typeface="Open Sans" panose="020B0606030504020204" pitchFamily="34" charset="0"/>
-                <a:cs typeface="Open Sans" panose="020B0606030504020204" pitchFamily="34" charset="0"/>
-              </a:rPr>
-              <a:t>Assign user rights to a group in Active Directory: Active Directory. Retrieved May 14, 2015, from </a:t>
-            </a:r>
-            <a:r>
-              <a:rPr lang="en-AU" sz="1400" dirty="0">
-                <a:solidFill>
-                  <a:srgbClr val="111111"/>
-                </a:solidFill>
-                <a:latin typeface="Open Sans" panose="020B0606030504020204" pitchFamily="34" charset="0"/>
-                <a:ea typeface="Open Sans" panose="020B0606030504020204" pitchFamily="34" charset="0"/>
-                <a:cs typeface="Open Sans" panose="020B0606030504020204" pitchFamily="34" charset="0"/>
-                <a:hlinkClick r:id="rId5"/>
-              </a:rPr>
-              <a:t>https://technet.microsoft.com/en-au/library/cc786658(v=ws.10).</a:t>
-            </a:r>
-            <a:r>
-              <a:rPr lang="en-AU" sz="1400" dirty="0" smtClean="0">
-                <a:solidFill>
-                  <a:srgbClr val="111111"/>
-                </a:solidFill>
-                <a:latin typeface="Open Sans" panose="020B0606030504020204" pitchFamily="34" charset="0"/>
-                <a:ea typeface="Open Sans" panose="020B0606030504020204" pitchFamily="34" charset="0"/>
-                <a:cs typeface="Open Sans" panose="020B0606030504020204" pitchFamily="34" charset="0"/>
-                <a:hlinkClick r:id="rId5"/>
-              </a:rPr>
-              <a:t>aspx</a:t>
-            </a:r>
-            <a:endParaRPr lang="en-AU" sz="1400" dirty="0" smtClean="0">
-              <a:solidFill>
-                <a:srgbClr val="111111"/>
-              </a:solidFill>
-              <a:latin typeface="Open Sans" panose="020B0606030504020204" pitchFamily="34" charset="0"/>
-              <a:ea typeface="Open Sans" panose="020B0606030504020204" pitchFamily="34" charset="0"/>
-              <a:cs typeface="Open Sans" panose="020B0606030504020204" pitchFamily="34" charset="0"/>
-            </a:endParaRPr>
-          </a:p>
-          <a:p>
-            <a:pPr marL="457200" indent="-457200" algn="l">
-              <a:lnSpc>
-                <a:spcPct val="100000"/>
-              </a:lnSpc>
+              <a:rPr lang="en-AU" sz="2600" dirty="0">
+                <a:solidFill>
+                  <a:srgbClr val="111111"/>
+                </a:solidFill>
+                <a:latin typeface="Open Sans" panose="020B0606030504020204" pitchFamily="34" charset="0"/>
+                <a:ea typeface="Open Sans" panose="020B0606030504020204" pitchFamily="34" charset="0"/>
+                <a:cs typeface="Open Sans" panose="020B0606030504020204" pitchFamily="34" charset="0"/>
+              </a:rPr>
+              <a:t>Simulates vulnerable services to entice </a:t>
+            </a:r>
+            <a:r>
+              <a:rPr lang="en-AU" sz="2600" dirty="0" smtClean="0">
+                <a:solidFill>
+                  <a:srgbClr val="111111"/>
+                </a:solidFill>
+                <a:latin typeface="Open Sans" panose="020B0606030504020204" pitchFamily="34" charset="0"/>
+                <a:ea typeface="Open Sans" panose="020B0606030504020204" pitchFamily="34" charset="0"/>
+                <a:cs typeface="Open Sans" panose="020B0606030504020204" pitchFamily="34" charset="0"/>
+              </a:rPr>
+              <a:t>attacker</a:t>
+            </a:r>
+          </a:p>
+          <a:p>
+            <a:pPr marL="742950" lvl="1" indent="-285750">
               <a:buFont typeface="Arial" panose="020B0604020202020204" pitchFamily="34" charset="0"/>
               <a:buChar char="•"/>
             </a:pPr>
             <a:r>
-              <a:rPr lang="en-AU" sz="1400" dirty="0" smtClean="0">
-                <a:solidFill>
-                  <a:srgbClr val="111111"/>
-                </a:solidFill>
-                <a:latin typeface="Open Sans" panose="020B0606030504020204" pitchFamily="34" charset="0"/>
-                <a:ea typeface="Open Sans" panose="020B0606030504020204" pitchFamily="34" charset="0"/>
-                <a:cs typeface="Open Sans" panose="020B0606030504020204" pitchFamily="34" charset="0"/>
-              </a:rPr>
-              <a:t>Microsoft</a:t>
-            </a:r>
-            <a:r>
-              <a:rPr lang="en-AU" sz="1400" dirty="0">
-                <a:solidFill>
-                  <a:srgbClr val="111111"/>
-                </a:solidFill>
-                <a:latin typeface="Open Sans" panose="020B0606030504020204" pitchFamily="34" charset="0"/>
-                <a:ea typeface="Open Sans" panose="020B0606030504020204" pitchFamily="34" charset="0"/>
-                <a:cs typeface="Open Sans" panose="020B0606030504020204" pitchFamily="34" charset="0"/>
-              </a:rPr>
-              <a:t>. (2007). Configure UAC settings via policy - Microsoft Reduce Customer Effort Center - Site Home - TechNet Blogs. Retrieved May 14, 2015, from </a:t>
-            </a:r>
-            <a:r>
-              <a:rPr lang="en-AU" sz="1400" dirty="0">
-                <a:solidFill>
-                  <a:srgbClr val="111111"/>
-                </a:solidFill>
-                <a:latin typeface="Open Sans" panose="020B0606030504020204" pitchFamily="34" charset="0"/>
-                <a:ea typeface="Open Sans" panose="020B0606030504020204" pitchFamily="34" charset="0"/>
-                <a:cs typeface="Open Sans" panose="020B0606030504020204" pitchFamily="34" charset="0"/>
-                <a:hlinkClick r:id="rId6"/>
-              </a:rPr>
-              <a:t>http://</a:t>
-            </a:r>
-            <a:r>
-              <a:rPr lang="en-AU" sz="1400" dirty="0" smtClean="0">
-                <a:solidFill>
-                  <a:srgbClr val="111111"/>
-                </a:solidFill>
-                <a:latin typeface="Open Sans" panose="020B0606030504020204" pitchFamily="34" charset="0"/>
-                <a:ea typeface="Open Sans" panose="020B0606030504020204" pitchFamily="34" charset="0"/>
-                <a:cs typeface="Open Sans" panose="020B0606030504020204" pitchFamily="34" charset="0"/>
-                <a:hlinkClick r:id="rId6"/>
-              </a:rPr>
-              <a:t>blogs.technet.com/b/asiasupp/archive/2007/02/08/configure-uac-settings-via-policy.aspx</a:t>
-            </a:r>
-            <a:endParaRPr lang="en-AU" sz="1400" dirty="0" smtClean="0">
-              <a:solidFill>
-                <a:srgbClr val="111111"/>
-              </a:solidFill>
-              <a:latin typeface="Open Sans" panose="020B0606030504020204" pitchFamily="34" charset="0"/>
-              <a:ea typeface="Open Sans" panose="020B0606030504020204" pitchFamily="34" charset="0"/>
-              <a:cs typeface="Open Sans" panose="020B0606030504020204" pitchFamily="34" charset="0"/>
-            </a:endParaRPr>
-          </a:p>
-          <a:p>
-            <a:pPr marL="457200" indent="-457200" algn="l">
-              <a:lnSpc>
-                <a:spcPct val="100000"/>
-              </a:lnSpc>
+              <a:rPr lang="en-AU" sz="2600" dirty="0" smtClean="0">
+                <a:solidFill>
+                  <a:srgbClr val="111111"/>
+                </a:solidFill>
+                <a:latin typeface="Open Sans" panose="020B0606030504020204" pitchFamily="34" charset="0"/>
+                <a:ea typeface="Open Sans" panose="020B0606030504020204" pitchFamily="34" charset="0"/>
+                <a:cs typeface="Open Sans" panose="020B0606030504020204" pitchFamily="34" charset="0"/>
+              </a:rPr>
+              <a:t>Diverts attackers away from critical systems in the event an attacker compromises network</a:t>
+            </a:r>
+          </a:p>
+          <a:p>
+            <a:pPr marL="742950" lvl="1" indent="-285750">
               <a:buFont typeface="Arial" panose="020B0604020202020204" pitchFamily="34" charset="0"/>
               <a:buChar char="•"/>
             </a:pPr>
             <a:r>
-              <a:rPr lang="en-AU" sz="1400" dirty="0">
-                <a:solidFill>
-                  <a:srgbClr val="111111"/>
-                </a:solidFill>
-                <a:latin typeface="Open Sans" panose="020B0606030504020204" pitchFamily="34" charset="0"/>
-                <a:ea typeface="Open Sans" panose="020B0606030504020204" pitchFamily="34" charset="0"/>
-                <a:cs typeface="Open Sans" panose="020B0606030504020204" pitchFamily="34" charset="0"/>
-              </a:rPr>
-              <a:t>Microsoft. (2012). Password must meet complexity requirements. Retrieved May 14, 2015, from </a:t>
-            </a:r>
-            <a:r>
-              <a:rPr lang="en-AU" sz="1400" dirty="0">
-                <a:solidFill>
-                  <a:srgbClr val="111111"/>
-                </a:solidFill>
-                <a:latin typeface="Open Sans" panose="020B0606030504020204" pitchFamily="34" charset="0"/>
-                <a:ea typeface="Open Sans" panose="020B0606030504020204" pitchFamily="34" charset="0"/>
-                <a:cs typeface="Open Sans" panose="020B0606030504020204" pitchFamily="34" charset="0"/>
-                <a:hlinkClick r:id="rId7"/>
-              </a:rPr>
-              <a:t>https://technet.microsoft.com/en-us/library/hh994562(v=ws.10).</a:t>
-            </a:r>
-            <a:r>
-              <a:rPr lang="en-AU" sz="1400" dirty="0" smtClean="0">
-                <a:solidFill>
-                  <a:srgbClr val="111111"/>
-                </a:solidFill>
-                <a:latin typeface="Open Sans" panose="020B0606030504020204" pitchFamily="34" charset="0"/>
-                <a:ea typeface="Open Sans" panose="020B0606030504020204" pitchFamily="34" charset="0"/>
-                <a:cs typeface="Open Sans" panose="020B0606030504020204" pitchFamily="34" charset="0"/>
-                <a:hlinkClick r:id="rId7"/>
-              </a:rPr>
-              <a:t>aspx</a:t>
-            </a:r>
-            <a:endParaRPr lang="en-AU" sz="1400" dirty="0" smtClean="0">
-              <a:solidFill>
-                <a:srgbClr val="111111"/>
-              </a:solidFill>
-              <a:latin typeface="Open Sans" panose="020B0606030504020204" pitchFamily="34" charset="0"/>
-              <a:ea typeface="Open Sans" panose="020B0606030504020204" pitchFamily="34" charset="0"/>
-              <a:cs typeface="Open Sans" panose="020B0606030504020204" pitchFamily="34" charset="0"/>
-            </a:endParaRPr>
-          </a:p>
-          <a:p>
-            <a:pPr marL="457200" indent="-457200" algn="l">
-              <a:lnSpc>
-                <a:spcPct val="100000"/>
-              </a:lnSpc>
-              <a:buFont typeface="Arial" panose="020B0604020202020204" pitchFamily="34" charset="0"/>
-              <a:buChar char="•"/>
-            </a:pPr>
-            <a:r>
-              <a:rPr lang="en-AU" sz="1400" dirty="0">
-                <a:solidFill>
-                  <a:srgbClr val="111111"/>
-                </a:solidFill>
-                <a:latin typeface="Open Sans" panose="020B0606030504020204" pitchFamily="34" charset="0"/>
-                <a:ea typeface="Open Sans" panose="020B0606030504020204" pitchFamily="34" charset="0"/>
-                <a:cs typeface="Open Sans" panose="020B0606030504020204" pitchFamily="34" charset="0"/>
-              </a:rPr>
-              <a:t>Microsoft. (n.d.-a). Screen Saver timeout. Retrieved May 14, 2015, from </a:t>
-            </a:r>
-            <a:r>
-              <a:rPr lang="en-AU" sz="1400" dirty="0">
-                <a:solidFill>
-                  <a:srgbClr val="111111"/>
-                </a:solidFill>
-                <a:latin typeface="Open Sans" panose="020B0606030504020204" pitchFamily="34" charset="0"/>
-                <a:ea typeface="Open Sans" panose="020B0606030504020204" pitchFamily="34" charset="0"/>
-                <a:cs typeface="Open Sans" panose="020B0606030504020204" pitchFamily="34" charset="0"/>
-                <a:hlinkClick r:id="rId8"/>
-              </a:rPr>
-              <a:t>https://</a:t>
-            </a:r>
-            <a:r>
-              <a:rPr lang="en-AU" sz="1400" dirty="0" smtClean="0">
-                <a:solidFill>
-                  <a:srgbClr val="111111"/>
-                </a:solidFill>
-                <a:latin typeface="Open Sans" panose="020B0606030504020204" pitchFamily="34" charset="0"/>
-                <a:ea typeface="Open Sans" panose="020B0606030504020204" pitchFamily="34" charset="0"/>
-                <a:cs typeface="Open Sans" panose="020B0606030504020204" pitchFamily="34" charset="0"/>
-                <a:hlinkClick r:id="rId8"/>
-              </a:rPr>
-              <a:t>technet.microsoft.com/en-us/library/cc961876.aspx</a:t>
-            </a:r>
-            <a:endParaRPr lang="en-AU" sz="1400" dirty="0" smtClean="0">
-              <a:solidFill>
-                <a:srgbClr val="111111"/>
-              </a:solidFill>
-              <a:latin typeface="Open Sans" panose="020B0606030504020204" pitchFamily="34" charset="0"/>
-              <a:ea typeface="Open Sans" panose="020B0606030504020204" pitchFamily="34" charset="0"/>
-              <a:cs typeface="Open Sans" panose="020B0606030504020204" pitchFamily="34" charset="0"/>
-            </a:endParaRPr>
-          </a:p>
-          <a:p>
-            <a:pPr marL="457200" indent="-457200" algn="l">
-              <a:lnSpc>
-                <a:spcPct val="100000"/>
-              </a:lnSpc>
-              <a:buFont typeface="Arial" panose="020B0604020202020204" pitchFamily="34" charset="0"/>
-              <a:buChar char="•"/>
-            </a:pPr>
-            <a:r>
-              <a:rPr lang="en-AU" sz="1400" dirty="0">
-                <a:solidFill>
-                  <a:srgbClr val="111111"/>
-                </a:solidFill>
-                <a:latin typeface="Open Sans" panose="020B0606030504020204" pitchFamily="34" charset="0"/>
-                <a:ea typeface="Open Sans" panose="020B0606030504020204" pitchFamily="34" charset="0"/>
-                <a:cs typeface="Open Sans" panose="020B0606030504020204" pitchFamily="34" charset="0"/>
-              </a:rPr>
-              <a:t>Microsoft. (n.d.-b). What is User Account Control? - Windows Help. Retrieved March 14, 2015, from </a:t>
-            </a:r>
-            <a:r>
-              <a:rPr lang="en-AU" sz="1400" dirty="0">
-                <a:solidFill>
-                  <a:srgbClr val="111111"/>
-                </a:solidFill>
-                <a:latin typeface="Open Sans" panose="020B0606030504020204" pitchFamily="34" charset="0"/>
-                <a:ea typeface="Open Sans" panose="020B0606030504020204" pitchFamily="34" charset="0"/>
-                <a:cs typeface="Open Sans" panose="020B0606030504020204" pitchFamily="34" charset="0"/>
-                <a:hlinkClick r:id="rId9"/>
-              </a:rPr>
-              <a:t>http://</a:t>
-            </a:r>
-            <a:r>
-              <a:rPr lang="en-AU" sz="1400" dirty="0" smtClean="0">
-                <a:solidFill>
-                  <a:srgbClr val="111111"/>
-                </a:solidFill>
-                <a:latin typeface="Open Sans" panose="020B0606030504020204" pitchFamily="34" charset="0"/>
-                <a:ea typeface="Open Sans" panose="020B0606030504020204" pitchFamily="34" charset="0"/>
-                <a:cs typeface="Open Sans" panose="020B0606030504020204" pitchFamily="34" charset="0"/>
-                <a:hlinkClick r:id="rId9"/>
-              </a:rPr>
-              <a:t>windows.microsoft.com/en-au/windows/what-is-user-account-control#1TC=windows-vista</a:t>
-            </a:r>
-            <a:endParaRPr lang="en-AU" sz="1400" dirty="0" smtClean="0">
-              <a:solidFill>
-                <a:srgbClr val="111111"/>
-              </a:solidFill>
-              <a:latin typeface="Open Sans" panose="020B0606030504020204" pitchFamily="34" charset="0"/>
-              <a:ea typeface="Open Sans" panose="020B0606030504020204" pitchFamily="34" charset="0"/>
-              <a:cs typeface="Open Sans" panose="020B0606030504020204" pitchFamily="34" charset="0"/>
-            </a:endParaRPr>
-          </a:p>
-          <a:p>
-            <a:pPr marL="457200" indent="-457200" algn="l">
-              <a:lnSpc>
-                <a:spcPct val="100000"/>
-              </a:lnSpc>
-              <a:buFont typeface="Arial" panose="020B0604020202020204" pitchFamily="34" charset="0"/>
-              <a:buChar char="•"/>
-            </a:pPr>
-            <a:r>
-              <a:rPr lang="en-AU" sz="1400" dirty="0">
-                <a:solidFill>
-                  <a:srgbClr val="111111"/>
-                </a:solidFill>
-                <a:latin typeface="Open Sans" panose="020B0606030504020204" pitchFamily="34" charset="0"/>
-                <a:ea typeface="Open Sans" panose="020B0606030504020204" pitchFamily="34" charset="0"/>
-                <a:cs typeface="Open Sans" panose="020B0606030504020204" pitchFamily="34" charset="0"/>
-              </a:rPr>
-              <a:t>O’Connor, E. (2008). BigAdmin Feature Article: Patch Management Best Practices. Retrieved May 13, 2015, from </a:t>
-            </a:r>
-            <a:r>
-              <a:rPr lang="en-AU" sz="1400" dirty="0">
-                <a:solidFill>
-                  <a:srgbClr val="111111"/>
-                </a:solidFill>
-                <a:latin typeface="Open Sans" panose="020B0606030504020204" pitchFamily="34" charset="0"/>
-                <a:ea typeface="Open Sans" panose="020B0606030504020204" pitchFamily="34" charset="0"/>
-                <a:cs typeface="Open Sans" panose="020B0606030504020204" pitchFamily="34" charset="0"/>
-                <a:hlinkClick r:id="rId10"/>
-              </a:rPr>
-              <a:t>http://</a:t>
-            </a:r>
-            <a:r>
-              <a:rPr lang="en-AU" sz="1400" dirty="0" smtClean="0">
-                <a:solidFill>
-                  <a:srgbClr val="111111"/>
-                </a:solidFill>
-                <a:latin typeface="Open Sans" panose="020B0606030504020204" pitchFamily="34" charset="0"/>
-                <a:ea typeface="Open Sans" panose="020B0606030504020204" pitchFamily="34" charset="0"/>
-                <a:cs typeface="Open Sans" panose="020B0606030504020204" pitchFamily="34" charset="0"/>
-                <a:hlinkClick r:id="rId10"/>
-              </a:rPr>
-              <a:t>www.oracle.com/technetwork/systems/articles/patch-management-jsp-135385.html</a:t>
-            </a:r>
-            <a:endParaRPr lang="en-AU" sz="1400" dirty="0" smtClean="0">
-              <a:solidFill>
-                <a:srgbClr val="111111"/>
-              </a:solidFill>
-              <a:latin typeface="Open Sans" panose="020B0606030504020204" pitchFamily="34" charset="0"/>
-              <a:ea typeface="Open Sans" panose="020B0606030504020204" pitchFamily="34" charset="0"/>
-              <a:cs typeface="Open Sans" panose="020B0606030504020204" pitchFamily="34" charset="0"/>
-            </a:endParaRPr>
-          </a:p>
-          <a:p>
-            <a:pPr marL="457200" indent="-457200" algn="l">
-              <a:lnSpc>
-                <a:spcPct val="100000"/>
-              </a:lnSpc>
-              <a:buFont typeface="Arial" panose="020B0604020202020204" pitchFamily="34" charset="0"/>
-              <a:buChar char="•"/>
-            </a:pPr>
-            <a:r>
-              <a:rPr lang="en-AU" sz="1400" dirty="0">
-                <a:solidFill>
-                  <a:srgbClr val="111111"/>
-                </a:solidFill>
-                <a:latin typeface="Open Sans" panose="020B0606030504020204" pitchFamily="34" charset="0"/>
-                <a:ea typeface="Open Sans" panose="020B0606030504020204" pitchFamily="34" charset="0"/>
-                <a:cs typeface="Open Sans" panose="020B0606030504020204" pitchFamily="34" charset="0"/>
-              </a:rPr>
-              <a:t>Oliver, J., &amp; Snowden, E. [LastWeekTonight]. (2015, April 9). Last Week Tonight with John Oliver: Edward Snowden on Passwords. Retrieved May 6, 2015, from </a:t>
-            </a:r>
-            <a:r>
-              <a:rPr lang="en-AU" sz="1400" dirty="0">
-                <a:solidFill>
-                  <a:srgbClr val="111111"/>
-                </a:solidFill>
-                <a:latin typeface="Open Sans" panose="020B0606030504020204" pitchFamily="34" charset="0"/>
-                <a:ea typeface="Open Sans" panose="020B0606030504020204" pitchFamily="34" charset="0"/>
-                <a:cs typeface="Open Sans" panose="020B0606030504020204" pitchFamily="34" charset="0"/>
-                <a:hlinkClick r:id="rId11"/>
-              </a:rPr>
-              <a:t>https://</a:t>
-            </a:r>
-            <a:r>
-              <a:rPr lang="en-AU" sz="1400" dirty="0" smtClean="0">
-                <a:solidFill>
-                  <a:srgbClr val="111111"/>
-                </a:solidFill>
-                <a:latin typeface="Open Sans" panose="020B0606030504020204" pitchFamily="34" charset="0"/>
-                <a:ea typeface="Open Sans" panose="020B0606030504020204" pitchFamily="34" charset="0"/>
-                <a:cs typeface="Open Sans" panose="020B0606030504020204" pitchFamily="34" charset="0"/>
-                <a:hlinkClick r:id="rId11"/>
-              </a:rPr>
-              <a:t>www.youtube.com/watch?v=yzGzB-yYKcc</a:t>
-            </a:r>
-            <a:endParaRPr lang="en-AU" sz="1400" dirty="0" smtClean="0">
-              <a:solidFill>
-                <a:srgbClr val="111111"/>
-              </a:solidFill>
-              <a:latin typeface="Open Sans" panose="020B0606030504020204" pitchFamily="34" charset="0"/>
-              <a:ea typeface="Open Sans" panose="020B0606030504020204" pitchFamily="34" charset="0"/>
-              <a:cs typeface="Open Sans" panose="020B0606030504020204" pitchFamily="34" charset="0"/>
-            </a:endParaRPr>
-          </a:p>
-          <a:p>
-            <a:pPr marL="457200" indent="-457200" algn="l">
-              <a:lnSpc>
-                <a:spcPct val="100000"/>
-              </a:lnSpc>
-              <a:buFont typeface="Arial" panose="020B0604020202020204" pitchFamily="34" charset="0"/>
-              <a:buChar char="•"/>
-            </a:pPr>
-            <a:r>
-              <a:rPr lang="en-AU" sz="1400" dirty="0">
-                <a:solidFill>
-                  <a:srgbClr val="111111"/>
-                </a:solidFill>
-                <a:latin typeface="Open Sans" panose="020B0606030504020204" pitchFamily="34" charset="0"/>
-                <a:ea typeface="Open Sans" panose="020B0606030504020204" pitchFamily="34" charset="0"/>
-                <a:cs typeface="Open Sans" panose="020B0606030504020204" pitchFamily="34" charset="0"/>
-              </a:rPr>
-              <a:t>Scarfone, K., &amp; Souppaya, M. (2013). Guide to Enterprise Patch Management Technologies NIST Special Publication 800-40 Guide to Enterprise Patch Management Technologies. NIST. </a:t>
-            </a:r>
-            <a:r>
-              <a:rPr lang="en-AU" sz="1400" dirty="0" smtClean="0">
-                <a:solidFill>
-                  <a:srgbClr val="111111"/>
-                </a:solidFill>
-                <a:latin typeface="Open Sans" panose="020B0606030504020204" pitchFamily="34" charset="0"/>
-                <a:ea typeface="Open Sans" panose="020B0606030504020204" pitchFamily="34" charset="0"/>
-                <a:cs typeface="Open Sans" panose="020B0606030504020204" pitchFamily="34" charset="0"/>
-              </a:rPr>
-              <a:t>doi:10.6028/NIST.SP.800-40r3</a:t>
-            </a:r>
-          </a:p>
-          <a:p>
-            <a:pPr marL="457200" indent="-457200" algn="l">
-              <a:lnSpc>
-                <a:spcPct val="100000"/>
-              </a:lnSpc>
-              <a:buFont typeface="Arial" panose="020B0604020202020204" pitchFamily="34" charset="0"/>
-              <a:buChar char="•"/>
-            </a:pPr>
-            <a:r>
-              <a:rPr lang="en-AU" sz="1400" dirty="0">
-                <a:solidFill>
-                  <a:srgbClr val="111111"/>
-                </a:solidFill>
-                <a:latin typeface="Open Sans" panose="020B0606030504020204" pitchFamily="34" charset="0"/>
-                <a:ea typeface="Open Sans" panose="020B0606030504020204" pitchFamily="34" charset="0"/>
-                <a:cs typeface="Open Sans" panose="020B0606030504020204" pitchFamily="34" charset="0"/>
-              </a:rPr>
-              <a:t>Tice, K. [solarwindsinc]. (2012, September 12)  Patch Manager Guided Tour. Retrieved May 14, 2015, from </a:t>
-            </a:r>
-            <a:r>
-              <a:rPr lang="en-AU" sz="1400" dirty="0">
-                <a:solidFill>
-                  <a:srgbClr val="111111"/>
-                </a:solidFill>
-                <a:latin typeface="Open Sans" panose="020B0606030504020204" pitchFamily="34" charset="0"/>
-                <a:ea typeface="Open Sans" panose="020B0606030504020204" pitchFamily="34" charset="0"/>
-                <a:cs typeface="Open Sans" panose="020B0606030504020204" pitchFamily="34" charset="0"/>
-                <a:hlinkClick r:id="rId12"/>
-              </a:rPr>
-              <a:t>https://www.youtube.com/watch?v=-</a:t>
-            </a:r>
-            <a:r>
-              <a:rPr lang="en-AU" sz="1400" dirty="0" smtClean="0">
-                <a:solidFill>
-                  <a:srgbClr val="111111"/>
-                </a:solidFill>
-                <a:latin typeface="Open Sans" panose="020B0606030504020204" pitchFamily="34" charset="0"/>
-                <a:ea typeface="Open Sans" panose="020B0606030504020204" pitchFamily="34" charset="0"/>
-                <a:cs typeface="Open Sans" panose="020B0606030504020204" pitchFamily="34" charset="0"/>
-                <a:hlinkClick r:id="rId12"/>
-              </a:rPr>
-              <a:t>DldViUL1d0</a:t>
-            </a:r>
-            <a:endParaRPr lang="en-AU" sz="1400" dirty="0" smtClean="0">
-              <a:solidFill>
-                <a:srgbClr val="111111"/>
-              </a:solidFill>
-              <a:latin typeface="Open Sans" panose="020B0606030504020204" pitchFamily="34" charset="0"/>
-              <a:ea typeface="Open Sans" panose="020B0606030504020204" pitchFamily="34" charset="0"/>
-              <a:cs typeface="Open Sans" panose="020B0606030504020204" pitchFamily="34" charset="0"/>
-            </a:endParaRPr>
-          </a:p>
-          <a:p>
-            <a:pPr marL="457200" indent="-457200" algn="l">
-              <a:lnSpc>
-                <a:spcPct val="100000"/>
-              </a:lnSpc>
-              <a:buFont typeface="Arial" panose="020B0604020202020204" pitchFamily="34" charset="0"/>
-              <a:buChar char="•"/>
-            </a:pPr>
-            <a:endParaRPr lang="en-AU" sz="1400" dirty="0" smtClean="0">
-              <a:solidFill>
-                <a:srgbClr val="111111"/>
-              </a:solidFill>
-              <a:latin typeface="Open Sans" panose="020B0606030504020204" pitchFamily="34" charset="0"/>
-              <a:ea typeface="Open Sans" panose="020B0606030504020204" pitchFamily="34" charset="0"/>
-              <a:cs typeface="Open Sans" panose="020B0606030504020204" pitchFamily="34" charset="0"/>
-            </a:endParaRPr>
+              <a:rPr lang="en-AU" sz="2600" dirty="0" smtClean="0">
+                <a:solidFill>
+                  <a:srgbClr val="111111"/>
+                </a:solidFill>
+                <a:latin typeface="Open Sans" panose="020B0606030504020204" pitchFamily="34" charset="0"/>
+                <a:ea typeface="Open Sans" panose="020B0606030504020204" pitchFamily="34" charset="0"/>
+                <a:cs typeface="Open Sans" panose="020B0606030504020204" pitchFamily="34" charset="0"/>
+              </a:rPr>
+              <a:t>Logs events</a:t>
+            </a:r>
           </a:p>
         </p:txBody>
       </p:sp>
     </p:spTree>
     <p:extLst>
       <p:ext uri="{BB962C8B-B14F-4D97-AF65-F5344CB8AC3E}">
-        <p14:creationId xmlns:p14="http://schemas.microsoft.com/office/powerpoint/2010/main" val="636747076"/>
+        <p14:creationId xmlns:p14="http://schemas.microsoft.com/office/powerpoint/2010/main" val="402785050"/>
       </p:ext>
     </p:extLst>
   </p:cSld>
@@ -12023,28 +11348,29 @@
         </p:nvSpPr>
         <p:spPr>
           <a:xfrm>
-            <a:off x="1524000" y="0"/>
-            <a:ext cx="9144000" cy="6858000"/>
+            <a:off x="338667" y="1"/>
+            <a:ext cx="9144000" cy="970843"/>
           </a:xfrm>
         </p:spPr>
         <p:txBody>
-          <a:bodyPr anchor="ctr">
+          <a:bodyPr anchor="b">
             <a:normAutofit/>
           </a:bodyPr>
           <a:lstStyle/>
           <a:p>
-            <a:r>
-              <a:rPr lang="en-AU" sz="4400" b="1" dirty="0" smtClean="0">
-                <a:solidFill>
-                  <a:srgbClr val="111111"/>
-                </a:solidFill>
-                <a:latin typeface="Open Sans" panose="020B0606030504020204" pitchFamily="34" charset="0"/>
-                <a:ea typeface="Open Sans" panose="020B0606030504020204" pitchFamily="34" charset="0"/>
-                <a:cs typeface="Open Sans" panose="020B0606030504020204" pitchFamily="34" charset="0"/>
-              </a:rPr>
-              <a:t>Intrusion detection system</a:t>
-            </a:r>
-            <a:endParaRPr lang="en-AU" sz="4400" b="1" dirty="0">
+            <a:pPr algn="l"/>
+            <a:r>
+              <a:rPr lang="en-AU" sz="3600" b="1" dirty="0" smtClean="0">
+                <a:solidFill>
+                  <a:srgbClr val="111111"/>
+                </a:solidFill>
+                <a:latin typeface="Open Sans" panose="020B0606030504020204" pitchFamily="34" charset="0"/>
+                <a:ea typeface="Open Sans" panose="020B0606030504020204" pitchFamily="34" charset="0"/>
+                <a:cs typeface="Open Sans" panose="020B0606030504020204" pitchFamily="34" charset="0"/>
+              </a:rPr>
+              <a:t>References</a:t>
+            </a:r>
+            <a:endParaRPr lang="en-AU" sz="3600" dirty="0">
               <a:solidFill>
                 <a:srgbClr val="111111"/>
               </a:solidFill>
@@ -12055,10 +11381,758 @@
           </a:p>
         </p:txBody>
       </p:sp>
+      <p:sp>
+        <p:nvSpPr>
+          <p:cNvPr id="5" name="Title 3"/>
+          <p:cNvSpPr txBox="1">
+            <a:spLocks/>
+          </p:cNvSpPr>
+          <p:nvPr/>
+        </p:nvSpPr>
+        <p:spPr>
+          <a:xfrm>
+            <a:off x="338667" y="1196622"/>
+            <a:ext cx="11514666" cy="5113867"/>
+          </a:xfrm>
+          <a:prstGeom prst="rect">
+            <a:avLst/>
+          </a:prstGeom>
+        </p:spPr>
+        <p:txBody>
+          <a:bodyPr vert="horz" lIns="91440" tIns="45720" rIns="91440" bIns="45720" rtlCol="0" anchor="t">
+            <a:normAutofit lnSpcReduction="10000"/>
+          </a:bodyPr>
+          <a:lstStyle>
+            <a:lvl1pPr algn="ctr" defTabSz="914400" rtl="0" eaLnBrk="1" latinLnBrk="0" hangingPunct="1">
+              <a:lnSpc>
+                <a:spcPct val="90000"/>
+              </a:lnSpc>
+              <a:spcBef>
+                <a:spcPct val="0"/>
+              </a:spcBef>
+              <a:buNone/>
+              <a:defRPr sz="6000" kern="1200">
+                <a:solidFill>
+                  <a:schemeClr val="tx1"/>
+                </a:solidFill>
+                <a:latin typeface="+mj-lt"/>
+                <a:ea typeface="+mj-ea"/>
+                <a:cs typeface="+mj-cs"/>
+              </a:defRPr>
+            </a:lvl1pPr>
+          </a:lstStyle>
+          <a:p>
+            <a:pPr marL="457200" indent="-457200" algn="l">
+              <a:lnSpc>
+                <a:spcPct val="100000"/>
+              </a:lnSpc>
+              <a:buFont typeface="Arial" panose="020B0604020202020204" pitchFamily="34" charset="0"/>
+              <a:buChar char="•"/>
+            </a:pPr>
+            <a:r>
+              <a:rPr lang="en-AU" sz="1400" dirty="0">
+                <a:solidFill>
+                  <a:srgbClr val="111111"/>
+                </a:solidFill>
+                <a:latin typeface="Open Sans" panose="020B0606030504020204" pitchFamily="34" charset="0"/>
+                <a:ea typeface="Open Sans" panose="020B0606030504020204" pitchFamily="34" charset="0"/>
+                <a:cs typeface="Open Sans" panose="020B0606030504020204" pitchFamily="34" charset="0"/>
+              </a:rPr>
+              <a:t>Baker, W. H., Hylender, C. D., &amp; Valentine, J. A. (2008). 2008 Data Breach Investigations Report, 1–29</a:t>
+            </a:r>
+            <a:r>
+              <a:rPr lang="en-AU" sz="1400" dirty="0" smtClean="0">
+                <a:solidFill>
+                  <a:srgbClr val="111111"/>
+                </a:solidFill>
+                <a:latin typeface="Open Sans" panose="020B0606030504020204" pitchFamily="34" charset="0"/>
+                <a:ea typeface="Open Sans" panose="020B0606030504020204" pitchFamily="34" charset="0"/>
+                <a:cs typeface="Open Sans" panose="020B0606030504020204" pitchFamily="34" charset="0"/>
+              </a:rPr>
+              <a:t>.</a:t>
+            </a:r>
+          </a:p>
+          <a:p>
+            <a:pPr marL="457200" indent="-457200" algn="l">
+              <a:lnSpc>
+                <a:spcPct val="100000"/>
+              </a:lnSpc>
+              <a:buFont typeface="Arial" panose="020B0604020202020204" pitchFamily="34" charset="0"/>
+              <a:buChar char="•"/>
+            </a:pPr>
+            <a:r>
+              <a:rPr lang="en-AU" sz="1400" dirty="0">
+                <a:solidFill>
+                  <a:srgbClr val="111111"/>
+                </a:solidFill>
+                <a:latin typeface="Open Sans" panose="020B0606030504020204" pitchFamily="34" charset="0"/>
+                <a:ea typeface="Open Sans" panose="020B0606030504020204" pitchFamily="34" charset="0"/>
+                <a:cs typeface="Open Sans" panose="020B0606030504020204" pitchFamily="34" charset="0"/>
+              </a:rPr>
+              <a:t>Goodin, D. (2014). Stanford’s password policy shuns one-size-fits-all security | Ars Technica. Ars Technica. Retrieved April 30, 2015, from </a:t>
+            </a:r>
+            <a:r>
+              <a:rPr lang="en-AU" sz="1400" dirty="0">
+                <a:solidFill>
+                  <a:srgbClr val="111111"/>
+                </a:solidFill>
+                <a:latin typeface="Open Sans" panose="020B0606030504020204" pitchFamily="34" charset="0"/>
+                <a:ea typeface="Open Sans" panose="020B0606030504020204" pitchFamily="34" charset="0"/>
+                <a:cs typeface="Open Sans" panose="020B0606030504020204" pitchFamily="34" charset="0"/>
+                <a:hlinkClick r:id="rId2"/>
+              </a:rPr>
+              <a:t>http://arstechnica.com/security/2014/04/25/stanfords-password-policy-shuns-one-size-fits-all-security</a:t>
+            </a:r>
+            <a:r>
+              <a:rPr lang="en-AU" sz="1400" dirty="0" smtClean="0">
+                <a:solidFill>
+                  <a:srgbClr val="111111"/>
+                </a:solidFill>
+                <a:latin typeface="Open Sans" panose="020B0606030504020204" pitchFamily="34" charset="0"/>
+                <a:ea typeface="Open Sans" panose="020B0606030504020204" pitchFamily="34" charset="0"/>
+                <a:cs typeface="Open Sans" panose="020B0606030504020204" pitchFamily="34" charset="0"/>
+                <a:hlinkClick r:id="rId2"/>
+              </a:rPr>
+              <a:t>/</a:t>
+            </a:r>
+            <a:endParaRPr lang="en-AU" sz="1400" dirty="0" smtClean="0">
+              <a:solidFill>
+                <a:srgbClr val="111111"/>
+              </a:solidFill>
+              <a:latin typeface="Open Sans" panose="020B0606030504020204" pitchFamily="34" charset="0"/>
+              <a:ea typeface="Open Sans" panose="020B0606030504020204" pitchFamily="34" charset="0"/>
+              <a:cs typeface="Open Sans" panose="020B0606030504020204" pitchFamily="34" charset="0"/>
+            </a:endParaRPr>
+          </a:p>
+          <a:p>
+            <a:pPr marL="457200" indent="-457200" algn="l">
+              <a:lnSpc>
+                <a:spcPct val="100000"/>
+              </a:lnSpc>
+              <a:buFont typeface="Arial" panose="020B0604020202020204" pitchFamily="34" charset="0"/>
+              <a:buChar char="•"/>
+            </a:pPr>
+            <a:r>
+              <a:rPr lang="en-AU" sz="1400" dirty="0">
+                <a:solidFill>
+                  <a:srgbClr val="111111"/>
+                </a:solidFill>
+                <a:latin typeface="Open Sans" panose="020B0606030504020204" pitchFamily="34" charset="0"/>
+                <a:ea typeface="Open Sans" panose="020B0606030504020204" pitchFamily="34" charset="0"/>
+                <a:cs typeface="Open Sans" panose="020B0606030504020204" pitchFamily="34" charset="0"/>
+              </a:rPr>
+              <a:t>Machkovech, S. (2015). Hacked French network exposed its own passwords during TV interview | Ars Technica. Ars Technica. Retrieved May 6, 2015, from </a:t>
+            </a:r>
+            <a:r>
+              <a:rPr lang="en-AU" sz="1400" dirty="0">
+                <a:solidFill>
+                  <a:srgbClr val="111111"/>
+                </a:solidFill>
+                <a:latin typeface="Open Sans" panose="020B0606030504020204" pitchFamily="34" charset="0"/>
+                <a:ea typeface="Open Sans" panose="020B0606030504020204" pitchFamily="34" charset="0"/>
+                <a:cs typeface="Open Sans" panose="020B0606030504020204" pitchFamily="34" charset="0"/>
+                <a:hlinkClick r:id="rId3"/>
+              </a:rPr>
+              <a:t>http://arstechnica.com/security/2015/04/09/hacked-french-network-exposed-its-own-passwords-during-tv-interview</a:t>
+            </a:r>
+            <a:r>
+              <a:rPr lang="en-AU" sz="1400" dirty="0" smtClean="0">
+                <a:solidFill>
+                  <a:srgbClr val="111111"/>
+                </a:solidFill>
+                <a:latin typeface="Open Sans" panose="020B0606030504020204" pitchFamily="34" charset="0"/>
+                <a:ea typeface="Open Sans" panose="020B0606030504020204" pitchFamily="34" charset="0"/>
+                <a:cs typeface="Open Sans" panose="020B0606030504020204" pitchFamily="34" charset="0"/>
+                <a:hlinkClick r:id="rId3"/>
+              </a:rPr>
+              <a:t>/</a:t>
+            </a:r>
+            <a:endParaRPr lang="en-AU" sz="1400" dirty="0" smtClean="0">
+              <a:solidFill>
+                <a:srgbClr val="111111"/>
+              </a:solidFill>
+              <a:latin typeface="Open Sans" panose="020B0606030504020204" pitchFamily="34" charset="0"/>
+              <a:ea typeface="Open Sans" panose="020B0606030504020204" pitchFamily="34" charset="0"/>
+              <a:cs typeface="Open Sans" panose="020B0606030504020204" pitchFamily="34" charset="0"/>
+            </a:endParaRPr>
+          </a:p>
+          <a:p>
+            <a:pPr marL="457200" indent="-457200" algn="l">
+              <a:lnSpc>
+                <a:spcPct val="100000"/>
+              </a:lnSpc>
+              <a:buFont typeface="Arial" panose="020B0604020202020204" pitchFamily="34" charset="0"/>
+              <a:buChar char="•"/>
+            </a:pPr>
+            <a:r>
+              <a:rPr lang="en-AU" sz="1400" dirty="0">
+                <a:solidFill>
+                  <a:srgbClr val="111111"/>
+                </a:solidFill>
+                <a:latin typeface="Open Sans" panose="020B0606030504020204" pitchFamily="34" charset="0"/>
+                <a:ea typeface="Open Sans" panose="020B0606030504020204" pitchFamily="34" charset="0"/>
+                <a:cs typeface="Open Sans" panose="020B0606030504020204" pitchFamily="34" charset="0"/>
+              </a:rPr>
+              <a:t>Microsoft. (</a:t>
+            </a:r>
+            <a:r>
+              <a:rPr lang="en-AU" sz="1400" dirty="0" smtClean="0">
+                <a:solidFill>
+                  <a:srgbClr val="111111"/>
+                </a:solidFill>
+                <a:latin typeface="Open Sans" panose="020B0606030504020204" pitchFamily="34" charset="0"/>
+                <a:ea typeface="Open Sans" panose="020B0606030504020204" pitchFamily="34" charset="0"/>
+                <a:cs typeface="Open Sans" panose="020B0606030504020204" pitchFamily="34" charset="0"/>
+              </a:rPr>
+              <a:t>2005a). </a:t>
+            </a:r>
+            <a:r>
+              <a:rPr lang="en-AU" sz="1400" dirty="0">
+                <a:solidFill>
+                  <a:srgbClr val="111111"/>
+                </a:solidFill>
+                <a:latin typeface="Open Sans" panose="020B0606030504020204" pitchFamily="34" charset="0"/>
+                <a:ea typeface="Open Sans" panose="020B0606030504020204" pitchFamily="34" charset="0"/>
+                <a:cs typeface="Open Sans" panose="020B0606030504020204" pitchFamily="34" charset="0"/>
+              </a:rPr>
+              <a:t>Apply or modify password policy: Logon and Authentication. Retrieved May 14, 2015, from </a:t>
+            </a:r>
+            <a:r>
+              <a:rPr lang="en-AU" sz="1400" dirty="0">
+                <a:solidFill>
+                  <a:srgbClr val="111111"/>
+                </a:solidFill>
+                <a:latin typeface="Open Sans" panose="020B0606030504020204" pitchFamily="34" charset="0"/>
+                <a:ea typeface="Open Sans" panose="020B0606030504020204" pitchFamily="34" charset="0"/>
+                <a:cs typeface="Open Sans" panose="020B0606030504020204" pitchFamily="34" charset="0"/>
+                <a:hlinkClick r:id="rId4"/>
+              </a:rPr>
+              <a:t>https://technet.microsoft.com/en-au/library/cc781633(v=ws.10).aspx?f=255&amp;MSPPError=-</a:t>
+            </a:r>
+            <a:r>
+              <a:rPr lang="en-AU" sz="1400" dirty="0" smtClean="0">
+                <a:solidFill>
+                  <a:srgbClr val="111111"/>
+                </a:solidFill>
+                <a:latin typeface="Open Sans" panose="020B0606030504020204" pitchFamily="34" charset="0"/>
+                <a:ea typeface="Open Sans" panose="020B0606030504020204" pitchFamily="34" charset="0"/>
+                <a:cs typeface="Open Sans" panose="020B0606030504020204" pitchFamily="34" charset="0"/>
+                <a:hlinkClick r:id="rId4"/>
+              </a:rPr>
+              <a:t>2147217396#BKMK_3</a:t>
+            </a:r>
+            <a:endParaRPr lang="en-AU" sz="1400" dirty="0" smtClean="0">
+              <a:solidFill>
+                <a:srgbClr val="111111"/>
+              </a:solidFill>
+              <a:latin typeface="Open Sans" panose="020B0606030504020204" pitchFamily="34" charset="0"/>
+              <a:ea typeface="Open Sans" panose="020B0606030504020204" pitchFamily="34" charset="0"/>
+              <a:cs typeface="Open Sans" panose="020B0606030504020204" pitchFamily="34" charset="0"/>
+            </a:endParaRPr>
+          </a:p>
+          <a:p>
+            <a:pPr marL="457200" indent="-457200" algn="l">
+              <a:lnSpc>
+                <a:spcPct val="100000"/>
+              </a:lnSpc>
+              <a:buFont typeface="Arial" panose="020B0604020202020204" pitchFamily="34" charset="0"/>
+              <a:buChar char="•"/>
+            </a:pPr>
+            <a:r>
+              <a:rPr lang="en-AU" sz="1400" dirty="0">
+                <a:solidFill>
+                  <a:srgbClr val="111111"/>
+                </a:solidFill>
+                <a:latin typeface="Open Sans" panose="020B0606030504020204" pitchFamily="34" charset="0"/>
+                <a:ea typeface="Open Sans" panose="020B0606030504020204" pitchFamily="34" charset="0"/>
+                <a:cs typeface="Open Sans" panose="020B0606030504020204" pitchFamily="34" charset="0"/>
+              </a:rPr>
+              <a:t>Microsoft. (</a:t>
+            </a:r>
+            <a:r>
+              <a:rPr lang="en-AU" sz="1400" dirty="0" smtClean="0">
+                <a:solidFill>
+                  <a:srgbClr val="111111"/>
+                </a:solidFill>
+                <a:latin typeface="Open Sans" panose="020B0606030504020204" pitchFamily="34" charset="0"/>
+                <a:ea typeface="Open Sans" panose="020B0606030504020204" pitchFamily="34" charset="0"/>
+                <a:cs typeface="Open Sans" panose="020B0606030504020204" pitchFamily="34" charset="0"/>
+              </a:rPr>
+              <a:t>2005b). </a:t>
+            </a:r>
+            <a:r>
+              <a:rPr lang="en-AU" sz="1400" dirty="0">
+                <a:solidFill>
+                  <a:srgbClr val="111111"/>
+                </a:solidFill>
+                <a:latin typeface="Open Sans" panose="020B0606030504020204" pitchFamily="34" charset="0"/>
+                <a:ea typeface="Open Sans" panose="020B0606030504020204" pitchFamily="34" charset="0"/>
+                <a:cs typeface="Open Sans" panose="020B0606030504020204" pitchFamily="34" charset="0"/>
+              </a:rPr>
+              <a:t>Assign user rights to a group in Active Directory: Active Directory. Retrieved May 14, 2015, from </a:t>
+            </a:r>
+            <a:r>
+              <a:rPr lang="en-AU" sz="1400" dirty="0">
+                <a:solidFill>
+                  <a:srgbClr val="111111"/>
+                </a:solidFill>
+                <a:latin typeface="Open Sans" panose="020B0606030504020204" pitchFamily="34" charset="0"/>
+                <a:ea typeface="Open Sans" panose="020B0606030504020204" pitchFamily="34" charset="0"/>
+                <a:cs typeface="Open Sans" panose="020B0606030504020204" pitchFamily="34" charset="0"/>
+                <a:hlinkClick r:id="rId5"/>
+              </a:rPr>
+              <a:t>https://technet.microsoft.com/en-au/library/cc786658(v=ws.10).</a:t>
+            </a:r>
+            <a:r>
+              <a:rPr lang="en-AU" sz="1400" dirty="0" smtClean="0">
+                <a:solidFill>
+                  <a:srgbClr val="111111"/>
+                </a:solidFill>
+                <a:latin typeface="Open Sans" panose="020B0606030504020204" pitchFamily="34" charset="0"/>
+                <a:ea typeface="Open Sans" panose="020B0606030504020204" pitchFamily="34" charset="0"/>
+                <a:cs typeface="Open Sans" panose="020B0606030504020204" pitchFamily="34" charset="0"/>
+                <a:hlinkClick r:id="rId5"/>
+              </a:rPr>
+              <a:t>aspx</a:t>
+            </a:r>
+            <a:endParaRPr lang="en-AU" sz="1400" dirty="0" smtClean="0">
+              <a:solidFill>
+                <a:srgbClr val="111111"/>
+              </a:solidFill>
+              <a:latin typeface="Open Sans" panose="020B0606030504020204" pitchFamily="34" charset="0"/>
+              <a:ea typeface="Open Sans" panose="020B0606030504020204" pitchFamily="34" charset="0"/>
+              <a:cs typeface="Open Sans" panose="020B0606030504020204" pitchFamily="34" charset="0"/>
+            </a:endParaRPr>
+          </a:p>
+          <a:p>
+            <a:pPr marL="457200" indent="-457200" algn="l">
+              <a:lnSpc>
+                <a:spcPct val="100000"/>
+              </a:lnSpc>
+              <a:buFont typeface="Arial" panose="020B0604020202020204" pitchFamily="34" charset="0"/>
+              <a:buChar char="•"/>
+            </a:pPr>
+            <a:r>
+              <a:rPr lang="en-AU" sz="1400" dirty="0" smtClean="0">
+                <a:solidFill>
+                  <a:srgbClr val="111111"/>
+                </a:solidFill>
+                <a:latin typeface="Open Sans" panose="020B0606030504020204" pitchFamily="34" charset="0"/>
+                <a:ea typeface="Open Sans" panose="020B0606030504020204" pitchFamily="34" charset="0"/>
+                <a:cs typeface="Open Sans" panose="020B0606030504020204" pitchFamily="34" charset="0"/>
+              </a:rPr>
+              <a:t>Microsoft</a:t>
+            </a:r>
+            <a:r>
+              <a:rPr lang="en-AU" sz="1400" dirty="0">
+                <a:solidFill>
+                  <a:srgbClr val="111111"/>
+                </a:solidFill>
+                <a:latin typeface="Open Sans" panose="020B0606030504020204" pitchFamily="34" charset="0"/>
+                <a:ea typeface="Open Sans" panose="020B0606030504020204" pitchFamily="34" charset="0"/>
+                <a:cs typeface="Open Sans" panose="020B0606030504020204" pitchFamily="34" charset="0"/>
+              </a:rPr>
+              <a:t>. (2007). Configure UAC settings via policy - Microsoft Reduce Customer Effort Center - Site Home - TechNet Blogs. Retrieved May 14, 2015, from </a:t>
+            </a:r>
+            <a:r>
+              <a:rPr lang="en-AU" sz="1400" dirty="0">
+                <a:solidFill>
+                  <a:srgbClr val="111111"/>
+                </a:solidFill>
+                <a:latin typeface="Open Sans" panose="020B0606030504020204" pitchFamily="34" charset="0"/>
+                <a:ea typeface="Open Sans" panose="020B0606030504020204" pitchFamily="34" charset="0"/>
+                <a:cs typeface="Open Sans" panose="020B0606030504020204" pitchFamily="34" charset="0"/>
+                <a:hlinkClick r:id="rId6"/>
+              </a:rPr>
+              <a:t>http://</a:t>
+            </a:r>
+            <a:r>
+              <a:rPr lang="en-AU" sz="1400" dirty="0" smtClean="0">
+                <a:solidFill>
+                  <a:srgbClr val="111111"/>
+                </a:solidFill>
+                <a:latin typeface="Open Sans" panose="020B0606030504020204" pitchFamily="34" charset="0"/>
+                <a:ea typeface="Open Sans" panose="020B0606030504020204" pitchFamily="34" charset="0"/>
+                <a:cs typeface="Open Sans" panose="020B0606030504020204" pitchFamily="34" charset="0"/>
+                <a:hlinkClick r:id="rId6"/>
+              </a:rPr>
+              <a:t>blogs.technet.com/b/asiasupp/archive/2007/02/08/configure-uac-settings-via-policy.aspx</a:t>
+            </a:r>
+            <a:endParaRPr lang="en-AU" sz="1400" dirty="0" smtClean="0">
+              <a:solidFill>
+                <a:srgbClr val="111111"/>
+              </a:solidFill>
+              <a:latin typeface="Open Sans" panose="020B0606030504020204" pitchFamily="34" charset="0"/>
+              <a:ea typeface="Open Sans" panose="020B0606030504020204" pitchFamily="34" charset="0"/>
+              <a:cs typeface="Open Sans" panose="020B0606030504020204" pitchFamily="34" charset="0"/>
+            </a:endParaRPr>
+          </a:p>
+          <a:p>
+            <a:pPr marL="457200" indent="-457200" algn="l">
+              <a:lnSpc>
+                <a:spcPct val="100000"/>
+              </a:lnSpc>
+              <a:buFont typeface="Arial" panose="020B0604020202020204" pitchFamily="34" charset="0"/>
+              <a:buChar char="•"/>
+            </a:pPr>
+            <a:r>
+              <a:rPr lang="en-AU" sz="1400" dirty="0">
+                <a:solidFill>
+                  <a:srgbClr val="111111"/>
+                </a:solidFill>
+                <a:latin typeface="Open Sans" panose="020B0606030504020204" pitchFamily="34" charset="0"/>
+                <a:ea typeface="Open Sans" panose="020B0606030504020204" pitchFamily="34" charset="0"/>
+                <a:cs typeface="Open Sans" panose="020B0606030504020204" pitchFamily="34" charset="0"/>
+              </a:rPr>
+              <a:t>Microsoft. (2012). Password must meet complexity requirements. Retrieved May 14, 2015, from </a:t>
+            </a:r>
+            <a:r>
+              <a:rPr lang="en-AU" sz="1400" dirty="0">
+                <a:solidFill>
+                  <a:srgbClr val="111111"/>
+                </a:solidFill>
+                <a:latin typeface="Open Sans" panose="020B0606030504020204" pitchFamily="34" charset="0"/>
+                <a:ea typeface="Open Sans" panose="020B0606030504020204" pitchFamily="34" charset="0"/>
+                <a:cs typeface="Open Sans" panose="020B0606030504020204" pitchFamily="34" charset="0"/>
+                <a:hlinkClick r:id="rId7"/>
+              </a:rPr>
+              <a:t>https://technet.microsoft.com/en-us/library/hh994562(v=ws.10).</a:t>
+            </a:r>
+            <a:r>
+              <a:rPr lang="en-AU" sz="1400" dirty="0" smtClean="0">
+                <a:solidFill>
+                  <a:srgbClr val="111111"/>
+                </a:solidFill>
+                <a:latin typeface="Open Sans" panose="020B0606030504020204" pitchFamily="34" charset="0"/>
+                <a:ea typeface="Open Sans" panose="020B0606030504020204" pitchFamily="34" charset="0"/>
+                <a:cs typeface="Open Sans" panose="020B0606030504020204" pitchFamily="34" charset="0"/>
+                <a:hlinkClick r:id="rId7"/>
+              </a:rPr>
+              <a:t>aspx</a:t>
+            </a:r>
+            <a:endParaRPr lang="en-AU" sz="1400" dirty="0" smtClean="0">
+              <a:solidFill>
+                <a:srgbClr val="111111"/>
+              </a:solidFill>
+              <a:latin typeface="Open Sans" panose="020B0606030504020204" pitchFamily="34" charset="0"/>
+              <a:ea typeface="Open Sans" panose="020B0606030504020204" pitchFamily="34" charset="0"/>
+              <a:cs typeface="Open Sans" panose="020B0606030504020204" pitchFamily="34" charset="0"/>
+            </a:endParaRPr>
+          </a:p>
+          <a:p>
+            <a:pPr marL="457200" indent="-457200" algn="l">
+              <a:lnSpc>
+                <a:spcPct val="100000"/>
+              </a:lnSpc>
+              <a:buFont typeface="Arial" panose="020B0604020202020204" pitchFamily="34" charset="0"/>
+              <a:buChar char="•"/>
+            </a:pPr>
+            <a:r>
+              <a:rPr lang="en-AU" sz="1400" dirty="0">
+                <a:solidFill>
+                  <a:srgbClr val="111111"/>
+                </a:solidFill>
+                <a:latin typeface="Open Sans" panose="020B0606030504020204" pitchFamily="34" charset="0"/>
+                <a:ea typeface="Open Sans" panose="020B0606030504020204" pitchFamily="34" charset="0"/>
+                <a:cs typeface="Open Sans" panose="020B0606030504020204" pitchFamily="34" charset="0"/>
+              </a:rPr>
+              <a:t>Microsoft. (n.d.-a). Screen Saver timeout. Retrieved May 14, 2015, from </a:t>
+            </a:r>
+            <a:r>
+              <a:rPr lang="en-AU" sz="1400" dirty="0">
+                <a:solidFill>
+                  <a:srgbClr val="111111"/>
+                </a:solidFill>
+                <a:latin typeface="Open Sans" panose="020B0606030504020204" pitchFamily="34" charset="0"/>
+                <a:ea typeface="Open Sans" panose="020B0606030504020204" pitchFamily="34" charset="0"/>
+                <a:cs typeface="Open Sans" panose="020B0606030504020204" pitchFamily="34" charset="0"/>
+                <a:hlinkClick r:id="rId8"/>
+              </a:rPr>
+              <a:t>https://</a:t>
+            </a:r>
+            <a:r>
+              <a:rPr lang="en-AU" sz="1400" dirty="0" smtClean="0">
+                <a:solidFill>
+                  <a:srgbClr val="111111"/>
+                </a:solidFill>
+                <a:latin typeface="Open Sans" panose="020B0606030504020204" pitchFamily="34" charset="0"/>
+                <a:ea typeface="Open Sans" panose="020B0606030504020204" pitchFamily="34" charset="0"/>
+                <a:cs typeface="Open Sans" panose="020B0606030504020204" pitchFamily="34" charset="0"/>
+                <a:hlinkClick r:id="rId8"/>
+              </a:rPr>
+              <a:t>technet.microsoft.com/en-us/library/cc961876.aspx</a:t>
+            </a:r>
+            <a:endParaRPr lang="en-AU" sz="1400" dirty="0" smtClean="0">
+              <a:solidFill>
+                <a:srgbClr val="111111"/>
+              </a:solidFill>
+              <a:latin typeface="Open Sans" panose="020B0606030504020204" pitchFamily="34" charset="0"/>
+              <a:ea typeface="Open Sans" panose="020B0606030504020204" pitchFamily="34" charset="0"/>
+              <a:cs typeface="Open Sans" panose="020B0606030504020204" pitchFamily="34" charset="0"/>
+            </a:endParaRPr>
+          </a:p>
+          <a:p>
+            <a:pPr marL="457200" indent="-457200" algn="l">
+              <a:lnSpc>
+                <a:spcPct val="100000"/>
+              </a:lnSpc>
+              <a:buFont typeface="Arial" panose="020B0604020202020204" pitchFamily="34" charset="0"/>
+              <a:buChar char="•"/>
+            </a:pPr>
+            <a:r>
+              <a:rPr lang="en-AU" sz="1400" dirty="0">
+                <a:solidFill>
+                  <a:srgbClr val="111111"/>
+                </a:solidFill>
+                <a:latin typeface="Open Sans" panose="020B0606030504020204" pitchFamily="34" charset="0"/>
+                <a:ea typeface="Open Sans" panose="020B0606030504020204" pitchFamily="34" charset="0"/>
+                <a:cs typeface="Open Sans" panose="020B0606030504020204" pitchFamily="34" charset="0"/>
+              </a:rPr>
+              <a:t>Microsoft. (n.d.-b). What is User Account Control? - Windows Help. Retrieved March 14, 2015, from </a:t>
+            </a:r>
+            <a:r>
+              <a:rPr lang="en-AU" sz="1400" dirty="0">
+                <a:solidFill>
+                  <a:srgbClr val="111111"/>
+                </a:solidFill>
+                <a:latin typeface="Open Sans" panose="020B0606030504020204" pitchFamily="34" charset="0"/>
+                <a:ea typeface="Open Sans" panose="020B0606030504020204" pitchFamily="34" charset="0"/>
+                <a:cs typeface="Open Sans" panose="020B0606030504020204" pitchFamily="34" charset="0"/>
+                <a:hlinkClick r:id="rId9"/>
+              </a:rPr>
+              <a:t>http://</a:t>
+            </a:r>
+            <a:r>
+              <a:rPr lang="en-AU" sz="1400" dirty="0" smtClean="0">
+                <a:solidFill>
+                  <a:srgbClr val="111111"/>
+                </a:solidFill>
+                <a:latin typeface="Open Sans" panose="020B0606030504020204" pitchFamily="34" charset="0"/>
+                <a:ea typeface="Open Sans" panose="020B0606030504020204" pitchFamily="34" charset="0"/>
+                <a:cs typeface="Open Sans" panose="020B0606030504020204" pitchFamily="34" charset="0"/>
+                <a:hlinkClick r:id="rId9"/>
+              </a:rPr>
+              <a:t>windows.microsoft.com/en-au/windows/what-is-user-account-control#1TC=windows-vista</a:t>
+            </a:r>
+            <a:endParaRPr lang="en-AU" sz="1400" dirty="0" smtClean="0">
+              <a:solidFill>
+                <a:srgbClr val="111111"/>
+              </a:solidFill>
+              <a:latin typeface="Open Sans" panose="020B0606030504020204" pitchFamily="34" charset="0"/>
+              <a:ea typeface="Open Sans" panose="020B0606030504020204" pitchFamily="34" charset="0"/>
+              <a:cs typeface="Open Sans" panose="020B0606030504020204" pitchFamily="34" charset="0"/>
+            </a:endParaRPr>
+          </a:p>
+          <a:p>
+            <a:pPr marL="457200" indent="-457200" algn="l">
+              <a:lnSpc>
+                <a:spcPct val="100000"/>
+              </a:lnSpc>
+              <a:buFont typeface="Arial" panose="020B0604020202020204" pitchFamily="34" charset="0"/>
+              <a:buChar char="•"/>
+            </a:pPr>
+            <a:r>
+              <a:rPr lang="en-AU" sz="1400" dirty="0">
+                <a:solidFill>
+                  <a:srgbClr val="111111"/>
+                </a:solidFill>
+                <a:latin typeface="Open Sans" panose="020B0606030504020204" pitchFamily="34" charset="0"/>
+                <a:ea typeface="Open Sans" panose="020B0606030504020204" pitchFamily="34" charset="0"/>
+                <a:cs typeface="Open Sans" panose="020B0606030504020204" pitchFamily="34" charset="0"/>
+              </a:rPr>
+              <a:t>O’Connor, E. (2008). BigAdmin Feature Article: Patch Management Best Practices. Retrieved May 13, 2015, from </a:t>
+            </a:r>
+            <a:r>
+              <a:rPr lang="en-AU" sz="1400" dirty="0">
+                <a:solidFill>
+                  <a:srgbClr val="111111"/>
+                </a:solidFill>
+                <a:latin typeface="Open Sans" panose="020B0606030504020204" pitchFamily="34" charset="0"/>
+                <a:ea typeface="Open Sans" panose="020B0606030504020204" pitchFamily="34" charset="0"/>
+                <a:cs typeface="Open Sans" panose="020B0606030504020204" pitchFamily="34" charset="0"/>
+                <a:hlinkClick r:id="rId10"/>
+              </a:rPr>
+              <a:t>http://</a:t>
+            </a:r>
+            <a:r>
+              <a:rPr lang="en-AU" sz="1400" dirty="0" smtClean="0">
+                <a:solidFill>
+                  <a:srgbClr val="111111"/>
+                </a:solidFill>
+                <a:latin typeface="Open Sans" panose="020B0606030504020204" pitchFamily="34" charset="0"/>
+                <a:ea typeface="Open Sans" panose="020B0606030504020204" pitchFamily="34" charset="0"/>
+                <a:cs typeface="Open Sans" panose="020B0606030504020204" pitchFamily="34" charset="0"/>
+                <a:hlinkClick r:id="rId10"/>
+              </a:rPr>
+              <a:t>www.oracle.com/technetwork/systems/articles/patch-management-jsp-135385.html</a:t>
+            </a:r>
+            <a:endParaRPr lang="en-AU" sz="1400" dirty="0" smtClean="0">
+              <a:solidFill>
+                <a:srgbClr val="111111"/>
+              </a:solidFill>
+              <a:latin typeface="Open Sans" panose="020B0606030504020204" pitchFamily="34" charset="0"/>
+              <a:ea typeface="Open Sans" panose="020B0606030504020204" pitchFamily="34" charset="0"/>
+              <a:cs typeface="Open Sans" panose="020B0606030504020204" pitchFamily="34" charset="0"/>
+            </a:endParaRPr>
+          </a:p>
+          <a:p>
+            <a:pPr marL="457200" indent="-457200" algn="l">
+              <a:lnSpc>
+                <a:spcPct val="100000"/>
+              </a:lnSpc>
+              <a:buFont typeface="Arial" panose="020B0604020202020204" pitchFamily="34" charset="0"/>
+              <a:buChar char="•"/>
+            </a:pPr>
+            <a:r>
+              <a:rPr lang="en-AU" sz="1400" dirty="0">
+                <a:solidFill>
+                  <a:srgbClr val="111111"/>
+                </a:solidFill>
+                <a:latin typeface="Open Sans" panose="020B0606030504020204" pitchFamily="34" charset="0"/>
+                <a:ea typeface="Open Sans" panose="020B0606030504020204" pitchFamily="34" charset="0"/>
+                <a:cs typeface="Open Sans" panose="020B0606030504020204" pitchFamily="34" charset="0"/>
+              </a:rPr>
+              <a:t>Oliver, J., &amp; Snowden, E. [LastWeekTonight]. (2015, April 9). Last Week Tonight with John Oliver: Edward Snowden on Passwords. Retrieved May 6, 2015, from </a:t>
+            </a:r>
+            <a:r>
+              <a:rPr lang="en-AU" sz="1400" dirty="0">
+                <a:solidFill>
+                  <a:srgbClr val="111111"/>
+                </a:solidFill>
+                <a:latin typeface="Open Sans" panose="020B0606030504020204" pitchFamily="34" charset="0"/>
+                <a:ea typeface="Open Sans" panose="020B0606030504020204" pitchFamily="34" charset="0"/>
+                <a:cs typeface="Open Sans" panose="020B0606030504020204" pitchFamily="34" charset="0"/>
+                <a:hlinkClick r:id="rId11"/>
+              </a:rPr>
+              <a:t>https://</a:t>
+            </a:r>
+            <a:r>
+              <a:rPr lang="en-AU" sz="1400" dirty="0" smtClean="0">
+                <a:solidFill>
+                  <a:srgbClr val="111111"/>
+                </a:solidFill>
+                <a:latin typeface="Open Sans" panose="020B0606030504020204" pitchFamily="34" charset="0"/>
+                <a:ea typeface="Open Sans" panose="020B0606030504020204" pitchFamily="34" charset="0"/>
+                <a:cs typeface="Open Sans" panose="020B0606030504020204" pitchFamily="34" charset="0"/>
+                <a:hlinkClick r:id="rId11"/>
+              </a:rPr>
+              <a:t>www.youtube.com/watch?v=yzGzB-yYKcc</a:t>
+            </a:r>
+            <a:endParaRPr lang="en-AU" sz="1400" dirty="0" smtClean="0">
+              <a:solidFill>
+                <a:srgbClr val="111111"/>
+              </a:solidFill>
+              <a:latin typeface="Open Sans" panose="020B0606030504020204" pitchFamily="34" charset="0"/>
+              <a:ea typeface="Open Sans" panose="020B0606030504020204" pitchFamily="34" charset="0"/>
+              <a:cs typeface="Open Sans" panose="020B0606030504020204" pitchFamily="34" charset="0"/>
+            </a:endParaRPr>
+          </a:p>
+          <a:p>
+            <a:pPr marL="457200" indent="-457200" algn="l">
+              <a:lnSpc>
+                <a:spcPct val="100000"/>
+              </a:lnSpc>
+              <a:buFont typeface="Arial" panose="020B0604020202020204" pitchFamily="34" charset="0"/>
+              <a:buChar char="•"/>
+            </a:pPr>
+            <a:r>
+              <a:rPr lang="en-AU" sz="1400" dirty="0">
+                <a:solidFill>
+                  <a:srgbClr val="111111"/>
+                </a:solidFill>
+                <a:latin typeface="Open Sans" panose="020B0606030504020204" pitchFamily="34" charset="0"/>
+                <a:ea typeface="Open Sans" panose="020B0606030504020204" pitchFamily="34" charset="0"/>
+                <a:cs typeface="Open Sans" panose="020B0606030504020204" pitchFamily="34" charset="0"/>
+              </a:rPr>
+              <a:t>Scarfone, K., &amp; Souppaya, M. (2013). Guide to Enterprise Patch Management Technologies NIST Special Publication 800-40 Guide to Enterprise Patch Management Technologies. NIST. </a:t>
+            </a:r>
+            <a:r>
+              <a:rPr lang="en-AU" sz="1400" dirty="0" smtClean="0">
+                <a:solidFill>
+                  <a:srgbClr val="111111"/>
+                </a:solidFill>
+                <a:latin typeface="Open Sans" panose="020B0606030504020204" pitchFamily="34" charset="0"/>
+                <a:ea typeface="Open Sans" panose="020B0606030504020204" pitchFamily="34" charset="0"/>
+                <a:cs typeface="Open Sans" panose="020B0606030504020204" pitchFamily="34" charset="0"/>
+              </a:rPr>
+              <a:t>doi:10.6028/NIST.SP.800-40r3</a:t>
+            </a:r>
+          </a:p>
+          <a:p>
+            <a:pPr marL="457200" indent="-457200" algn="l">
+              <a:lnSpc>
+                <a:spcPct val="100000"/>
+              </a:lnSpc>
+              <a:buFont typeface="Arial" panose="020B0604020202020204" pitchFamily="34" charset="0"/>
+              <a:buChar char="•"/>
+            </a:pPr>
+            <a:r>
+              <a:rPr lang="en-AU" sz="1400" dirty="0">
+                <a:solidFill>
+                  <a:srgbClr val="111111"/>
+                </a:solidFill>
+                <a:latin typeface="Open Sans" panose="020B0606030504020204" pitchFamily="34" charset="0"/>
+                <a:ea typeface="Open Sans" panose="020B0606030504020204" pitchFamily="34" charset="0"/>
+                <a:cs typeface="Open Sans" panose="020B0606030504020204" pitchFamily="34" charset="0"/>
+              </a:rPr>
+              <a:t>Tice, K. [solarwindsinc]. (2012, September 12)  Patch Manager Guided Tour. Retrieved May 14, 2015, from </a:t>
+            </a:r>
+            <a:r>
+              <a:rPr lang="en-AU" sz="1400" dirty="0">
+                <a:solidFill>
+                  <a:srgbClr val="111111"/>
+                </a:solidFill>
+                <a:latin typeface="Open Sans" panose="020B0606030504020204" pitchFamily="34" charset="0"/>
+                <a:ea typeface="Open Sans" panose="020B0606030504020204" pitchFamily="34" charset="0"/>
+                <a:cs typeface="Open Sans" panose="020B0606030504020204" pitchFamily="34" charset="0"/>
+                <a:hlinkClick r:id="rId12"/>
+              </a:rPr>
+              <a:t>https://www.youtube.com/watch?v=-</a:t>
+            </a:r>
+            <a:r>
+              <a:rPr lang="en-AU" sz="1400" dirty="0" smtClean="0">
+                <a:solidFill>
+                  <a:srgbClr val="111111"/>
+                </a:solidFill>
+                <a:latin typeface="Open Sans" panose="020B0606030504020204" pitchFamily="34" charset="0"/>
+                <a:ea typeface="Open Sans" panose="020B0606030504020204" pitchFamily="34" charset="0"/>
+                <a:cs typeface="Open Sans" panose="020B0606030504020204" pitchFamily="34" charset="0"/>
+                <a:hlinkClick r:id="rId12"/>
+              </a:rPr>
+              <a:t>DldViUL1d0</a:t>
+            </a:r>
+            <a:endParaRPr lang="en-AU" sz="1400" dirty="0" smtClean="0">
+              <a:solidFill>
+                <a:srgbClr val="111111"/>
+              </a:solidFill>
+              <a:latin typeface="Open Sans" panose="020B0606030504020204" pitchFamily="34" charset="0"/>
+              <a:ea typeface="Open Sans" panose="020B0606030504020204" pitchFamily="34" charset="0"/>
+              <a:cs typeface="Open Sans" panose="020B0606030504020204" pitchFamily="34" charset="0"/>
+            </a:endParaRPr>
+          </a:p>
+          <a:p>
+            <a:pPr marL="457200" indent="-457200" algn="l">
+              <a:lnSpc>
+                <a:spcPct val="100000"/>
+              </a:lnSpc>
+              <a:buFont typeface="Arial" panose="020B0604020202020204" pitchFamily="34" charset="0"/>
+              <a:buChar char="•"/>
+            </a:pPr>
+            <a:endParaRPr lang="en-AU" sz="1400" dirty="0" smtClean="0">
+              <a:solidFill>
+                <a:srgbClr val="111111"/>
+              </a:solidFill>
+              <a:latin typeface="Open Sans" panose="020B0606030504020204" pitchFamily="34" charset="0"/>
+              <a:ea typeface="Open Sans" panose="020B0606030504020204" pitchFamily="34" charset="0"/>
+              <a:cs typeface="Open Sans" panose="020B0606030504020204" pitchFamily="34" charset="0"/>
+            </a:endParaRPr>
+          </a:p>
+        </p:txBody>
+      </p:sp>
     </p:spTree>
     <p:extLst>
       <p:ext uri="{BB962C8B-B14F-4D97-AF65-F5344CB8AC3E}">
-        <p14:creationId xmlns:p14="http://schemas.microsoft.com/office/powerpoint/2010/main" val="2136438796"/>
+        <p14:creationId xmlns:p14="http://schemas.microsoft.com/office/powerpoint/2010/main" val="636747076"/>
       </p:ext>
     </p:extLst>
   </p:cSld>
@@ -12121,7 +12195,7 @@
             <a:r>
               <a:rPr lang="en-AU" sz="3600" b="1" dirty="0" smtClean="0">
                 <a:solidFill>
-                  <a:srgbClr val="111111"/>
+                  <a:srgbClr val="FF0000"/>
                 </a:solidFill>
                 <a:latin typeface="Open Sans" panose="020B0606030504020204" pitchFamily="34" charset="0"/>
                 <a:ea typeface="Open Sans" panose="020B0606030504020204" pitchFamily="34" charset="0"/>
@@ -12132,7 +12206,7 @@
             <a:br>
               <a:rPr lang="en-AU" sz="3600" b="1" dirty="0" smtClean="0">
                 <a:solidFill>
-                  <a:srgbClr val="111111"/>
+                  <a:srgbClr val="FF0000"/>
                 </a:solidFill>
                 <a:latin typeface="Open Sans" panose="020B0606030504020204" pitchFamily="34" charset="0"/>
                 <a:ea typeface="Open Sans" panose="020B0606030504020204" pitchFamily="34" charset="0"/>
@@ -12142,7 +12216,7 @@
             <a:r>
               <a:rPr lang="en-AU" sz="3600" b="1" dirty="0" smtClean="0">
                 <a:solidFill>
-                  <a:srgbClr val="111111"/>
+                  <a:srgbClr val="FF0000"/>
                 </a:solidFill>
                 <a:latin typeface="Open Sans" panose="020B0606030504020204" pitchFamily="34" charset="0"/>
                 <a:ea typeface="Open Sans" panose="020B0606030504020204" pitchFamily="34" charset="0"/>
@@ -12152,7 +12226,7 @@
             </a:r>
             <a:endParaRPr lang="en-AU" sz="3600" dirty="0">
               <a:solidFill>
-                <a:srgbClr val="111111"/>
+                <a:srgbClr val="FF0000"/>
               </a:solidFill>
               <a:latin typeface="Open Sans" panose="020B0606030504020204" pitchFamily="34" charset="0"/>
               <a:ea typeface="Open Sans" panose="020B0606030504020204" pitchFamily="34" charset="0"/>
@@ -12213,18 +12287,7 @@
                 <a:ea typeface="Open Sans" panose="020B0606030504020204" pitchFamily="34" charset="0"/>
                 <a:cs typeface="Open Sans" panose="020B0606030504020204" pitchFamily="34" charset="0"/>
               </a:rPr>
-              <a:t>Potentially installed through malware </a:t>
-            </a:r>
-            <a:r>
-              <a:rPr lang="en-AU" sz="2600" dirty="0" smtClean="0">
-                <a:solidFill>
-                  <a:srgbClr val="111111"/>
-                </a:solidFill>
-                <a:latin typeface="Open Sans" panose="020B0606030504020204" pitchFamily="34" charset="0"/>
-                <a:ea typeface="Open Sans" panose="020B0606030504020204" pitchFamily="34" charset="0"/>
-                <a:cs typeface="Open Sans" panose="020B0606030504020204" pitchFamily="34" charset="0"/>
-              </a:rPr>
-              <a:t>propagation</a:t>
+              <a:t>Potentially installed through malware propagation</a:t>
             </a:r>
           </a:p>
           <a:p>
@@ -12243,14 +12306,6 @@
               </a:rPr>
               <a:t>Offers zero protection</a:t>
             </a:r>
-            <a:endParaRPr lang="en-AU" sz="2600" dirty="0" smtClean="0">
-              <a:solidFill>
-                <a:srgbClr val="111111"/>
-              </a:solidFill>
-              <a:latin typeface="Open Sans" panose="020B0606030504020204" pitchFamily="34" charset="0"/>
-              <a:ea typeface="Open Sans" panose="020B0606030504020204" pitchFamily="34" charset="0"/>
-              <a:cs typeface="Open Sans" panose="020B0606030504020204" pitchFamily="34" charset="0"/>
-            </a:endParaRPr>
           </a:p>
           <a:p>
             <a:pPr marL="285750" indent="-285750">
@@ -12414,6 +12469,90 @@
         </p:nvSpPr>
         <p:spPr>
           <a:xfrm>
+            <a:off x="1524000" y="0"/>
+            <a:ext cx="9144000" cy="6858000"/>
+          </a:xfrm>
+        </p:spPr>
+        <p:txBody>
+          <a:bodyPr anchor="ctr">
+            <a:normAutofit/>
+          </a:bodyPr>
+          <a:lstStyle/>
+          <a:p>
+            <a:r>
+              <a:rPr lang="en-AU" sz="4400" b="1" dirty="0" smtClean="0">
+                <a:solidFill>
+                  <a:srgbClr val="111111"/>
+                </a:solidFill>
+                <a:latin typeface="Open Sans" panose="020B0606030504020204" pitchFamily="34" charset="0"/>
+                <a:ea typeface="Open Sans" panose="020B0606030504020204" pitchFamily="34" charset="0"/>
+                <a:cs typeface="Open Sans" panose="020B0606030504020204" pitchFamily="34" charset="0"/>
+              </a:rPr>
+              <a:t>Intrusion detection system</a:t>
+            </a:r>
+            <a:endParaRPr lang="en-AU" sz="4400" b="1" dirty="0">
+              <a:solidFill>
+                <a:srgbClr val="111111"/>
+              </a:solidFill>
+              <a:latin typeface="Open Sans" panose="020B0606030504020204" pitchFamily="34" charset="0"/>
+              <a:ea typeface="Open Sans" panose="020B0606030504020204" pitchFamily="34" charset="0"/>
+              <a:cs typeface="Open Sans" panose="020B0606030504020204" pitchFamily="34" charset="0"/>
+            </a:endParaRPr>
+          </a:p>
+        </p:txBody>
+      </p:sp>
+    </p:spTree>
+    <p:extLst>
+      <p:ext uri="{BB962C8B-B14F-4D97-AF65-F5344CB8AC3E}">
+        <p14:creationId xmlns:p14="http://schemas.microsoft.com/office/powerpoint/2010/main" val="2136438796"/>
+      </p:ext>
+    </p:extLst>
+  </p:cSld>
+  <p:clrMapOvr>
+    <a:masterClrMapping/>
+  </p:clrMapOvr>
+  <p:transition spd="slow">
+    <p:push/>
+  </p:transition>
+  <p:timing>
+    <p:tnLst>
+      <p:par>
+        <p:cTn id="1" dur="indefinite" restart="never" nodeType="tmRoot"/>
+      </p:par>
+    </p:tnLst>
+  </p:timing>
+</p:sld>
+</file>
+
+<file path=ppt/slides/slide31.xml><?xml version="1.0" encoding="utf-8"?>
+<p:sld xmlns:a="http://schemas.openxmlformats.org/drawingml/2006/main" xmlns:r="http://schemas.openxmlformats.org/officeDocument/2006/relationships" xmlns:p="http://schemas.openxmlformats.org/presentationml/2006/main">
+  <p:cSld>
+    <p:spTree>
+      <p:nvGrpSpPr>
+        <p:cNvPr id="1" name=""/>
+        <p:cNvGrpSpPr/>
+        <p:nvPr/>
+      </p:nvGrpSpPr>
+      <p:grpSpPr>
+        <a:xfrm>
+          <a:off x="0" y="0"/>
+          <a:ext cx="0" cy="0"/>
+          <a:chOff x="0" y="0"/>
+          <a:chExt cx="0" cy="0"/>
+        </a:xfrm>
+      </p:grpSpPr>
+      <p:sp>
+        <p:nvSpPr>
+          <p:cNvPr id="4" name="Title 3"/>
+          <p:cNvSpPr>
+            <a:spLocks noGrp="1"/>
+          </p:cNvSpPr>
+          <p:nvPr>
+            <p:ph type="ctrTitle"/>
+          </p:nvPr>
+        </p:nvSpPr>
+        <p:spPr>
+          <a:xfrm>
             <a:off x="1524000" y="-1187268"/>
             <a:ext cx="9144000" cy="2917370"/>
           </a:xfrm>
@@ -12687,13 +12826,24 @@
             <a:r>
               <a:rPr lang="en-AU" sz="3200" b="1" dirty="0" smtClean="0">
                 <a:solidFill>
-                  <a:srgbClr val="111111"/>
+                  <a:srgbClr val="00B050"/>
                 </a:solidFill>
                 <a:latin typeface="Open Sans" panose="020B0606030504020204" pitchFamily="34" charset="0"/>
                 <a:ea typeface="Open Sans" panose="020B0606030504020204" pitchFamily="34" charset="0"/>
                 <a:cs typeface="Open Sans" panose="020B0606030504020204" pitchFamily="34" charset="0"/>
               </a:rPr>
               <a:t>Recommend:</a:t>
+            </a:r>
+            <a:r>
+              <a:rPr lang="en-AU" sz="3200" b="1" dirty="0" smtClean="0">
+                <a:solidFill>
+                  <a:srgbClr val="111111"/>
+                </a:solidFill>
+                <a:latin typeface="Open Sans" panose="020B0606030504020204" pitchFamily="34" charset="0"/>
+                <a:ea typeface="Open Sans" panose="020B0606030504020204" pitchFamily="34" charset="0"/>
+                <a:cs typeface="Open Sans" panose="020B0606030504020204" pitchFamily="34" charset="0"/>
+              </a:rPr>
+              <a:t/>
             </a:r>
             <a:br>
               <a:rPr lang="en-AU" sz="3200" b="1" dirty="0" smtClean="0">
@@ -13055,25 +13205,7 @@
                 <a:cs typeface="Open Sans" panose="020B0606030504020204" pitchFamily="34" charset="0"/>
                 <a:hlinkClick r:id="rId3"/>
               </a:rPr>
-              <a:t>(Kaspersky Lab, </a:t>
-            </a:r>
-            <a:r>
-              <a:rPr lang="en-AU" sz="2400" dirty="0" smtClean="0">
-                <a:latin typeface="Open Sans" panose="020B0606030504020204" pitchFamily="34" charset="0"/>
-                <a:ea typeface="Open Sans" panose="020B0606030504020204" pitchFamily="34" charset="0"/>
-                <a:cs typeface="Open Sans" panose="020B0606030504020204" pitchFamily="34" charset="0"/>
-                <a:hlinkClick r:id="rId3"/>
-              </a:rPr>
-              <a:t>2013a, </a:t>
-            </a:r>
-            <a:r>
-              <a:rPr lang="en-AU" sz="2400" dirty="0" smtClean="0">
-                <a:latin typeface="Open Sans" panose="020B0606030504020204" pitchFamily="34" charset="0"/>
-                <a:ea typeface="Open Sans" panose="020B0606030504020204" pitchFamily="34" charset="0"/>
-                <a:cs typeface="Open Sans" panose="020B0606030504020204" pitchFamily="34" charset="0"/>
-                <a:hlinkClick r:id="rId3"/>
-              </a:rPr>
-              <a:t>p. 1)</a:t>
+              <a:t>(Kaspersky Lab, 2013a, p. 1)</a:t>
             </a:r>
             <a:endParaRPr lang="en-AU" sz="2400" dirty="0">
               <a:latin typeface="Open Sans" panose="020B0606030504020204" pitchFamily="34" charset="0"/>

</xml_diff>

<commit_message>
CSI1101 A2: added passphrases recommendation
</commit_message>
<xml_diff>
--- a/year_1/sem_2/CSI1101_computer_security/0b_assignment_2_[22MAY15_0900]/dev/CSI1101_PONCE_A2_v03.pptx
+++ b/year_1/sem_2/CSI1101_computer_security/0b_assignment_2_[22MAY15_0900]/dev/CSI1101_PONCE_A2_v03.pptx
@@ -28,36 +28,37 @@
     <p:sldId id="354" r:id="rId22"/>
     <p:sldId id="355" r:id="rId23"/>
     <p:sldId id="389" r:id="rId24"/>
-    <p:sldId id="365" r:id="rId25"/>
-    <p:sldId id="366" r:id="rId26"/>
-    <p:sldId id="367" r:id="rId27"/>
-    <p:sldId id="368" r:id="rId28"/>
-    <p:sldId id="369" r:id="rId29"/>
-    <p:sldId id="272" r:id="rId30"/>
-    <p:sldId id="380" r:id="rId31"/>
-    <p:sldId id="370" r:id="rId32"/>
+    <p:sldId id="390" r:id="rId25"/>
+    <p:sldId id="365" r:id="rId26"/>
+    <p:sldId id="366" r:id="rId27"/>
+    <p:sldId id="367" r:id="rId28"/>
+    <p:sldId id="368" r:id="rId29"/>
+    <p:sldId id="369" r:id="rId30"/>
+    <p:sldId id="272" r:id="rId31"/>
+    <p:sldId id="380" r:id="rId32"/>
+    <p:sldId id="370" r:id="rId33"/>
   </p:sldIdLst>
   <p:sldSz cx="12192000" cy="6858000"/>
   <p:notesSz cx="6858000" cy="9144000"/>
   <p:embeddedFontLst>
     <p:embeddedFont>
       <p:font typeface="Calibri Light" panose="020F0302020204030204" pitchFamily="34" charset="0"/>
-      <p:regular r:id="rId33"/>
-      <p:italic r:id="rId34"/>
+      <p:regular r:id="rId34"/>
+      <p:italic r:id="rId35"/>
     </p:embeddedFont>
     <p:embeddedFont>
       <p:font typeface="Open Sans" panose="020B0606030504020204" pitchFamily="34" charset="0"/>
-      <p:regular r:id="rId35"/>
-      <p:bold r:id="rId36"/>
-      <p:italic r:id="rId37"/>
-      <p:boldItalic r:id="rId38"/>
+      <p:regular r:id="rId36"/>
+      <p:bold r:id="rId37"/>
+      <p:italic r:id="rId38"/>
+      <p:boldItalic r:id="rId39"/>
     </p:embeddedFont>
     <p:embeddedFont>
       <p:font typeface="Calibri" panose="020F0502020204030204" pitchFamily="34" charset="0"/>
-      <p:regular r:id="rId39"/>
-      <p:bold r:id="rId40"/>
-      <p:italic r:id="rId41"/>
-      <p:boldItalic r:id="rId42"/>
+      <p:regular r:id="rId40"/>
+      <p:bold r:id="rId41"/>
+      <p:italic r:id="rId42"/>
+      <p:boldItalic r:id="rId43"/>
     </p:embeddedFont>
   </p:embeddedFontLst>
   <p:defaultTextStyle>
@@ -305,7 +306,7 @@
           <a:p>
             <a:fld id="{7B1A49F8-424C-43DF-ABBC-6BF9F0D68733}" type="datetimeFigureOut">
               <a:rPr lang="en-AU" smtClean="0"/>
-              <a:t>16/05/2015</a:t>
+              <a:t>17/05/2015</a:t>
             </a:fld>
             <a:endParaRPr lang="en-AU"/>
           </a:p>
@@ -475,7 +476,7 @@
           <a:p>
             <a:fld id="{7B1A49F8-424C-43DF-ABBC-6BF9F0D68733}" type="datetimeFigureOut">
               <a:rPr lang="en-AU" smtClean="0"/>
-              <a:t>16/05/2015</a:t>
+              <a:t>17/05/2015</a:t>
             </a:fld>
             <a:endParaRPr lang="en-AU"/>
           </a:p>
@@ -655,7 +656,7 @@
           <a:p>
             <a:fld id="{7B1A49F8-424C-43DF-ABBC-6BF9F0D68733}" type="datetimeFigureOut">
               <a:rPr lang="en-AU" smtClean="0"/>
-              <a:t>16/05/2015</a:t>
+              <a:t>17/05/2015</a:t>
             </a:fld>
             <a:endParaRPr lang="en-AU"/>
           </a:p>
@@ -825,7 +826,7 @@
           <a:p>
             <a:fld id="{7B1A49F8-424C-43DF-ABBC-6BF9F0D68733}" type="datetimeFigureOut">
               <a:rPr lang="en-AU" smtClean="0"/>
-              <a:t>16/05/2015</a:t>
+              <a:t>17/05/2015</a:t>
             </a:fld>
             <a:endParaRPr lang="en-AU"/>
           </a:p>
@@ -1071,7 +1072,7 @@
           <a:p>
             <a:fld id="{7B1A49F8-424C-43DF-ABBC-6BF9F0D68733}" type="datetimeFigureOut">
               <a:rPr lang="en-AU" smtClean="0"/>
-              <a:t>16/05/2015</a:t>
+              <a:t>17/05/2015</a:t>
             </a:fld>
             <a:endParaRPr lang="en-AU"/>
           </a:p>
@@ -1303,7 +1304,7 @@
           <a:p>
             <a:fld id="{7B1A49F8-424C-43DF-ABBC-6BF9F0D68733}" type="datetimeFigureOut">
               <a:rPr lang="en-AU" smtClean="0"/>
-              <a:t>16/05/2015</a:t>
+              <a:t>17/05/2015</a:t>
             </a:fld>
             <a:endParaRPr lang="en-AU"/>
           </a:p>
@@ -1670,7 +1671,7 @@
           <a:p>
             <a:fld id="{7B1A49F8-424C-43DF-ABBC-6BF9F0D68733}" type="datetimeFigureOut">
               <a:rPr lang="en-AU" smtClean="0"/>
-              <a:t>16/05/2015</a:t>
+              <a:t>17/05/2015</a:t>
             </a:fld>
             <a:endParaRPr lang="en-AU"/>
           </a:p>
@@ -1788,7 +1789,7 @@
           <a:p>
             <a:fld id="{7B1A49F8-424C-43DF-ABBC-6BF9F0D68733}" type="datetimeFigureOut">
               <a:rPr lang="en-AU" smtClean="0"/>
-              <a:t>16/05/2015</a:t>
+              <a:t>17/05/2015</a:t>
             </a:fld>
             <a:endParaRPr lang="en-AU"/>
           </a:p>
@@ -1883,7 +1884,7 @@
           <a:p>
             <a:fld id="{7B1A49F8-424C-43DF-ABBC-6BF9F0D68733}" type="datetimeFigureOut">
               <a:rPr lang="en-AU" smtClean="0"/>
-              <a:t>16/05/2015</a:t>
+              <a:t>17/05/2015</a:t>
             </a:fld>
             <a:endParaRPr lang="en-AU"/>
           </a:p>
@@ -2160,7 +2161,7 @@
           <a:p>
             <a:fld id="{7B1A49F8-424C-43DF-ABBC-6BF9F0D68733}" type="datetimeFigureOut">
               <a:rPr lang="en-AU" smtClean="0"/>
-              <a:t>16/05/2015</a:t>
+              <a:t>17/05/2015</a:t>
             </a:fld>
             <a:endParaRPr lang="en-AU"/>
           </a:p>
@@ -2413,7 +2414,7 @@
           <a:p>
             <a:fld id="{7B1A49F8-424C-43DF-ABBC-6BF9F0D68733}" type="datetimeFigureOut">
               <a:rPr lang="en-AU" smtClean="0"/>
-              <a:t>16/05/2015</a:t>
+              <a:t>17/05/2015</a:t>
             </a:fld>
             <a:endParaRPr lang="en-AU"/>
           </a:p>
@@ -2629,7 +2630,7 @@
           <a:p>
             <a:fld id="{7B1A49F8-424C-43DF-ABBC-6BF9F0D68733}" type="datetimeFigureOut">
               <a:rPr lang="en-AU" smtClean="0"/>
-              <a:t>16/05/2015</a:t>
+              <a:t>17/05/2015</a:t>
             </a:fld>
             <a:endParaRPr lang="en-AU"/>
           </a:p>
@@ -3302,18 +3303,7 @@
                 <a:ea typeface="Open Sans" panose="020B0606030504020204" pitchFamily="34" charset="0"/>
                 <a:cs typeface="Open Sans" panose="020B0606030504020204" pitchFamily="34" charset="0"/>
               </a:rPr>
-              <a:t>OS / application </a:t>
-            </a:r>
-            <a:r>
-              <a:rPr lang="en-AU" sz="3600" b="1" dirty="0" smtClean="0">
-                <a:solidFill>
-                  <a:srgbClr val="FF0000"/>
-                </a:solidFill>
-                <a:latin typeface="Open Sans" panose="020B0606030504020204" pitchFamily="34" charset="0"/>
-                <a:ea typeface="Open Sans" panose="020B0606030504020204" pitchFamily="34" charset="0"/>
-                <a:cs typeface="Open Sans" panose="020B0606030504020204" pitchFamily="34" charset="0"/>
-              </a:rPr>
-              <a:t>vulnerabilities</a:t>
+              <a:t>OS / application vulnerabilities</a:t>
             </a:r>
             <a:endParaRPr lang="en-AU" sz="3600" dirty="0">
               <a:solidFill>
@@ -8486,18 +8476,7 @@
                 <a:ea typeface="Open Sans" panose="020B0606030504020204" pitchFamily="34" charset="0"/>
                 <a:cs typeface="Open Sans" panose="020B0606030504020204" pitchFamily="34" charset="0"/>
               </a:rPr>
-              <a:t>creenserver password </a:t>
-            </a:r>
-            <a:r>
-              <a:rPr lang="en-AU" sz="2600" dirty="0" smtClean="0">
-                <a:solidFill>
-                  <a:srgbClr val="111111"/>
-                </a:solidFill>
-                <a:latin typeface="Open Sans" panose="020B0606030504020204" pitchFamily="34" charset="0"/>
-                <a:ea typeface="Open Sans" panose="020B0606030504020204" pitchFamily="34" charset="0"/>
-                <a:cs typeface="Open Sans" panose="020B0606030504020204" pitchFamily="34" charset="0"/>
-              </a:rPr>
-              <a:t>protection </a:t>
+              <a:t>creenserver password protection </a:t>
             </a:r>
             <a:r>
               <a:rPr lang="en-AU" sz="2600" dirty="0">
@@ -8534,18 +8513,7 @@
                 <a:ea typeface="Open Sans" panose="020B0606030504020204" pitchFamily="34" charset="0"/>
                 <a:cs typeface="Open Sans" panose="020B0606030504020204" pitchFamily="34" charset="0"/>
               </a:rPr>
-              <a:t>Enable </a:t>
-            </a:r>
-            <a:r>
-              <a:rPr lang="en-AU" sz="2600" dirty="0" smtClean="0">
-                <a:solidFill>
-                  <a:srgbClr val="111111"/>
-                </a:solidFill>
-                <a:latin typeface="Open Sans" panose="020B0606030504020204" pitchFamily="34" charset="0"/>
-                <a:ea typeface="Open Sans" panose="020B0606030504020204" pitchFamily="34" charset="0"/>
-                <a:cs typeface="Open Sans" panose="020B0606030504020204" pitchFamily="34" charset="0"/>
-              </a:rPr>
-              <a:t>UAC </a:t>
+              <a:t>Enable UAC </a:t>
             </a:r>
             <a:r>
               <a:rPr lang="en-AU" sz="2600" dirty="0">
@@ -8582,18 +8550,7 @@
                 <a:ea typeface="Open Sans" panose="020B0606030504020204" pitchFamily="34" charset="0"/>
                 <a:cs typeface="Open Sans" panose="020B0606030504020204" pitchFamily="34" charset="0"/>
               </a:rPr>
-              <a:t>Password </a:t>
-            </a:r>
-            <a:r>
-              <a:rPr lang="en-AU" sz="2600" dirty="0" smtClean="0">
-                <a:solidFill>
-                  <a:srgbClr val="111111"/>
-                </a:solidFill>
-                <a:latin typeface="Open Sans" panose="020B0606030504020204" pitchFamily="34" charset="0"/>
-                <a:ea typeface="Open Sans" panose="020B0606030504020204" pitchFamily="34" charset="0"/>
-                <a:cs typeface="Open Sans" panose="020B0606030504020204" pitchFamily="34" charset="0"/>
-              </a:rPr>
-              <a:t>strength policies </a:t>
+              <a:t>Password strength policies </a:t>
             </a:r>
             <a:r>
               <a:rPr lang="en-AU" sz="2600" dirty="0">
@@ -8630,29 +8587,7 @@
                 <a:ea typeface="Open Sans" panose="020B0606030504020204" pitchFamily="34" charset="0"/>
                 <a:cs typeface="Open Sans" panose="020B0606030504020204" pitchFamily="34" charset="0"/>
               </a:rPr>
-              <a:t>Lock account after </a:t>
-            </a:r>
-            <a:r>
-              <a:rPr lang="en-AU" sz="2600" dirty="0" smtClean="0">
-                <a:solidFill>
-                  <a:srgbClr val="111111"/>
-                </a:solidFill>
-                <a:latin typeface="Open Sans" panose="020B0606030504020204" pitchFamily="34" charset="0"/>
-                <a:ea typeface="Open Sans" panose="020B0606030504020204" pitchFamily="34" charset="0"/>
-                <a:cs typeface="Open Sans" panose="020B0606030504020204" pitchFamily="34" charset="0"/>
-              </a:rPr>
-              <a:t>failed </a:t>
-            </a:r>
-            <a:r>
-              <a:rPr lang="en-AU" sz="2600" dirty="0" smtClean="0">
-                <a:solidFill>
-                  <a:srgbClr val="111111"/>
-                </a:solidFill>
-                <a:latin typeface="Open Sans" panose="020B0606030504020204" pitchFamily="34" charset="0"/>
-                <a:ea typeface="Open Sans" panose="020B0606030504020204" pitchFamily="34" charset="0"/>
-                <a:cs typeface="Open Sans" panose="020B0606030504020204" pitchFamily="34" charset="0"/>
-              </a:rPr>
-              <a:t>attempts </a:t>
+              <a:t>Lock account after failed attempts </a:t>
             </a:r>
             <a:r>
               <a:rPr lang="en-AU" sz="2600" dirty="0">
@@ -8775,43 +8710,7 @@
                 <a:cs typeface="Open Sans" panose="020B0606030504020204" pitchFamily="34" charset="0"/>
                 <a:hlinkClick r:id="rId2"/>
               </a:rPr>
-              <a:t>(</a:t>
-            </a:r>
-            <a:r>
-              <a:rPr lang="en-AU" sz="2800" b="1" dirty="0" smtClean="0">
-                <a:solidFill>
-                  <a:srgbClr val="111111"/>
-                </a:solidFill>
-                <a:latin typeface="Open Sans" panose="020B0606030504020204" pitchFamily="34" charset="0"/>
-                <a:ea typeface="Open Sans" panose="020B0606030504020204" pitchFamily="34" charset="0"/>
-                <a:cs typeface="Open Sans" panose="020B0606030504020204" pitchFamily="34" charset="0"/>
-                <a:hlinkClick r:id="rId2"/>
-              </a:rPr>
-              <a:t>Concept Draw</a:t>
-            </a:r>
-            <a:r>
-              <a:rPr lang="en-AU" sz="2800" b="1" dirty="0" smtClean="0">
-                <a:solidFill>
-                  <a:srgbClr val="111111"/>
-                </a:solidFill>
-                <a:latin typeface="Open Sans" panose="020B0606030504020204" pitchFamily="34" charset="0"/>
-                <a:ea typeface="Open Sans" panose="020B0606030504020204" pitchFamily="34" charset="0"/>
-                <a:cs typeface="Open Sans" panose="020B0606030504020204" pitchFamily="34" charset="0"/>
-                <a:hlinkClick r:id="rId2"/>
-              </a:rPr>
-              <a:t>, </a:t>
-            </a:r>
-            <a:r>
-              <a:rPr lang="en-AU" sz="2800" b="1" dirty="0" smtClean="0">
-                <a:solidFill>
-                  <a:srgbClr val="111111"/>
-                </a:solidFill>
-                <a:latin typeface="Open Sans" panose="020B0606030504020204" pitchFamily="34" charset="0"/>
-                <a:ea typeface="Open Sans" panose="020B0606030504020204" pitchFamily="34" charset="0"/>
-                <a:cs typeface="Open Sans" panose="020B0606030504020204" pitchFamily="34" charset="0"/>
-                <a:hlinkClick r:id="rId2"/>
-              </a:rPr>
-              <a:t>n.d.)</a:t>
+              <a:t>(Concept Draw, n.d.)</a:t>
             </a:r>
             <a:endParaRPr lang="en-AU" sz="2800" dirty="0">
               <a:solidFill>
@@ -9114,49 +9013,8 @@
                 <a:ea typeface="Open Sans" panose="020B0606030504020204" pitchFamily="34" charset="0"/>
                 <a:cs typeface="Open Sans" panose="020B0606030504020204" pitchFamily="34" charset="0"/>
               </a:rPr>
-              <a:t>Security </a:t>
-            </a:r>
-            <a:r>
-              <a:rPr lang="en-AU" sz="2600" dirty="0" smtClean="0">
-                <a:solidFill>
-                  <a:srgbClr val="111111"/>
-                </a:solidFill>
-                <a:latin typeface="Open Sans" panose="020B0606030504020204" pitchFamily="34" charset="0"/>
-                <a:ea typeface="Open Sans" panose="020B0606030504020204" pitchFamily="34" charset="0"/>
-                <a:cs typeface="Open Sans" panose="020B0606030504020204" pitchFamily="34" charset="0"/>
-              </a:rPr>
-              <a:t>settings </a:t>
-            </a:r>
-            <a:r>
-              <a:rPr lang="en-AU" sz="2600" dirty="0" smtClean="0">
-                <a:solidFill>
-                  <a:srgbClr val="111111"/>
-                </a:solidFill>
-                <a:latin typeface="Open Sans" panose="020B0606030504020204" pitchFamily="34" charset="0"/>
-                <a:ea typeface="Open Sans" panose="020B0606030504020204" pitchFamily="34" charset="0"/>
-                <a:cs typeface="Open Sans" panose="020B0606030504020204" pitchFamily="34" charset="0"/>
-              </a:rPr>
-              <a:t>enforced </a:t>
-            </a:r>
-            <a:r>
-              <a:rPr lang="en-AU" sz="2600" dirty="0" smtClean="0">
-                <a:solidFill>
-                  <a:srgbClr val="111111"/>
-                </a:solidFill>
-                <a:latin typeface="Open Sans" panose="020B0606030504020204" pitchFamily="34" charset="0"/>
-                <a:ea typeface="Open Sans" panose="020B0606030504020204" pitchFamily="34" charset="0"/>
-                <a:cs typeface="Open Sans" panose="020B0606030504020204" pitchFamily="34" charset="0"/>
-              </a:rPr>
-              <a:t>consistently across all devices</a:t>
-            </a:r>
-            <a:endParaRPr lang="en-AU" sz="2600" dirty="0" smtClean="0">
-              <a:solidFill>
-                <a:srgbClr val="111111"/>
-              </a:solidFill>
-              <a:latin typeface="Open Sans" panose="020B0606030504020204" pitchFamily="34" charset="0"/>
-              <a:ea typeface="Open Sans" panose="020B0606030504020204" pitchFamily="34" charset="0"/>
-              <a:cs typeface="Open Sans" panose="020B0606030504020204" pitchFamily="34" charset="0"/>
-            </a:endParaRPr>
+              <a:t>Security settings enforced consistently across all devices</a:t>
+            </a:r>
           </a:p>
         </p:txBody>
       </p:sp>
@@ -9238,25 +9096,7 @@
                 <a:cs typeface="Open Sans" panose="020B0606030504020204" pitchFamily="34" charset="0"/>
                 <a:hlinkClick r:id="rId3"/>
               </a:rPr>
-              <a:t>(</a:t>
-            </a:r>
-            <a:r>
-              <a:rPr lang="en-AU" sz="2000" dirty="0" smtClean="0">
-                <a:latin typeface="Open Sans" panose="020B0606030504020204" pitchFamily="34" charset="0"/>
-                <a:ea typeface="Open Sans" panose="020B0606030504020204" pitchFamily="34" charset="0"/>
-                <a:cs typeface="Open Sans" panose="020B0606030504020204" pitchFamily="34" charset="0"/>
-                <a:hlinkClick r:id="rId3"/>
-              </a:rPr>
-              <a:t>jppi</a:t>
-            </a:r>
-            <a:r>
-              <a:rPr lang="en-AU" sz="2000" dirty="0" smtClean="0">
-                <a:latin typeface="Open Sans" panose="020B0606030504020204" pitchFamily="34" charset="0"/>
-                <a:ea typeface="Open Sans" panose="020B0606030504020204" pitchFamily="34" charset="0"/>
-                <a:cs typeface="Open Sans" panose="020B0606030504020204" pitchFamily="34" charset="0"/>
-                <a:hlinkClick r:id="rId3"/>
-              </a:rPr>
-              <a:t>, 2007)</a:t>
+              <a:t>(jppi, 2007)</a:t>
             </a:r>
             <a:endParaRPr lang="en-AU" sz="2000" dirty="0">
               <a:latin typeface="Open Sans" panose="020B0606030504020204" pitchFamily="34" charset="0"/>
@@ -10097,12 +9937,12 @@
         </p:nvSpPr>
         <p:spPr>
           <a:xfrm>
-            <a:off x="1524000" y="-1470455"/>
-            <a:ext cx="9144000" cy="2917370"/>
+            <a:off x="1524000" y="0"/>
+            <a:ext cx="9144000" cy="1730102"/>
           </a:xfrm>
         </p:spPr>
         <p:txBody>
-          <a:bodyPr anchor="b">
+          <a:bodyPr tIns="612000" anchor="t">
             <a:normAutofit/>
           </a:bodyPr>
           <a:lstStyle/>
@@ -10111,6 +9951,17 @@
             <a:r>
               <a:rPr lang="en-AU" sz="3200" b="1" dirty="0" smtClean="0">
                 <a:solidFill>
+                  <a:srgbClr val="00B050"/>
+                </a:solidFill>
+                <a:latin typeface="Open Sans" panose="020B0606030504020204" pitchFamily="34" charset="0"/>
+                <a:ea typeface="Open Sans" panose="020B0606030504020204" pitchFamily="34" charset="0"/>
+                <a:cs typeface="Open Sans" panose="020B0606030504020204" pitchFamily="34" charset="0"/>
+              </a:rPr>
+              <a:t>Recommend:</a:t>
+            </a:r>
+            <a:r>
+              <a:rPr lang="en-AU" sz="3200" b="1" dirty="0" smtClean="0">
+                <a:solidFill>
                   <a:srgbClr val="111111"/>
                 </a:solidFill>
                 <a:latin typeface="Open Sans" panose="020B0606030504020204" pitchFamily="34" charset="0"/>
@@ -10138,28 +9989,7 @@
                 <a:ea typeface="Open Sans" panose="020B0606030504020204" pitchFamily="34" charset="0"/>
                 <a:cs typeface="Open Sans" panose="020B0606030504020204" pitchFamily="34" charset="0"/>
               </a:rPr>
-              <a:t>Security issue:</a:t>
-            </a:r>
-            <a:br>
-              <a:rPr lang="en-AU" sz="3200" b="1" dirty="0" smtClean="0">
-                <a:solidFill>
-                  <a:srgbClr val="111111"/>
-                </a:solidFill>
-                <a:latin typeface="Open Sans" panose="020B0606030504020204" pitchFamily="34" charset="0"/>
-                <a:ea typeface="Open Sans" panose="020B0606030504020204" pitchFamily="34" charset="0"/>
-                <a:cs typeface="Open Sans" panose="020B0606030504020204" pitchFamily="34" charset="0"/>
-              </a:rPr>
-            </a:br>
-            <a:r>
-              <a:rPr lang="en-AU" sz="3200" b="1" dirty="0" smtClean="0">
-                <a:solidFill>
-                  <a:srgbClr val="111111"/>
-                </a:solidFill>
-                <a:latin typeface="Open Sans" panose="020B0606030504020204" pitchFamily="34" charset="0"/>
-                <a:ea typeface="Open Sans" panose="020B0606030504020204" pitchFamily="34" charset="0"/>
-                <a:cs typeface="Open Sans" panose="020B0606030504020204" pitchFamily="34" charset="0"/>
-              </a:rPr>
-              <a:t>mIRC Internet Relay Chat</a:t>
+              <a:t>Passphrases</a:t>
             </a:r>
             <a:endParaRPr lang="en-AU" sz="3200" dirty="0">
               <a:solidFill>
@@ -10180,8 +10010,8 @@
         </p:nvSpPr>
         <p:spPr>
           <a:xfrm>
-            <a:off x="1524000" y="1958544"/>
-            <a:ext cx="9144000" cy="3293209"/>
+            <a:off x="1524000" y="1730102"/>
+            <a:ext cx="9144000" cy="1292662"/>
           </a:xfrm>
           <a:prstGeom prst="rect">
             <a:avLst/>
@@ -10199,32 +10029,27 @@
               <a:buChar char="•"/>
             </a:pPr>
             <a:r>
-              <a:rPr lang="en-AU" sz="2600" dirty="0">
-                <a:solidFill>
-                  <a:srgbClr val="111111"/>
-                </a:solidFill>
-                <a:latin typeface="Open Sans" panose="020B0606030504020204" pitchFamily="34" charset="0"/>
-                <a:ea typeface="Open Sans" panose="020B0606030504020204" pitchFamily="34" charset="0"/>
-                <a:cs typeface="Open Sans" panose="020B0606030504020204" pitchFamily="34" charset="0"/>
-              </a:rPr>
-              <a:t>Internet Relay Chat (IRC) share similar risks of malware propagation as email</a:t>
-            </a:r>
-          </a:p>
-          <a:p>
-            <a:pPr marL="285750" indent="-285750">
-              <a:buFont typeface="Arial" panose="020B0604020202020204" pitchFamily="34" charset="0"/>
-              <a:buChar char="•"/>
-            </a:pPr>
-            <a:r>
-              <a:rPr lang="en-AU" sz="2600" dirty="0">
-                <a:solidFill>
-                  <a:srgbClr val="111111"/>
-                </a:solidFill>
-                <a:latin typeface="Open Sans" panose="020B0606030504020204" pitchFamily="34" charset="0"/>
-                <a:ea typeface="Open Sans" panose="020B0606030504020204" pitchFamily="34" charset="0"/>
-                <a:cs typeface="Open Sans" panose="020B0606030504020204" pitchFamily="34" charset="0"/>
-              </a:rPr>
-              <a:t>Attackers may use social engineering to</a:t>
+              <a:rPr lang="en-AU" sz="2600" dirty="0" smtClean="0">
+                <a:solidFill>
+                  <a:srgbClr val="111111"/>
+                </a:solidFill>
+                <a:latin typeface="Open Sans" panose="020B0606030504020204" pitchFamily="34" charset="0"/>
+                <a:ea typeface="Open Sans" panose="020B0606030504020204" pitchFamily="34" charset="0"/>
+                <a:cs typeface="Open Sans" panose="020B0606030504020204" pitchFamily="34" charset="0"/>
+                <a:hlinkClick r:id="rId3"/>
+              </a:rPr>
+              <a:t>Oliver &amp; Snowden (2015)</a:t>
+            </a:r>
+            <a:r>
+              <a:rPr lang="en-AU" sz="2600" dirty="0" smtClean="0">
+                <a:solidFill>
+                  <a:srgbClr val="111111"/>
+                </a:solidFill>
+                <a:latin typeface="Open Sans" panose="020B0606030504020204" pitchFamily="34" charset="0"/>
+                <a:ea typeface="Open Sans" panose="020B0606030504020204" pitchFamily="34" charset="0"/>
+                <a:cs typeface="Open Sans" panose="020B0606030504020204" pitchFamily="34" charset="0"/>
+              </a:rPr>
+              <a:t> discuss how to select a strong but memorable passphrase</a:t>
             </a:r>
           </a:p>
           <a:p>
@@ -10233,40 +10058,6 @@
               <a:buChar char="•"/>
             </a:pPr>
             <a:r>
-              <a:rPr lang="en-AU" sz="2600" dirty="0">
-                <a:solidFill>
-                  <a:srgbClr val="111111"/>
-                </a:solidFill>
-                <a:latin typeface="Open Sans" panose="020B0606030504020204" pitchFamily="34" charset="0"/>
-                <a:ea typeface="Open Sans" panose="020B0606030504020204" pitchFamily="34" charset="0"/>
-                <a:cs typeface="Open Sans" panose="020B0606030504020204" pitchFamily="34" charset="0"/>
-              </a:rPr>
-              <a:t>Convince victims to view links to malicious web pages or files</a:t>
-            </a:r>
-          </a:p>
-          <a:p>
-            <a:pPr marL="742950" lvl="1" indent="-285750">
-              <a:buFont typeface="Arial" panose="020B0604020202020204" pitchFamily="34" charset="0"/>
-              <a:buChar char="•"/>
-            </a:pPr>
-            <a:r>
-              <a:rPr lang="en-AU" sz="2600" dirty="0">
-                <a:solidFill>
-                  <a:srgbClr val="111111"/>
-                </a:solidFill>
-                <a:latin typeface="Open Sans" panose="020B0606030504020204" pitchFamily="34" charset="0"/>
-                <a:ea typeface="Open Sans" panose="020B0606030504020204" pitchFamily="34" charset="0"/>
-                <a:cs typeface="Open Sans" panose="020B0606030504020204" pitchFamily="34" charset="0"/>
-              </a:rPr>
-              <a:t>Convince victims to open malicious files sent directly through IRCs file-sharing protocol</a:t>
-            </a:r>
-          </a:p>
-          <a:p>
-            <a:pPr marL="285750" indent="-285750">
-              <a:buFont typeface="Arial" panose="020B0604020202020204" pitchFamily="34" charset="0"/>
-              <a:buChar char="•"/>
-            </a:pPr>
-            <a:r>
               <a:rPr lang="en-AU" sz="2600" dirty="0" smtClean="0">
                 <a:solidFill>
                   <a:srgbClr val="111111"/>
@@ -10275,9 +10066,9 @@
                 <a:ea typeface="Open Sans" panose="020B0606030504020204" pitchFamily="34" charset="0"/>
                 <a:cs typeface="Open Sans" panose="020B0606030504020204" pitchFamily="34" charset="0"/>
               </a:rPr>
-              <a:t>Removal of mIRC will mitigate these risks</a:t>
-            </a:r>
-            <a:endParaRPr lang="en-AU" sz="3600" b="1" dirty="0">
+              <a:t>Won’t have to write it down or save in plaintext</a:t>
+            </a:r>
+            <a:endParaRPr lang="en-AU" sz="2600" dirty="0" smtClean="0">
               <a:solidFill>
                 <a:srgbClr val="111111"/>
               </a:solidFill>
@@ -10288,10 +10079,36 @@
           </a:p>
         </p:txBody>
       </p:sp>
+      <p:pic>
+        <p:nvPicPr>
+          <p:cNvPr id="3" name="yzGzB-yYKcc"/>
+          <p:cNvPicPr>
+            <a:picLocks noRot="1" noChangeAspect="1"/>
+          </p:cNvPicPr>
+          <p:nvPr>
+            <a:videoFile r:link="rId1"/>
+          </p:nvPr>
+        </p:nvPicPr>
+        <p:blipFill>
+          <a:blip r:embed="rId4"/>
+          <a:stretch>
+            <a:fillRect/>
+          </a:stretch>
+        </p:blipFill>
+        <p:spPr>
+          <a:xfrm>
+            <a:off x="3121520" y="3151163"/>
+            <a:ext cx="5948960" cy="3346290"/>
+          </a:xfrm>
+          <a:prstGeom prst="rect">
+            <a:avLst/>
+          </a:prstGeom>
+        </p:spPr>
+      </p:pic>
     </p:spTree>
     <p:extLst>
       <p:ext uri="{BB962C8B-B14F-4D97-AF65-F5344CB8AC3E}">
-        <p14:creationId xmlns:p14="http://schemas.microsoft.com/office/powerpoint/2010/main" val="551019555"/>
+        <p14:creationId xmlns:p14="http://schemas.microsoft.com/office/powerpoint/2010/main" val="634985698"/>
       </p:ext>
     </p:extLst>
   </p:cSld>
@@ -10340,28 +10157,187 @@
         </p:nvSpPr>
         <p:spPr>
           <a:xfrm>
-            <a:off x="1524000" y="0"/>
-            <a:ext cx="9144000" cy="6858000"/>
+            <a:off x="1524000" y="-1470455"/>
+            <a:ext cx="9144000" cy="2917370"/>
           </a:xfrm>
         </p:spPr>
         <p:txBody>
-          <a:bodyPr anchor="ctr">
+          <a:bodyPr anchor="b">
             <a:normAutofit/>
           </a:bodyPr>
           <a:lstStyle/>
           <a:p>
-            <a:r>
-              <a:rPr lang="en-AU" sz="4400" b="1" dirty="0" smtClean="0">
-                <a:solidFill>
-                  <a:srgbClr val="111111"/>
-                </a:solidFill>
-                <a:latin typeface="Open Sans" panose="020B0606030504020204" pitchFamily="34" charset="0"/>
-                <a:ea typeface="Open Sans" panose="020B0606030504020204" pitchFamily="34" charset="0"/>
-                <a:cs typeface="Open Sans" panose="020B0606030504020204" pitchFamily="34" charset="0"/>
-              </a:rPr>
-              <a:t>Summary</a:t>
-            </a:r>
-            <a:endParaRPr lang="en-AU" sz="4400" b="1" dirty="0">
+            <a:pPr algn="l"/>
+            <a:r>
+              <a:rPr lang="en-AU" sz="3200" b="1" dirty="0" smtClean="0">
+                <a:solidFill>
+                  <a:srgbClr val="111111"/>
+                </a:solidFill>
+                <a:latin typeface="Open Sans" panose="020B0606030504020204" pitchFamily="34" charset="0"/>
+                <a:ea typeface="Open Sans" panose="020B0606030504020204" pitchFamily="34" charset="0"/>
+                <a:cs typeface="Open Sans" panose="020B0606030504020204" pitchFamily="34" charset="0"/>
+              </a:rPr>
+              <a:t/>
+            </a:r>
+            <a:br>
+              <a:rPr lang="en-AU" sz="3200" b="1" dirty="0" smtClean="0">
+                <a:solidFill>
+                  <a:srgbClr val="111111"/>
+                </a:solidFill>
+                <a:latin typeface="Open Sans" panose="020B0606030504020204" pitchFamily="34" charset="0"/>
+                <a:ea typeface="Open Sans" panose="020B0606030504020204" pitchFamily="34" charset="0"/>
+                <a:cs typeface="Open Sans" panose="020B0606030504020204" pitchFamily="34" charset="0"/>
+              </a:rPr>
+            </a:br>
+            <a:r>
+              <a:rPr lang="en-AU" sz="3200" b="1" dirty="0" smtClean="0">
+                <a:solidFill>
+                  <a:srgbClr val="FF0000"/>
+                </a:solidFill>
+                <a:latin typeface="Open Sans" panose="020B0606030504020204" pitchFamily="34" charset="0"/>
+                <a:ea typeface="Open Sans" panose="020B0606030504020204" pitchFamily="34" charset="0"/>
+                <a:cs typeface="Open Sans" panose="020B0606030504020204" pitchFamily="34" charset="0"/>
+              </a:rPr>
+              <a:t>Security issue:</a:t>
+            </a:r>
+            <a:br>
+              <a:rPr lang="en-AU" sz="3200" b="1" dirty="0" smtClean="0">
+                <a:solidFill>
+                  <a:srgbClr val="FF0000"/>
+                </a:solidFill>
+                <a:latin typeface="Open Sans" panose="020B0606030504020204" pitchFamily="34" charset="0"/>
+                <a:ea typeface="Open Sans" panose="020B0606030504020204" pitchFamily="34" charset="0"/>
+                <a:cs typeface="Open Sans" panose="020B0606030504020204" pitchFamily="34" charset="0"/>
+              </a:rPr>
+            </a:br>
+            <a:r>
+              <a:rPr lang="en-AU" sz="3200" b="1" dirty="0" smtClean="0">
+                <a:solidFill>
+                  <a:srgbClr val="FF0000"/>
+                </a:solidFill>
+                <a:latin typeface="Open Sans" panose="020B0606030504020204" pitchFamily="34" charset="0"/>
+                <a:ea typeface="Open Sans" panose="020B0606030504020204" pitchFamily="34" charset="0"/>
+                <a:cs typeface="Open Sans" panose="020B0606030504020204" pitchFamily="34" charset="0"/>
+              </a:rPr>
+              <a:t>mIRC Internet Relay Chat</a:t>
+            </a:r>
+            <a:endParaRPr lang="en-AU" sz="3200" dirty="0">
+              <a:solidFill>
+                <a:srgbClr val="FF0000"/>
+              </a:solidFill>
+              <a:latin typeface="Open Sans" panose="020B0606030504020204" pitchFamily="34" charset="0"/>
+              <a:ea typeface="Open Sans" panose="020B0606030504020204" pitchFamily="34" charset="0"/>
+              <a:cs typeface="Open Sans" panose="020B0606030504020204" pitchFamily="34" charset="0"/>
+            </a:endParaRPr>
+          </a:p>
+        </p:txBody>
+      </p:sp>
+      <p:sp>
+        <p:nvSpPr>
+          <p:cNvPr id="2" name="TextBox 1"/>
+          <p:cNvSpPr txBox="1"/>
+          <p:nvPr/>
+        </p:nvSpPr>
+        <p:spPr>
+          <a:xfrm>
+            <a:off x="1524000" y="1958544"/>
+            <a:ext cx="9144000" cy="3293209"/>
+          </a:xfrm>
+          <a:prstGeom prst="rect">
+            <a:avLst/>
+          </a:prstGeom>
+          <a:noFill/>
+        </p:spPr>
+        <p:txBody>
+          <a:bodyPr wrap="square" rtlCol="0">
+            <a:spAutoFit/>
+          </a:bodyPr>
+          <a:lstStyle/>
+          <a:p>
+            <a:pPr marL="285750" indent="-285750">
+              <a:buFont typeface="Arial" panose="020B0604020202020204" pitchFamily="34" charset="0"/>
+              <a:buChar char="•"/>
+            </a:pPr>
+            <a:r>
+              <a:rPr lang="en-AU" sz="2600" dirty="0">
+                <a:solidFill>
+                  <a:srgbClr val="111111"/>
+                </a:solidFill>
+                <a:latin typeface="Open Sans" panose="020B0606030504020204" pitchFamily="34" charset="0"/>
+                <a:ea typeface="Open Sans" panose="020B0606030504020204" pitchFamily="34" charset="0"/>
+                <a:cs typeface="Open Sans" panose="020B0606030504020204" pitchFamily="34" charset="0"/>
+              </a:rPr>
+              <a:t>Internet Relay Chat (IRC) share similar risks of malware propagation as email</a:t>
+            </a:r>
+          </a:p>
+          <a:p>
+            <a:pPr marL="285750" indent="-285750">
+              <a:buFont typeface="Arial" panose="020B0604020202020204" pitchFamily="34" charset="0"/>
+              <a:buChar char="•"/>
+            </a:pPr>
+            <a:r>
+              <a:rPr lang="en-AU" sz="2600" dirty="0">
+                <a:solidFill>
+                  <a:srgbClr val="111111"/>
+                </a:solidFill>
+                <a:latin typeface="Open Sans" panose="020B0606030504020204" pitchFamily="34" charset="0"/>
+                <a:ea typeface="Open Sans" panose="020B0606030504020204" pitchFamily="34" charset="0"/>
+                <a:cs typeface="Open Sans" panose="020B0606030504020204" pitchFamily="34" charset="0"/>
+              </a:rPr>
+              <a:t>Attackers may use social engineering to</a:t>
+            </a:r>
+          </a:p>
+          <a:p>
+            <a:pPr marL="742950" lvl="1" indent="-285750">
+              <a:buFont typeface="Arial" panose="020B0604020202020204" pitchFamily="34" charset="0"/>
+              <a:buChar char="•"/>
+            </a:pPr>
+            <a:r>
+              <a:rPr lang="en-AU" sz="2600" dirty="0">
+                <a:solidFill>
+                  <a:srgbClr val="111111"/>
+                </a:solidFill>
+                <a:latin typeface="Open Sans" panose="020B0606030504020204" pitchFamily="34" charset="0"/>
+                <a:ea typeface="Open Sans" panose="020B0606030504020204" pitchFamily="34" charset="0"/>
+                <a:cs typeface="Open Sans" panose="020B0606030504020204" pitchFamily="34" charset="0"/>
+              </a:rPr>
+              <a:t>Convince victims to view links to malicious web pages or files</a:t>
+            </a:r>
+          </a:p>
+          <a:p>
+            <a:pPr marL="742950" lvl="1" indent="-285750">
+              <a:buFont typeface="Arial" panose="020B0604020202020204" pitchFamily="34" charset="0"/>
+              <a:buChar char="•"/>
+            </a:pPr>
+            <a:r>
+              <a:rPr lang="en-AU" sz="2600" dirty="0">
+                <a:solidFill>
+                  <a:srgbClr val="111111"/>
+                </a:solidFill>
+                <a:latin typeface="Open Sans" panose="020B0606030504020204" pitchFamily="34" charset="0"/>
+                <a:ea typeface="Open Sans" panose="020B0606030504020204" pitchFamily="34" charset="0"/>
+                <a:cs typeface="Open Sans" panose="020B0606030504020204" pitchFamily="34" charset="0"/>
+              </a:rPr>
+              <a:t>Convince victims to open malicious files sent directly through IRCs file-sharing protocol</a:t>
+            </a:r>
+          </a:p>
+          <a:p>
+            <a:pPr marL="285750" indent="-285750">
+              <a:buFont typeface="Arial" panose="020B0604020202020204" pitchFamily="34" charset="0"/>
+              <a:buChar char="•"/>
+            </a:pPr>
+            <a:r>
+              <a:rPr lang="en-AU" sz="2600" dirty="0" smtClean="0">
+                <a:solidFill>
+                  <a:srgbClr val="111111"/>
+                </a:solidFill>
+                <a:latin typeface="Open Sans" panose="020B0606030504020204" pitchFamily="34" charset="0"/>
+                <a:ea typeface="Open Sans" panose="020B0606030504020204" pitchFamily="34" charset="0"/>
+                <a:cs typeface="Open Sans" panose="020B0606030504020204" pitchFamily="34" charset="0"/>
+              </a:rPr>
+              <a:t>Removal of mIRC will mitigate these risks</a:t>
+            </a:r>
+            <a:endParaRPr lang="en-AU" sz="3600" b="1" dirty="0">
               <a:solidFill>
                 <a:srgbClr val="111111"/>
               </a:solidFill>
@@ -10375,7 +10351,7 @@
     </p:spTree>
     <p:extLst>
       <p:ext uri="{BB962C8B-B14F-4D97-AF65-F5344CB8AC3E}">
-        <p14:creationId xmlns:p14="http://schemas.microsoft.com/office/powerpoint/2010/main" val="4049782558"/>
+        <p14:creationId xmlns:p14="http://schemas.microsoft.com/office/powerpoint/2010/main" val="551019555"/>
       </p:ext>
     </p:extLst>
   </p:cSld>
@@ -10424,29 +10400,28 @@
         </p:nvSpPr>
         <p:spPr>
           <a:xfrm>
-            <a:off x="1524000" y="-506438"/>
-            <a:ext cx="9144000" cy="1446915"/>
+            <a:off x="1524000" y="0"/>
+            <a:ext cx="9144000" cy="6858000"/>
           </a:xfrm>
         </p:spPr>
         <p:txBody>
-          <a:bodyPr anchor="b">
+          <a:bodyPr anchor="ctr">
             <a:normAutofit/>
           </a:bodyPr>
           <a:lstStyle/>
           <a:p>
-            <a:pPr algn="l"/>
-            <a:r>
-              <a:rPr lang="en-AU" sz="3200" b="1" dirty="0" smtClean="0">
-                <a:solidFill>
-                  <a:srgbClr val="111111"/>
-                </a:solidFill>
-                <a:latin typeface="Open Sans" panose="020B0606030504020204" pitchFamily="34" charset="0"/>
-                <a:ea typeface="Open Sans" panose="020B0606030504020204" pitchFamily="34" charset="0"/>
-                <a:cs typeface="Open Sans" panose="020B0606030504020204" pitchFamily="34" charset="0"/>
-              </a:rPr>
-              <a:t>Patch management</a:t>
-            </a:r>
-            <a:endParaRPr lang="en-AU" sz="3200" dirty="0">
+            <a:r>
+              <a:rPr lang="en-AU" sz="4400" b="1" dirty="0" smtClean="0">
+                <a:solidFill>
+                  <a:srgbClr val="111111"/>
+                </a:solidFill>
+                <a:latin typeface="Open Sans" panose="020B0606030504020204" pitchFamily="34" charset="0"/>
+                <a:ea typeface="Open Sans" panose="020B0606030504020204" pitchFamily="34" charset="0"/>
+                <a:cs typeface="Open Sans" panose="020B0606030504020204" pitchFamily="34" charset="0"/>
+              </a:rPr>
+              <a:t>Summary</a:t>
+            </a:r>
+            <a:endParaRPr lang="en-AU" sz="4400" b="1" dirty="0">
               <a:solidFill>
                 <a:srgbClr val="111111"/>
               </a:solidFill>
@@ -10457,284 +10432,10 @@
           </a:p>
         </p:txBody>
       </p:sp>
-      <p:sp>
-        <p:nvSpPr>
-          <p:cNvPr id="2" name="TextBox 1"/>
-          <p:cNvSpPr txBox="1"/>
-          <p:nvPr/>
-        </p:nvSpPr>
-        <p:spPr>
-          <a:xfrm>
-            <a:off x="1524000" y="1452107"/>
-            <a:ext cx="9144000" cy="1692771"/>
-          </a:xfrm>
-          <a:prstGeom prst="rect">
-            <a:avLst/>
-          </a:prstGeom>
-          <a:noFill/>
-        </p:spPr>
-        <p:txBody>
-          <a:bodyPr wrap="square" rtlCol="0">
-            <a:spAutoFit/>
-          </a:bodyPr>
-          <a:lstStyle/>
-          <a:p>
-            <a:pPr marL="285750" indent="-285750">
-              <a:buFont typeface="Arial" panose="020B0604020202020204" pitchFamily="34" charset="0"/>
-              <a:buChar char="•"/>
-            </a:pPr>
-            <a:r>
-              <a:rPr lang="en-AU" sz="2600" dirty="0" smtClean="0">
-                <a:solidFill>
-                  <a:srgbClr val="111111"/>
-                </a:solidFill>
-                <a:latin typeface="Open Sans" panose="020B0606030504020204" pitchFamily="34" charset="0"/>
-                <a:ea typeface="Open Sans" panose="020B0606030504020204" pitchFamily="34" charset="0"/>
-                <a:cs typeface="Open Sans" panose="020B0606030504020204" pitchFamily="34" charset="0"/>
-              </a:rPr>
-              <a:t>Use proactive patch management strategy</a:t>
-            </a:r>
-          </a:p>
-          <a:p>
-            <a:pPr marL="742950" lvl="1" indent="-285750">
-              <a:buFont typeface="Arial" panose="020B0604020202020204" pitchFamily="34" charset="0"/>
-              <a:buChar char="•"/>
-            </a:pPr>
-            <a:r>
-              <a:rPr lang="en-AU" sz="2600" dirty="0" smtClean="0">
-                <a:solidFill>
-                  <a:srgbClr val="111111"/>
-                </a:solidFill>
-                <a:latin typeface="Open Sans" panose="020B0606030504020204" pitchFamily="34" charset="0"/>
-                <a:ea typeface="Open Sans" panose="020B0606030504020204" pitchFamily="34" charset="0"/>
-                <a:cs typeface="Open Sans" panose="020B0606030504020204" pitchFamily="34" charset="0"/>
-              </a:rPr>
-              <a:t>Mitigate vulnerabilities in software</a:t>
-            </a:r>
-          </a:p>
-          <a:p>
-            <a:pPr marL="285750" indent="-285750">
-              <a:buFont typeface="Arial" panose="020B0604020202020204" pitchFamily="34" charset="0"/>
-              <a:buChar char="•"/>
-            </a:pPr>
-            <a:r>
-              <a:rPr lang="en-AU" sz="2600" dirty="0" smtClean="0">
-                <a:solidFill>
-                  <a:srgbClr val="111111"/>
-                </a:solidFill>
-                <a:latin typeface="Open Sans" panose="020B0606030504020204" pitchFamily="34" charset="0"/>
-                <a:ea typeface="Open Sans" panose="020B0606030504020204" pitchFamily="34" charset="0"/>
-                <a:cs typeface="Open Sans" panose="020B0606030504020204" pitchFamily="34" charset="0"/>
-              </a:rPr>
-              <a:t>Recommend </a:t>
-            </a:r>
-            <a:r>
-              <a:rPr lang="en-AU" sz="2600" dirty="0" smtClean="0">
-                <a:solidFill>
-                  <a:srgbClr val="111111"/>
-                </a:solidFill>
-                <a:latin typeface="Open Sans" panose="020B0606030504020204" pitchFamily="34" charset="0"/>
-                <a:ea typeface="Open Sans" panose="020B0606030504020204" pitchFamily="34" charset="0"/>
-                <a:cs typeface="Open Sans" panose="020B0606030504020204" pitchFamily="34" charset="0"/>
-                <a:hlinkClick r:id="rId2"/>
-              </a:rPr>
-              <a:t>SolarWinds Patch Manager 2.1</a:t>
-            </a:r>
-            <a:endParaRPr lang="en-AU" sz="3600" dirty="0" smtClean="0">
-              <a:solidFill>
-                <a:srgbClr val="111111"/>
-              </a:solidFill>
-              <a:latin typeface="Open Sans" panose="020B0606030504020204" pitchFamily="34" charset="0"/>
-              <a:ea typeface="Open Sans" panose="020B0606030504020204" pitchFamily="34" charset="0"/>
-              <a:cs typeface="Open Sans" panose="020B0606030504020204" pitchFamily="34" charset="0"/>
-            </a:endParaRPr>
-          </a:p>
-          <a:p>
-            <a:pPr marL="742950" lvl="1" indent="-285750">
-              <a:buFont typeface="Arial" panose="020B0604020202020204" pitchFamily="34" charset="0"/>
-              <a:buChar char="•"/>
-            </a:pPr>
-            <a:r>
-              <a:rPr lang="en-AU" sz="2600" dirty="0" smtClean="0">
-                <a:solidFill>
-                  <a:srgbClr val="111111"/>
-                </a:solidFill>
-                <a:latin typeface="Open Sans" panose="020B0606030504020204" pitchFamily="34" charset="0"/>
-                <a:ea typeface="Open Sans" panose="020B0606030504020204" pitchFamily="34" charset="0"/>
-                <a:cs typeface="Open Sans" panose="020B0606030504020204" pitchFamily="34" charset="0"/>
-              </a:rPr>
-              <a:t>Manage patching in large computer network</a:t>
-            </a:r>
-          </a:p>
-        </p:txBody>
-      </p:sp>
-      <p:sp>
-        <p:nvSpPr>
-          <p:cNvPr id="5" name="Title 3"/>
-          <p:cNvSpPr txBox="1">
-            <a:spLocks/>
-          </p:cNvSpPr>
-          <p:nvPr/>
-        </p:nvSpPr>
-        <p:spPr>
-          <a:xfrm>
-            <a:off x="1524000" y="2344659"/>
-            <a:ext cx="9144000" cy="1446915"/>
-          </a:xfrm>
-          <a:prstGeom prst="rect">
-            <a:avLst/>
-          </a:prstGeom>
-        </p:spPr>
-        <p:txBody>
-          <a:bodyPr vert="horz" lIns="91440" tIns="45720" rIns="91440" bIns="45720" rtlCol="0" anchor="b">
-            <a:normAutofit/>
-          </a:bodyPr>
-          <a:lstStyle>
-            <a:lvl1pPr algn="ctr" defTabSz="914400" rtl="0" eaLnBrk="1" latinLnBrk="0" hangingPunct="1">
-              <a:lnSpc>
-                <a:spcPct val="90000"/>
-              </a:lnSpc>
-              <a:spcBef>
-                <a:spcPct val="0"/>
-              </a:spcBef>
-              <a:buNone/>
-              <a:defRPr sz="6000" kern="1200">
-                <a:solidFill>
-                  <a:schemeClr val="tx1"/>
-                </a:solidFill>
-                <a:latin typeface="+mj-lt"/>
-                <a:ea typeface="+mj-ea"/>
-                <a:cs typeface="+mj-cs"/>
-              </a:defRPr>
-            </a:lvl1pPr>
-          </a:lstStyle>
-          <a:p>
-            <a:pPr algn="l"/>
-            <a:r>
-              <a:rPr lang="en-AU" sz="3200" b="1" dirty="0" smtClean="0">
-                <a:solidFill>
-                  <a:srgbClr val="111111"/>
-                </a:solidFill>
-                <a:latin typeface="Open Sans" panose="020B0606030504020204" pitchFamily="34" charset="0"/>
-                <a:ea typeface="Open Sans" panose="020B0606030504020204" pitchFamily="34" charset="0"/>
-                <a:cs typeface="Open Sans" panose="020B0606030504020204" pitchFamily="34" charset="0"/>
-              </a:rPr>
-              <a:t>Passwords</a:t>
-            </a:r>
-            <a:endParaRPr lang="en-AU" sz="3200" dirty="0">
-              <a:solidFill>
-                <a:srgbClr val="111111"/>
-              </a:solidFill>
-              <a:latin typeface="Open Sans" panose="020B0606030504020204" pitchFamily="34" charset="0"/>
-              <a:ea typeface="Open Sans" panose="020B0606030504020204" pitchFamily="34" charset="0"/>
-              <a:cs typeface="Open Sans" panose="020B0606030504020204" pitchFamily="34" charset="0"/>
-            </a:endParaRPr>
-          </a:p>
-        </p:txBody>
-      </p:sp>
-      <p:sp>
-        <p:nvSpPr>
-          <p:cNvPr id="6" name="TextBox 5"/>
-          <p:cNvSpPr txBox="1"/>
-          <p:nvPr/>
-        </p:nvSpPr>
-        <p:spPr>
-          <a:xfrm>
-            <a:off x="1524000" y="4303204"/>
-            <a:ext cx="9144000" cy="2092881"/>
-          </a:xfrm>
-          <a:prstGeom prst="rect">
-            <a:avLst/>
-          </a:prstGeom>
-          <a:noFill/>
-        </p:spPr>
-        <p:txBody>
-          <a:bodyPr wrap="square" rtlCol="0">
-            <a:spAutoFit/>
-          </a:bodyPr>
-          <a:lstStyle/>
-          <a:p>
-            <a:pPr marL="285750" indent="-285750">
-              <a:buFont typeface="Arial" panose="020B0604020202020204" pitchFamily="34" charset="0"/>
-              <a:buChar char="•"/>
-            </a:pPr>
-            <a:r>
-              <a:rPr lang="en-AU" sz="2600" dirty="0" smtClean="0">
-                <a:solidFill>
-                  <a:srgbClr val="111111"/>
-                </a:solidFill>
-                <a:latin typeface="Open Sans" panose="020B0606030504020204" pitchFamily="34" charset="0"/>
-                <a:ea typeface="Open Sans" panose="020B0606030504020204" pitchFamily="34" charset="0"/>
-                <a:cs typeface="Open Sans" panose="020B0606030504020204" pitchFamily="34" charset="0"/>
-              </a:rPr>
-              <a:t>Configure users/groups with Active Directory</a:t>
-            </a:r>
-          </a:p>
-          <a:p>
-            <a:pPr marL="742950" lvl="1" indent="-285750">
-              <a:buFont typeface="Arial" panose="020B0604020202020204" pitchFamily="34" charset="0"/>
-              <a:buChar char="•"/>
-            </a:pPr>
-            <a:r>
-              <a:rPr lang="en-AU" sz="2600" dirty="0" smtClean="0">
-                <a:solidFill>
-                  <a:srgbClr val="111111"/>
-                </a:solidFill>
-                <a:latin typeface="Open Sans" panose="020B0606030504020204" pitchFamily="34" charset="0"/>
-                <a:ea typeface="Open Sans" panose="020B0606030504020204" pitchFamily="34" charset="0"/>
-                <a:cs typeface="Open Sans" panose="020B0606030504020204" pitchFamily="34" charset="0"/>
-              </a:rPr>
-              <a:t>Enforce passwords, password policy, screensaver lock, and account lockout after failed attempts</a:t>
-            </a:r>
-          </a:p>
-          <a:p>
-            <a:pPr marL="285750" indent="-285750">
-              <a:buFont typeface="Arial" panose="020B0604020202020204" pitchFamily="34" charset="0"/>
-              <a:buChar char="•"/>
-            </a:pPr>
-            <a:r>
-              <a:rPr lang="en-AU" sz="2600" dirty="0" smtClean="0">
-                <a:solidFill>
-                  <a:srgbClr val="111111"/>
-                </a:solidFill>
-                <a:latin typeface="Open Sans" panose="020B0606030504020204" pitchFamily="34" charset="0"/>
-                <a:ea typeface="Open Sans" panose="020B0606030504020204" pitchFamily="34" charset="0"/>
-                <a:cs typeface="Open Sans" panose="020B0606030504020204" pitchFamily="34" charset="0"/>
-              </a:rPr>
-              <a:t>Use passphrases for password policies</a:t>
-            </a:r>
-            <a:endParaRPr lang="en-AU" sz="3600" dirty="0" smtClean="0">
-              <a:solidFill>
-                <a:srgbClr val="111111"/>
-              </a:solidFill>
-              <a:latin typeface="Open Sans" panose="020B0606030504020204" pitchFamily="34" charset="0"/>
-              <a:ea typeface="Open Sans" panose="020B0606030504020204" pitchFamily="34" charset="0"/>
-              <a:cs typeface="Open Sans" panose="020B0606030504020204" pitchFamily="34" charset="0"/>
-            </a:endParaRPr>
-          </a:p>
-          <a:p>
-            <a:pPr marL="742950" lvl="1" indent="-285750">
-              <a:buFont typeface="Arial" panose="020B0604020202020204" pitchFamily="34" charset="0"/>
-              <a:buChar char="•"/>
-            </a:pPr>
-            <a:r>
-              <a:rPr lang="en-AU" sz="2600" dirty="0" smtClean="0">
-                <a:solidFill>
-                  <a:srgbClr val="111111"/>
-                </a:solidFill>
-                <a:latin typeface="Open Sans" panose="020B0606030504020204" pitchFamily="34" charset="0"/>
-                <a:ea typeface="Open Sans" panose="020B0606030504020204" pitchFamily="34" charset="0"/>
-                <a:cs typeface="Open Sans" panose="020B0606030504020204" pitchFamily="34" charset="0"/>
-              </a:rPr>
-              <a:t>Prevent users from writing passwords down</a:t>
-            </a:r>
-          </a:p>
-        </p:txBody>
-      </p:sp>
     </p:spTree>
     <p:extLst>
       <p:ext uri="{BB962C8B-B14F-4D97-AF65-F5344CB8AC3E}">
-        <p14:creationId xmlns:p14="http://schemas.microsoft.com/office/powerpoint/2010/main" val="587882714"/>
+        <p14:creationId xmlns:p14="http://schemas.microsoft.com/office/powerpoint/2010/main" val="4049782558"/>
       </p:ext>
     </p:extLst>
   </p:cSld>
@@ -10783,7 +10484,7 @@
         </p:nvSpPr>
         <p:spPr>
           <a:xfrm>
-            <a:off x="1524000" y="-1"/>
+            <a:off x="1524000" y="-506438"/>
             <a:ext cx="9144000" cy="1446915"/>
           </a:xfrm>
         </p:spPr>
@@ -10803,7 +10504,7 @@
                 <a:ea typeface="Open Sans" panose="020B0606030504020204" pitchFamily="34" charset="0"/>
                 <a:cs typeface="Open Sans" panose="020B0606030504020204" pitchFamily="34" charset="0"/>
               </a:rPr>
-              <a:t>User practices</a:t>
+              <a:t>Patch management</a:t>
             </a:r>
             <a:endParaRPr lang="en-AU" sz="3200" dirty="0">
               <a:solidFill>
@@ -10824,8 +10525,8 @@
         </p:nvSpPr>
         <p:spPr>
           <a:xfrm>
-            <a:off x="1524000" y="1958544"/>
-            <a:ext cx="9144000" cy="1292662"/>
+            <a:off x="1524000" y="1452107"/>
+            <a:ext cx="9144000" cy="1692771"/>
           </a:xfrm>
           <a:prstGeom prst="rect">
             <a:avLst/>
@@ -10851,7 +10552,24 @@
                 <a:ea typeface="Open Sans" panose="020B0606030504020204" pitchFamily="34" charset="0"/>
                 <a:cs typeface="Open Sans" panose="020B0606030504020204" pitchFamily="34" charset="0"/>
               </a:rPr>
-              <a:t>Do not store passwords in plaintext files or handwritten notes</a:t>
+              <a:t>Use proactive patch management strategy</a:t>
+            </a:r>
+          </a:p>
+          <a:p>
+            <a:pPr marL="742950" lvl="1" indent="-285750">
+              <a:buFont typeface="Arial" panose="020B0604020202020204" pitchFamily="34" charset="0"/>
+              <a:buChar char="•"/>
+            </a:pPr>
+            <a:r>
+              <a:rPr lang="en-AU" sz="2600" dirty="0" smtClean="0">
+                <a:solidFill>
+                  <a:srgbClr val="111111"/>
+                </a:solidFill>
+                <a:latin typeface="Open Sans" panose="020B0606030504020204" pitchFamily="34" charset="0"/>
+                <a:ea typeface="Open Sans" panose="020B0606030504020204" pitchFamily="34" charset="0"/>
+                <a:cs typeface="Open Sans" panose="020B0606030504020204" pitchFamily="34" charset="0"/>
+              </a:rPr>
+              <a:t>Mitigate vulnerabilities in software</a:t>
             </a:r>
           </a:p>
           <a:p>
@@ -10868,9 +10586,21 @@
                 <a:ea typeface="Open Sans" panose="020B0606030504020204" pitchFamily="34" charset="0"/>
                 <a:cs typeface="Open Sans" panose="020B0606030504020204" pitchFamily="34" charset="0"/>
               </a:rPr>
-              <a:t>Remove mIRC to prevent malware propagation</a:t>
-            </a:r>
-            <a:endParaRPr lang="en-AU" sz="3600" dirty="0">
+              <a:t>Recommend </a:t>
+            </a:r>
+            <a:r>
+              <a:rPr lang="en-AU" sz="2600" dirty="0" smtClean="0">
+                <a:solidFill>
+                  <a:srgbClr val="111111"/>
+                </a:solidFill>
+                <a:latin typeface="Open Sans" panose="020B0606030504020204" pitchFamily="34" charset="0"/>
+                <a:ea typeface="Open Sans" panose="020B0606030504020204" pitchFamily="34" charset="0"/>
+                <a:cs typeface="Open Sans" panose="020B0606030504020204" pitchFamily="34" charset="0"/>
+                <a:hlinkClick r:id="rId2"/>
+              </a:rPr>
+              <a:t>SolarWinds Patch Manager 2.1</a:t>
+            </a:r>
+            <a:endParaRPr lang="en-AU" sz="3600" dirty="0" smtClean="0">
               <a:solidFill>
                 <a:srgbClr val="111111"/>
               </a:solidFill>
@@ -10878,6 +10608,23 @@
               <a:ea typeface="Open Sans" panose="020B0606030504020204" pitchFamily="34" charset="0"/>
               <a:cs typeface="Open Sans" panose="020B0606030504020204" pitchFamily="34" charset="0"/>
             </a:endParaRPr>
+          </a:p>
+          <a:p>
+            <a:pPr marL="742950" lvl="1" indent="-285750">
+              <a:buFont typeface="Arial" panose="020B0604020202020204" pitchFamily="34" charset="0"/>
+              <a:buChar char="•"/>
+            </a:pPr>
+            <a:r>
+              <a:rPr lang="en-AU" sz="2600" dirty="0" smtClean="0">
+                <a:solidFill>
+                  <a:srgbClr val="111111"/>
+                </a:solidFill>
+                <a:latin typeface="Open Sans" panose="020B0606030504020204" pitchFamily="34" charset="0"/>
+                <a:ea typeface="Open Sans" panose="020B0606030504020204" pitchFamily="34" charset="0"/>
+                <a:cs typeface="Open Sans" panose="020B0606030504020204" pitchFamily="34" charset="0"/>
+              </a:rPr>
+              <a:t>Manage patching in large computer network</a:t>
+            </a:r>
           </a:p>
         </p:txBody>
       </p:sp>
@@ -10891,7 +10638,7 @@
         </p:nvSpPr>
         <p:spPr>
           <a:xfrm>
-            <a:off x="1524000" y="2851096"/>
+            <a:off x="1524000" y="2344659"/>
             <a:ext cx="9144000" cy="1446915"/>
           </a:xfrm>
           <a:prstGeom prst="rect">
@@ -10932,7 +10679,7 @@
                 <a:ea typeface="Open Sans" panose="020B0606030504020204" pitchFamily="34" charset="0"/>
                 <a:cs typeface="Open Sans" panose="020B0606030504020204" pitchFamily="34" charset="0"/>
               </a:rPr>
-              <a:t>User rights</a:t>
+              <a:t>Passwords</a:t>
             </a:r>
             <a:endParaRPr lang="en-AU" sz="3200" dirty="0">
               <a:solidFill>
@@ -10953,8 +10700,8 @@
         </p:nvSpPr>
         <p:spPr>
           <a:xfrm>
-            <a:off x="1524000" y="4809641"/>
-            <a:ext cx="9144000" cy="1692771"/>
+            <a:off x="1524000" y="4303204"/>
+            <a:ext cx="9144000" cy="2092881"/>
           </a:xfrm>
           <a:prstGeom prst="rect">
             <a:avLst/>
@@ -10980,7 +10727,41 @@
                 <a:ea typeface="Open Sans" panose="020B0606030504020204" pitchFamily="34" charset="0"/>
                 <a:cs typeface="Open Sans" panose="020B0606030504020204" pitchFamily="34" charset="0"/>
               </a:rPr>
-              <a:t>Configure Active Directory user groups with appropriate user rights</a:t>
+              <a:t>Configure users/groups with Active Directory</a:t>
+            </a:r>
+          </a:p>
+          <a:p>
+            <a:pPr marL="742950" lvl="1" indent="-285750">
+              <a:buFont typeface="Arial" panose="020B0604020202020204" pitchFamily="34" charset="0"/>
+              <a:buChar char="•"/>
+            </a:pPr>
+            <a:r>
+              <a:rPr lang="en-AU" sz="2600" dirty="0" smtClean="0">
+                <a:solidFill>
+                  <a:srgbClr val="111111"/>
+                </a:solidFill>
+                <a:latin typeface="Open Sans" panose="020B0606030504020204" pitchFamily="34" charset="0"/>
+                <a:ea typeface="Open Sans" panose="020B0606030504020204" pitchFamily="34" charset="0"/>
+                <a:cs typeface="Open Sans" panose="020B0606030504020204" pitchFamily="34" charset="0"/>
+              </a:rPr>
+              <a:t>Enforce passwords, password policy, screensaver lock, and account lockout after failed attempts</a:t>
+            </a:r>
+          </a:p>
+          <a:p>
+            <a:pPr marL="285750" indent="-285750">
+              <a:buFont typeface="Arial" panose="020B0604020202020204" pitchFamily="34" charset="0"/>
+              <a:buChar char="•"/>
+            </a:pPr>
+            <a:r>
+              <a:rPr lang="en-AU" sz="2600" dirty="0" smtClean="0">
+                <a:solidFill>
+                  <a:srgbClr val="111111"/>
+                </a:solidFill>
+                <a:latin typeface="Open Sans" panose="020B0606030504020204" pitchFamily="34" charset="0"/>
+                <a:ea typeface="Open Sans" panose="020B0606030504020204" pitchFamily="34" charset="0"/>
+                <a:cs typeface="Open Sans" panose="020B0606030504020204" pitchFamily="34" charset="0"/>
+              </a:rPr>
+              <a:t>Use passphrases for password policies</a:t>
             </a:r>
             <a:endParaRPr lang="en-AU" sz="3600" dirty="0" smtClean="0">
               <a:solidFill>
@@ -11005,24 +10786,7 @@
                 <a:ea typeface="Open Sans" panose="020B0606030504020204" pitchFamily="34" charset="0"/>
                 <a:cs typeface="Open Sans" panose="020B0606030504020204" pitchFamily="34" charset="0"/>
               </a:rPr>
-              <a:t>Reserve admin rights for IT support staff</a:t>
-            </a:r>
-          </a:p>
-          <a:p>
-            <a:pPr marL="285750" indent="-285750">
-              <a:buFont typeface="Arial" panose="020B0604020202020204" pitchFamily="34" charset="0"/>
-              <a:buChar char="•"/>
-            </a:pPr>
-            <a:r>
-              <a:rPr lang="en-AU" sz="2600" dirty="0" smtClean="0">
-                <a:solidFill>
-                  <a:srgbClr val="111111"/>
-                </a:solidFill>
-                <a:latin typeface="Open Sans" panose="020B0606030504020204" pitchFamily="34" charset="0"/>
-                <a:ea typeface="Open Sans" panose="020B0606030504020204" pitchFamily="34" charset="0"/>
-                <a:cs typeface="Open Sans" panose="020B0606030504020204" pitchFamily="34" charset="0"/>
-              </a:rPr>
-              <a:t>Enforce UAC through Active Directory group policy</a:t>
+              <a:t>Prevent users from writing passwords down</a:t>
             </a:r>
           </a:p>
         </p:txBody>
@@ -11030,7 +10794,7 @@
     </p:spTree>
     <p:extLst>
       <p:ext uri="{BB962C8B-B14F-4D97-AF65-F5344CB8AC3E}">
-        <p14:creationId xmlns:p14="http://schemas.microsoft.com/office/powerpoint/2010/main" val="2924220329"/>
+        <p14:creationId xmlns:p14="http://schemas.microsoft.com/office/powerpoint/2010/main" val="587882714"/>
       </p:ext>
     </p:extLst>
   </p:cSld>
@@ -11099,7 +10863,7 @@
                 <a:ea typeface="Open Sans" panose="020B0606030504020204" pitchFamily="34" charset="0"/>
                 <a:cs typeface="Open Sans" panose="020B0606030504020204" pitchFamily="34" charset="0"/>
               </a:rPr>
-              <a:t>Anti-virus and network security</a:t>
+              <a:t>User practices</a:t>
             </a:r>
             <a:endParaRPr lang="en-AU" sz="3200" dirty="0">
               <a:solidFill>
@@ -11121,7 +10885,7 @@
         <p:spPr>
           <a:xfrm>
             <a:off x="1524000" y="1958544"/>
-            <a:ext cx="9144000" cy="2893100"/>
+            <a:ext cx="9144000" cy="1292662"/>
           </a:xfrm>
           <a:prstGeom prst="rect">
             <a:avLst/>
@@ -11147,9 +10911,26 @@
                 <a:ea typeface="Open Sans" panose="020B0606030504020204" pitchFamily="34" charset="0"/>
                 <a:cs typeface="Open Sans" panose="020B0606030504020204" pitchFamily="34" charset="0"/>
               </a:rPr>
-              <a:t>Remove fake anti-virus</a:t>
-            </a:r>
-            <a:endParaRPr lang="en-AU" sz="2600" dirty="0">
+              <a:t>Do not store passwords in plaintext files or handwritten notes</a:t>
+            </a:r>
+          </a:p>
+          <a:p>
+            <a:pPr marL="285750" indent="-285750">
+              <a:buFont typeface="Arial" panose="020B0604020202020204" pitchFamily="34" charset="0"/>
+              <a:buChar char="•"/>
+            </a:pPr>
+            <a:r>
+              <a:rPr lang="en-AU" sz="2600" dirty="0" smtClean="0">
+                <a:solidFill>
+                  <a:srgbClr val="111111"/>
+                </a:solidFill>
+                <a:latin typeface="Open Sans" panose="020B0606030504020204" pitchFamily="34" charset="0"/>
+                <a:ea typeface="Open Sans" panose="020B0606030504020204" pitchFamily="34" charset="0"/>
+                <a:cs typeface="Open Sans" panose="020B0606030504020204" pitchFamily="34" charset="0"/>
+              </a:rPr>
+              <a:t>Remove mIRC to prevent malware propagation</a:t>
+            </a:r>
+            <a:endParaRPr lang="en-AU" sz="3600" dirty="0">
               <a:solidFill>
                 <a:srgbClr val="111111"/>
               </a:solidFill>
@@ -11158,35 +10939,62 @@
               <a:cs typeface="Open Sans" panose="020B0606030504020204" pitchFamily="34" charset="0"/>
             </a:endParaRPr>
           </a:p>
-          <a:p>
-            <a:pPr marL="285750" indent="-285750">
-              <a:buFont typeface="Arial" panose="020B0604020202020204" pitchFamily="34" charset="0"/>
-              <a:buChar char="•"/>
-            </a:pPr>
-            <a:r>
-              <a:rPr lang="en-AU" sz="2600" dirty="0" smtClean="0">
-                <a:solidFill>
-                  <a:srgbClr val="111111"/>
-                </a:solidFill>
-                <a:latin typeface="Open Sans" panose="020B0606030504020204" pitchFamily="34" charset="0"/>
-                <a:ea typeface="Open Sans" panose="020B0606030504020204" pitchFamily="34" charset="0"/>
-                <a:cs typeface="Open Sans" panose="020B0606030504020204" pitchFamily="34" charset="0"/>
-              </a:rPr>
-              <a:t>Recommend </a:t>
-            </a:r>
-            <a:r>
-              <a:rPr lang="en-AU" sz="2600" dirty="0" smtClean="0">
-                <a:solidFill>
-                  <a:srgbClr val="111111"/>
-                </a:solidFill>
-                <a:latin typeface="Open Sans" panose="020B0606030504020204" pitchFamily="34" charset="0"/>
-                <a:ea typeface="Open Sans" panose="020B0606030504020204" pitchFamily="34" charset="0"/>
-                <a:cs typeface="Open Sans" panose="020B0606030504020204" pitchFamily="34" charset="0"/>
-                <a:hlinkClick r:id="rId2"/>
-              </a:rPr>
-              <a:t>Kaspersky End Point Security Select</a:t>
-            </a:r>
-            <a:endParaRPr lang="en-AU" sz="2600" dirty="0" smtClean="0">
+        </p:txBody>
+      </p:sp>
+      <p:sp>
+        <p:nvSpPr>
+          <p:cNvPr id="5" name="Title 3"/>
+          <p:cNvSpPr txBox="1">
+            <a:spLocks/>
+          </p:cNvSpPr>
+          <p:nvPr/>
+        </p:nvSpPr>
+        <p:spPr>
+          <a:xfrm>
+            <a:off x="1524000" y="2851096"/>
+            <a:ext cx="9144000" cy="1446915"/>
+          </a:xfrm>
+          <a:prstGeom prst="rect">
+            <a:avLst/>
+          </a:prstGeom>
+        </p:spPr>
+        <p:txBody>
+          <a:bodyPr vert="horz" lIns="91440" tIns="45720" rIns="91440" bIns="45720" rtlCol="0" anchor="b">
+            <a:normAutofit/>
+          </a:bodyPr>
+          <a:lstStyle>
+            <a:lvl1pPr algn="ctr" defTabSz="914400" rtl="0" eaLnBrk="1" latinLnBrk="0" hangingPunct="1">
+              <a:lnSpc>
+                <a:spcPct val="90000"/>
+              </a:lnSpc>
+              <a:spcBef>
+                <a:spcPct val="0"/>
+              </a:spcBef>
+              <a:buNone/>
+              <a:defRPr sz="6000" kern="1200">
+                <a:solidFill>
+                  <a:schemeClr val="tx1"/>
+                </a:solidFill>
+                <a:latin typeface="+mj-lt"/>
+                <a:ea typeface="+mj-ea"/>
+                <a:cs typeface="+mj-cs"/>
+              </a:defRPr>
+            </a:lvl1pPr>
+          </a:lstStyle>
+          <a:p>
+            <a:pPr algn="l"/>
+            <a:r>
+              <a:rPr lang="en-AU" sz="3200" b="1" dirty="0" smtClean="0">
+                <a:solidFill>
+                  <a:srgbClr val="111111"/>
+                </a:solidFill>
+                <a:latin typeface="Open Sans" panose="020B0606030504020204" pitchFamily="34" charset="0"/>
+                <a:ea typeface="Open Sans" panose="020B0606030504020204" pitchFamily="34" charset="0"/>
+                <a:cs typeface="Open Sans" panose="020B0606030504020204" pitchFamily="34" charset="0"/>
+              </a:rPr>
+              <a:t>User rights</a:t>
+            </a:r>
+            <a:endParaRPr lang="en-AU" sz="3200" dirty="0">
               <a:solidFill>
                 <a:srgbClr val="111111"/>
               </a:solidFill>
@@ -11195,6 +11003,29 @@
               <a:cs typeface="Open Sans" panose="020B0606030504020204" pitchFamily="34" charset="0"/>
             </a:endParaRPr>
           </a:p>
+        </p:txBody>
+      </p:sp>
+      <p:sp>
+        <p:nvSpPr>
+          <p:cNvPr id="6" name="TextBox 5"/>
+          <p:cNvSpPr txBox="1"/>
+          <p:nvPr/>
+        </p:nvSpPr>
+        <p:spPr>
+          <a:xfrm>
+            <a:off x="1524000" y="4809641"/>
+            <a:ext cx="9144000" cy="1692771"/>
+          </a:xfrm>
+          <a:prstGeom prst="rect">
+            <a:avLst/>
+          </a:prstGeom>
+          <a:noFill/>
+        </p:spPr>
+        <p:txBody>
+          <a:bodyPr wrap="square" rtlCol="0">
+            <a:spAutoFit/>
+          </a:bodyPr>
+          <a:lstStyle/>
           <a:p>
             <a:pPr marL="285750" indent="-285750">
               <a:buFont typeface="Arial" panose="020B0604020202020204" pitchFamily="34" charset="0"/>
@@ -11209,21 +11040,9 @@
                 <a:ea typeface="Open Sans" panose="020B0606030504020204" pitchFamily="34" charset="0"/>
                 <a:cs typeface="Open Sans" panose="020B0606030504020204" pitchFamily="34" charset="0"/>
               </a:rPr>
-              <a:t>Recommend </a:t>
-            </a:r>
-            <a:r>
-              <a:rPr lang="en-AU" sz="2600" dirty="0" smtClean="0">
-                <a:solidFill>
-                  <a:srgbClr val="111111"/>
-                </a:solidFill>
-                <a:latin typeface="Open Sans" panose="020B0606030504020204" pitchFamily="34" charset="0"/>
-                <a:ea typeface="Open Sans" panose="020B0606030504020204" pitchFamily="34" charset="0"/>
-                <a:cs typeface="Open Sans" panose="020B0606030504020204" pitchFamily="34" charset="0"/>
-                <a:hlinkClick r:id="rId3"/>
-              </a:rPr>
-              <a:t>KFSensor honeypot system</a:t>
-            </a:r>
-            <a:endParaRPr lang="en-AU" sz="2600" dirty="0" smtClean="0">
+              <a:t>Configure Active Directory user groups with appropriate user rights</a:t>
+            </a:r>
+            <a:endParaRPr lang="en-AU" sz="3600" dirty="0" smtClean="0">
               <a:solidFill>
                 <a:srgbClr val="111111"/>
               </a:solidFill>
@@ -11238,17 +11057,6 @@
               <a:buChar char="•"/>
             </a:pPr>
             <a:r>
-              <a:rPr lang="en-AU" sz="2600" dirty="0">
-                <a:solidFill>
-                  <a:srgbClr val="111111"/>
-                </a:solidFill>
-                <a:latin typeface="Open Sans" panose="020B0606030504020204" pitchFamily="34" charset="0"/>
-                <a:ea typeface="Open Sans" panose="020B0606030504020204" pitchFamily="34" charset="0"/>
-                <a:cs typeface="Open Sans" panose="020B0606030504020204" pitchFamily="34" charset="0"/>
-              </a:rPr>
-              <a:t>Simulates vulnerable services to entice </a:t>
-            </a:r>
-            <a:r>
               <a:rPr lang="en-AU" sz="2600" dirty="0" smtClean="0">
                 <a:solidFill>
                   <a:srgbClr val="111111"/>
@@ -11257,11 +11065,11 @@
                 <a:ea typeface="Open Sans" panose="020B0606030504020204" pitchFamily="34" charset="0"/>
                 <a:cs typeface="Open Sans" panose="020B0606030504020204" pitchFamily="34" charset="0"/>
               </a:rPr>
-              <a:t>attacker</a:t>
-            </a:r>
-          </a:p>
-          <a:p>
-            <a:pPr marL="742950" lvl="1" indent="-285750">
+              <a:t>Reserve admin rights for IT support staff</a:t>
+            </a:r>
+          </a:p>
+          <a:p>
+            <a:pPr marL="285750" indent="-285750">
               <a:buFont typeface="Arial" panose="020B0604020202020204" pitchFamily="34" charset="0"/>
               <a:buChar char="•"/>
             </a:pPr>
@@ -11274,24 +11082,7 @@
                 <a:ea typeface="Open Sans" panose="020B0606030504020204" pitchFamily="34" charset="0"/>
                 <a:cs typeface="Open Sans" panose="020B0606030504020204" pitchFamily="34" charset="0"/>
               </a:rPr>
-              <a:t>Diverts attackers away from critical systems in the event an attacker compromises network</a:t>
-            </a:r>
-          </a:p>
-          <a:p>
-            <a:pPr marL="742950" lvl="1" indent="-285750">
-              <a:buFont typeface="Arial" panose="020B0604020202020204" pitchFamily="34" charset="0"/>
-              <a:buChar char="•"/>
-            </a:pPr>
-            <a:r>
-              <a:rPr lang="en-AU" sz="2600" dirty="0" smtClean="0">
-                <a:solidFill>
-                  <a:srgbClr val="111111"/>
-                </a:solidFill>
-                <a:latin typeface="Open Sans" panose="020B0606030504020204" pitchFamily="34" charset="0"/>
-                <a:ea typeface="Open Sans" panose="020B0606030504020204" pitchFamily="34" charset="0"/>
-                <a:cs typeface="Open Sans" panose="020B0606030504020204" pitchFamily="34" charset="0"/>
-              </a:rPr>
-              <a:t>Logs events</a:t>
+              <a:t>Enforce UAC through Active Directory group policy</a:t>
             </a:r>
           </a:p>
         </p:txBody>
@@ -11299,7 +11090,7 @@
     </p:spTree>
     <p:extLst>
       <p:ext uri="{BB962C8B-B14F-4D97-AF65-F5344CB8AC3E}">
-        <p14:creationId xmlns:p14="http://schemas.microsoft.com/office/powerpoint/2010/main" val="402785050"/>
+        <p14:creationId xmlns:p14="http://schemas.microsoft.com/office/powerpoint/2010/main" val="2924220329"/>
       </p:ext>
     </p:extLst>
   </p:cSld>
@@ -11348,8 +11139,8 @@
         </p:nvSpPr>
         <p:spPr>
           <a:xfrm>
-            <a:off x="338667" y="1"/>
-            <a:ext cx="9144000" cy="970843"/>
+            <a:off x="1524000" y="-1"/>
+            <a:ext cx="9144000" cy="1446915"/>
           </a:xfrm>
         </p:spPr>
         <p:txBody>
@@ -11360,17 +11151,17 @@
           <a:p>
             <a:pPr algn="l"/>
             <a:r>
-              <a:rPr lang="en-AU" sz="3600" b="1" dirty="0" smtClean="0">
-                <a:solidFill>
-                  <a:srgbClr val="111111"/>
-                </a:solidFill>
-                <a:latin typeface="Open Sans" panose="020B0606030504020204" pitchFamily="34" charset="0"/>
-                <a:ea typeface="Open Sans" panose="020B0606030504020204" pitchFamily="34" charset="0"/>
-                <a:cs typeface="Open Sans" panose="020B0606030504020204" pitchFamily="34" charset="0"/>
-              </a:rPr>
-              <a:t>References</a:t>
-            </a:r>
-            <a:endParaRPr lang="en-AU" sz="3600" dirty="0">
+              <a:rPr lang="en-AU" sz="3200" b="1" dirty="0" smtClean="0">
+                <a:solidFill>
+                  <a:srgbClr val="111111"/>
+                </a:solidFill>
+                <a:latin typeface="Open Sans" panose="020B0606030504020204" pitchFamily="34" charset="0"/>
+                <a:ea typeface="Open Sans" panose="020B0606030504020204" pitchFamily="34" charset="0"/>
+                <a:cs typeface="Open Sans" panose="020B0606030504020204" pitchFamily="34" charset="0"/>
+              </a:rPr>
+              <a:t>Anti-virus and network security</a:t>
+            </a:r>
+            <a:endParaRPr lang="en-AU" sz="3200" dirty="0">
               <a:solidFill>
                 <a:srgbClr val="111111"/>
               </a:solidFill>
@@ -11383,119 +11174,42 @@
       </p:sp>
       <p:sp>
         <p:nvSpPr>
-          <p:cNvPr id="5" name="Title 3"/>
-          <p:cNvSpPr txBox="1">
-            <a:spLocks/>
-          </p:cNvSpPr>
+          <p:cNvPr id="2" name="TextBox 1"/>
+          <p:cNvSpPr txBox="1"/>
           <p:nvPr/>
         </p:nvSpPr>
         <p:spPr>
           <a:xfrm>
-            <a:off x="338667" y="1196622"/>
-            <a:ext cx="11514666" cy="5113867"/>
+            <a:off x="1524000" y="1958544"/>
+            <a:ext cx="9144000" cy="2893100"/>
           </a:xfrm>
           <a:prstGeom prst="rect">
             <a:avLst/>
           </a:prstGeom>
+          <a:noFill/>
         </p:spPr>
         <p:txBody>
-          <a:bodyPr vert="horz" lIns="91440" tIns="45720" rIns="91440" bIns="45720" rtlCol="0" anchor="t">
-            <a:normAutofit lnSpcReduction="10000"/>
+          <a:bodyPr wrap="square" rtlCol="0">
+            <a:spAutoFit/>
           </a:bodyPr>
-          <a:lstStyle>
-            <a:lvl1pPr algn="ctr" defTabSz="914400" rtl="0" eaLnBrk="1" latinLnBrk="0" hangingPunct="1">
-              <a:lnSpc>
-                <a:spcPct val="90000"/>
-              </a:lnSpc>
-              <a:spcBef>
-                <a:spcPct val="0"/>
-              </a:spcBef>
-              <a:buNone/>
-              <a:defRPr sz="6000" kern="1200">
-                <a:solidFill>
-                  <a:schemeClr val="tx1"/>
-                </a:solidFill>
-                <a:latin typeface="+mj-lt"/>
-                <a:ea typeface="+mj-ea"/>
-                <a:cs typeface="+mj-cs"/>
-              </a:defRPr>
-            </a:lvl1pPr>
-          </a:lstStyle>
-          <a:p>
-            <a:pPr marL="457200" indent="-457200" algn="l">
-              <a:lnSpc>
-                <a:spcPct val="100000"/>
-              </a:lnSpc>
+          <a:lstStyle/>
+          <a:p>
+            <a:pPr marL="285750" indent="-285750">
               <a:buFont typeface="Arial" panose="020B0604020202020204" pitchFamily="34" charset="0"/>
               <a:buChar char="•"/>
             </a:pPr>
             <a:r>
-              <a:rPr lang="en-AU" sz="1400" dirty="0">
-                <a:solidFill>
-                  <a:srgbClr val="111111"/>
-                </a:solidFill>
-                <a:latin typeface="Open Sans" panose="020B0606030504020204" pitchFamily="34" charset="0"/>
-                <a:ea typeface="Open Sans" panose="020B0606030504020204" pitchFamily="34" charset="0"/>
-                <a:cs typeface="Open Sans" panose="020B0606030504020204" pitchFamily="34" charset="0"/>
-              </a:rPr>
-              <a:t>Baker, W. H., Hylender, C. D., &amp; Valentine, J. A. (2008). 2008 Data Breach Investigations Report, 1–29</a:t>
-            </a:r>
-            <a:r>
-              <a:rPr lang="en-AU" sz="1400" dirty="0" smtClean="0">
-                <a:solidFill>
-                  <a:srgbClr val="111111"/>
-                </a:solidFill>
-                <a:latin typeface="Open Sans" panose="020B0606030504020204" pitchFamily="34" charset="0"/>
-                <a:ea typeface="Open Sans" panose="020B0606030504020204" pitchFamily="34" charset="0"/>
-                <a:cs typeface="Open Sans" panose="020B0606030504020204" pitchFamily="34" charset="0"/>
-              </a:rPr>
-              <a:t>.</a:t>
-            </a:r>
-          </a:p>
-          <a:p>
-            <a:pPr marL="457200" indent="-457200" algn="l">
-              <a:lnSpc>
-                <a:spcPct val="100000"/>
-              </a:lnSpc>
-              <a:buFont typeface="Arial" panose="020B0604020202020204" pitchFamily="34" charset="0"/>
-              <a:buChar char="•"/>
-            </a:pPr>
-            <a:r>
-              <a:rPr lang="en-AU" sz="1400" dirty="0">
-                <a:solidFill>
-                  <a:srgbClr val="111111"/>
-                </a:solidFill>
-                <a:latin typeface="Open Sans" panose="020B0606030504020204" pitchFamily="34" charset="0"/>
-                <a:ea typeface="Open Sans" panose="020B0606030504020204" pitchFamily="34" charset="0"/>
-                <a:cs typeface="Open Sans" panose="020B0606030504020204" pitchFamily="34" charset="0"/>
-              </a:rPr>
-              <a:t>Goodin, D. (2014). Stanford’s password policy shuns one-size-fits-all security | Ars Technica. Ars Technica. Retrieved April 30, 2015, from </a:t>
-            </a:r>
-            <a:r>
-              <a:rPr lang="en-AU" sz="1400" dirty="0">
-                <a:solidFill>
-                  <a:srgbClr val="111111"/>
-                </a:solidFill>
-                <a:latin typeface="Open Sans" panose="020B0606030504020204" pitchFamily="34" charset="0"/>
-                <a:ea typeface="Open Sans" panose="020B0606030504020204" pitchFamily="34" charset="0"/>
-                <a:cs typeface="Open Sans" panose="020B0606030504020204" pitchFamily="34" charset="0"/>
-                <a:hlinkClick r:id="rId2"/>
-              </a:rPr>
-              <a:t>http://arstechnica.com/security/2014/04/25/stanfords-password-policy-shuns-one-size-fits-all-security</a:t>
-            </a:r>
-            <a:r>
-              <a:rPr lang="en-AU" sz="1400" dirty="0" smtClean="0">
-                <a:solidFill>
-                  <a:srgbClr val="111111"/>
-                </a:solidFill>
-                <a:latin typeface="Open Sans" panose="020B0606030504020204" pitchFamily="34" charset="0"/>
-                <a:ea typeface="Open Sans" panose="020B0606030504020204" pitchFamily="34" charset="0"/>
-                <a:cs typeface="Open Sans" panose="020B0606030504020204" pitchFamily="34" charset="0"/>
-                <a:hlinkClick r:id="rId2"/>
-              </a:rPr>
-              <a:t>/</a:t>
-            </a:r>
-            <a:endParaRPr lang="en-AU" sz="1400" dirty="0" smtClean="0">
+              <a:rPr lang="en-AU" sz="2600" dirty="0" smtClean="0">
+                <a:solidFill>
+                  <a:srgbClr val="111111"/>
+                </a:solidFill>
+                <a:latin typeface="Open Sans" panose="020B0606030504020204" pitchFamily="34" charset="0"/>
+                <a:ea typeface="Open Sans" panose="020B0606030504020204" pitchFamily="34" charset="0"/>
+                <a:cs typeface="Open Sans" panose="020B0606030504020204" pitchFamily="34" charset="0"/>
+              </a:rPr>
+              <a:t>Remove fake anti-virus</a:t>
+            </a:r>
+            <a:endParaRPr lang="en-AU" sz="2600" dirty="0">
               <a:solidFill>
                 <a:srgbClr val="111111"/>
               </a:solidFill>
@@ -11505,49 +11219,34 @@
             </a:endParaRPr>
           </a:p>
           <a:p>
-            <a:pPr marL="457200" indent="-457200" algn="l">
-              <a:lnSpc>
-                <a:spcPct val="100000"/>
-              </a:lnSpc>
+            <a:pPr marL="285750" indent="-285750">
               <a:buFont typeface="Arial" panose="020B0604020202020204" pitchFamily="34" charset="0"/>
               <a:buChar char="•"/>
             </a:pPr>
             <a:r>
-              <a:rPr lang="en-AU" sz="1400" dirty="0">
-                <a:solidFill>
-                  <a:srgbClr val="111111"/>
-                </a:solidFill>
-                <a:latin typeface="Open Sans" panose="020B0606030504020204" pitchFamily="34" charset="0"/>
-                <a:ea typeface="Open Sans" panose="020B0606030504020204" pitchFamily="34" charset="0"/>
-                <a:cs typeface="Open Sans" panose="020B0606030504020204" pitchFamily="34" charset="0"/>
-              </a:rPr>
-              <a:t>Machkovech, S. (2015). Hacked French network exposed its own passwords during TV interview | Ars Technica. Ars Technica. Retrieved May 6, 2015, from </a:t>
-            </a:r>
-            <a:r>
-              <a:rPr lang="en-AU" sz="1400" dirty="0">
-                <a:solidFill>
-                  <a:srgbClr val="111111"/>
-                </a:solidFill>
-                <a:latin typeface="Open Sans" panose="020B0606030504020204" pitchFamily="34" charset="0"/>
-                <a:ea typeface="Open Sans" panose="020B0606030504020204" pitchFamily="34" charset="0"/>
-                <a:cs typeface="Open Sans" panose="020B0606030504020204" pitchFamily="34" charset="0"/>
-                <a:hlinkClick r:id="rId3"/>
-              </a:rPr>
-              <a:t>http://arstechnica.com/security/2015/04/09/hacked-french-network-exposed-its-own-passwords-during-tv-interview</a:t>
-            </a:r>
-            <a:r>
-              <a:rPr lang="en-AU" sz="1400" dirty="0" smtClean="0">
-                <a:solidFill>
-                  <a:srgbClr val="111111"/>
-                </a:solidFill>
-                <a:latin typeface="Open Sans" panose="020B0606030504020204" pitchFamily="34" charset="0"/>
-                <a:ea typeface="Open Sans" panose="020B0606030504020204" pitchFamily="34" charset="0"/>
-                <a:cs typeface="Open Sans" panose="020B0606030504020204" pitchFamily="34" charset="0"/>
-                <a:hlinkClick r:id="rId3"/>
-              </a:rPr>
-              <a:t>/</a:t>
-            </a:r>
-            <a:endParaRPr lang="en-AU" sz="1400" dirty="0" smtClean="0">
+              <a:rPr lang="en-AU" sz="2600" dirty="0" smtClean="0">
+                <a:solidFill>
+                  <a:srgbClr val="111111"/>
+                </a:solidFill>
+                <a:latin typeface="Open Sans" panose="020B0606030504020204" pitchFamily="34" charset="0"/>
+                <a:ea typeface="Open Sans" panose="020B0606030504020204" pitchFamily="34" charset="0"/>
+                <a:cs typeface="Open Sans" panose="020B0606030504020204" pitchFamily="34" charset="0"/>
+              </a:rPr>
+              <a:t>Recommend </a:t>
+            </a:r>
+            <a:r>
+              <a:rPr lang="en-AU" sz="2600" dirty="0" smtClean="0">
+                <a:solidFill>
+                  <a:srgbClr val="111111"/>
+                </a:solidFill>
+                <a:latin typeface="Open Sans" panose="020B0606030504020204" pitchFamily="34" charset="0"/>
+                <a:ea typeface="Open Sans" panose="020B0606030504020204" pitchFamily="34" charset="0"/>
+                <a:cs typeface="Open Sans" panose="020B0606030504020204" pitchFamily="34" charset="0"/>
+                <a:hlinkClick r:id="rId2"/>
+              </a:rPr>
+              <a:t>Kaspersky End Point Security Select</a:t>
+            </a:r>
+            <a:endParaRPr lang="en-AU" sz="2600" dirty="0" smtClean="0">
               <a:solidFill>
                 <a:srgbClr val="111111"/>
               </a:solidFill>
@@ -11557,71 +11256,34 @@
             </a:endParaRPr>
           </a:p>
           <a:p>
-            <a:pPr marL="457200" indent="-457200" algn="l">
-              <a:lnSpc>
-                <a:spcPct val="100000"/>
-              </a:lnSpc>
+            <a:pPr marL="285750" indent="-285750">
               <a:buFont typeface="Arial" panose="020B0604020202020204" pitchFamily="34" charset="0"/>
               <a:buChar char="•"/>
             </a:pPr>
             <a:r>
-              <a:rPr lang="en-AU" sz="1400" dirty="0">
-                <a:solidFill>
-                  <a:srgbClr val="111111"/>
-                </a:solidFill>
-                <a:latin typeface="Open Sans" panose="020B0606030504020204" pitchFamily="34" charset="0"/>
-                <a:ea typeface="Open Sans" panose="020B0606030504020204" pitchFamily="34" charset="0"/>
-                <a:cs typeface="Open Sans" panose="020B0606030504020204" pitchFamily="34" charset="0"/>
-              </a:rPr>
-              <a:t>Microsoft. (</a:t>
-            </a:r>
-            <a:r>
-              <a:rPr lang="en-AU" sz="1400" dirty="0" smtClean="0">
-                <a:solidFill>
-                  <a:srgbClr val="111111"/>
-                </a:solidFill>
-                <a:latin typeface="Open Sans" panose="020B0606030504020204" pitchFamily="34" charset="0"/>
-                <a:ea typeface="Open Sans" panose="020B0606030504020204" pitchFamily="34" charset="0"/>
-                <a:cs typeface="Open Sans" panose="020B0606030504020204" pitchFamily="34" charset="0"/>
-              </a:rPr>
-              <a:t>2005a). </a:t>
-            </a:r>
-            <a:r>
-              <a:rPr lang="en-AU" sz="1400" dirty="0">
-                <a:solidFill>
-                  <a:srgbClr val="111111"/>
-                </a:solidFill>
-                <a:latin typeface="Open Sans" panose="020B0606030504020204" pitchFamily="34" charset="0"/>
-                <a:ea typeface="Open Sans" panose="020B0606030504020204" pitchFamily="34" charset="0"/>
-                <a:cs typeface="Open Sans" panose="020B0606030504020204" pitchFamily="34" charset="0"/>
-              </a:rPr>
-              <a:t>Apply or modify password policy: Logon and Authentication. Retrieved May 14, 2015, from </a:t>
-            </a:r>
-            <a:r>
-              <a:rPr lang="en-AU" sz="1400" dirty="0">
-                <a:solidFill>
-                  <a:srgbClr val="111111"/>
-                </a:solidFill>
-                <a:latin typeface="Open Sans" panose="020B0606030504020204" pitchFamily="34" charset="0"/>
-                <a:ea typeface="Open Sans" panose="020B0606030504020204" pitchFamily="34" charset="0"/>
-                <a:cs typeface="Open Sans" panose="020B0606030504020204" pitchFamily="34" charset="0"/>
-                <a:hlinkClick r:id="rId4"/>
-              </a:rPr>
-              <a:t>https://technet.microsoft.com/en-au/library/cc781633(v=ws.10).aspx?f=255&amp;MSPPError=-</a:t>
-            </a:r>
-            <a:r>
-              <a:rPr lang="en-AU" sz="1400" dirty="0" smtClean="0">
-                <a:solidFill>
-                  <a:srgbClr val="111111"/>
-                </a:solidFill>
-                <a:latin typeface="Open Sans" panose="020B0606030504020204" pitchFamily="34" charset="0"/>
-                <a:ea typeface="Open Sans" panose="020B0606030504020204" pitchFamily="34" charset="0"/>
-                <a:cs typeface="Open Sans" panose="020B0606030504020204" pitchFamily="34" charset="0"/>
-                <a:hlinkClick r:id="rId4"/>
-              </a:rPr>
-              <a:t>2147217396#BKMK_3</a:t>
-            </a:r>
-            <a:endParaRPr lang="en-AU" sz="1400" dirty="0" smtClean="0">
+              <a:rPr lang="en-AU" sz="2600" dirty="0" smtClean="0">
+                <a:solidFill>
+                  <a:srgbClr val="111111"/>
+                </a:solidFill>
+                <a:latin typeface="Open Sans" panose="020B0606030504020204" pitchFamily="34" charset="0"/>
+                <a:ea typeface="Open Sans" panose="020B0606030504020204" pitchFamily="34" charset="0"/>
+                <a:cs typeface="Open Sans" panose="020B0606030504020204" pitchFamily="34" charset="0"/>
+              </a:rPr>
+              <a:t>Recommend </a:t>
+            </a:r>
+            <a:r>
+              <a:rPr lang="en-AU" sz="2600" dirty="0" smtClean="0">
+                <a:solidFill>
+                  <a:srgbClr val="111111"/>
+                </a:solidFill>
+                <a:latin typeface="Open Sans" panose="020B0606030504020204" pitchFamily="34" charset="0"/>
+                <a:ea typeface="Open Sans" panose="020B0606030504020204" pitchFamily="34" charset="0"/>
+                <a:cs typeface="Open Sans" panose="020B0606030504020204" pitchFamily="34" charset="0"/>
+                <a:hlinkClick r:id="rId3"/>
+              </a:rPr>
+              <a:t>KFSensor honeypot system</a:t>
+            </a:r>
+            <a:endParaRPr lang="en-AU" sz="2600" dirty="0" smtClean="0">
               <a:solidFill>
                 <a:srgbClr val="111111"/>
               </a:solidFill>
@@ -11631,508 +11293,73 @@
             </a:endParaRPr>
           </a:p>
           <a:p>
-            <a:pPr marL="457200" indent="-457200" algn="l">
-              <a:lnSpc>
-                <a:spcPct val="100000"/>
-              </a:lnSpc>
+            <a:pPr marL="742950" lvl="1" indent="-285750">
               <a:buFont typeface="Arial" panose="020B0604020202020204" pitchFamily="34" charset="0"/>
               <a:buChar char="•"/>
             </a:pPr>
             <a:r>
-              <a:rPr lang="en-AU" sz="1400" dirty="0">
-                <a:solidFill>
-                  <a:srgbClr val="111111"/>
-                </a:solidFill>
-                <a:latin typeface="Open Sans" panose="020B0606030504020204" pitchFamily="34" charset="0"/>
-                <a:ea typeface="Open Sans" panose="020B0606030504020204" pitchFamily="34" charset="0"/>
-                <a:cs typeface="Open Sans" panose="020B0606030504020204" pitchFamily="34" charset="0"/>
-              </a:rPr>
-              <a:t>Microsoft. (</a:t>
-            </a:r>
-            <a:r>
-              <a:rPr lang="en-AU" sz="1400" dirty="0" smtClean="0">
-                <a:solidFill>
-                  <a:srgbClr val="111111"/>
-                </a:solidFill>
-                <a:latin typeface="Open Sans" panose="020B0606030504020204" pitchFamily="34" charset="0"/>
-                <a:ea typeface="Open Sans" panose="020B0606030504020204" pitchFamily="34" charset="0"/>
-                <a:cs typeface="Open Sans" panose="020B0606030504020204" pitchFamily="34" charset="0"/>
-              </a:rPr>
-              <a:t>2005b). </a:t>
-            </a:r>
-            <a:r>
-              <a:rPr lang="en-AU" sz="1400" dirty="0">
-                <a:solidFill>
-                  <a:srgbClr val="111111"/>
-                </a:solidFill>
-                <a:latin typeface="Open Sans" panose="020B0606030504020204" pitchFamily="34" charset="0"/>
-                <a:ea typeface="Open Sans" panose="020B0606030504020204" pitchFamily="34" charset="0"/>
-                <a:cs typeface="Open Sans" panose="020B0606030504020204" pitchFamily="34" charset="0"/>
-              </a:rPr>
-              <a:t>Assign user rights to a group in Active Directory: Active Directory. Retrieved May 14, 2015, from </a:t>
-            </a:r>
-            <a:r>
-              <a:rPr lang="en-AU" sz="1400" dirty="0">
-                <a:solidFill>
-                  <a:srgbClr val="111111"/>
-                </a:solidFill>
-                <a:latin typeface="Open Sans" panose="020B0606030504020204" pitchFamily="34" charset="0"/>
-                <a:ea typeface="Open Sans" panose="020B0606030504020204" pitchFamily="34" charset="0"/>
-                <a:cs typeface="Open Sans" panose="020B0606030504020204" pitchFamily="34" charset="0"/>
-                <a:hlinkClick r:id="rId5"/>
-              </a:rPr>
-              <a:t>https://technet.microsoft.com/en-au/library/cc786658(v=ws.10).</a:t>
-            </a:r>
-            <a:r>
-              <a:rPr lang="en-AU" sz="1400" dirty="0" smtClean="0">
-                <a:solidFill>
-                  <a:srgbClr val="111111"/>
-                </a:solidFill>
-                <a:latin typeface="Open Sans" panose="020B0606030504020204" pitchFamily="34" charset="0"/>
-                <a:ea typeface="Open Sans" panose="020B0606030504020204" pitchFamily="34" charset="0"/>
-                <a:cs typeface="Open Sans" panose="020B0606030504020204" pitchFamily="34" charset="0"/>
-                <a:hlinkClick r:id="rId5"/>
-              </a:rPr>
-              <a:t>aspx</a:t>
-            </a:r>
-            <a:endParaRPr lang="en-AU" sz="1400" dirty="0" smtClean="0">
-              <a:solidFill>
-                <a:srgbClr val="111111"/>
-              </a:solidFill>
-              <a:latin typeface="Open Sans" panose="020B0606030504020204" pitchFamily="34" charset="0"/>
-              <a:ea typeface="Open Sans" panose="020B0606030504020204" pitchFamily="34" charset="0"/>
-              <a:cs typeface="Open Sans" panose="020B0606030504020204" pitchFamily="34" charset="0"/>
-            </a:endParaRPr>
-          </a:p>
-          <a:p>
-            <a:pPr marL="457200" indent="-457200" algn="l">
-              <a:lnSpc>
-                <a:spcPct val="100000"/>
-              </a:lnSpc>
+              <a:rPr lang="en-AU" sz="2600" dirty="0">
+                <a:solidFill>
+                  <a:srgbClr val="111111"/>
+                </a:solidFill>
+                <a:latin typeface="Open Sans" panose="020B0606030504020204" pitchFamily="34" charset="0"/>
+                <a:ea typeface="Open Sans" panose="020B0606030504020204" pitchFamily="34" charset="0"/>
+                <a:cs typeface="Open Sans" panose="020B0606030504020204" pitchFamily="34" charset="0"/>
+              </a:rPr>
+              <a:t>Simulates vulnerable services to entice </a:t>
+            </a:r>
+            <a:r>
+              <a:rPr lang="en-AU" sz="2600" dirty="0" smtClean="0">
+                <a:solidFill>
+                  <a:srgbClr val="111111"/>
+                </a:solidFill>
+                <a:latin typeface="Open Sans" panose="020B0606030504020204" pitchFamily="34" charset="0"/>
+                <a:ea typeface="Open Sans" panose="020B0606030504020204" pitchFamily="34" charset="0"/>
+                <a:cs typeface="Open Sans" panose="020B0606030504020204" pitchFamily="34" charset="0"/>
+              </a:rPr>
+              <a:t>attacker</a:t>
+            </a:r>
+          </a:p>
+          <a:p>
+            <a:pPr marL="742950" lvl="1" indent="-285750">
               <a:buFont typeface="Arial" panose="020B0604020202020204" pitchFamily="34" charset="0"/>
               <a:buChar char="•"/>
             </a:pPr>
             <a:r>
-              <a:rPr lang="en-AU" sz="1400" dirty="0" smtClean="0">
-                <a:solidFill>
-                  <a:srgbClr val="111111"/>
-                </a:solidFill>
-                <a:latin typeface="Open Sans" panose="020B0606030504020204" pitchFamily="34" charset="0"/>
-                <a:ea typeface="Open Sans" panose="020B0606030504020204" pitchFamily="34" charset="0"/>
-                <a:cs typeface="Open Sans" panose="020B0606030504020204" pitchFamily="34" charset="0"/>
-              </a:rPr>
-              <a:t>Microsoft</a:t>
-            </a:r>
-            <a:r>
-              <a:rPr lang="en-AU" sz="1400" dirty="0">
-                <a:solidFill>
-                  <a:srgbClr val="111111"/>
-                </a:solidFill>
-                <a:latin typeface="Open Sans" panose="020B0606030504020204" pitchFamily="34" charset="0"/>
-                <a:ea typeface="Open Sans" panose="020B0606030504020204" pitchFamily="34" charset="0"/>
-                <a:cs typeface="Open Sans" panose="020B0606030504020204" pitchFamily="34" charset="0"/>
-              </a:rPr>
-              <a:t>. (2007). Configure UAC settings via policy - Microsoft Reduce Customer Effort Center - Site Home - TechNet Blogs. Retrieved May 14, 2015, from </a:t>
-            </a:r>
-            <a:r>
-              <a:rPr lang="en-AU" sz="1400" dirty="0">
-                <a:solidFill>
-                  <a:srgbClr val="111111"/>
-                </a:solidFill>
-                <a:latin typeface="Open Sans" panose="020B0606030504020204" pitchFamily="34" charset="0"/>
-                <a:ea typeface="Open Sans" panose="020B0606030504020204" pitchFamily="34" charset="0"/>
-                <a:cs typeface="Open Sans" panose="020B0606030504020204" pitchFamily="34" charset="0"/>
-                <a:hlinkClick r:id="rId6"/>
-              </a:rPr>
-              <a:t>http://</a:t>
-            </a:r>
-            <a:r>
-              <a:rPr lang="en-AU" sz="1400" dirty="0" smtClean="0">
-                <a:solidFill>
-                  <a:srgbClr val="111111"/>
-                </a:solidFill>
-                <a:latin typeface="Open Sans" panose="020B0606030504020204" pitchFamily="34" charset="0"/>
-                <a:ea typeface="Open Sans" panose="020B0606030504020204" pitchFamily="34" charset="0"/>
-                <a:cs typeface="Open Sans" panose="020B0606030504020204" pitchFamily="34" charset="0"/>
-                <a:hlinkClick r:id="rId6"/>
-              </a:rPr>
-              <a:t>blogs.technet.com/b/asiasupp/archive/2007/02/08/configure-uac-settings-via-policy.aspx</a:t>
-            </a:r>
-            <a:endParaRPr lang="en-AU" sz="1400" dirty="0" smtClean="0">
-              <a:solidFill>
-                <a:srgbClr val="111111"/>
-              </a:solidFill>
-              <a:latin typeface="Open Sans" panose="020B0606030504020204" pitchFamily="34" charset="0"/>
-              <a:ea typeface="Open Sans" panose="020B0606030504020204" pitchFamily="34" charset="0"/>
-              <a:cs typeface="Open Sans" panose="020B0606030504020204" pitchFamily="34" charset="0"/>
-            </a:endParaRPr>
-          </a:p>
-          <a:p>
-            <a:pPr marL="457200" indent="-457200" algn="l">
-              <a:lnSpc>
-                <a:spcPct val="100000"/>
-              </a:lnSpc>
+              <a:rPr lang="en-AU" sz="2600" dirty="0" smtClean="0">
+                <a:solidFill>
+                  <a:srgbClr val="111111"/>
+                </a:solidFill>
+                <a:latin typeface="Open Sans" panose="020B0606030504020204" pitchFamily="34" charset="0"/>
+                <a:ea typeface="Open Sans" panose="020B0606030504020204" pitchFamily="34" charset="0"/>
+                <a:cs typeface="Open Sans" panose="020B0606030504020204" pitchFamily="34" charset="0"/>
+              </a:rPr>
+              <a:t>Diverts attackers away from critical systems in the event an attacker compromises network</a:t>
+            </a:r>
+          </a:p>
+          <a:p>
+            <a:pPr marL="742950" lvl="1" indent="-285750">
               <a:buFont typeface="Arial" panose="020B0604020202020204" pitchFamily="34" charset="0"/>
               <a:buChar char="•"/>
             </a:pPr>
             <a:r>
-              <a:rPr lang="en-AU" sz="1400" dirty="0">
-                <a:solidFill>
-                  <a:srgbClr val="111111"/>
-                </a:solidFill>
-                <a:latin typeface="Open Sans" panose="020B0606030504020204" pitchFamily="34" charset="0"/>
-                <a:ea typeface="Open Sans" panose="020B0606030504020204" pitchFamily="34" charset="0"/>
-                <a:cs typeface="Open Sans" panose="020B0606030504020204" pitchFamily="34" charset="0"/>
-              </a:rPr>
-              <a:t>Microsoft. (2012). Password must meet complexity requirements. Retrieved May 14, 2015, from </a:t>
-            </a:r>
-            <a:r>
-              <a:rPr lang="en-AU" sz="1400" dirty="0">
-                <a:solidFill>
-                  <a:srgbClr val="111111"/>
-                </a:solidFill>
-                <a:latin typeface="Open Sans" panose="020B0606030504020204" pitchFamily="34" charset="0"/>
-                <a:ea typeface="Open Sans" panose="020B0606030504020204" pitchFamily="34" charset="0"/>
-                <a:cs typeface="Open Sans" panose="020B0606030504020204" pitchFamily="34" charset="0"/>
-                <a:hlinkClick r:id="rId7"/>
-              </a:rPr>
-              <a:t>https://technet.microsoft.com/en-us/library/hh994562(v=ws.10).</a:t>
-            </a:r>
-            <a:r>
-              <a:rPr lang="en-AU" sz="1400" dirty="0" smtClean="0">
-                <a:solidFill>
-                  <a:srgbClr val="111111"/>
-                </a:solidFill>
-                <a:latin typeface="Open Sans" panose="020B0606030504020204" pitchFamily="34" charset="0"/>
-                <a:ea typeface="Open Sans" panose="020B0606030504020204" pitchFamily="34" charset="0"/>
-                <a:cs typeface="Open Sans" panose="020B0606030504020204" pitchFamily="34" charset="0"/>
-                <a:hlinkClick r:id="rId7"/>
-              </a:rPr>
-              <a:t>aspx</a:t>
-            </a:r>
-            <a:endParaRPr lang="en-AU" sz="1400" dirty="0" smtClean="0">
-              <a:solidFill>
-                <a:srgbClr val="111111"/>
-              </a:solidFill>
-              <a:latin typeface="Open Sans" panose="020B0606030504020204" pitchFamily="34" charset="0"/>
-              <a:ea typeface="Open Sans" panose="020B0606030504020204" pitchFamily="34" charset="0"/>
-              <a:cs typeface="Open Sans" panose="020B0606030504020204" pitchFamily="34" charset="0"/>
-            </a:endParaRPr>
-          </a:p>
-          <a:p>
-            <a:pPr marL="457200" indent="-457200" algn="l">
-              <a:lnSpc>
-                <a:spcPct val="100000"/>
-              </a:lnSpc>
-              <a:buFont typeface="Arial" panose="020B0604020202020204" pitchFamily="34" charset="0"/>
-              <a:buChar char="•"/>
-            </a:pPr>
-            <a:r>
-              <a:rPr lang="en-AU" sz="1400" dirty="0">
-                <a:solidFill>
-                  <a:srgbClr val="111111"/>
-                </a:solidFill>
-                <a:latin typeface="Open Sans" panose="020B0606030504020204" pitchFamily="34" charset="0"/>
-                <a:ea typeface="Open Sans" panose="020B0606030504020204" pitchFamily="34" charset="0"/>
-                <a:cs typeface="Open Sans" panose="020B0606030504020204" pitchFamily="34" charset="0"/>
-              </a:rPr>
-              <a:t>Microsoft. (n.d.-a). Screen Saver timeout. Retrieved May 14, 2015, from </a:t>
-            </a:r>
-            <a:r>
-              <a:rPr lang="en-AU" sz="1400" dirty="0">
-                <a:solidFill>
-                  <a:srgbClr val="111111"/>
-                </a:solidFill>
-                <a:latin typeface="Open Sans" panose="020B0606030504020204" pitchFamily="34" charset="0"/>
-                <a:ea typeface="Open Sans" panose="020B0606030504020204" pitchFamily="34" charset="0"/>
-                <a:cs typeface="Open Sans" panose="020B0606030504020204" pitchFamily="34" charset="0"/>
-                <a:hlinkClick r:id="rId8"/>
-              </a:rPr>
-              <a:t>https://</a:t>
-            </a:r>
-            <a:r>
-              <a:rPr lang="en-AU" sz="1400" dirty="0" smtClean="0">
-                <a:solidFill>
-                  <a:srgbClr val="111111"/>
-                </a:solidFill>
-                <a:latin typeface="Open Sans" panose="020B0606030504020204" pitchFamily="34" charset="0"/>
-                <a:ea typeface="Open Sans" panose="020B0606030504020204" pitchFamily="34" charset="0"/>
-                <a:cs typeface="Open Sans" panose="020B0606030504020204" pitchFamily="34" charset="0"/>
-                <a:hlinkClick r:id="rId8"/>
-              </a:rPr>
-              <a:t>technet.microsoft.com/en-us/library/cc961876.aspx</a:t>
-            </a:r>
-            <a:endParaRPr lang="en-AU" sz="1400" dirty="0" smtClean="0">
-              <a:solidFill>
-                <a:srgbClr val="111111"/>
-              </a:solidFill>
-              <a:latin typeface="Open Sans" panose="020B0606030504020204" pitchFamily="34" charset="0"/>
-              <a:ea typeface="Open Sans" panose="020B0606030504020204" pitchFamily="34" charset="0"/>
-              <a:cs typeface="Open Sans" panose="020B0606030504020204" pitchFamily="34" charset="0"/>
-            </a:endParaRPr>
-          </a:p>
-          <a:p>
-            <a:pPr marL="457200" indent="-457200" algn="l">
-              <a:lnSpc>
-                <a:spcPct val="100000"/>
-              </a:lnSpc>
-              <a:buFont typeface="Arial" panose="020B0604020202020204" pitchFamily="34" charset="0"/>
-              <a:buChar char="•"/>
-            </a:pPr>
-            <a:r>
-              <a:rPr lang="en-AU" sz="1400" dirty="0">
-                <a:solidFill>
-                  <a:srgbClr val="111111"/>
-                </a:solidFill>
-                <a:latin typeface="Open Sans" panose="020B0606030504020204" pitchFamily="34" charset="0"/>
-                <a:ea typeface="Open Sans" panose="020B0606030504020204" pitchFamily="34" charset="0"/>
-                <a:cs typeface="Open Sans" panose="020B0606030504020204" pitchFamily="34" charset="0"/>
-              </a:rPr>
-              <a:t>Microsoft. (n.d.-b). What is User Account Control? - Windows Help. Retrieved March 14, 2015, from </a:t>
-            </a:r>
-            <a:r>
-              <a:rPr lang="en-AU" sz="1400" dirty="0">
-                <a:solidFill>
-                  <a:srgbClr val="111111"/>
-                </a:solidFill>
-                <a:latin typeface="Open Sans" panose="020B0606030504020204" pitchFamily="34" charset="0"/>
-                <a:ea typeface="Open Sans" panose="020B0606030504020204" pitchFamily="34" charset="0"/>
-                <a:cs typeface="Open Sans" panose="020B0606030504020204" pitchFamily="34" charset="0"/>
-                <a:hlinkClick r:id="rId9"/>
-              </a:rPr>
-              <a:t>http://</a:t>
-            </a:r>
-            <a:r>
-              <a:rPr lang="en-AU" sz="1400" dirty="0" smtClean="0">
-                <a:solidFill>
-                  <a:srgbClr val="111111"/>
-                </a:solidFill>
-                <a:latin typeface="Open Sans" panose="020B0606030504020204" pitchFamily="34" charset="0"/>
-                <a:ea typeface="Open Sans" panose="020B0606030504020204" pitchFamily="34" charset="0"/>
-                <a:cs typeface="Open Sans" panose="020B0606030504020204" pitchFamily="34" charset="0"/>
-                <a:hlinkClick r:id="rId9"/>
-              </a:rPr>
-              <a:t>windows.microsoft.com/en-au/windows/what-is-user-account-control#1TC=windows-vista</a:t>
-            </a:r>
-            <a:endParaRPr lang="en-AU" sz="1400" dirty="0" smtClean="0">
-              <a:solidFill>
-                <a:srgbClr val="111111"/>
-              </a:solidFill>
-              <a:latin typeface="Open Sans" panose="020B0606030504020204" pitchFamily="34" charset="0"/>
-              <a:ea typeface="Open Sans" panose="020B0606030504020204" pitchFamily="34" charset="0"/>
-              <a:cs typeface="Open Sans" panose="020B0606030504020204" pitchFamily="34" charset="0"/>
-            </a:endParaRPr>
-          </a:p>
-          <a:p>
-            <a:pPr marL="457200" indent="-457200" algn="l">
-              <a:lnSpc>
-                <a:spcPct val="100000"/>
-              </a:lnSpc>
-              <a:buFont typeface="Arial" panose="020B0604020202020204" pitchFamily="34" charset="0"/>
-              <a:buChar char="•"/>
-            </a:pPr>
-            <a:r>
-              <a:rPr lang="en-AU" sz="1400" dirty="0">
-                <a:solidFill>
-                  <a:srgbClr val="111111"/>
-                </a:solidFill>
-                <a:latin typeface="Open Sans" panose="020B0606030504020204" pitchFamily="34" charset="0"/>
-                <a:ea typeface="Open Sans" panose="020B0606030504020204" pitchFamily="34" charset="0"/>
-                <a:cs typeface="Open Sans" panose="020B0606030504020204" pitchFamily="34" charset="0"/>
-              </a:rPr>
-              <a:t>O’Connor, E. (2008). BigAdmin Feature Article: Patch Management Best Practices. Retrieved May 13, 2015, from </a:t>
-            </a:r>
-            <a:r>
-              <a:rPr lang="en-AU" sz="1400" dirty="0">
-                <a:solidFill>
-                  <a:srgbClr val="111111"/>
-                </a:solidFill>
-                <a:latin typeface="Open Sans" panose="020B0606030504020204" pitchFamily="34" charset="0"/>
-                <a:ea typeface="Open Sans" panose="020B0606030504020204" pitchFamily="34" charset="0"/>
-                <a:cs typeface="Open Sans" panose="020B0606030504020204" pitchFamily="34" charset="0"/>
-                <a:hlinkClick r:id="rId10"/>
-              </a:rPr>
-              <a:t>http://</a:t>
-            </a:r>
-            <a:r>
-              <a:rPr lang="en-AU" sz="1400" dirty="0" smtClean="0">
-                <a:solidFill>
-                  <a:srgbClr val="111111"/>
-                </a:solidFill>
-                <a:latin typeface="Open Sans" panose="020B0606030504020204" pitchFamily="34" charset="0"/>
-                <a:ea typeface="Open Sans" panose="020B0606030504020204" pitchFamily="34" charset="0"/>
-                <a:cs typeface="Open Sans" panose="020B0606030504020204" pitchFamily="34" charset="0"/>
-                <a:hlinkClick r:id="rId10"/>
-              </a:rPr>
-              <a:t>www.oracle.com/technetwork/systems/articles/patch-management-jsp-135385.html</a:t>
-            </a:r>
-            <a:endParaRPr lang="en-AU" sz="1400" dirty="0" smtClean="0">
-              <a:solidFill>
-                <a:srgbClr val="111111"/>
-              </a:solidFill>
-              <a:latin typeface="Open Sans" panose="020B0606030504020204" pitchFamily="34" charset="0"/>
-              <a:ea typeface="Open Sans" panose="020B0606030504020204" pitchFamily="34" charset="0"/>
-              <a:cs typeface="Open Sans" panose="020B0606030504020204" pitchFamily="34" charset="0"/>
-            </a:endParaRPr>
-          </a:p>
-          <a:p>
-            <a:pPr marL="457200" indent="-457200" algn="l">
-              <a:lnSpc>
-                <a:spcPct val="100000"/>
-              </a:lnSpc>
-              <a:buFont typeface="Arial" panose="020B0604020202020204" pitchFamily="34" charset="0"/>
-              <a:buChar char="•"/>
-            </a:pPr>
-            <a:r>
-              <a:rPr lang="en-AU" sz="1400" dirty="0">
-                <a:solidFill>
-                  <a:srgbClr val="111111"/>
-                </a:solidFill>
-                <a:latin typeface="Open Sans" panose="020B0606030504020204" pitchFamily="34" charset="0"/>
-                <a:ea typeface="Open Sans" panose="020B0606030504020204" pitchFamily="34" charset="0"/>
-                <a:cs typeface="Open Sans" panose="020B0606030504020204" pitchFamily="34" charset="0"/>
-              </a:rPr>
-              <a:t>Oliver, J., &amp; Snowden, E. [LastWeekTonight]. (2015, April 9). Last Week Tonight with John Oliver: Edward Snowden on Passwords. Retrieved May 6, 2015, from </a:t>
-            </a:r>
-            <a:r>
-              <a:rPr lang="en-AU" sz="1400" dirty="0">
-                <a:solidFill>
-                  <a:srgbClr val="111111"/>
-                </a:solidFill>
-                <a:latin typeface="Open Sans" panose="020B0606030504020204" pitchFamily="34" charset="0"/>
-                <a:ea typeface="Open Sans" panose="020B0606030504020204" pitchFamily="34" charset="0"/>
-                <a:cs typeface="Open Sans" panose="020B0606030504020204" pitchFamily="34" charset="0"/>
-                <a:hlinkClick r:id="rId11"/>
-              </a:rPr>
-              <a:t>https://</a:t>
-            </a:r>
-            <a:r>
-              <a:rPr lang="en-AU" sz="1400" dirty="0" smtClean="0">
-                <a:solidFill>
-                  <a:srgbClr val="111111"/>
-                </a:solidFill>
-                <a:latin typeface="Open Sans" panose="020B0606030504020204" pitchFamily="34" charset="0"/>
-                <a:ea typeface="Open Sans" panose="020B0606030504020204" pitchFamily="34" charset="0"/>
-                <a:cs typeface="Open Sans" panose="020B0606030504020204" pitchFamily="34" charset="0"/>
-                <a:hlinkClick r:id="rId11"/>
-              </a:rPr>
-              <a:t>www.youtube.com/watch?v=yzGzB-yYKcc</a:t>
-            </a:r>
-            <a:endParaRPr lang="en-AU" sz="1400" dirty="0" smtClean="0">
-              <a:solidFill>
-                <a:srgbClr val="111111"/>
-              </a:solidFill>
-              <a:latin typeface="Open Sans" panose="020B0606030504020204" pitchFamily="34" charset="0"/>
-              <a:ea typeface="Open Sans" panose="020B0606030504020204" pitchFamily="34" charset="0"/>
-              <a:cs typeface="Open Sans" panose="020B0606030504020204" pitchFamily="34" charset="0"/>
-            </a:endParaRPr>
-          </a:p>
-          <a:p>
-            <a:pPr marL="457200" indent="-457200" algn="l">
-              <a:lnSpc>
-                <a:spcPct val="100000"/>
-              </a:lnSpc>
-              <a:buFont typeface="Arial" panose="020B0604020202020204" pitchFamily="34" charset="0"/>
-              <a:buChar char="•"/>
-            </a:pPr>
-            <a:r>
-              <a:rPr lang="en-AU" sz="1400" dirty="0">
-                <a:solidFill>
-                  <a:srgbClr val="111111"/>
-                </a:solidFill>
-                <a:latin typeface="Open Sans" panose="020B0606030504020204" pitchFamily="34" charset="0"/>
-                <a:ea typeface="Open Sans" panose="020B0606030504020204" pitchFamily="34" charset="0"/>
-                <a:cs typeface="Open Sans" panose="020B0606030504020204" pitchFamily="34" charset="0"/>
-              </a:rPr>
-              <a:t>Scarfone, K., &amp; Souppaya, M. (2013). Guide to Enterprise Patch Management Technologies NIST Special Publication 800-40 Guide to Enterprise Patch Management Technologies. NIST. </a:t>
-            </a:r>
-            <a:r>
-              <a:rPr lang="en-AU" sz="1400" dirty="0" smtClean="0">
-                <a:solidFill>
-                  <a:srgbClr val="111111"/>
-                </a:solidFill>
-                <a:latin typeface="Open Sans" panose="020B0606030504020204" pitchFamily="34" charset="0"/>
-                <a:ea typeface="Open Sans" panose="020B0606030504020204" pitchFamily="34" charset="0"/>
-                <a:cs typeface="Open Sans" panose="020B0606030504020204" pitchFamily="34" charset="0"/>
-              </a:rPr>
-              <a:t>doi:10.6028/NIST.SP.800-40r3</a:t>
-            </a:r>
-          </a:p>
-          <a:p>
-            <a:pPr marL="457200" indent="-457200" algn="l">
-              <a:lnSpc>
-                <a:spcPct val="100000"/>
-              </a:lnSpc>
-              <a:buFont typeface="Arial" panose="020B0604020202020204" pitchFamily="34" charset="0"/>
-              <a:buChar char="•"/>
-            </a:pPr>
-            <a:r>
-              <a:rPr lang="en-AU" sz="1400" dirty="0">
-                <a:solidFill>
-                  <a:srgbClr val="111111"/>
-                </a:solidFill>
-                <a:latin typeface="Open Sans" panose="020B0606030504020204" pitchFamily="34" charset="0"/>
-                <a:ea typeface="Open Sans" panose="020B0606030504020204" pitchFamily="34" charset="0"/>
-                <a:cs typeface="Open Sans" panose="020B0606030504020204" pitchFamily="34" charset="0"/>
-              </a:rPr>
-              <a:t>Tice, K. [solarwindsinc]. (2012, September 12)  Patch Manager Guided Tour. Retrieved May 14, 2015, from </a:t>
-            </a:r>
-            <a:r>
-              <a:rPr lang="en-AU" sz="1400" dirty="0">
-                <a:solidFill>
-                  <a:srgbClr val="111111"/>
-                </a:solidFill>
-                <a:latin typeface="Open Sans" panose="020B0606030504020204" pitchFamily="34" charset="0"/>
-                <a:ea typeface="Open Sans" panose="020B0606030504020204" pitchFamily="34" charset="0"/>
-                <a:cs typeface="Open Sans" panose="020B0606030504020204" pitchFamily="34" charset="0"/>
-                <a:hlinkClick r:id="rId12"/>
-              </a:rPr>
-              <a:t>https://www.youtube.com/watch?v=-</a:t>
-            </a:r>
-            <a:r>
-              <a:rPr lang="en-AU" sz="1400" dirty="0" smtClean="0">
-                <a:solidFill>
-                  <a:srgbClr val="111111"/>
-                </a:solidFill>
-                <a:latin typeface="Open Sans" panose="020B0606030504020204" pitchFamily="34" charset="0"/>
-                <a:ea typeface="Open Sans" panose="020B0606030504020204" pitchFamily="34" charset="0"/>
-                <a:cs typeface="Open Sans" panose="020B0606030504020204" pitchFamily="34" charset="0"/>
-                <a:hlinkClick r:id="rId12"/>
-              </a:rPr>
-              <a:t>DldViUL1d0</a:t>
-            </a:r>
-            <a:endParaRPr lang="en-AU" sz="1400" dirty="0" smtClean="0">
-              <a:solidFill>
-                <a:srgbClr val="111111"/>
-              </a:solidFill>
-              <a:latin typeface="Open Sans" panose="020B0606030504020204" pitchFamily="34" charset="0"/>
-              <a:ea typeface="Open Sans" panose="020B0606030504020204" pitchFamily="34" charset="0"/>
-              <a:cs typeface="Open Sans" panose="020B0606030504020204" pitchFamily="34" charset="0"/>
-            </a:endParaRPr>
-          </a:p>
-          <a:p>
-            <a:pPr marL="457200" indent="-457200" algn="l">
-              <a:lnSpc>
-                <a:spcPct val="100000"/>
-              </a:lnSpc>
-              <a:buFont typeface="Arial" panose="020B0604020202020204" pitchFamily="34" charset="0"/>
-              <a:buChar char="•"/>
-            </a:pPr>
-            <a:endParaRPr lang="en-AU" sz="1400" dirty="0" smtClean="0">
-              <a:solidFill>
-                <a:srgbClr val="111111"/>
-              </a:solidFill>
-              <a:latin typeface="Open Sans" panose="020B0606030504020204" pitchFamily="34" charset="0"/>
-              <a:ea typeface="Open Sans" panose="020B0606030504020204" pitchFamily="34" charset="0"/>
-              <a:cs typeface="Open Sans" panose="020B0606030504020204" pitchFamily="34" charset="0"/>
-            </a:endParaRPr>
+              <a:rPr lang="en-AU" sz="2600" dirty="0" smtClean="0">
+                <a:solidFill>
+                  <a:srgbClr val="111111"/>
+                </a:solidFill>
+                <a:latin typeface="Open Sans" panose="020B0606030504020204" pitchFamily="34" charset="0"/>
+                <a:ea typeface="Open Sans" panose="020B0606030504020204" pitchFamily="34" charset="0"/>
+                <a:cs typeface="Open Sans" panose="020B0606030504020204" pitchFamily="34" charset="0"/>
+              </a:rPr>
+              <a:t>Logs events</a:t>
+            </a:r>
           </a:p>
         </p:txBody>
       </p:sp>
     </p:spTree>
     <p:extLst>
       <p:ext uri="{BB962C8B-B14F-4D97-AF65-F5344CB8AC3E}">
-        <p14:creationId xmlns:p14="http://schemas.microsoft.com/office/powerpoint/2010/main" val="636747076"/>
+        <p14:creationId xmlns:p14="http://schemas.microsoft.com/office/powerpoint/2010/main" val="402785050"/>
       </p:ext>
     </p:extLst>
   </p:cSld>
@@ -12469,6 +11696,839 @@
         </p:nvSpPr>
         <p:spPr>
           <a:xfrm>
+            <a:off x="338667" y="1"/>
+            <a:ext cx="9144000" cy="970843"/>
+          </a:xfrm>
+        </p:spPr>
+        <p:txBody>
+          <a:bodyPr anchor="b">
+            <a:normAutofit/>
+          </a:bodyPr>
+          <a:lstStyle/>
+          <a:p>
+            <a:pPr algn="l"/>
+            <a:r>
+              <a:rPr lang="en-AU" sz="3600" b="1" dirty="0" smtClean="0">
+                <a:solidFill>
+                  <a:srgbClr val="111111"/>
+                </a:solidFill>
+                <a:latin typeface="Open Sans" panose="020B0606030504020204" pitchFamily="34" charset="0"/>
+                <a:ea typeface="Open Sans" panose="020B0606030504020204" pitchFamily="34" charset="0"/>
+                <a:cs typeface="Open Sans" panose="020B0606030504020204" pitchFamily="34" charset="0"/>
+              </a:rPr>
+              <a:t>References</a:t>
+            </a:r>
+            <a:endParaRPr lang="en-AU" sz="3600" dirty="0">
+              <a:solidFill>
+                <a:srgbClr val="111111"/>
+              </a:solidFill>
+              <a:latin typeface="Open Sans" panose="020B0606030504020204" pitchFamily="34" charset="0"/>
+              <a:ea typeface="Open Sans" panose="020B0606030504020204" pitchFamily="34" charset="0"/>
+              <a:cs typeface="Open Sans" panose="020B0606030504020204" pitchFamily="34" charset="0"/>
+            </a:endParaRPr>
+          </a:p>
+        </p:txBody>
+      </p:sp>
+      <p:sp>
+        <p:nvSpPr>
+          <p:cNvPr id="5" name="Title 3"/>
+          <p:cNvSpPr txBox="1">
+            <a:spLocks/>
+          </p:cNvSpPr>
+          <p:nvPr/>
+        </p:nvSpPr>
+        <p:spPr>
+          <a:xfrm>
+            <a:off x="338667" y="1196622"/>
+            <a:ext cx="11514666" cy="5113867"/>
+          </a:xfrm>
+          <a:prstGeom prst="rect">
+            <a:avLst/>
+          </a:prstGeom>
+        </p:spPr>
+        <p:txBody>
+          <a:bodyPr vert="horz" lIns="91440" tIns="45720" rIns="91440" bIns="45720" rtlCol="0" anchor="t">
+            <a:normAutofit lnSpcReduction="10000"/>
+          </a:bodyPr>
+          <a:lstStyle>
+            <a:lvl1pPr algn="ctr" defTabSz="914400" rtl="0" eaLnBrk="1" latinLnBrk="0" hangingPunct="1">
+              <a:lnSpc>
+                <a:spcPct val="90000"/>
+              </a:lnSpc>
+              <a:spcBef>
+                <a:spcPct val="0"/>
+              </a:spcBef>
+              <a:buNone/>
+              <a:defRPr sz="6000" kern="1200">
+                <a:solidFill>
+                  <a:schemeClr val="tx1"/>
+                </a:solidFill>
+                <a:latin typeface="+mj-lt"/>
+                <a:ea typeface="+mj-ea"/>
+                <a:cs typeface="+mj-cs"/>
+              </a:defRPr>
+            </a:lvl1pPr>
+          </a:lstStyle>
+          <a:p>
+            <a:pPr marL="457200" indent="-457200" algn="l">
+              <a:lnSpc>
+                <a:spcPct val="100000"/>
+              </a:lnSpc>
+              <a:buFont typeface="Arial" panose="020B0604020202020204" pitchFamily="34" charset="0"/>
+              <a:buChar char="•"/>
+            </a:pPr>
+            <a:r>
+              <a:rPr lang="en-AU" sz="1400" dirty="0">
+                <a:solidFill>
+                  <a:srgbClr val="111111"/>
+                </a:solidFill>
+                <a:latin typeface="Open Sans" panose="020B0606030504020204" pitchFamily="34" charset="0"/>
+                <a:ea typeface="Open Sans" panose="020B0606030504020204" pitchFamily="34" charset="0"/>
+                <a:cs typeface="Open Sans" panose="020B0606030504020204" pitchFamily="34" charset="0"/>
+              </a:rPr>
+              <a:t>Baker, W. H., Hylender, C. D., &amp; Valentine, J. A. (2008). 2008 Data Breach Investigations Report, 1–29</a:t>
+            </a:r>
+            <a:r>
+              <a:rPr lang="en-AU" sz="1400" dirty="0" smtClean="0">
+                <a:solidFill>
+                  <a:srgbClr val="111111"/>
+                </a:solidFill>
+                <a:latin typeface="Open Sans" panose="020B0606030504020204" pitchFamily="34" charset="0"/>
+                <a:ea typeface="Open Sans" panose="020B0606030504020204" pitchFamily="34" charset="0"/>
+                <a:cs typeface="Open Sans" panose="020B0606030504020204" pitchFamily="34" charset="0"/>
+              </a:rPr>
+              <a:t>.</a:t>
+            </a:r>
+          </a:p>
+          <a:p>
+            <a:pPr marL="457200" indent="-457200" algn="l">
+              <a:lnSpc>
+                <a:spcPct val="100000"/>
+              </a:lnSpc>
+              <a:buFont typeface="Arial" panose="020B0604020202020204" pitchFamily="34" charset="0"/>
+              <a:buChar char="•"/>
+            </a:pPr>
+            <a:r>
+              <a:rPr lang="en-AU" sz="1400" dirty="0">
+                <a:solidFill>
+                  <a:srgbClr val="111111"/>
+                </a:solidFill>
+                <a:latin typeface="Open Sans" panose="020B0606030504020204" pitchFamily="34" charset="0"/>
+                <a:ea typeface="Open Sans" panose="020B0606030504020204" pitchFamily="34" charset="0"/>
+                <a:cs typeface="Open Sans" panose="020B0606030504020204" pitchFamily="34" charset="0"/>
+              </a:rPr>
+              <a:t>Goodin, D. (2014). Stanford’s password policy shuns one-size-fits-all security | Ars Technica. Ars Technica. Retrieved April 30, 2015, from </a:t>
+            </a:r>
+            <a:r>
+              <a:rPr lang="en-AU" sz="1400" dirty="0">
+                <a:solidFill>
+                  <a:srgbClr val="111111"/>
+                </a:solidFill>
+                <a:latin typeface="Open Sans" panose="020B0606030504020204" pitchFamily="34" charset="0"/>
+                <a:ea typeface="Open Sans" panose="020B0606030504020204" pitchFamily="34" charset="0"/>
+                <a:cs typeface="Open Sans" panose="020B0606030504020204" pitchFamily="34" charset="0"/>
+                <a:hlinkClick r:id="rId2"/>
+              </a:rPr>
+              <a:t>http://arstechnica.com/security/2014/04/25/stanfords-password-policy-shuns-one-size-fits-all-security</a:t>
+            </a:r>
+            <a:r>
+              <a:rPr lang="en-AU" sz="1400" dirty="0" smtClean="0">
+                <a:solidFill>
+                  <a:srgbClr val="111111"/>
+                </a:solidFill>
+                <a:latin typeface="Open Sans" panose="020B0606030504020204" pitchFamily="34" charset="0"/>
+                <a:ea typeface="Open Sans" panose="020B0606030504020204" pitchFamily="34" charset="0"/>
+                <a:cs typeface="Open Sans" panose="020B0606030504020204" pitchFamily="34" charset="0"/>
+                <a:hlinkClick r:id="rId2"/>
+              </a:rPr>
+              <a:t>/</a:t>
+            </a:r>
+            <a:endParaRPr lang="en-AU" sz="1400" dirty="0" smtClean="0">
+              <a:solidFill>
+                <a:srgbClr val="111111"/>
+              </a:solidFill>
+              <a:latin typeface="Open Sans" panose="020B0606030504020204" pitchFamily="34" charset="0"/>
+              <a:ea typeface="Open Sans" panose="020B0606030504020204" pitchFamily="34" charset="0"/>
+              <a:cs typeface="Open Sans" panose="020B0606030504020204" pitchFamily="34" charset="0"/>
+            </a:endParaRPr>
+          </a:p>
+          <a:p>
+            <a:pPr marL="457200" indent="-457200" algn="l">
+              <a:lnSpc>
+                <a:spcPct val="100000"/>
+              </a:lnSpc>
+              <a:buFont typeface="Arial" panose="020B0604020202020204" pitchFamily="34" charset="0"/>
+              <a:buChar char="•"/>
+            </a:pPr>
+            <a:r>
+              <a:rPr lang="en-AU" sz="1400" dirty="0">
+                <a:solidFill>
+                  <a:srgbClr val="111111"/>
+                </a:solidFill>
+                <a:latin typeface="Open Sans" panose="020B0606030504020204" pitchFamily="34" charset="0"/>
+                <a:ea typeface="Open Sans" panose="020B0606030504020204" pitchFamily="34" charset="0"/>
+                <a:cs typeface="Open Sans" panose="020B0606030504020204" pitchFamily="34" charset="0"/>
+              </a:rPr>
+              <a:t>Machkovech, S. (2015). Hacked French network exposed its own passwords during TV interview | Ars Technica. Ars Technica. Retrieved May 6, 2015, from </a:t>
+            </a:r>
+            <a:r>
+              <a:rPr lang="en-AU" sz="1400" dirty="0">
+                <a:solidFill>
+                  <a:srgbClr val="111111"/>
+                </a:solidFill>
+                <a:latin typeface="Open Sans" panose="020B0606030504020204" pitchFamily="34" charset="0"/>
+                <a:ea typeface="Open Sans" panose="020B0606030504020204" pitchFamily="34" charset="0"/>
+                <a:cs typeface="Open Sans" panose="020B0606030504020204" pitchFamily="34" charset="0"/>
+                <a:hlinkClick r:id="rId3"/>
+              </a:rPr>
+              <a:t>http://arstechnica.com/security/2015/04/09/hacked-french-network-exposed-its-own-passwords-during-tv-interview</a:t>
+            </a:r>
+            <a:r>
+              <a:rPr lang="en-AU" sz="1400" dirty="0" smtClean="0">
+                <a:solidFill>
+                  <a:srgbClr val="111111"/>
+                </a:solidFill>
+                <a:latin typeface="Open Sans" panose="020B0606030504020204" pitchFamily="34" charset="0"/>
+                <a:ea typeface="Open Sans" panose="020B0606030504020204" pitchFamily="34" charset="0"/>
+                <a:cs typeface="Open Sans" panose="020B0606030504020204" pitchFamily="34" charset="0"/>
+                <a:hlinkClick r:id="rId3"/>
+              </a:rPr>
+              <a:t>/</a:t>
+            </a:r>
+            <a:endParaRPr lang="en-AU" sz="1400" dirty="0" smtClean="0">
+              <a:solidFill>
+                <a:srgbClr val="111111"/>
+              </a:solidFill>
+              <a:latin typeface="Open Sans" panose="020B0606030504020204" pitchFamily="34" charset="0"/>
+              <a:ea typeface="Open Sans" panose="020B0606030504020204" pitchFamily="34" charset="0"/>
+              <a:cs typeface="Open Sans" panose="020B0606030504020204" pitchFamily="34" charset="0"/>
+            </a:endParaRPr>
+          </a:p>
+          <a:p>
+            <a:pPr marL="457200" indent="-457200" algn="l">
+              <a:lnSpc>
+                <a:spcPct val="100000"/>
+              </a:lnSpc>
+              <a:buFont typeface="Arial" panose="020B0604020202020204" pitchFamily="34" charset="0"/>
+              <a:buChar char="•"/>
+            </a:pPr>
+            <a:r>
+              <a:rPr lang="en-AU" sz="1400" dirty="0">
+                <a:solidFill>
+                  <a:srgbClr val="111111"/>
+                </a:solidFill>
+                <a:latin typeface="Open Sans" panose="020B0606030504020204" pitchFamily="34" charset="0"/>
+                <a:ea typeface="Open Sans" panose="020B0606030504020204" pitchFamily="34" charset="0"/>
+                <a:cs typeface="Open Sans" panose="020B0606030504020204" pitchFamily="34" charset="0"/>
+              </a:rPr>
+              <a:t>Microsoft. (</a:t>
+            </a:r>
+            <a:r>
+              <a:rPr lang="en-AU" sz="1400" dirty="0" smtClean="0">
+                <a:solidFill>
+                  <a:srgbClr val="111111"/>
+                </a:solidFill>
+                <a:latin typeface="Open Sans" panose="020B0606030504020204" pitchFamily="34" charset="0"/>
+                <a:ea typeface="Open Sans" panose="020B0606030504020204" pitchFamily="34" charset="0"/>
+                <a:cs typeface="Open Sans" panose="020B0606030504020204" pitchFamily="34" charset="0"/>
+              </a:rPr>
+              <a:t>2005a). </a:t>
+            </a:r>
+            <a:r>
+              <a:rPr lang="en-AU" sz="1400" dirty="0">
+                <a:solidFill>
+                  <a:srgbClr val="111111"/>
+                </a:solidFill>
+                <a:latin typeface="Open Sans" panose="020B0606030504020204" pitchFamily="34" charset="0"/>
+                <a:ea typeface="Open Sans" panose="020B0606030504020204" pitchFamily="34" charset="0"/>
+                <a:cs typeface="Open Sans" panose="020B0606030504020204" pitchFamily="34" charset="0"/>
+              </a:rPr>
+              <a:t>Apply or modify password policy: Logon and Authentication. Retrieved May 14, 2015, from </a:t>
+            </a:r>
+            <a:r>
+              <a:rPr lang="en-AU" sz="1400" dirty="0">
+                <a:solidFill>
+                  <a:srgbClr val="111111"/>
+                </a:solidFill>
+                <a:latin typeface="Open Sans" panose="020B0606030504020204" pitchFamily="34" charset="0"/>
+                <a:ea typeface="Open Sans" panose="020B0606030504020204" pitchFamily="34" charset="0"/>
+                <a:cs typeface="Open Sans" panose="020B0606030504020204" pitchFamily="34" charset="0"/>
+                <a:hlinkClick r:id="rId4"/>
+              </a:rPr>
+              <a:t>https://technet.microsoft.com/en-au/library/cc781633(v=ws.10).aspx?f=255&amp;MSPPError=-</a:t>
+            </a:r>
+            <a:r>
+              <a:rPr lang="en-AU" sz="1400" dirty="0" smtClean="0">
+                <a:solidFill>
+                  <a:srgbClr val="111111"/>
+                </a:solidFill>
+                <a:latin typeface="Open Sans" panose="020B0606030504020204" pitchFamily="34" charset="0"/>
+                <a:ea typeface="Open Sans" panose="020B0606030504020204" pitchFamily="34" charset="0"/>
+                <a:cs typeface="Open Sans" panose="020B0606030504020204" pitchFamily="34" charset="0"/>
+                <a:hlinkClick r:id="rId4"/>
+              </a:rPr>
+              <a:t>2147217396#BKMK_3</a:t>
+            </a:r>
+            <a:endParaRPr lang="en-AU" sz="1400" dirty="0" smtClean="0">
+              <a:solidFill>
+                <a:srgbClr val="111111"/>
+              </a:solidFill>
+              <a:latin typeface="Open Sans" panose="020B0606030504020204" pitchFamily="34" charset="0"/>
+              <a:ea typeface="Open Sans" panose="020B0606030504020204" pitchFamily="34" charset="0"/>
+              <a:cs typeface="Open Sans" panose="020B0606030504020204" pitchFamily="34" charset="0"/>
+            </a:endParaRPr>
+          </a:p>
+          <a:p>
+            <a:pPr marL="457200" indent="-457200" algn="l">
+              <a:lnSpc>
+                <a:spcPct val="100000"/>
+              </a:lnSpc>
+              <a:buFont typeface="Arial" panose="020B0604020202020204" pitchFamily="34" charset="0"/>
+              <a:buChar char="•"/>
+            </a:pPr>
+            <a:r>
+              <a:rPr lang="en-AU" sz="1400" dirty="0">
+                <a:solidFill>
+                  <a:srgbClr val="111111"/>
+                </a:solidFill>
+                <a:latin typeface="Open Sans" panose="020B0606030504020204" pitchFamily="34" charset="0"/>
+                <a:ea typeface="Open Sans" panose="020B0606030504020204" pitchFamily="34" charset="0"/>
+                <a:cs typeface="Open Sans" panose="020B0606030504020204" pitchFamily="34" charset="0"/>
+              </a:rPr>
+              <a:t>Microsoft. (</a:t>
+            </a:r>
+            <a:r>
+              <a:rPr lang="en-AU" sz="1400" dirty="0" smtClean="0">
+                <a:solidFill>
+                  <a:srgbClr val="111111"/>
+                </a:solidFill>
+                <a:latin typeface="Open Sans" panose="020B0606030504020204" pitchFamily="34" charset="0"/>
+                <a:ea typeface="Open Sans" panose="020B0606030504020204" pitchFamily="34" charset="0"/>
+                <a:cs typeface="Open Sans" panose="020B0606030504020204" pitchFamily="34" charset="0"/>
+              </a:rPr>
+              <a:t>2005b). </a:t>
+            </a:r>
+            <a:r>
+              <a:rPr lang="en-AU" sz="1400" dirty="0">
+                <a:solidFill>
+                  <a:srgbClr val="111111"/>
+                </a:solidFill>
+                <a:latin typeface="Open Sans" panose="020B0606030504020204" pitchFamily="34" charset="0"/>
+                <a:ea typeface="Open Sans" panose="020B0606030504020204" pitchFamily="34" charset="0"/>
+                <a:cs typeface="Open Sans" panose="020B0606030504020204" pitchFamily="34" charset="0"/>
+              </a:rPr>
+              <a:t>Assign user rights to a group in Active Directory: Active Directory. Retrieved May 14, 2015, from </a:t>
+            </a:r>
+            <a:r>
+              <a:rPr lang="en-AU" sz="1400" dirty="0">
+                <a:solidFill>
+                  <a:srgbClr val="111111"/>
+                </a:solidFill>
+                <a:latin typeface="Open Sans" panose="020B0606030504020204" pitchFamily="34" charset="0"/>
+                <a:ea typeface="Open Sans" panose="020B0606030504020204" pitchFamily="34" charset="0"/>
+                <a:cs typeface="Open Sans" panose="020B0606030504020204" pitchFamily="34" charset="0"/>
+                <a:hlinkClick r:id="rId5"/>
+              </a:rPr>
+              <a:t>https://technet.microsoft.com/en-au/library/cc786658(v=ws.10).</a:t>
+            </a:r>
+            <a:r>
+              <a:rPr lang="en-AU" sz="1400" dirty="0" smtClean="0">
+                <a:solidFill>
+                  <a:srgbClr val="111111"/>
+                </a:solidFill>
+                <a:latin typeface="Open Sans" panose="020B0606030504020204" pitchFamily="34" charset="0"/>
+                <a:ea typeface="Open Sans" panose="020B0606030504020204" pitchFamily="34" charset="0"/>
+                <a:cs typeface="Open Sans" panose="020B0606030504020204" pitchFamily="34" charset="0"/>
+                <a:hlinkClick r:id="rId5"/>
+              </a:rPr>
+              <a:t>aspx</a:t>
+            </a:r>
+            <a:endParaRPr lang="en-AU" sz="1400" dirty="0" smtClean="0">
+              <a:solidFill>
+                <a:srgbClr val="111111"/>
+              </a:solidFill>
+              <a:latin typeface="Open Sans" panose="020B0606030504020204" pitchFamily="34" charset="0"/>
+              <a:ea typeface="Open Sans" panose="020B0606030504020204" pitchFamily="34" charset="0"/>
+              <a:cs typeface="Open Sans" panose="020B0606030504020204" pitchFamily="34" charset="0"/>
+            </a:endParaRPr>
+          </a:p>
+          <a:p>
+            <a:pPr marL="457200" indent="-457200" algn="l">
+              <a:lnSpc>
+                <a:spcPct val="100000"/>
+              </a:lnSpc>
+              <a:buFont typeface="Arial" panose="020B0604020202020204" pitchFamily="34" charset="0"/>
+              <a:buChar char="•"/>
+            </a:pPr>
+            <a:r>
+              <a:rPr lang="en-AU" sz="1400" dirty="0" smtClean="0">
+                <a:solidFill>
+                  <a:srgbClr val="111111"/>
+                </a:solidFill>
+                <a:latin typeface="Open Sans" panose="020B0606030504020204" pitchFamily="34" charset="0"/>
+                <a:ea typeface="Open Sans" panose="020B0606030504020204" pitchFamily="34" charset="0"/>
+                <a:cs typeface="Open Sans" panose="020B0606030504020204" pitchFamily="34" charset="0"/>
+              </a:rPr>
+              <a:t>Microsoft</a:t>
+            </a:r>
+            <a:r>
+              <a:rPr lang="en-AU" sz="1400" dirty="0">
+                <a:solidFill>
+                  <a:srgbClr val="111111"/>
+                </a:solidFill>
+                <a:latin typeface="Open Sans" panose="020B0606030504020204" pitchFamily="34" charset="0"/>
+                <a:ea typeface="Open Sans" panose="020B0606030504020204" pitchFamily="34" charset="0"/>
+                <a:cs typeface="Open Sans" panose="020B0606030504020204" pitchFamily="34" charset="0"/>
+              </a:rPr>
+              <a:t>. (2007). Configure UAC settings via policy - Microsoft Reduce Customer Effort Center - Site Home - TechNet Blogs. Retrieved May 14, 2015, from </a:t>
+            </a:r>
+            <a:r>
+              <a:rPr lang="en-AU" sz="1400" dirty="0">
+                <a:solidFill>
+                  <a:srgbClr val="111111"/>
+                </a:solidFill>
+                <a:latin typeface="Open Sans" panose="020B0606030504020204" pitchFamily="34" charset="0"/>
+                <a:ea typeface="Open Sans" panose="020B0606030504020204" pitchFamily="34" charset="0"/>
+                <a:cs typeface="Open Sans" panose="020B0606030504020204" pitchFamily="34" charset="0"/>
+                <a:hlinkClick r:id="rId6"/>
+              </a:rPr>
+              <a:t>http://</a:t>
+            </a:r>
+            <a:r>
+              <a:rPr lang="en-AU" sz="1400" dirty="0" smtClean="0">
+                <a:solidFill>
+                  <a:srgbClr val="111111"/>
+                </a:solidFill>
+                <a:latin typeface="Open Sans" panose="020B0606030504020204" pitchFamily="34" charset="0"/>
+                <a:ea typeface="Open Sans" panose="020B0606030504020204" pitchFamily="34" charset="0"/>
+                <a:cs typeface="Open Sans" panose="020B0606030504020204" pitchFamily="34" charset="0"/>
+                <a:hlinkClick r:id="rId6"/>
+              </a:rPr>
+              <a:t>blogs.technet.com/b/asiasupp/archive/2007/02/08/configure-uac-settings-via-policy.aspx</a:t>
+            </a:r>
+            <a:endParaRPr lang="en-AU" sz="1400" dirty="0" smtClean="0">
+              <a:solidFill>
+                <a:srgbClr val="111111"/>
+              </a:solidFill>
+              <a:latin typeface="Open Sans" panose="020B0606030504020204" pitchFamily="34" charset="0"/>
+              <a:ea typeface="Open Sans" panose="020B0606030504020204" pitchFamily="34" charset="0"/>
+              <a:cs typeface="Open Sans" panose="020B0606030504020204" pitchFamily="34" charset="0"/>
+            </a:endParaRPr>
+          </a:p>
+          <a:p>
+            <a:pPr marL="457200" indent="-457200" algn="l">
+              <a:lnSpc>
+                <a:spcPct val="100000"/>
+              </a:lnSpc>
+              <a:buFont typeface="Arial" panose="020B0604020202020204" pitchFamily="34" charset="0"/>
+              <a:buChar char="•"/>
+            </a:pPr>
+            <a:r>
+              <a:rPr lang="en-AU" sz="1400" dirty="0">
+                <a:solidFill>
+                  <a:srgbClr val="111111"/>
+                </a:solidFill>
+                <a:latin typeface="Open Sans" panose="020B0606030504020204" pitchFamily="34" charset="0"/>
+                <a:ea typeface="Open Sans" panose="020B0606030504020204" pitchFamily="34" charset="0"/>
+                <a:cs typeface="Open Sans" panose="020B0606030504020204" pitchFamily="34" charset="0"/>
+              </a:rPr>
+              <a:t>Microsoft. (2012). Password must meet complexity requirements. Retrieved May 14, 2015, from </a:t>
+            </a:r>
+            <a:r>
+              <a:rPr lang="en-AU" sz="1400" dirty="0">
+                <a:solidFill>
+                  <a:srgbClr val="111111"/>
+                </a:solidFill>
+                <a:latin typeface="Open Sans" panose="020B0606030504020204" pitchFamily="34" charset="0"/>
+                <a:ea typeface="Open Sans" panose="020B0606030504020204" pitchFamily="34" charset="0"/>
+                <a:cs typeface="Open Sans" panose="020B0606030504020204" pitchFamily="34" charset="0"/>
+                <a:hlinkClick r:id="rId7"/>
+              </a:rPr>
+              <a:t>https://technet.microsoft.com/en-us/library/hh994562(v=ws.10).</a:t>
+            </a:r>
+            <a:r>
+              <a:rPr lang="en-AU" sz="1400" dirty="0" smtClean="0">
+                <a:solidFill>
+                  <a:srgbClr val="111111"/>
+                </a:solidFill>
+                <a:latin typeface="Open Sans" panose="020B0606030504020204" pitchFamily="34" charset="0"/>
+                <a:ea typeface="Open Sans" panose="020B0606030504020204" pitchFamily="34" charset="0"/>
+                <a:cs typeface="Open Sans" panose="020B0606030504020204" pitchFamily="34" charset="0"/>
+                <a:hlinkClick r:id="rId7"/>
+              </a:rPr>
+              <a:t>aspx</a:t>
+            </a:r>
+            <a:endParaRPr lang="en-AU" sz="1400" dirty="0" smtClean="0">
+              <a:solidFill>
+                <a:srgbClr val="111111"/>
+              </a:solidFill>
+              <a:latin typeface="Open Sans" panose="020B0606030504020204" pitchFamily="34" charset="0"/>
+              <a:ea typeface="Open Sans" panose="020B0606030504020204" pitchFamily="34" charset="0"/>
+              <a:cs typeface="Open Sans" panose="020B0606030504020204" pitchFamily="34" charset="0"/>
+            </a:endParaRPr>
+          </a:p>
+          <a:p>
+            <a:pPr marL="457200" indent="-457200" algn="l">
+              <a:lnSpc>
+                <a:spcPct val="100000"/>
+              </a:lnSpc>
+              <a:buFont typeface="Arial" panose="020B0604020202020204" pitchFamily="34" charset="0"/>
+              <a:buChar char="•"/>
+            </a:pPr>
+            <a:r>
+              <a:rPr lang="en-AU" sz="1400" dirty="0">
+                <a:solidFill>
+                  <a:srgbClr val="111111"/>
+                </a:solidFill>
+                <a:latin typeface="Open Sans" panose="020B0606030504020204" pitchFamily="34" charset="0"/>
+                <a:ea typeface="Open Sans" panose="020B0606030504020204" pitchFamily="34" charset="0"/>
+                <a:cs typeface="Open Sans" panose="020B0606030504020204" pitchFamily="34" charset="0"/>
+              </a:rPr>
+              <a:t>Microsoft. (n.d.-a). Screen Saver timeout. Retrieved May 14, 2015, from </a:t>
+            </a:r>
+            <a:r>
+              <a:rPr lang="en-AU" sz="1400" dirty="0">
+                <a:solidFill>
+                  <a:srgbClr val="111111"/>
+                </a:solidFill>
+                <a:latin typeface="Open Sans" panose="020B0606030504020204" pitchFamily="34" charset="0"/>
+                <a:ea typeface="Open Sans" panose="020B0606030504020204" pitchFamily="34" charset="0"/>
+                <a:cs typeface="Open Sans" panose="020B0606030504020204" pitchFamily="34" charset="0"/>
+                <a:hlinkClick r:id="rId8"/>
+              </a:rPr>
+              <a:t>https://</a:t>
+            </a:r>
+            <a:r>
+              <a:rPr lang="en-AU" sz="1400" dirty="0" smtClean="0">
+                <a:solidFill>
+                  <a:srgbClr val="111111"/>
+                </a:solidFill>
+                <a:latin typeface="Open Sans" panose="020B0606030504020204" pitchFamily="34" charset="0"/>
+                <a:ea typeface="Open Sans" panose="020B0606030504020204" pitchFamily="34" charset="0"/>
+                <a:cs typeface="Open Sans" panose="020B0606030504020204" pitchFamily="34" charset="0"/>
+                <a:hlinkClick r:id="rId8"/>
+              </a:rPr>
+              <a:t>technet.microsoft.com/en-us/library/cc961876.aspx</a:t>
+            </a:r>
+            <a:endParaRPr lang="en-AU" sz="1400" dirty="0" smtClean="0">
+              <a:solidFill>
+                <a:srgbClr val="111111"/>
+              </a:solidFill>
+              <a:latin typeface="Open Sans" panose="020B0606030504020204" pitchFamily="34" charset="0"/>
+              <a:ea typeface="Open Sans" panose="020B0606030504020204" pitchFamily="34" charset="0"/>
+              <a:cs typeface="Open Sans" panose="020B0606030504020204" pitchFamily="34" charset="0"/>
+            </a:endParaRPr>
+          </a:p>
+          <a:p>
+            <a:pPr marL="457200" indent="-457200" algn="l">
+              <a:lnSpc>
+                <a:spcPct val="100000"/>
+              </a:lnSpc>
+              <a:buFont typeface="Arial" panose="020B0604020202020204" pitchFamily="34" charset="0"/>
+              <a:buChar char="•"/>
+            </a:pPr>
+            <a:r>
+              <a:rPr lang="en-AU" sz="1400" dirty="0">
+                <a:solidFill>
+                  <a:srgbClr val="111111"/>
+                </a:solidFill>
+                <a:latin typeface="Open Sans" panose="020B0606030504020204" pitchFamily="34" charset="0"/>
+                <a:ea typeface="Open Sans" panose="020B0606030504020204" pitchFamily="34" charset="0"/>
+                <a:cs typeface="Open Sans" panose="020B0606030504020204" pitchFamily="34" charset="0"/>
+              </a:rPr>
+              <a:t>Microsoft. (n.d.-b). What is User Account Control? - Windows Help. Retrieved March 14, 2015, from </a:t>
+            </a:r>
+            <a:r>
+              <a:rPr lang="en-AU" sz="1400" dirty="0">
+                <a:solidFill>
+                  <a:srgbClr val="111111"/>
+                </a:solidFill>
+                <a:latin typeface="Open Sans" panose="020B0606030504020204" pitchFamily="34" charset="0"/>
+                <a:ea typeface="Open Sans" panose="020B0606030504020204" pitchFamily="34" charset="0"/>
+                <a:cs typeface="Open Sans" panose="020B0606030504020204" pitchFamily="34" charset="0"/>
+                <a:hlinkClick r:id="rId9"/>
+              </a:rPr>
+              <a:t>http://</a:t>
+            </a:r>
+            <a:r>
+              <a:rPr lang="en-AU" sz="1400" dirty="0" smtClean="0">
+                <a:solidFill>
+                  <a:srgbClr val="111111"/>
+                </a:solidFill>
+                <a:latin typeface="Open Sans" panose="020B0606030504020204" pitchFamily="34" charset="0"/>
+                <a:ea typeface="Open Sans" panose="020B0606030504020204" pitchFamily="34" charset="0"/>
+                <a:cs typeface="Open Sans" panose="020B0606030504020204" pitchFamily="34" charset="0"/>
+                <a:hlinkClick r:id="rId9"/>
+              </a:rPr>
+              <a:t>windows.microsoft.com/en-au/windows/what-is-user-account-control#1TC=windows-vista</a:t>
+            </a:r>
+            <a:endParaRPr lang="en-AU" sz="1400" dirty="0" smtClean="0">
+              <a:solidFill>
+                <a:srgbClr val="111111"/>
+              </a:solidFill>
+              <a:latin typeface="Open Sans" panose="020B0606030504020204" pitchFamily="34" charset="0"/>
+              <a:ea typeface="Open Sans" panose="020B0606030504020204" pitchFamily="34" charset="0"/>
+              <a:cs typeface="Open Sans" panose="020B0606030504020204" pitchFamily="34" charset="0"/>
+            </a:endParaRPr>
+          </a:p>
+          <a:p>
+            <a:pPr marL="457200" indent="-457200" algn="l">
+              <a:lnSpc>
+                <a:spcPct val="100000"/>
+              </a:lnSpc>
+              <a:buFont typeface="Arial" panose="020B0604020202020204" pitchFamily="34" charset="0"/>
+              <a:buChar char="•"/>
+            </a:pPr>
+            <a:r>
+              <a:rPr lang="en-AU" sz="1400" dirty="0">
+                <a:solidFill>
+                  <a:srgbClr val="111111"/>
+                </a:solidFill>
+                <a:latin typeface="Open Sans" panose="020B0606030504020204" pitchFamily="34" charset="0"/>
+                <a:ea typeface="Open Sans" panose="020B0606030504020204" pitchFamily="34" charset="0"/>
+                <a:cs typeface="Open Sans" panose="020B0606030504020204" pitchFamily="34" charset="0"/>
+              </a:rPr>
+              <a:t>O’Connor, E. (2008). BigAdmin Feature Article: Patch Management Best Practices. Retrieved May 13, 2015, from </a:t>
+            </a:r>
+            <a:r>
+              <a:rPr lang="en-AU" sz="1400" dirty="0">
+                <a:solidFill>
+                  <a:srgbClr val="111111"/>
+                </a:solidFill>
+                <a:latin typeface="Open Sans" panose="020B0606030504020204" pitchFamily="34" charset="0"/>
+                <a:ea typeface="Open Sans" panose="020B0606030504020204" pitchFamily="34" charset="0"/>
+                <a:cs typeface="Open Sans" panose="020B0606030504020204" pitchFamily="34" charset="0"/>
+                <a:hlinkClick r:id="rId10"/>
+              </a:rPr>
+              <a:t>http://</a:t>
+            </a:r>
+            <a:r>
+              <a:rPr lang="en-AU" sz="1400" dirty="0" smtClean="0">
+                <a:solidFill>
+                  <a:srgbClr val="111111"/>
+                </a:solidFill>
+                <a:latin typeface="Open Sans" panose="020B0606030504020204" pitchFamily="34" charset="0"/>
+                <a:ea typeface="Open Sans" panose="020B0606030504020204" pitchFamily="34" charset="0"/>
+                <a:cs typeface="Open Sans" panose="020B0606030504020204" pitchFamily="34" charset="0"/>
+                <a:hlinkClick r:id="rId10"/>
+              </a:rPr>
+              <a:t>www.oracle.com/technetwork/systems/articles/patch-management-jsp-135385.html</a:t>
+            </a:r>
+            <a:endParaRPr lang="en-AU" sz="1400" dirty="0" smtClean="0">
+              <a:solidFill>
+                <a:srgbClr val="111111"/>
+              </a:solidFill>
+              <a:latin typeface="Open Sans" panose="020B0606030504020204" pitchFamily="34" charset="0"/>
+              <a:ea typeface="Open Sans" panose="020B0606030504020204" pitchFamily="34" charset="0"/>
+              <a:cs typeface="Open Sans" panose="020B0606030504020204" pitchFamily="34" charset="0"/>
+            </a:endParaRPr>
+          </a:p>
+          <a:p>
+            <a:pPr marL="457200" indent="-457200" algn="l">
+              <a:lnSpc>
+                <a:spcPct val="100000"/>
+              </a:lnSpc>
+              <a:buFont typeface="Arial" panose="020B0604020202020204" pitchFamily="34" charset="0"/>
+              <a:buChar char="•"/>
+            </a:pPr>
+            <a:r>
+              <a:rPr lang="en-AU" sz="1400" dirty="0">
+                <a:solidFill>
+                  <a:srgbClr val="111111"/>
+                </a:solidFill>
+                <a:latin typeface="Open Sans" panose="020B0606030504020204" pitchFamily="34" charset="0"/>
+                <a:ea typeface="Open Sans" panose="020B0606030504020204" pitchFamily="34" charset="0"/>
+                <a:cs typeface="Open Sans" panose="020B0606030504020204" pitchFamily="34" charset="0"/>
+              </a:rPr>
+              <a:t>Oliver, J., &amp; Snowden, E. [LastWeekTonight]. (2015, April 9). Last Week Tonight with John Oliver: Edward Snowden on Passwords. Retrieved May 6, 2015, from </a:t>
+            </a:r>
+            <a:r>
+              <a:rPr lang="en-AU" sz="1400" dirty="0">
+                <a:solidFill>
+                  <a:srgbClr val="111111"/>
+                </a:solidFill>
+                <a:latin typeface="Open Sans" panose="020B0606030504020204" pitchFamily="34" charset="0"/>
+                <a:ea typeface="Open Sans" panose="020B0606030504020204" pitchFamily="34" charset="0"/>
+                <a:cs typeface="Open Sans" panose="020B0606030504020204" pitchFamily="34" charset="0"/>
+                <a:hlinkClick r:id="rId11"/>
+              </a:rPr>
+              <a:t>https://</a:t>
+            </a:r>
+            <a:r>
+              <a:rPr lang="en-AU" sz="1400" dirty="0" smtClean="0">
+                <a:solidFill>
+                  <a:srgbClr val="111111"/>
+                </a:solidFill>
+                <a:latin typeface="Open Sans" panose="020B0606030504020204" pitchFamily="34" charset="0"/>
+                <a:ea typeface="Open Sans" panose="020B0606030504020204" pitchFamily="34" charset="0"/>
+                <a:cs typeface="Open Sans" panose="020B0606030504020204" pitchFamily="34" charset="0"/>
+                <a:hlinkClick r:id="rId11"/>
+              </a:rPr>
+              <a:t>www.youtube.com/watch?v=yzGzB-yYKcc</a:t>
+            </a:r>
+            <a:endParaRPr lang="en-AU" sz="1400" dirty="0" smtClean="0">
+              <a:solidFill>
+                <a:srgbClr val="111111"/>
+              </a:solidFill>
+              <a:latin typeface="Open Sans" panose="020B0606030504020204" pitchFamily="34" charset="0"/>
+              <a:ea typeface="Open Sans" panose="020B0606030504020204" pitchFamily="34" charset="0"/>
+              <a:cs typeface="Open Sans" panose="020B0606030504020204" pitchFamily="34" charset="0"/>
+            </a:endParaRPr>
+          </a:p>
+          <a:p>
+            <a:pPr marL="457200" indent="-457200" algn="l">
+              <a:lnSpc>
+                <a:spcPct val="100000"/>
+              </a:lnSpc>
+              <a:buFont typeface="Arial" panose="020B0604020202020204" pitchFamily="34" charset="0"/>
+              <a:buChar char="•"/>
+            </a:pPr>
+            <a:r>
+              <a:rPr lang="en-AU" sz="1400" dirty="0">
+                <a:solidFill>
+                  <a:srgbClr val="111111"/>
+                </a:solidFill>
+                <a:latin typeface="Open Sans" panose="020B0606030504020204" pitchFamily="34" charset="0"/>
+                <a:ea typeface="Open Sans" panose="020B0606030504020204" pitchFamily="34" charset="0"/>
+                <a:cs typeface="Open Sans" panose="020B0606030504020204" pitchFamily="34" charset="0"/>
+              </a:rPr>
+              <a:t>Scarfone, K., &amp; Souppaya, M. (2013). Guide to Enterprise Patch Management Technologies NIST Special Publication 800-40 Guide to Enterprise Patch Management Technologies. NIST. </a:t>
+            </a:r>
+            <a:r>
+              <a:rPr lang="en-AU" sz="1400" dirty="0" smtClean="0">
+                <a:solidFill>
+                  <a:srgbClr val="111111"/>
+                </a:solidFill>
+                <a:latin typeface="Open Sans" panose="020B0606030504020204" pitchFamily="34" charset="0"/>
+                <a:ea typeface="Open Sans" panose="020B0606030504020204" pitchFamily="34" charset="0"/>
+                <a:cs typeface="Open Sans" panose="020B0606030504020204" pitchFamily="34" charset="0"/>
+              </a:rPr>
+              <a:t>doi:10.6028/NIST.SP.800-40r3</a:t>
+            </a:r>
+          </a:p>
+          <a:p>
+            <a:pPr marL="457200" indent="-457200" algn="l">
+              <a:lnSpc>
+                <a:spcPct val="100000"/>
+              </a:lnSpc>
+              <a:buFont typeface="Arial" panose="020B0604020202020204" pitchFamily="34" charset="0"/>
+              <a:buChar char="•"/>
+            </a:pPr>
+            <a:r>
+              <a:rPr lang="en-AU" sz="1400" dirty="0">
+                <a:solidFill>
+                  <a:srgbClr val="111111"/>
+                </a:solidFill>
+                <a:latin typeface="Open Sans" panose="020B0606030504020204" pitchFamily="34" charset="0"/>
+                <a:ea typeface="Open Sans" panose="020B0606030504020204" pitchFamily="34" charset="0"/>
+                <a:cs typeface="Open Sans" panose="020B0606030504020204" pitchFamily="34" charset="0"/>
+              </a:rPr>
+              <a:t>Tice, K. [solarwindsinc]. (2012, September 12)  Patch Manager Guided Tour. Retrieved May 14, 2015, from </a:t>
+            </a:r>
+            <a:r>
+              <a:rPr lang="en-AU" sz="1400" dirty="0">
+                <a:solidFill>
+                  <a:srgbClr val="111111"/>
+                </a:solidFill>
+                <a:latin typeface="Open Sans" panose="020B0606030504020204" pitchFamily="34" charset="0"/>
+                <a:ea typeface="Open Sans" panose="020B0606030504020204" pitchFamily="34" charset="0"/>
+                <a:cs typeface="Open Sans" panose="020B0606030504020204" pitchFamily="34" charset="0"/>
+                <a:hlinkClick r:id="rId12"/>
+              </a:rPr>
+              <a:t>https://www.youtube.com/watch?v=-</a:t>
+            </a:r>
+            <a:r>
+              <a:rPr lang="en-AU" sz="1400" dirty="0" smtClean="0">
+                <a:solidFill>
+                  <a:srgbClr val="111111"/>
+                </a:solidFill>
+                <a:latin typeface="Open Sans" panose="020B0606030504020204" pitchFamily="34" charset="0"/>
+                <a:ea typeface="Open Sans" panose="020B0606030504020204" pitchFamily="34" charset="0"/>
+                <a:cs typeface="Open Sans" panose="020B0606030504020204" pitchFamily="34" charset="0"/>
+                <a:hlinkClick r:id="rId12"/>
+              </a:rPr>
+              <a:t>DldViUL1d0</a:t>
+            </a:r>
+            <a:endParaRPr lang="en-AU" sz="1400" dirty="0" smtClean="0">
+              <a:solidFill>
+                <a:srgbClr val="111111"/>
+              </a:solidFill>
+              <a:latin typeface="Open Sans" panose="020B0606030504020204" pitchFamily="34" charset="0"/>
+              <a:ea typeface="Open Sans" panose="020B0606030504020204" pitchFamily="34" charset="0"/>
+              <a:cs typeface="Open Sans" panose="020B0606030504020204" pitchFamily="34" charset="0"/>
+            </a:endParaRPr>
+          </a:p>
+          <a:p>
+            <a:pPr marL="457200" indent="-457200" algn="l">
+              <a:lnSpc>
+                <a:spcPct val="100000"/>
+              </a:lnSpc>
+              <a:buFont typeface="Arial" panose="020B0604020202020204" pitchFamily="34" charset="0"/>
+              <a:buChar char="•"/>
+            </a:pPr>
+            <a:endParaRPr lang="en-AU" sz="1400" dirty="0" smtClean="0">
+              <a:solidFill>
+                <a:srgbClr val="111111"/>
+              </a:solidFill>
+              <a:latin typeface="Open Sans" panose="020B0606030504020204" pitchFamily="34" charset="0"/>
+              <a:ea typeface="Open Sans" panose="020B0606030504020204" pitchFamily="34" charset="0"/>
+              <a:cs typeface="Open Sans" panose="020B0606030504020204" pitchFamily="34" charset="0"/>
+            </a:endParaRPr>
+          </a:p>
+        </p:txBody>
+      </p:sp>
+    </p:spTree>
+    <p:extLst>
+      <p:ext uri="{BB962C8B-B14F-4D97-AF65-F5344CB8AC3E}">
+        <p14:creationId xmlns:p14="http://schemas.microsoft.com/office/powerpoint/2010/main" val="636747076"/>
+      </p:ext>
+    </p:extLst>
+  </p:cSld>
+  <p:clrMapOvr>
+    <a:masterClrMapping/>
+  </p:clrMapOvr>
+  <p:transition spd="slow">
+    <p:push/>
+  </p:transition>
+  <p:timing>
+    <p:tnLst>
+      <p:par>
+        <p:cTn id="1" dur="indefinite" restart="never" nodeType="tmRoot"/>
+      </p:par>
+    </p:tnLst>
+  </p:timing>
+</p:sld>
+</file>
+
+<file path=ppt/slides/slide31.xml><?xml version="1.0" encoding="utf-8"?>
+<p:sld xmlns:a="http://schemas.openxmlformats.org/drawingml/2006/main" xmlns:r="http://schemas.openxmlformats.org/officeDocument/2006/relationships" xmlns:p="http://schemas.openxmlformats.org/presentationml/2006/main">
+  <p:cSld>
+    <p:spTree>
+      <p:nvGrpSpPr>
+        <p:cNvPr id="1" name=""/>
+        <p:cNvGrpSpPr/>
+        <p:nvPr/>
+      </p:nvGrpSpPr>
+      <p:grpSpPr>
+        <a:xfrm>
+          <a:off x="0" y="0"/>
+          <a:ext cx="0" cy="0"/>
+          <a:chOff x="0" y="0"/>
+          <a:chExt cx="0" cy="0"/>
+        </a:xfrm>
+      </p:grpSpPr>
+      <p:sp>
+        <p:nvSpPr>
+          <p:cNvPr id="4" name="Title 3"/>
+          <p:cNvSpPr>
+            <a:spLocks noGrp="1"/>
+          </p:cNvSpPr>
+          <p:nvPr>
+            <p:ph type="ctrTitle"/>
+          </p:nvPr>
+        </p:nvSpPr>
+        <p:spPr>
+          <a:xfrm>
             <a:off x="1524000" y="0"/>
             <a:ext cx="9144000" cy="6858000"/>
           </a:xfrm>
@@ -12524,7 +12584,7 @@
 </p:sld>
 </file>
 
-<file path=ppt/slides/slide31.xml><?xml version="1.0" encoding="utf-8"?>
+<file path=ppt/slides/slide32.xml><?xml version="1.0" encoding="utf-8"?>
 <p:sld xmlns:a="http://schemas.openxmlformats.org/drawingml/2006/main" xmlns:r="http://schemas.openxmlformats.org/officeDocument/2006/relationships" xmlns:p="http://schemas.openxmlformats.org/presentationml/2006/main">
   <p:cSld>
     <p:spTree>

</xml_diff>

<commit_message>
CSI1101 A2: added more images, finished bib, ready for submission
</commit_message>
<xml_diff>
--- a/year_1/sem_2/CSI1101_computer_security/0b_assignment_2_[22MAY15_0900]/dev/CSI1101_PONCE_A2_v03.pptx
+++ b/year_1/sem_2/CSI1101_computer_security/0b_assignment_2_[22MAY15_0900]/dev/CSI1101_PONCE_A2_v03.pptx
@@ -24,19 +24,19 @@
     <p:sldId id="386" r:id="rId18"/>
     <p:sldId id="387" r:id="rId19"/>
     <p:sldId id="388" r:id="rId20"/>
-    <p:sldId id="353" r:id="rId21"/>
-    <p:sldId id="354" r:id="rId22"/>
-    <p:sldId id="355" r:id="rId23"/>
-    <p:sldId id="389" r:id="rId24"/>
-    <p:sldId id="390" r:id="rId25"/>
-    <p:sldId id="365" r:id="rId26"/>
-    <p:sldId id="366" r:id="rId27"/>
-    <p:sldId id="367" r:id="rId28"/>
-    <p:sldId id="368" r:id="rId29"/>
-    <p:sldId id="369" r:id="rId30"/>
-    <p:sldId id="272" r:id="rId31"/>
-    <p:sldId id="380" r:id="rId32"/>
-    <p:sldId id="370" r:id="rId33"/>
+    <p:sldId id="393" r:id="rId21"/>
+    <p:sldId id="353" r:id="rId22"/>
+    <p:sldId id="354" r:id="rId23"/>
+    <p:sldId id="355" r:id="rId24"/>
+    <p:sldId id="389" r:id="rId25"/>
+    <p:sldId id="390" r:id="rId26"/>
+    <p:sldId id="365" r:id="rId27"/>
+    <p:sldId id="391" r:id="rId28"/>
+    <p:sldId id="366" r:id="rId29"/>
+    <p:sldId id="367" r:id="rId30"/>
+    <p:sldId id="392" r:id="rId31"/>
+    <p:sldId id="394" r:id="rId32"/>
+    <p:sldId id="272" r:id="rId33"/>
   </p:sldIdLst>
   <p:sldSz cx="12192000" cy="6858000"/>
   <p:notesSz cx="6858000" cy="9144000"/>
@@ -306,7 +306,7 @@
           <a:p>
             <a:fld id="{7B1A49F8-424C-43DF-ABBC-6BF9F0D68733}" type="datetimeFigureOut">
               <a:rPr lang="en-AU" smtClean="0"/>
-              <a:t>17/05/2015</a:t>
+              <a:t>18/05/2015</a:t>
             </a:fld>
             <a:endParaRPr lang="en-AU"/>
           </a:p>
@@ -476,7 +476,7 @@
           <a:p>
             <a:fld id="{7B1A49F8-424C-43DF-ABBC-6BF9F0D68733}" type="datetimeFigureOut">
               <a:rPr lang="en-AU" smtClean="0"/>
-              <a:t>17/05/2015</a:t>
+              <a:t>18/05/2015</a:t>
             </a:fld>
             <a:endParaRPr lang="en-AU"/>
           </a:p>
@@ -656,7 +656,7 @@
           <a:p>
             <a:fld id="{7B1A49F8-424C-43DF-ABBC-6BF9F0D68733}" type="datetimeFigureOut">
               <a:rPr lang="en-AU" smtClean="0"/>
-              <a:t>17/05/2015</a:t>
+              <a:t>18/05/2015</a:t>
             </a:fld>
             <a:endParaRPr lang="en-AU"/>
           </a:p>
@@ -826,7 +826,7 @@
           <a:p>
             <a:fld id="{7B1A49F8-424C-43DF-ABBC-6BF9F0D68733}" type="datetimeFigureOut">
               <a:rPr lang="en-AU" smtClean="0"/>
-              <a:t>17/05/2015</a:t>
+              <a:t>18/05/2015</a:t>
             </a:fld>
             <a:endParaRPr lang="en-AU"/>
           </a:p>
@@ -1072,7 +1072,7 @@
           <a:p>
             <a:fld id="{7B1A49F8-424C-43DF-ABBC-6BF9F0D68733}" type="datetimeFigureOut">
               <a:rPr lang="en-AU" smtClean="0"/>
-              <a:t>17/05/2015</a:t>
+              <a:t>18/05/2015</a:t>
             </a:fld>
             <a:endParaRPr lang="en-AU"/>
           </a:p>
@@ -1304,7 +1304,7 @@
           <a:p>
             <a:fld id="{7B1A49F8-424C-43DF-ABBC-6BF9F0D68733}" type="datetimeFigureOut">
               <a:rPr lang="en-AU" smtClean="0"/>
-              <a:t>17/05/2015</a:t>
+              <a:t>18/05/2015</a:t>
             </a:fld>
             <a:endParaRPr lang="en-AU"/>
           </a:p>
@@ -1671,7 +1671,7 @@
           <a:p>
             <a:fld id="{7B1A49F8-424C-43DF-ABBC-6BF9F0D68733}" type="datetimeFigureOut">
               <a:rPr lang="en-AU" smtClean="0"/>
-              <a:t>17/05/2015</a:t>
+              <a:t>18/05/2015</a:t>
             </a:fld>
             <a:endParaRPr lang="en-AU"/>
           </a:p>
@@ -1789,7 +1789,7 @@
           <a:p>
             <a:fld id="{7B1A49F8-424C-43DF-ABBC-6BF9F0D68733}" type="datetimeFigureOut">
               <a:rPr lang="en-AU" smtClean="0"/>
-              <a:t>17/05/2015</a:t>
+              <a:t>18/05/2015</a:t>
             </a:fld>
             <a:endParaRPr lang="en-AU"/>
           </a:p>
@@ -1884,7 +1884,7 @@
           <a:p>
             <a:fld id="{7B1A49F8-424C-43DF-ABBC-6BF9F0D68733}" type="datetimeFigureOut">
               <a:rPr lang="en-AU" smtClean="0"/>
-              <a:t>17/05/2015</a:t>
+              <a:t>18/05/2015</a:t>
             </a:fld>
             <a:endParaRPr lang="en-AU"/>
           </a:p>
@@ -2161,7 +2161,7 @@
           <a:p>
             <a:fld id="{7B1A49F8-424C-43DF-ABBC-6BF9F0D68733}" type="datetimeFigureOut">
               <a:rPr lang="en-AU" smtClean="0"/>
-              <a:t>17/05/2015</a:t>
+              <a:t>18/05/2015</a:t>
             </a:fld>
             <a:endParaRPr lang="en-AU"/>
           </a:p>
@@ -2414,7 +2414,7 @@
           <a:p>
             <a:fld id="{7B1A49F8-424C-43DF-ABBC-6BF9F0D68733}" type="datetimeFigureOut">
               <a:rPr lang="en-AU" smtClean="0"/>
-              <a:t>17/05/2015</a:t>
+              <a:t>18/05/2015</a:t>
             </a:fld>
             <a:endParaRPr lang="en-AU"/>
           </a:p>
@@ -2630,7 +2630,7 @@
           <a:p>
             <a:fld id="{7B1A49F8-424C-43DF-ABBC-6BF9F0D68733}" type="datetimeFigureOut">
               <a:rPr lang="en-AU" smtClean="0"/>
-              <a:t>17/05/2015</a:t>
+              <a:t>18/05/2015</a:t>
             </a:fld>
             <a:endParaRPr lang="en-AU"/>
           </a:p>
@@ -5442,8 +5442,8 @@
         </p:nvSpPr>
         <p:spPr>
           <a:xfrm>
-            <a:off x="7493391" y="3660973"/>
-            <a:ext cx="2590800" cy="401200"/>
+            <a:off x="7493390" y="3660973"/>
+            <a:ext cx="3174609" cy="401200"/>
           </a:xfrm>
           <a:prstGeom prst="rect">
             <a:avLst/>
@@ -5463,7 +5463,25 @@
                 <a:cs typeface="Open Sans" panose="020B0606030504020204" pitchFamily="34" charset="0"/>
                 <a:hlinkClick r:id="rId2"/>
               </a:rPr>
-              <a:t>(AV-TEST, 2013, p. 7)</a:t>
+              <a:t>(AV-TEST, </a:t>
+            </a:r>
+            <a:r>
+              <a:rPr lang="en-AU" sz="2000" dirty="0" smtClean="0">
+                <a:latin typeface="Open Sans" panose="020B0606030504020204" pitchFamily="34" charset="0"/>
+                <a:ea typeface="Open Sans" panose="020B0606030504020204" pitchFamily="34" charset="0"/>
+                <a:cs typeface="Open Sans" panose="020B0606030504020204" pitchFamily="34" charset="0"/>
+                <a:hlinkClick r:id="rId2"/>
+              </a:rPr>
+              <a:t>2013, </a:t>
+            </a:r>
+            <a:r>
+              <a:rPr lang="en-AU" sz="2000" dirty="0" smtClean="0">
+                <a:latin typeface="Open Sans" panose="020B0606030504020204" pitchFamily="34" charset="0"/>
+                <a:ea typeface="Open Sans" panose="020B0606030504020204" pitchFamily="34" charset="0"/>
+                <a:cs typeface="Open Sans" panose="020B0606030504020204" pitchFamily="34" charset="0"/>
+                <a:hlinkClick r:id="rId2"/>
+              </a:rPr>
+              <a:t>p. 7)</a:t>
             </a:r>
             <a:endParaRPr lang="en-AU" sz="2000" dirty="0">
               <a:latin typeface="Open Sans" panose="020B0606030504020204" pitchFamily="34" charset="0"/>
@@ -7609,7 +7627,18 @@
                 <a:ea typeface="Open Sans" panose="020B0606030504020204" pitchFamily="34" charset="0"/>
                 <a:cs typeface="Open Sans" panose="020B0606030504020204" pitchFamily="34" charset="0"/>
               </a:rPr>
-              <a:t>Scored highly by AV-TEST</a:t>
+              <a:t>Both features scored </a:t>
+            </a:r>
+            <a:r>
+              <a:rPr lang="en-AU" sz="2600" dirty="0" smtClean="0">
+                <a:solidFill>
+                  <a:srgbClr val="111111"/>
+                </a:solidFill>
+                <a:latin typeface="Open Sans" panose="020B0606030504020204" pitchFamily="34" charset="0"/>
+                <a:ea typeface="Open Sans" panose="020B0606030504020204" pitchFamily="34" charset="0"/>
+                <a:cs typeface="Open Sans" panose="020B0606030504020204" pitchFamily="34" charset="0"/>
+              </a:rPr>
+              <a:t>highly by AV-TEST</a:t>
             </a:r>
           </a:p>
           <a:p>
@@ -7798,7 +7827,19 @@
                 <a:cs typeface="Open Sans" panose="020B0606030504020204" pitchFamily="34" charset="0"/>
                 <a:hlinkClick r:id="rId3"/>
               </a:rPr>
-              <a:t>(Kaspersky Lab, 2013b)</a:t>
+              <a:t>(Kaspersky Lab, </a:t>
+            </a:r>
+            <a:r>
+              <a:rPr lang="en-AU" sz="2800" b="1" dirty="0" smtClean="0">
+                <a:solidFill>
+                  <a:srgbClr val="111111"/>
+                </a:solidFill>
+                <a:latin typeface="Open Sans" panose="020B0606030504020204" pitchFamily="34" charset="0"/>
+                <a:ea typeface="Open Sans" panose="020B0606030504020204" pitchFamily="34" charset="0"/>
+                <a:cs typeface="Open Sans" panose="020B0606030504020204" pitchFamily="34" charset="0"/>
+                <a:hlinkClick r:id="rId3"/>
+              </a:rPr>
+              <a:t>2013b)</a:t>
             </a:r>
             <a:endParaRPr lang="en-AU" sz="2800" dirty="0">
               <a:solidFill>
@@ -7835,6 +7876,13 @@
           <a:prstGeom prst="rect">
             <a:avLst/>
           </a:prstGeom>
+          <a:effectLst>
+            <a:outerShdw blurRad="50800" dist="38100" dir="2700000" algn="tl" rotWithShape="0">
+              <a:prstClr val="black">
+                <a:alpha val="40000"/>
+              </a:prstClr>
+            </a:outerShdw>
+          </a:effectLst>
         </p:spPr>
       </p:pic>
     </p:spTree>
@@ -8414,14 +8462,8 @@
                 <a:ea typeface="Open Sans" panose="020B0606030504020204" pitchFamily="34" charset="0"/>
                 <a:cs typeface="Open Sans" panose="020B0606030504020204" pitchFamily="34" charset="0"/>
               </a:rPr>
-              <a:t>Configure group access rights</a:t>
-            </a:r>
-          </a:p>
-          <a:p>
-            <a:pPr marL="742950" lvl="1" indent="-285750">
-              <a:buFont typeface="Arial" panose="020B0604020202020204" pitchFamily="34" charset="0"/>
-              <a:buChar char="•"/>
-            </a:pPr>
+              <a:t>Configure group access </a:t>
+            </a:r>
             <a:r>
               <a:rPr lang="en-AU" sz="2600" dirty="0" smtClean="0">
                 <a:solidFill>
@@ -8431,14 +8473,8 @@
                 <a:ea typeface="Open Sans" panose="020B0606030504020204" pitchFamily="34" charset="0"/>
                 <a:cs typeface="Open Sans" panose="020B0606030504020204" pitchFamily="34" charset="0"/>
               </a:rPr>
-              <a:t>Reserve admin rights to IT support staff only</a:t>
-            </a:r>
-          </a:p>
-          <a:p>
-            <a:pPr marL="285750" indent="-285750">
-              <a:buFont typeface="Arial" panose="020B0604020202020204" pitchFamily="34" charset="0"/>
-              <a:buChar char="•"/>
-            </a:pPr>
+              <a:t>rights </a:t>
+            </a:r>
             <a:r>
               <a:rPr lang="en-AU" sz="2600" dirty="0" smtClean="0">
                 <a:solidFill>
@@ -8447,48 +8483,9 @@
                 <a:latin typeface="Open Sans" panose="020B0606030504020204" pitchFamily="34" charset="0"/>
                 <a:ea typeface="Open Sans" panose="020B0606030504020204" pitchFamily="34" charset="0"/>
                 <a:cs typeface="Open Sans" panose="020B0606030504020204" pitchFamily="34" charset="0"/>
-              </a:rPr>
-              <a:t>Enforce security settings via group policies</a:t>
-            </a:r>
-          </a:p>
-          <a:p>
-            <a:pPr marL="742950" lvl="1" indent="-285750">
-              <a:buFont typeface="Arial" panose="020B0604020202020204" pitchFamily="34" charset="0"/>
-              <a:buChar char="•"/>
-            </a:pPr>
-            <a:r>
-              <a:rPr lang="en-AU" sz="2600" dirty="0">
-                <a:solidFill>
-                  <a:srgbClr val="111111"/>
-                </a:solidFill>
-                <a:latin typeface="Open Sans" panose="020B0606030504020204" pitchFamily="34" charset="0"/>
-                <a:ea typeface="Open Sans" panose="020B0606030504020204" pitchFamily="34" charset="0"/>
-                <a:cs typeface="Open Sans" panose="020B0606030504020204" pitchFamily="34" charset="0"/>
-              </a:rPr>
-              <a:t>S</a:t>
-            </a:r>
-            <a:r>
-              <a:rPr lang="en-AU" sz="2600" dirty="0" smtClean="0">
-                <a:solidFill>
-                  <a:srgbClr val="111111"/>
-                </a:solidFill>
-                <a:latin typeface="Open Sans" panose="020B0606030504020204" pitchFamily="34" charset="0"/>
-                <a:ea typeface="Open Sans" panose="020B0606030504020204" pitchFamily="34" charset="0"/>
-                <a:cs typeface="Open Sans" panose="020B0606030504020204" pitchFamily="34" charset="0"/>
-              </a:rPr>
-              <a:t>creenserver password protection </a:t>
-            </a:r>
-            <a:r>
-              <a:rPr lang="en-AU" sz="2600" dirty="0">
-                <a:solidFill>
-                  <a:srgbClr val="111111"/>
-                </a:solidFill>
-                <a:latin typeface="Open Sans" panose="020B0606030504020204" pitchFamily="34" charset="0"/>
-                <a:ea typeface="Open Sans" panose="020B0606030504020204" pitchFamily="34" charset="0"/>
-                <a:cs typeface="Open Sans" panose="020B0606030504020204" pitchFamily="34" charset="0"/>
                 <a:hlinkClick r:id="rId3"/>
               </a:rPr>
-              <a:t>(Microsoft n.d.-a)</a:t>
+              <a:t>(Microsoft, 2005a)</a:t>
             </a:r>
             <a:endParaRPr lang="en-AU" sz="2600" dirty="0" smtClean="0">
               <a:solidFill>
@@ -8513,8 +8510,31 @@
                 <a:ea typeface="Open Sans" panose="020B0606030504020204" pitchFamily="34" charset="0"/>
                 <a:cs typeface="Open Sans" panose="020B0606030504020204" pitchFamily="34" charset="0"/>
               </a:rPr>
-              <a:t>Enable UAC </a:t>
-            </a:r>
+              <a:t>Reserve admin rights to IT support staff only</a:t>
+            </a:r>
+          </a:p>
+          <a:p>
+            <a:pPr marL="285750" indent="-285750">
+              <a:buFont typeface="Arial" panose="020B0604020202020204" pitchFamily="34" charset="0"/>
+              <a:buChar char="•"/>
+            </a:pPr>
+            <a:r>
+              <a:rPr lang="en-AU" sz="2600" dirty="0" smtClean="0">
+                <a:solidFill>
+                  <a:srgbClr val="111111"/>
+                </a:solidFill>
+                <a:latin typeface="Open Sans" panose="020B0606030504020204" pitchFamily="34" charset="0"/>
+                <a:ea typeface="Open Sans" panose="020B0606030504020204" pitchFamily="34" charset="0"/>
+                <a:cs typeface="Open Sans" panose="020B0606030504020204" pitchFamily="34" charset="0"/>
+              </a:rPr>
+              <a:t>Enforce security settings via group policies</a:t>
+            </a:r>
+          </a:p>
+          <a:p>
+            <a:pPr marL="742950" lvl="1" indent="-285750">
+              <a:buFont typeface="Arial" panose="020B0604020202020204" pitchFamily="34" charset="0"/>
+              <a:buChar char="•"/>
+            </a:pPr>
             <a:r>
               <a:rPr lang="en-AU" sz="2600" dirty="0">
                 <a:solidFill>
@@ -8523,9 +8543,43 @@
                 <a:latin typeface="Open Sans" panose="020B0606030504020204" pitchFamily="34" charset="0"/>
                 <a:ea typeface="Open Sans" panose="020B0606030504020204" pitchFamily="34" charset="0"/>
                 <a:cs typeface="Open Sans" panose="020B0606030504020204" pitchFamily="34" charset="0"/>
+              </a:rPr>
+              <a:t>S</a:t>
+            </a:r>
+            <a:r>
+              <a:rPr lang="en-AU" sz="2600" dirty="0" smtClean="0">
+                <a:solidFill>
+                  <a:srgbClr val="111111"/>
+                </a:solidFill>
+                <a:latin typeface="Open Sans" panose="020B0606030504020204" pitchFamily="34" charset="0"/>
+                <a:ea typeface="Open Sans" panose="020B0606030504020204" pitchFamily="34" charset="0"/>
+                <a:cs typeface="Open Sans" panose="020B0606030504020204" pitchFamily="34" charset="0"/>
+              </a:rPr>
+              <a:t>creenserver password protection </a:t>
+            </a:r>
+            <a:r>
+              <a:rPr lang="en-AU" sz="2600" dirty="0">
+                <a:solidFill>
+                  <a:srgbClr val="111111"/>
+                </a:solidFill>
+                <a:latin typeface="Open Sans" panose="020B0606030504020204" pitchFamily="34" charset="0"/>
+                <a:ea typeface="Open Sans" panose="020B0606030504020204" pitchFamily="34" charset="0"/>
+                <a:cs typeface="Open Sans" panose="020B0606030504020204" pitchFamily="34" charset="0"/>
                 <a:hlinkClick r:id="rId4"/>
               </a:rPr>
-              <a:t>(Microsoft, 2007)</a:t>
+              <a:t>(Microsoft n.d</a:t>
+            </a:r>
+            <a:r>
+              <a:rPr lang="en-AU" sz="2600" dirty="0" smtClean="0">
+                <a:solidFill>
+                  <a:srgbClr val="111111"/>
+                </a:solidFill>
+                <a:latin typeface="Open Sans" panose="020B0606030504020204" pitchFamily="34" charset="0"/>
+                <a:ea typeface="Open Sans" panose="020B0606030504020204" pitchFamily="34" charset="0"/>
+                <a:cs typeface="Open Sans" panose="020B0606030504020204" pitchFamily="34" charset="0"/>
+                <a:hlinkClick r:id="rId4"/>
+              </a:rPr>
+              <a:t>.)</a:t>
             </a:r>
             <a:endParaRPr lang="en-AU" sz="2600" dirty="0" smtClean="0">
               <a:solidFill>
@@ -8550,7 +8604,7 @@
                 <a:ea typeface="Open Sans" panose="020B0606030504020204" pitchFamily="34" charset="0"/>
                 <a:cs typeface="Open Sans" panose="020B0606030504020204" pitchFamily="34" charset="0"/>
               </a:rPr>
-              <a:t>Password strength policies </a:t>
+              <a:t>Enable UAC </a:t>
             </a:r>
             <a:r>
               <a:rPr lang="en-AU" sz="2600" dirty="0">
@@ -8562,7 +8616,7 @@
                 <a:cs typeface="Open Sans" panose="020B0606030504020204" pitchFamily="34" charset="0"/>
                 <a:hlinkClick r:id="rId5"/>
               </a:rPr>
-              <a:t>(Microsoft, 2012)</a:t>
+              <a:t>(Microsoft, 2007)</a:t>
             </a:r>
             <a:endParaRPr lang="en-AU" sz="2600" dirty="0" smtClean="0">
               <a:solidFill>
@@ -8587,6 +8641,43 @@
                 <a:ea typeface="Open Sans" panose="020B0606030504020204" pitchFamily="34" charset="0"/>
                 <a:cs typeface="Open Sans" panose="020B0606030504020204" pitchFamily="34" charset="0"/>
               </a:rPr>
+              <a:t>Password strength policies </a:t>
+            </a:r>
+            <a:r>
+              <a:rPr lang="en-AU" sz="2600" dirty="0">
+                <a:solidFill>
+                  <a:srgbClr val="111111"/>
+                </a:solidFill>
+                <a:latin typeface="Open Sans" panose="020B0606030504020204" pitchFamily="34" charset="0"/>
+                <a:ea typeface="Open Sans" panose="020B0606030504020204" pitchFamily="34" charset="0"/>
+                <a:cs typeface="Open Sans" panose="020B0606030504020204" pitchFamily="34" charset="0"/>
+                <a:hlinkClick r:id="rId6"/>
+              </a:rPr>
+              <a:t>(Microsoft, 2012)</a:t>
+            </a:r>
+            <a:endParaRPr lang="en-AU" sz="2600" dirty="0" smtClean="0">
+              <a:solidFill>
+                <a:srgbClr val="111111"/>
+              </a:solidFill>
+              <a:latin typeface="Open Sans" panose="020B0606030504020204" pitchFamily="34" charset="0"/>
+              <a:ea typeface="Open Sans" panose="020B0606030504020204" pitchFamily="34" charset="0"/>
+              <a:cs typeface="Open Sans" panose="020B0606030504020204" pitchFamily="34" charset="0"/>
+            </a:endParaRPr>
+          </a:p>
+          <a:p>
+            <a:pPr marL="742950" lvl="1" indent="-285750">
+              <a:buFont typeface="Arial" panose="020B0604020202020204" pitchFamily="34" charset="0"/>
+              <a:buChar char="•"/>
+            </a:pPr>
+            <a:r>
+              <a:rPr lang="en-AU" sz="2600" dirty="0" smtClean="0">
+                <a:solidFill>
+                  <a:srgbClr val="111111"/>
+                </a:solidFill>
+                <a:latin typeface="Open Sans" panose="020B0606030504020204" pitchFamily="34" charset="0"/>
+                <a:ea typeface="Open Sans" panose="020B0606030504020204" pitchFamily="34" charset="0"/>
+                <a:cs typeface="Open Sans" panose="020B0606030504020204" pitchFamily="34" charset="0"/>
+              </a:rPr>
               <a:t>Lock account after failed attempts </a:t>
             </a:r>
             <a:r>
@@ -8597,7 +8688,7 @@
                 <a:latin typeface="Open Sans" panose="020B0606030504020204" pitchFamily="34" charset="0"/>
                 <a:ea typeface="Open Sans" panose="020B0606030504020204" pitchFamily="34" charset="0"/>
                 <a:cs typeface="Open Sans" panose="020B0606030504020204" pitchFamily="34" charset="0"/>
-                <a:hlinkClick r:id="rId6"/>
+                <a:hlinkClick r:id="rId3"/>
               </a:rPr>
               <a:t>(Microsoft, 2005b)</a:t>
             </a:r>
@@ -9243,6 +9334,144 @@
         <p:spPr>
           <a:xfrm>
             <a:off x="1524000" y="0"/>
+            <a:ext cx="9144000" cy="1983545"/>
+          </a:xfrm>
+        </p:spPr>
+        <p:txBody>
+          <a:bodyPr tIns="612000" bIns="612000" anchor="b">
+            <a:noAutofit/>
+          </a:bodyPr>
+          <a:lstStyle/>
+          <a:p>
+            <a:pPr algn="l"/>
+            <a:r>
+              <a:rPr lang="en-AU" sz="2800" b="1" dirty="0" smtClean="0">
+                <a:solidFill>
+                  <a:srgbClr val="111111"/>
+                </a:solidFill>
+                <a:latin typeface="Open Sans" panose="020B0606030504020204" pitchFamily="34" charset="0"/>
+                <a:ea typeface="Open Sans" panose="020B0606030504020204" pitchFamily="34" charset="0"/>
+                <a:cs typeface="Open Sans" panose="020B0606030504020204" pitchFamily="34" charset="0"/>
+              </a:rPr>
+              <a:t>Vista domain login screen </a:t>
+            </a:r>
+            <a:r>
+              <a:rPr lang="en-AU" sz="2800" b="1" dirty="0" smtClean="0">
+                <a:solidFill>
+                  <a:srgbClr val="111111"/>
+                </a:solidFill>
+                <a:latin typeface="Open Sans" panose="020B0606030504020204" pitchFamily="34" charset="0"/>
+                <a:ea typeface="Open Sans" panose="020B0606030504020204" pitchFamily="34" charset="0"/>
+                <a:cs typeface="Open Sans" panose="020B0606030504020204" pitchFamily="34" charset="0"/>
+                <a:hlinkClick r:id="rId2"/>
+              </a:rPr>
+              <a:t>(Pietroforte, 2006)</a:t>
+            </a:r>
+            <a:endParaRPr lang="en-AU" sz="2800" dirty="0">
+              <a:solidFill>
+                <a:srgbClr val="111111"/>
+              </a:solidFill>
+              <a:latin typeface="Open Sans" panose="020B0606030504020204" pitchFamily="34" charset="0"/>
+              <a:ea typeface="Open Sans" panose="020B0606030504020204" pitchFamily="34" charset="0"/>
+              <a:cs typeface="Open Sans" panose="020B0606030504020204" pitchFamily="34" charset="0"/>
+            </a:endParaRPr>
+          </a:p>
+        </p:txBody>
+      </p:sp>
+      <p:pic>
+        <p:nvPicPr>
+          <p:cNvPr id="2050" name="Picture 2" descr="https://4sysops.com/wp-content/uploads/2006/12/logon3.gif"/>
+          <p:cNvPicPr>
+            <a:picLocks noChangeAspect="1" noChangeArrowheads="1"/>
+          </p:cNvPicPr>
+          <p:nvPr/>
+        </p:nvPicPr>
+        <p:blipFill>
+          <a:blip r:embed="rId3">
+            <a:extLst>
+              <a:ext uri="{28A0092B-C50C-407E-A947-70E740481C1C}">
+                <a14:useLocalDpi xmlns:a14="http://schemas.microsoft.com/office/drawing/2010/main" val="0"/>
+              </a:ext>
+            </a:extLst>
+          </a:blip>
+          <a:srcRect/>
+          <a:stretch>
+            <a:fillRect/>
+          </a:stretch>
+        </p:blipFill>
+        <p:spPr bwMode="auto">
+          <a:xfrm>
+            <a:off x="4400550" y="1983545"/>
+            <a:ext cx="3390900" cy="3876676"/>
+          </a:xfrm>
+          <a:prstGeom prst="rect">
+            <a:avLst/>
+          </a:prstGeom>
+          <a:noFill/>
+          <a:extLst>
+            <a:ext uri="{909E8E84-426E-40DD-AFC4-6F175D3DCCD1}">
+              <a14:hiddenFill xmlns:a14="http://schemas.microsoft.com/office/drawing/2010/main">
+                <a:solidFill>
+                  <a:srgbClr val="FFFFFF"/>
+                </a:solidFill>
+              </a14:hiddenFill>
+            </a:ext>
+          </a:extLst>
+        </p:spPr>
+      </p:pic>
+    </p:spTree>
+    <p:extLst>
+      <p:ext uri="{BB962C8B-B14F-4D97-AF65-F5344CB8AC3E}">
+        <p14:creationId xmlns:p14="http://schemas.microsoft.com/office/powerpoint/2010/main" val="2383314892"/>
+      </p:ext>
+    </p:extLst>
+  </p:cSld>
+  <p:clrMapOvr>
+    <a:masterClrMapping/>
+  </p:clrMapOvr>
+  <p:transition spd="slow">
+    <p:push/>
+  </p:transition>
+  <p:timing>
+    <p:tnLst>
+      <p:par>
+        <p:cTn id="1" dur="indefinite" restart="never" nodeType="tmRoot"/>
+      </p:par>
+    </p:tnLst>
+  </p:timing>
+</p:sld>
+</file>
+
+<file path=ppt/slides/slide21.xml><?xml version="1.0" encoding="utf-8"?>
+<p:sld xmlns:a="http://schemas.openxmlformats.org/drawingml/2006/main" xmlns:r="http://schemas.openxmlformats.org/officeDocument/2006/relationships" xmlns:p="http://schemas.openxmlformats.org/presentationml/2006/main">
+  <p:cSld>
+    <p:spTree>
+      <p:nvGrpSpPr>
+        <p:cNvPr id="1" name=""/>
+        <p:cNvGrpSpPr/>
+        <p:nvPr/>
+      </p:nvGrpSpPr>
+      <p:grpSpPr>
+        <a:xfrm>
+          <a:off x="0" y="0"/>
+          <a:ext cx="0" cy="0"/>
+          <a:chOff x="0" y="0"/>
+          <a:chExt cx="0" cy="0"/>
+        </a:xfrm>
+      </p:grpSpPr>
+      <p:sp>
+        <p:nvSpPr>
+          <p:cNvPr id="4" name="Title 3"/>
+          <p:cNvSpPr>
+            <a:spLocks noGrp="1"/>
+          </p:cNvSpPr>
+          <p:nvPr>
+            <p:ph type="ctrTitle"/>
+          </p:nvPr>
+        </p:nvSpPr>
+        <p:spPr>
+          <a:xfrm>
+            <a:off x="1524000" y="0"/>
             <a:ext cx="9144000" cy="6858000"/>
           </a:xfrm>
         </p:spPr>
@@ -9297,7 +9526,7 @@
 </p:sld>
 </file>
 
-<file path=ppt/slides/slide21.xml><?xml version="1.0" encoding="utf-8"?>
+<file path=ppt/slides/slide22.xml><?xml version="1.0" encoding="utf-8"?>
 <p:sld xmlns:a="http://schemas.openxmlformats.org/drawingml/2006/main" xmlns:r="http://schemas.openxmlformats.org/officeDocument/2006/relationships" xmlns:p="http://schemas.openxmlformats.org/presentationml/2006/main">
   <p:cSld>
     <p:spTree>
@@ -9518,7 +9747,7 @@
 </p:sld>
 </file>
 
-<file path=ppt/slides/slide22.xml><?xml version="1.0" encoding="utf-8"?>
+<file path=ppt/slides/slide23.xml><?xml version="1.0" encoding="utf-8"?>
 <p:sld xmlns:a="http://schemas.openxmlformats.org/drawingml/2006/main" xmlns:r="http://schemas.openxmlformats.org/officeDocument/2006/relationships" xmlns:p="http://schemas.openxmlformats.org/presentationml/2006/main">
   <p:cSld>
     <p:spTree>
@@ -9741,154 +9970,6 @@
     <p:extLst>
       <p:ext uri="{BB962C8B-B14F-4D97-AF65-F5344CB8AC3E}">
         <p14:creationId xmlns:p14="http://schemas.microsoft.com/office/powerpoint/2010/main" val="2332012686"/>
-      </p:ext>
-    </p:extLst>
-  </p:cSld>
-  <p:clrMapOvr>
-    <a:masterClrMapping/>
-  </p:clrMapOvr>
-  <p:transition spd="slow">
-    <p:push/>
-  </p:transition>
-  <p:timing>
-    <p:tnLst>
-      <p:par>
-        <p:cTn id="1" dur="indefinite" restart="never" nodeType="tmRoot"/>
-      </p:par>
-    </p:tnLst>
-  </p:timing>
-</p:sld>
-</file>
-
-<file path=ppt/slides/slide23.xml><?xml version="1.0" encoding="utf-8"?>
-<p:sld xmlns:a="http://schemas.openxmlformats.org/drawingml/2006/main" xmlns:r="http://schemas.openxmlformats.org/officeDocument/2006/relationships" xmlns:p="http://schemas.openxmlformats.org/presentationml/2006/main">
-  <p:cSld>
-    <p:spTree>
-      <p:nvGrpSpPr>
-        <p:cNvPr id="1" name=""/>
-        <p:cNvGrpSpPr/>
-        <p:nvPr/>
-      </p:nvGrpSpPr>
-      <p:grpSpPr>
-        <a:xfrm>
-          <a:off x="0" y="0"/>
-          <a:ext cx="0" cy="0"/>
-          <a:chOff x="0" y="0"/>
-          <a:chExt cx="0" cy="0"/>
-        </a:xfrm>
-      </p:grpSpPr>
-      <p:sp>
-        <p:nvSpPr>
-          <p:cNvPr id="4" name="Title 3"/>
-          <p:cNvSpPr>
-            <a:spLocks noGrp="1"/>
-          </p:cNvSpPr>
-          <p:nvPr>
-            <p:ph type="ctrTitle"/>
-          </p:nvPr>
-        </p:nvSpPr>
-        <p:spPr>
-          <a:xfrm>
-            <a:off x="1524000" y="0"/>
-            <a:ext cx="9144000" cy="1983545"/>
-          </a:xfrm>
-        </p:spPr>
-        <p:txBody>
-          <a:bodyPr tIns="612000" bIns="612000" anchor="t">
-            <a:noAutofit/>
-          </a:bodyPr>
-          <a:lstStyle/>
-          <a:p>
-            <a:pPr algn="l"/>
-            <a:r>
-              <a:rPr lang="en-AU" sz="2800" b="1" dirty="0" smtClean="0">
-                <a:solidFill>
-                  <a:srgbClr val="111111"/>
-                </a:solidFill>
-                <a:latin typeface="Open Sans" panose="020B0606030504020204" pitchFamily="34" charset="0"/>
-                <a:ea typeface="Open Sans" panose="020B0606030504020204" pitchFamily="34" charset="0"/>
-                <a:cs typeface="Open Sans" panose="020B0606030504020204" pitchFamily="34" charset="0"/>
-              </a:rPr>
-              <a:t>Sticky-note password disclosure on TV</a:t>
-            </a:r>
-            <a:br>
-              <a:rPr lang="en-AU" sz="2800" b="1" dirty="0" smtClean="0">
-                <a:solidFill>
-                  <a:srgbClr val="111111"/>
-                </a:solidFill>
-                <a:latin typeface="Open Sans" panose="020B0606030504020204" pitchFamily="34" charset="0"/>
-                <a:ea typeface="Open Sans" panose="020B0606030504020204" pitchFamily="34" charset="0"/>
-                <a:cs typeface="Open Sans" panose="020B0606030504020204" pitchFamily="34" charset="0"/>
-              </a:rPr>
-            </a:br>
-            <a:r>
-              <a:rPr lang="en-AU" sz="2800" b="1" dirty="0" smtClean="0">
-                <a:solidFill>
-                  <a:srgbClr val="111111"/>
-                </a:solidFill>
-                <a:latin typeface="Open Sans" panose="020B0606030504020204" pitchFamily="34" charset="0"/>
-                <a:ea typeface="Open Sans" panose="020B0606030504020204" pitchFamily="34" charset="0"/>
-                <a:cs typeface="Open Sans" panose="020B0606030504020204" pitchFamily="34" charset="0"/>
-                <a:hlinkClick r:id="rId2"/>
-              </a:rPr>
-              <a:t>(@pent0thal, 2015)</a:t>
-            </a:r>
-            <a:endParaRPr lang="en-AU" sz="2800" dirty="0">
-              <a:solidFill>
-                <a:srgbClr val="111111"/>
-              </a:solidFill>
-              <a:latin typeface="Open Sans" panose="020B0606030504020204" pitchFamily="34" charset="0"/>
-              <a:ea typeface="Open Sans" panose="020B0606030504020204" pitchFamily="34" charset="0"/>
-              <a:cs typeface="Open Sans" panose="020B0606030504020204" pitchFamily="34" charset="0"/>
-            </a:endParaRPr>
-          </a:p>
-        </p:txBody>
-      </p:sp>
-      <p:pic>
-        <p:nvPicPr>
-          <p:cNvPr id="1028" name="Picture 4" descr="https://pbs.twimg.com/media/CCKgoRMWMAAUyeO.jpg:large"/>
-          <p:cNvPicPr>
-            <a:picLocks noChangeAspect="1" noChangeArrowheads="1"/>
-          </p:cNvPicPr>
-          <p:nvPr/>
-        </p:nvPicPr>
-        <p:blipFill>
-          <a:blip r:embed="rId3">
-            <a:extLst>
-              <a:ext uri="{28A0092B-C50C-407E-A947-70E740481C1C}">
-                <a14:useLocalDpi xmlns:a14="http://schemas.microsoft.com/office/drawing/2010/main" val="0"/>
-              </a:ext>
-            </a:extLst>
-          </a:blip>
-          <a:srcRect/>
-          <a:stretch>
-            <a:fillRect/>
-          </a:stretch>
-        </p:blipFill>
-        <p:spPr bwMode="auto">
-          <a:xfrm>
-            <a:off x="1795974" y="1557008"/>
-            <a:ext cx="8600052" cy="4732972"/>
-          </a:xfrm>
-          <a:prstGeom prst="rect">
-            <a:avLst/>
-          </a:prstGeom>
-          <a:noFill/>
-          <a:extLst>
-            <a:ext uri="{909E8E84-426E-40DD-AFC4-6F175D3DCCD1}">
-              <a14:hiddenFill xmlns:a14="http://schemas.microsoft.com/office/drawing/2010/main">
-                <a:solidFill>
-                  <a:srgbClr val="FFFFFF"/>
-                </a:solidFill>
-              </a14:hiddenFill>
-            </a:ext>
-          </a:extLst>
-        </p:spPr>
-      </p:pic>
-    </p:spTree>
-    <p:extLst>
-      <p:ext uri="{BB962C8B-B14F-4D97-AF65-F5344CB8AC3E}">
-        <p14:creationId xmlns:p14="http://schemas.microsoft.com/office/powerpoint/2010/main" val="1126494993"/>
       </p:ext>
     </p:extLst>
   </p:cSld>
@@ -9938,40 +10019,29 @@
         <p:spPr>
           <a:xfrm>
             <a:off x="1524000" y="0"/>
-            <a:ext cx="9144000" cy="1730102"/>
+            <a:ext cx="9144000" cy="1983545"/>
           </a:xfrm>
         </p:spPr>
         <p:txBody>
-          <a:bodyPr tIns="612000" anchor="t">
-            <a:normAutofit/>
+          <a:bodyPr tIns="612000" bIns="612000" anchor="t">
+            <a:noAutofit/>
           </a:bodyPr>
           <a:lstStyle/>
           <a:p>
             <a:pPr algn="l"/>
             <a:r>
-              <a:rPr lang="en-AU" sz="3200" b="1" dirty="0" smtClean="0">
-                <a:solidFill>
-                  <a:srgbClr val="00B050"/>
-                </a:solidFill>
-                <a:latin typeface="Open Sans" panose="020B0606030504020204" pitchFamily="34" charset="0"/>
-                <a:ea typeface="Open Sans" panose="020B0606030504020204" pitchFamily="34" charset="0"/>
-                <a:cs typeface="Open Sans" panose="020B0606030504020204" pitchFamily="34" charset="0"/>
-              </a:rPr>
-              <a:t>Recommend:</a:t>
-            </a:r>
-            <a:r>
-              <a:rPr lang="en-AU" sz="3200" b="1" dirty="0" smtClean="0">
-                <a:solidFill>
-                  <a:srgbClr val="111111"/>
-                </a:solidFill>
-                <a:latin typeface="Open Sans" panose="020B0606030504020204" pitchFamily="34" charset="0"/>
-                <a:ea typeface="Open Sans" panose="020B0606030504020204" pitchFamily="34" charset="0"/>
-                <a:cs typeface="Open Sans" panose="020B0606030504020204" pitchFamily="34" charset="0"/>
-              </a:rPr>
-              <a:t/>
+              <a:rPr lang="en-AU" sz="2800" b="1" dirty="0" smtClean="0">
+                <a:solidFill>
+                  <a:srgbClr val="111111"/>
+                </a:solidFill>
+                <a:latin typeface="Open Sans" panose="020B0606030504020204" pitchFamily="34" charset="0"/>
+                <a:ea typeface="Open Sans" panose="020B0606030504020204" pitchFamily="34" charset="0"/>
+                <a:cs typeface="Open Sans" panose="020B0606030504020204" pitchFamily="34" charset="0"/>
+              </a:rPr>
+              <a:t>Sticky-note password disclosure on TV</a:t>
             </a:r>
             <a:br>
-              <a:rPr lang="en-AU" sz="3200" b="1" dirty="0" smtClean="0">
+              <a:rPr lang="en-AU" sz="2800" b="1" dirty="0" smtClean="0">
                 <a:solidFill>
                   <a:srgbClr val="111111"/>
                 </a:solidFill>
@@ -9981,17 +10051,18 @@
               </a:rPr>
             </a:br>
             <a:r>
-              <a:rPr lang="en-AU" sz="3200" b="1" dirty="0" smtClean="0">
-                <a:solidFill>
-                  <a:srgbClr val="111111"/>
-                </a:solidFill>
-                <a:latin typeface="Open Sans" panose="020B0606030504020204" pitchFamily="34" charset="0"/>
-                <a:ea typeface="Open Sans" panose="020B0606030504020204" pitchFamily="34" charset="0"/>
-                <a:cs typeface="Open Sans" panose="020B0606030504020204" pitchFamily="34" charset="0"/>
-              </a:rPr>
-              <a:t>Passphrases</a:t>
-            </a:r>
-            <a:endParaRPr lang="en-AU" sz="3200" dirty="0">
+              <a:rPr lang="en-AU" sz="2800" b="1" dirty="0" smtClean="0">
+                <a:solidFill>
+                  <a:srgbClr val="111111"/>
+                </a:solidFill>
+                <a:latin typeface="Open Sans" panose="020B0606030504020204" pitchFamily="34" charset="0"/>
+                <a:ea typeface="Open Sans" panose="020B0606030504020204" pitchFamily="34" charset="0"/>
+                <a:cs typeface="Open Sans" panose="020B0606030504020204" pitchFamily="34" charset="0"/>
+                <a:hlinkClick r:id="rId2"/>
+              </a:rPr>
+              <a:t>(@pent0thal, 2015)</a:t>
+            </a:r>
+            <a:endParaRPr lang="en-AU" sz="2800" dirty="0">
               <a:solidFill>
                 <a:srgbClr val="111111"/>
               </a:solidFill>
@@ -10002,113 +10073,58 @@
           </a:p>
         </p:txBody>
       </p:sp>
-      <p:sp>
-        <p:nvSpPr>
-          <p:cNvPr id="2" name="TextBox 1"/>
-          <p:cNvSpPr txBox="1"/>
+      <p:pic>
+        <p:nvPicPr>
+          <p:cNvPr id="1028" name="Picture 4" descr="https://pbs.twimg.com/media/CCKgoRMWMAAUyeO.jpg:large"/>
+          <p:cNvPicPr>
+            <a:picLocks noChangeAspect="1" noChangeArrowheads="1"/>
+          </p:cNvPicPr>
           <p:nvPr/>
-        </p:nvSpPr>
-        <p:spPr>
+        </p:nvPicPr>
+        <p:blipFill>
+          <a:blip r:embed="rId3">
+            <a:extLst>
+              <a:ext uri="{28A0092B-C50C-407E-A947-70E740481C1C}">
+                <a14:useLocalDpi xmlns:a14="http://schemas.microsoft.com/office/drawing/2010/main" val="0"/>
+              </a:ext>
+            </a:extLst>
+          </a:blip>
+          <a:srcRect/>
+          <a:stretch>
+            <a:fillRect/>
+          </a:stretch>
+        </p:blipFill>
+        <p:spPr bwMode="auto">
           <a:xfrm>
-            <a:off x="1524000" y="1730102"/>
-            <a:ext cx="9144000" cy="1292662"/>
+            <a:off x="1795974" y="1557008"/>
+            <a:ext cx="8600052" cy="4732972"/>
           </a:xfrm>
           <a:prstGeom prst="rect">
             <a:avLst/>
           </a:prstGeom>
           <a:noFill/>
-        </p:spPr>
-        <p:txBody>
-          <a:bodyPr wrap="square" rtlCol="0">
-            <a:spAutoFit/>
-          </a:bodyPr>
-          <a:lstStyle/>
-          <a:p>
-            <a:pPr marL="285750" indent="-285750">
-              <a:buFont typeface="Arial" panose="020B0604020202020204" pitchFamily="34" charset="0"/>
-              <a:buChar char="•"/>
-            </a:pPr>
-            <a:r>
-              <a:rPr lang="en-AU" sz="2600" dirty="0" smtClean="0">
-                <a:solidFill>
-                  <a:srgbClr val="111111"/>
-                </a:solidFill>
-                <a:latin typeface="Open Sans" panose="020B0606030504020204" pitchFamily="34" charset="0"/>
-                <a:ea typeface="Open Sans" panose="020B0606030504020204" pitchFamily="34" charset="0"/>
-                <a:cs typeface="Open Sans" panose="020B0606030504020204" pitchFamily="34" charset="0"/>
-                <a:hlinkClick r:id="rId3"/>
-              </a:rPr>
-              <a:t>Oliver &amp; Snowden (2015)</a:t>
-            </a:r>
-            <a:r>
-              <a:rPr lang="en-AU" sz="2600" dirty="0" smtClean="0">
-                <a:solidFill>
-                  <a:srgbClr val="111111"/>
-                </a:solidFill>
-                <a:latin typeface="Open Sans" panose="020B0606030504020204" pitchFamily="34" charset="0"/>
-                <a:ea typeface="Open Sans" panose="020B0606030504020204" pitchFamily="34" charset="0"/>
-                <a:cs typeface="Open Sans" panose="020B0606030504020204" pitchFamily="34" charset="0"/>
-              </a:rPr>
-              <a:t> discuss how to select a strong but memorable passphrase</a:t>
-            </a:r>
-          </a:p>
-          <a:p>
-            <a:pPr marL="742950" lvl="1" indent="-285750">
-              <a:buFont typeface="Arial" panose="020B0604020202020204" pitchFamily="34" charset="0"/>
-              <a:buChar char="•"/>
-            </a:pPr>
-            <a:r>
-              <a:rPr lang="en-AU" sz="2600" dirty="0" smtClean="0">
-                <a:solidFill>
-                  <a:srgbClr val="111111"/>
-                </a:solidFill>
-                <a:latin typeface="Open Sans" panose="020B0606030504020204" pitchFamily="34" charset="0"/>
-                <a:ea typeface="Open Sans" panose="020B0606030504020204" pitchFamily="34" charset="0"/>
-                <a:cs typeface="Open Sans" panose="020B0606030504020204" pitchFamily="34" charset="0"/>
-              </a:rPr>
-              <a:t>Won’t have to write it down or save in plaintext</a:t>
-            </a:r>
-            <a:endParaRPr lang="en-AU" sz="2600" dirty="0" smtClean="0">
-              <a:solidFill>
-                <a:srgbClr val="111111"/>
-              </a:solidFill>
-              <a:latin typeface="Open Sans" panose="020B0606030504020204" pitchFamily="34" charset="0"/>
-              <a:ea typeface="Open Sans" panose="020B0606030504020204" pitchFamily="34" charset="0"/>
-              <a:cs typeface="Open Sans" panose="020B0606030504020204" pitchFamily="34" charset="0"/>
-            </a:endParaRPr>
-          </a:p>
-        </p:txBody>
-      </p:sp>
-      <p:pic>
-        <p:nvPicPr>
-          <p:cNvPr id="3" name="yzGzB-yYKcc"/>
-          <p:cNvPicPr>
-            <a:picLocks noRot="1" noChangeAspect="1"/>
-          </p:cNvPicPr>
-          <p:nvPr>
-            <a:videoFile r:link="rId1"/>
-          </p:nvPr>
-        </p:nvPicPr>
-        <p:blipFill>
-          <a:blip r:embed="rId4"/>
-          <a:stretch>
-            <a:fillRect/>
-          </a:stretch>
-        </p:blipFill>
-        <p:spPr>
-          <a:xfrm>
-            <a:off x="3121520" y="3151163"/>
-            <a:ext cx="5948960" cy="3346290"/>
-          </a:xfrm>
-          <a:prstGeom prst="rect">
-            <a:avLst/>
-          </a:prstGeom>
+          <a:effectLst>
+            <a:outerShdw blurRad="50800" dist="38100" dir="2700000" algn="tl" rotWithShape="0">
+              <a:prstClr val="black">
+                <a:alpha val="40000"/>
+              </a:prstClr>
+            </a:outerShdw>
+          </a:effectLst>
+          <a:extLst>
+            <a:ext uri="{909E8E84-426E-40DD-AFC4-6F175D3DCCD1}">
+              <a14:hiddenFill xmlns:a14="http://schemas.microsoft.com/office/drawing/2010/main">
+                <a:solidFill>
+                  <a:srgbClr val="FFFFFF"/>
+                </a:solidFill>
+              </a14:hiddenFill>
+            </a:ext>
+          </a:extLst>
         </p:spPr>
       </p:pic>
     </p:spTree>
     <p:extLst>
       <p:ext uri="{BB962C8B-B14F-4D97-AF65-F5344CB8AC3E}">
-        <p14:creationId xmlns:p14="http://schemas.microsoft.com/office/powerpoint/2010/main" val="634985698"/>
+        <p14:creationId xmlns:p14="http://schemas.microsoft.com/office/powerpoint/2010/main" val="1126494993"/>
       </p:ext>
     </p:extLst>
   </p:cSld>
@@ -10157,12 +10173,12 @@
         </p:nvSpPr>
         <p:spPr>
           <a:xfrm>
-            <a:off x="1524000" y="-1470455"/>
-            <a:ext cx="9144000" cy="2917370"/>
+            <a:off x="1524000" y="0"/>
+            <a:ext cx="9144000" cy="1730102"/>
           </a:xfrm>
         </p:spPr>
         <p:txBody>
-          <a:bodyPr anchor="b">
+          <a:bodyPr tIns="612000" anchor="t">
             <a:normAutofit/>
           </a:bodyPr>
           <a:lstStyle/>
@@ -10171,6 +10187,17 @@
             <a:r>
               <a:rPr lang="en-AU" sz="3200" b="1" dirty="0" smtClean="0">
                 <a:solidFill>
+                  <a:srgbClr val="00B050"/>
+                </a:solidFill>
+                <a:latin typeface="Open Sans" panose="020B0606030504020204" pitchFamily="34" charset="0"/>
+                <a:ea typeface="Open Sans" panose="020B0606030504020204" pitchFamily="34" charset="0"/>
+                <a:cs typeface="Open Sans" panose="020B0606030504020204" pitchFamily="34" charset="0"/>
+              </a:rPr>
+              <a:t>Recommend:</a:t>
+            </a:r>
+            <a:r>
+              <a:rPr lang="en-AU" sz="3200" b="1" dirty="0" smtClean="0">
+                <a:solidFill>
                   <a:srgbClr val="111111"/>
                 </a:solidFill>
                 <a:latin typeface="Open Sans" panose="020B0606030504020204" pitchFamily="34" charset="0"/>
@@ -10192,38 +10219,17 @@
             <a:r>
               <a:rPr lang="en-AU" sz="3200" b="1" dirty="0" smtClean="0">
                 <a:solidFill>
-                  <a:srgbClr val="FF0000"/>
-                </a:solidFill>
-                <a:latin typeface="Open Sans" panose="020B0606030504020204" pitchFamily="34" charset="0"/>
-                <a:ea typeface="Open Sans" panose="020B0606030504020204" pitchFamily="34" charset="0"/>
-                <a:cs typeface="Open Sans" panose="020B0606030504020204" pitchFamily="34" charset="0"/>
-              </a:rPr>
-              <a:t>Security issue:</a:t>
-            </a:r>
-            <a:br>
-              <a:rPr lang="en-AU" sz="3200" b="1" dirty="0" smtClean="0">
-                <a:solidFill>
-                  <a:srgbClr val="FF0000"/>
-                </a:solidFill>
-                <a:latin typeface="Open Sans" panose="020B0606030504020204" pitchFamily="34" charset="0"/>
-                <a:ea typeface="Open Sans" panose="020B0606030504020204" pitchFamily="34" charset="0"/>
-                <a:cs typeface="Open Sans" panose="020B0606030504020204" pitchFamily="34" charset="0"/>
-              </a:rPr>
-            </a:br>
-            <a:r>
-              <a:rPr lang="en-AU" sz="3200" b="1" dirty="0" smtClean="0">
-                <a:solidFill>
-                  <a:srgbClr val="FF0000"/>
-                </a:solidFill>
-                <a:latin typeface="Open Sans" panose="020B0606030504020204" pitchFamily="34" charset="0"/>
-                <a:ea typeface="Open Sans" panose="020B0606030504020204" pitchFamily="34" charset="0"/>
-                <a:cs typeface="Open Sans" panose="020B0606030504020204" pitchFamily="34" charset="0"/>
-              </a:rPr>
-              <a:t>mIRC Internet Relay Chat</a:t>
+                  <a:srgbClr val="111111"/>
+                </a:solidFill>
+                <a:latin typeface="Open Sans" panose="020B0606030504020204" pitchFamily="34" charset="0"/>
+                <a:ea typeface="Open Sans" panose="020B0606030504020204" pitchFamily="34" charset="0"/>
+                <a:cs typeface="Open Sans" panose="020B0606030504020204" pitchFamily="34" charset="0"/>
+              </a:rPr>
+              <a:t>Passphrases</a:t>
             </a:r>
             <a:endParaRPr lang="en-AU" sz="3200" dirty="0">
               <a:solidFill>
-                <a:srgbClr val="FF0000"/>
+                <a:srgbClr val="111111"/>
               </a:solidFill>
               <a:latin typeface="Open Sans" panose="020B0606030504020204" pitchFamily="34" charset="0"/>
               <a:ea typeface="Open Sans" panose="020B0606030504020204" pitchFamily="34" charset="0"/>
@@ -10240,8 +10246,8 @@
         </p:nvSpPr>
         <p:spPr>
           <a:xfrm>
-            <a:off x="1524000" y="1958544"/>
-            <a:ext cx="9144000" cy="3293209"/>
+            <a:off x="1524000" y="1730102"/>
+            <a:ext cx="9144000" cy="1292662"/>
           </a:xfrm>
           <a:prstGeom prst="rect">
             <a:avLst/>
@@ -10259,32 +10265,27 @@
               <a:buChar char="•"/>
             </a:pPr>
             <a:r>
-              <a:rPr lang="en-AU" sz="2600" dirty="0">
-                <a:solidFill>
-                  <a:srgbClr val="111111"/>
-                </a:solidFill>
-                <a:latin typeface="Open Sans" panose="020B0606030504020204" pitchFamily="34" charset="0"/>
-                <a:ea typeface="Open Sans" panose="020B0606030504020204" pitchFamily="34" charset="0"/>
-                <a:cs typeface="Open Sans" panose="020B0606030504020204" pitchFamily="34" charset="0"/>
-              </a:rPr>
-              <a:t>Internet Relay Chat (IRC) share similar risks of malware propagation as email</a:t>
-            </a:r>
-          </a:p>
-          <a:p>
-            <a:pPr marL="285750" indent="-285750">
-              <a:buFont typeface="Arial" panose="020B0604020202020204" pitchFamily="34" charset="0"/>
-              <a:buChar char="•"/>
-            </a:pPr>
-            <a:r>
-              <a:rPr lang="en-AU" sz="2600" dirty="0">
-                <a:solidFill>
-                  <a:srgbClr val="111111"/>
-                </a:solidFill>
-                <a:latin typeface="Open Sans" panose="020B0606030504020204" pitchFamily="34" charset="0"/>
-                <a:ea typeface="Open Sans" panose="020B0606030504020204" pitchFamily="34" charset="0"/>
-                <a:cs typeface="Open Sans" panose="020B0606030504020204" pitchFamily="34" charset="0"/>
-              </a:rPr>
-              <a:t>Attackers may use social engineering to</a:t>
+              <a:rPr lang="en-AU" sz="2600" dirty="0" smtClean="0">
+                <a:solidFill>
+                  <a:srgbClr val="111111"/>
+                </a:solidFill>
+                <a:latin typeface="Open Sans" panose="020B0606030504020204" pitchFamily="34" charset="0"/>
+                <a:ea typeface="Open Sans" panose="020B0606030504020204" pitchFamily="34" charset="0"/>
+                <a:cs typeface="Open Sans" panose="020B0606030504020204" pitchFamily="34" charset="0"/>
+                <a:hlinkClick r:id="rId3"/>
+              </a:rPr>
+              <a:t>Oliver &amp; Snowden (2015)</a:t>
+            </a:r>
+            <a:r>
+              <a:rPr lang="en-AU" sz="2600" dirty="0" smtClean="0">
+                <a:solidFill>
+                  <a:srgbClr val="111111"/>
+                </a:solidFill>
+                <a:latin typeface="Open Sans" panose="020B0606030504020204" pitchFamily="34" charset="0"/>
+                <a:ea typeface="Open Sans" panose="020B0606030504020204" pitchFamily="34" charset="0"/>
+                <a:cs typeface="Open Sans" panose="020B0606030504020204" pitchFamily="34" charset="0"/>
+              </a:rPr>
+              <a:t> discuss how to select a strong but memorable passphrase</a:t>
             </a:r>
           </a:p>
           <a:p>
@@ -10293,40 +10294,6 @@
               <a:buChar char="•"/>
             </a:pPr>
             <a:r>
-              <a:rPr lang="en-AU" sz="2600" dirty="0">
-                <a:solidFill>
-                  <a:srgbClr val="111111"/>
-                </a:solidFill>
-                <a:latin typeface="Open Sans" panose="020B0606030504020204" pitchFamily="34" charset="0"/>
-                <a:ea typeface="Open Sans" panose="020B0606030504020204" pitchFamily="34" charset="0"/>
-                <a:cs typeface="Open Sans" panose="020B0606030504020204" pitchFamily="34" charset="0"/>
-              </a:rPr>
-              <a:t>Convince victims to view links to malicious web pages or files</a:t>
-            </a:r>
-          </a:p>
-          <a:p>
-            <a:pPr marL="742950" lvl="1" indent="-285750">
-              <a:buFont typeface="Arial" panose="020B0604020202020204" pitchFamily="34" charset="0"/>
-              <a:buChar char="•"/>
-            </a:pPr>
-            <a:r>
-              <a:rPr lang="en-AU" sz="2600" dirty="0">
-                <a:solidFill>
-                  <a:srgbClr val="111111"/>
-                </a:solidFill>
-                <a:latin typeface="Open Sans" panose="020B0606030504020204" pitchFamily="34" charset="0"/>
-                <a:ea typeface="Open Sans" panose="020B0606030504020204" pitchFamily="34" charset="0"/>
-                <a:cs typeface="Open Sans" panose="020B0606030504020204" pitchFamily="34" charset="0"/>
-              </a:rPr>
-              <a:t>Convince victims to open malicious files sent directly through IRCs file-sharing protocol</a:t>
-            </a:r>
-          </a:p>
-          <a:p>
-            <a:pPr marL="285750" indent="-285750">
-              <a:buFont typeface="Arial" panose="020B0604020202020204" pitchFamily="34" charset="0"/>
-              <a:buChar char="•"/>
-            </a:pPr>
-            <a:r>
               <a:rPr lang="en-AU" sz="2600" dirty="0" smtClean="0">
                 <a:solidFill>
                   <a:srgbClr val="111111"/>
@@ -10335,23 +10302,48 @@
                 <a:ea typeface="Open Sans" panose="020B0606030504020204" pitchFamily="34" charset="0"/>
                 <a:cs typeface="Open Sans" panose="020B0606030504020204" pitchFamily="34" charset="0"/>
               </a:rPr>
-              <a:t>Removal of mIRC will mitigate these risks</a:t>
-            </a:r>
-            <a:endParaRPr lang="en-AU" sz="3600" b="1" dirty="0">
-              <a:solidFill>
-                <a:srgbClr val="111111"/>
-              </a:solidFill>
-              <a:latin typeface="Open Sans" panose="020B0606030504020204" pitchFamily="34" charset="0"/>
-              <a:ea typeface="Open Sans" panose="020B0606030504020204" pitchFamily="34" charset="0"/>
-              <a:cs typeface="Open Sans" panose="020B0606030504020204" pitchFamily="34" charset="0"/>
-            </a:endParaRPr>
+              <a:t>Won’t have to write it down or save in plaintext</a:t>
+            </a:r>
           </a:p>
         </p:txBody>
       </p:sp>
+      <p:pic>
+        <p:nvPicPr>
+          <p:cNvPr id="3" name="yzGzB-yYKcc"/>
+          <p:cNvPicPr>
+            <a:picLocks noRot="1" noChangeAspect="1"/>
+          </p:cNvPicPr>
+          <p:nvPr>
+            <a:videoFile r:link="rId1"/>
+          </p:nvPr>
+        </p:nvPicPr>
+        <p:blipFill>
+          <a:blip r:embed="rId4"/>
+          <a:stretch>
+            <a:fillRect/>
+          </a:stretch>
+        </p:blipFill>
+        <p:spPr>
+          <a:xfrm>
+            <a:off x="3121520" y="3151163"/>
+            <a:ext cx="5948960" cy="3346290"/>
+          </a:xfrm>
+          <a:prstGeom prst="rect">
+            <a:avLst/>
+          </a:prstGeom>
+          <a:effectLst>
+            <a:outerShdw blurRad="50800" dist="38100" dir="2700000" algn="tl" rotWithShape="0">
+              <a:prstClr val="black">
+                <a:alpha val="40000"/>
+              </a:prstClr>
+            </a:outerShdw>
+          </a:effectLst>
+        </p:spPr>
+      </p:pic>
     </p:spTree>
     <p:extLst>
       <p:ext uri="{BB962C8B-B14F-4D97-AF65-F5344CB8AC3E}">
-        <p14:creationId xmlns:p14="http://schemas.microsoft.com/office/powerpoint/2010/main" val="551019555"/>
+        <p14:creationId xmlns:p14="http://schemas.microsoft.com/office/powerpoint/2010/main" val="634985698"/>
       </p:ext>
     </p:extLst>
   </p:cSld>
@@ -10400,28 +10392,130 @@
         </p:nvSpPr>
         <p:spPr>
           <a:xfrm>
-            <a:off x="1524000" y="0"/>
-            <a:ext cx="9144000" cy="6858000"/>
+            <a:off x="1524000" y="-1470455"/>
+            <a:ext cx="9144000" cy="2917370"/>
           </a:xfrm>
         </p:spPr>
         <p:txBody>
-          <a:bodyPr anchor="ctr">
+          <a:bodyPr anchor="b">
             <a:normAutofit/>
           </a:bodyPr>
           <a:lstStyle/>
           <a:p>
-            <a:r>
-              <a:rPr lang="en-AU" sz="4400" b="1" dirty="0" smtClean="0">
-                <a:solidFill>
-                  <a:srgbClr val="111111"/>
-                </a:solidFill>
-                <a:latin typeface="Open Sans" panose="020B0606030504020204" pitchFamily="34" charset="0"/>
-                <a:ea typeface="Open Sans" panose="020B0606030504020204" pitchFamily="34" charset="0"/>
-                <a:cs typeface="Open Sans" panose="020B0606030504020204" pitchFamily="34" charset="0"/>
-              </a:rPr>
-              <a:t>Summary</a:t>
-            </a:r>
-            <a:endParaRPr lang="en-AU" sz="4400" b="1" dirty="0">
+            <a:pPr algn="l"/>
+            <a:r>
+              <a:rPr lang="en-AU" sz="3200" b="1" dirty="0" smtClean="0">
+                <a:solidFill>
+                  <a:srgbClr val="111111"/>
+                </a:solidFill>
+                <a:latin typeface="Open Sans" panose="020B0606030504020204" pitchFamily="34" charset="0"/>
+                <a:ea typeface="Open Sans" panose="020B0606030504020204" pitchFamily="34" charset="0"/>
+                <a:cs typeface="Open Sans" panose="020B0606030504020204" pitchFamily="34" charset="0"/>
+              </a:rPr>
+              <a:t/>
+            </a:r>
+            <a:br>
+              <a:rPr lang="en-AU" sz="3200" b="1" dirty="0" smtClean="0">
+                <a:solidFill>
+                  <a:srgbClr val="111111"/>
+                </a:solidFill>
+                <a:latin typeface="Open Sans" panose="020B0606030504020204" pitchFamily="34" charset="0"/>
+                <a:ea typeface="Open Sans" panose="020B0606030504020204" pitchFamily="34" charset="0"/>
+                <a:cs typeface="Open Sans" panose="020B0606030504020204" pitchFamily="34" charset="0"/>
+              </a:rPr>
+            </a:br>
+            <a:r>
+              <a:rPr lang="en-AU" sz="3200" b="1" dirty="0" smtClean="0">
+                <a:solidFill>
+                  <a:srgbClr val="FF0000"/>
+                </a:solidFill>
+                <a:latin typeface="Open Sans" panose="020B0606030504020204" pitchFamily="34" charset="0"/>
+                <a:ea typeface="Open Sans" panose="020B0606030504020204" pitchFamily="34" charset="0"/>
+                <a:cs typeface="Open Sans" panose="020B0606030504020204" pitchFamily="34" charset="0"/>
+              </a:rPr>
+              <a:t>Security issue:</a:t>
+            </a:r>
+            <a:br>
+              <a:rPr lang="en-AU" sz="3200" b="1" dirty="0" smtClean="0">
+                <a:solidFill>
+                  <a:srgbClr val="FF0000"/>
+                </a:solidFill>
+                <a:latin typeface="Open Sans" panose="020B0606030504020204" pitchFamily="34" charset="0"/>
+                <a:ea typeface="Open Sans" panose="020B0606030504020204" pitchFamily="34" charset="0"/>
+                <a:cs typeface="Open Sans" panose="020B0606030504020204" pitchFamily="34" charset="0"/>
+              </a:rPr>
+            </a:br>
+            <a:r>
+              <a:rPr lang="en-AU" sz="3200" b="1" dirty="0" smtClean="0">
+                <a:solidFill>
+                  <a:srgbClr val="FF0000"/>
+                </a:solidFill>
+                <a:latin typeface="Open Sans" panose="020B0606030504020204" pitchFamily="34" charset="0"/>
+                <a:ea typeface="Open Sans" panose="020B0606030504020204" pitchFamily="34" charset="0"/>
+                <a:cs typeface="Open Sans" panose="020B0606030504020204" pitchFamily="34" charset="0"/>
+              </a:rPr>
+              <a:t>mIRC Internet Relay Chat</a:t>
+            </a:r>
+            <a:endParaRPr lang="en-AU" sz="3200" dirty="0">
+              <a:solidFill>
+                <a:srgbClr val="FF0000"/>
+              </a:solidFill>
+              <a:latin typeface="Open Sans" panose="020B0606030504020204" pitchFamily="34" charset="0"/>
+              <a:ea typeface="Open Sans" panose="020B0606030504020204" pitchFamily="34" charset="0"/>
+              <a:cs typeface="Open Sans" panose="020B0606030504020204" pitchFamily="34" charset="0"/>
+            </a:endParaRPr>
+          </a:p>
+        </p:txBody>
+      </p:sp>
+      <p:sp>
+        <p:nvSpPr>
+          <p:cNvPr id="2" name="TextBox 1"/>
+          <p:cNvSpPr txBox="1"/>
+          <p:nvPr/>
+        </p:nvSpPr>
+        <p:spPr>
+          <a:xfrm>
+            <a:off x="1524000" y="1770459"/>
+            <a:ext cx="9144000" cy="1292662"/>
+          </a:xfrm>
+          <a:prstGeom prst="rect">
+            <a:avLst/>
+          </a:prstGeom>
+          <a:noFill/>
+        </p:spPr>
+        <p:txBody>
+          <a:bodyPr wrap="square" rtlCol="0">
+            <a:spAutoFit/>
+          </a:bodyPr>
+          <a:lstStyle/>
+          <a:p>
+            <a:pPr marL="285750" indent="-285750">
+              <a:buFont typeface="Arial" panose="020B0604020202020204" pitchFamily="34" charset="0"/>
+              <a:buChar char="•"/>
+            </a:pPr>
+            <a:r>
+              <a:rPr lang="en-AU" sz="2600" dirty="0">
+                <a:solidFill>
+                  <a:srgbClr val="111111"/>
+                </a:solidFill>
+                <a:latin typeface="Open Sans" panose="020B0606030504020204" pitchFamily="34" charset="0"/>
+                <a:ea typeface="Open Sans" panose="020B0606030504020204" pitchFamily="34" charset="0"/>
+                <a:cs typeface="Open Sans" panose="020B0606030504020204" pitchFamily="34" charset="0"/>
+              </a:rPr>
+              <a:t>Internet Relay Chat (IRC) share similar risks of malware propagation as </a:t>
+            </a:r>
+            <a:r>
+              <a:rPr lang="en-AU" sz="2600" dirty="0" smtClean="0">
+                <a:solidFill>
+                  <a:srgbClr val="111111"/>
+                </a:solidFill>
+                <a:latin typeface="Open Sans" panose="020B0606030504020204" pitchFamily="34" charset="0"/>
+                <a:ea typeface="Open Sans" panose="020B0606030504020204" pitchFamily="34" charset="0"/>
+                <a:cs typeface="Open Sans" panose="020B0606030504020204" pitchFamily="34" charset="0"/>
+              </a:rPr>
+              <a:t>email: Links, filesharing</a:t>
+            </a:r>
+            <a:endParaRPr lang="en-AU" sz="2600" dirty="0">
               <a:solidFill>
                 <a:srgbClr val="111111"/>
               </a:solidFill>
@@ -10430,12 +10524,139 @@
               <a:cs typeface="Open Sans" panose="020B0606030504020204" pitchFamily="34" charset="0"/>
             </a:endParaRPr>
           </a:p>
+          <a:p>
+            <a:pPr marL="285750" indent="-285750">
+              <a:buFont typeface="Arial" panose="020B0604020202020204" pitchFamily="34" charset="0"/>
+              <a:buChar char="•"/>
+            </a:pPr>
+            <a:r>
+              <a:rPr lang="en-AU" sz="2600" dirty="0" smtClean="0">
+                <a:solidFill>
+                  <a:srgbClr val="111111"/>
+                </a:solidFill>
+                <a:latin typeface="Open Sans" panose="020B0606030504020204" pitchFamily="34" charset="0"/>
+                <a:ea typeface="Open Sans" panose="020B0606030504020204" pitchFamily="34" charset="0"/>
+                <a:cs typeface="Open Sans" panose="020B0606030504020204" pitchFamily="34" charset="0"/>
+              </a:rPr>
+              <a:t>Used to control zombie hosts in botnet</a:t>
+            </a:r>
+            <a:endParaRPr lang="en-AU" sz="2600" dirty="0">
+              <a:solidFill>
+                <a:srgbClr val="111111"/>
+              </a:solidFill>
+              <a:latin typeface="Open Sans" panose="020B0606030504020204" pitchFamily="34" charset="0"/>
+              <a:ea typeface="Open Sans" panose="020B0606030504020204" pitchFamily="34" charset="0"/>
+              <a:cs typeface="Open Sans" panose="020B0606030504020204" pitchFamily="34" charset="0"/>
+            </a:endParaRPr>
+          </a:p>
+        </p:txBody>
+      </p:sp>
+      <p:pic>
+        <p:nvPicPr>
+          <p:cNvPr id="1026" name="Picture 2" descr="https://www.f-secure.com/virus-info/v-pics/devnull.gif"/>
+          <p:cNvPicPr>
+            <a:picLocks noChangeAspect="1" noChangeArrowheads="1"/>
+          </p:cNvPicPr>
+          <p:nvPr/>
+        </p:nvPicPr>
+        <p:blipFill>
+          <a:blip r:embed="rId2">
+            <a:extLst>
+              <a:ext uri="{28A0092B-C50C-407E-A947-70E740481C1C}">
+                <a14:useLocalDpi xmlns:a14="http://schemas.microsoft.com/office/drawing/2010/main" val="0"/>
+              </a:ext>
+            </a:extLst>
+          </a:blip>
+          <a:srcRect/>
+          <a:stretch>
+            <a:fillRect/>
+          </a:stretch>
+        </p:blipFill>
+        <p:spPr bwMode="auto">
+          <a:xfrm>
+            <a:off x="1524000" y="3386666"/>
+            <a:ext cx="2957273" cy="3141310"/>
+          </a:xfrm>
+          <a:prstGeom prst="rect">
+            <a:avLst/>
+          </a:prstGeom>
+          <a:noFill/>
+          <a:effectLst>
+            <a:outerShdw blurRad="50800" dist="38100" dir="2700000" algn="tl" rotWithShape="0">
+              <a:prstClr val="black">
+                <a:alpha val="40000"/>
+              </a:prstClr>
+            </a:outerShdw>
+          </a:effectLst>
+          <a:extLst>
+            <a:ext uri="{909E8E84-426E-40DD-AFC4-6F175D3DCCD1}">
+              <a14:hiddenFill xmlns:a14="http://schemas.microsoft.com/office/drawing/2010/main">
+                <a:solidFill>
+                  <a:srgbClr val="FFFFFF"/>
+                </a:solidFill>
+              </a14:hiddenFill>
+            </a:ext>
+          </a:extLst>
+        </p:spPr>
+      </p:pic>
+      <p:sp>
+        <p:nvSpPr>
+          <p:cNvPr id="5" name="TextBox 4"/>
+          <p:cNvSpPr txBox="1"/>
+          <p:nvPr/>
+        </p:nvSpPr>
+        <p:spPr>
+          <a:xfrm>
+            <a:off x="4481273" y="4602832"/>
+            <a:ext cx="6310905" cy="708977"/>
+          </a:xfrm>
+          <a:prstGeom prst="rect">
+            <a:avLst/>
+          </a:prstGeom>
+          <a:noFill/>
+        </p:spPr>
+        <p:txBody>
+          <a:bodyPr wrap="square" lIns="180000" tIns="46800" rIns="612000" rtlCol="0">
+            <a:spAutoFit/>
+          </a:bodyPr>
+          <a:lstStyle/>
+          <a:p>
+            <a:r>
+              <a:rPr lang="en-AU" sz="2000" dirty="0" smtClean="0">
+                <a:latin typeface="Open Sans" panose="020B0606030504020204" pitchFamily="34" charset="0"/>
+                <a:ea typeface="Open Sans" panose="020B0606030504020204" pitchFamily="34" charset="0"/>
+                <a:cs typeface="Open Sans" panose="020B0606030504020204" pitchFamily="34" charset="0"/>
+              </a:rPr>
+              <a:t>Botnet controlled via IRC channel</a:t>
+            </a:r>
+            <a:endParaRPr lang="en-AU" sz="2000" dirty="0">
+              <a:latin typeface="Open Sans" panose="020B0606030504020204" pitchFamily="34" charset="0"/>
+              <a:ea typeface="Open Sans" panose="020B0606030504020204" pitchFamily="34" charset="0"/>
+              <a:cs typeface="Open Sans" panose="020B0606030504020204" pitchFamily="34" charset="0"/>
+            </a:endParaRPr>
+          </a:p>
+          <a:p>
+            <a:r>
+              <a:rPr lang="en-AU" sz="2000" dirty="0" smtClean="0">
+                <a:latin typeface="Open Sans" panose="020B0606030504020204" pitchFamily="34" charset="0"/>
+                <a:ea typeface="Open Sans" panose="020B0606030504020204" pitchFamily="34" charset="0"/>
+                <a:cs typeface="Open Sans" panose="020B0606030504020204" pitchFamily="34" charset="0"/>
+                <a:hlinkClick r:id="rId3"/>
+              </a:rPr>
+              <a:t>(Carrera, 2002)</a:t>
+            </a:r>
+            <a:endParaRPr lang="en-AU" sz="2000" dirty="0">
+              <a:latin typeface="Open Sans" panose="020B0606030504020204" pitchFamily="34" charset="0"/>
+              <a:ea typeface="Open Sans" panose="020B0606030504020204" pitchFamily="34" charset="0"/>
+              <a:cs typeface="Open Sans" panose="020B0606030504020204" pitchFamily="34" charset="0"/>
+            </a:endParaRPr>
+          </a:p>
         </p:txBody>
       </p:sp>
     </p:spTree>
     <p:extLst>
       <p:ext uri="{BB962C8B-B14F-4D97-AF65-F5344CB8AC3E}">
-        <p14:creationId xmlns:p14="http://schemas.microsoft.com/office/powerpoint/2010/main" val="4049782558"/>
+        <p14:creationId xmlns:p14="http://schemas.microsoft.com/office/powerpoint/2010/main" val="551019555"/>
       </p:ext>
     </p:extLst>
   </p:cSld>
@@ -10474,58 +10695,13 @@
       </p:grpSpPr>
       <p:sp>
         <p:nvSpPr>
-          <p:cNvPr id="4" name="Title 3"/>
-          <p:cNvSpPr>
-            <a:spLocks noGrp="1"/>
-          </p:cNvSpPr>
-          <p:nvPr>
-            <p:ph type="ctrTitle"/>
-          </p:nvPr>
-        </p:nvSpPr>
-        <p:spPr>
-          <a:xfrm>
-            <a:off x="1524000" y="-506438"/>
-            <a:ext cx="9144000" cy="1446915"/>
-          </a:xfrm>
-        </p:spPr>
-        <p:txBody>
-          <a:bodyPr anchor="b">
-            <a:normAutofit/>
-          </a:bodyPr>
-          <a:lstStyle/>
-          <a:p>
-            <a:pPr algn="l"/>
-            <a:r>
-              <a:rPr lang="en-AU" sz="3200" b="1" dirty="0" smtClean="0">
-                <a:solidFill>
-                  <a:srgbClr val="111111"/>
-                </a:solidFill>
-                <a:latin typeface="Open Sans" panose="020B0606030504020204" pitchFamily="34" charset="0"/>
-                <a:ea typeface="Open Sans" panose="020B0606030504020204" pitchFamily="34" charset="0"/>
-                <a:cs typeface="Open Sans" panose="020B0606030504020204" pitchFamily="34" charset="0"/>
-              </a:rPr>
-              <a:t>Patch management</a:t>
-            </a:r>
-            <a:endParaRPr lang="en-AU" sz="3200" dirty="0">
-              <a:solidFill>
-                <a:srgbClr val="111111"/>
-              </a:solidFill>
-              <a:latin typeface="Open Sans" panose="020B0606030504020204" pitchFamily="34" charset="0"/>
-              <a:ea typeface="Open Sans" panose="020B0606030504020204" pitchFamily="34" charset="0"/>
-              <a:cs typeface="Open Sans" panose="020B0606030504020204" pitchFamily="34" charset="0"/>
-            </a:endParaRPr>
-          </a:p>
-        </p:txBody>
-      </p:sp>
-      <p:sp>
-        <p:nvSpPr>
           <p:cNvPr id="2" name="TextBox 1"/>
           <p:cNvSpPr txBox="1"/>
           <p:nvPr/>
         </p:nvSpPr>
         <p:spPr>
           <a:xfrm>
-            <a:off x="1524000" y="1452107"/>
+            <a:off x="1524000" y="1660716"/>
             <a:ext cx="9144000" cy="1692771"/>
           </a:xfrm>
           <a:prstGeom prst="rect">
@@ -10552,24 +10728,7 @@
                 <a:ea typeface="Open Sans" panose="020B0606030504020204" pitchFamily="34" charset="0"/>
                 <a:cs typeface="Open Sans" panose="020B0606030504020204" pitchFamily="34" charset="0"/>
               </a:rPr>
-              <a:t>Use proactive patch management strategy</a:t>
-            </a:r>
-          </a:p>
-          <a:p>
-            <a:pPr marL="742950" lvl="1" indent="-285750">
-              <a:buFont typeface="Arial" panose="020B0604020202020204" pitchFamily="34" charset="0"/>
-              <a:buChar char="•"/>
-            </a:pPr>
-            <a:r>
-              <a:rPr lang="en-AU" sz="2600" dirty="0" smtClean="0">
-                <a:solidFill>
-                  <a:srgbClr val="111111"/>
-                </a:solidFill>
-                <a:latin typeface="Open Sans" panose="020B0606030504020204" pitchFamily="34" charset="0"/>
-                <a:ea typeface="Open Sans" panose="020B0606030504020204" pitchFamily="34" charset="0"/>
-                <a:cs typeface="Open Sans" panose="020B0606030504020204" pitchFamily="34" charset="0"/>
-              </a:rPr>
-              <a:t>Mitigate vulnerabilities in software</a:t>
+              <a:t>Deny use/installation of IRC clients in corporate environment</a:t>
             </a:r>
           </a:p>
           <a:p>
@@ -10586,8 +10745,14 @@
                 <a:ea typeface="Open Sans" panose="020B0606030504020204" pitchFamily="34" charset="0"/>
                 <a:cs typeface="Open Sans" panose="020B0606030504020204" pitchFamily="34" charset="0"/>
               </a:rPr>
-              <a:t>Recommend </a:t>
-            </a:r>
+              <a:t>Mitigate risks of malware propagation</a:t>
+            </a:r>
+          </a:p>
+          <a:p>
+            <a:pPr marL="285750" indent="-285750">
+              <a:buFont typeface="Arial" panose="020B0604020202020204" pitchFamily="34" charset="0"/>
+              <a:buChar char="•"/>
+            </a:pPr>
             <a:r>
               <a:rPr lang="en-AU" sz="2600" dirty="0" smtClean="0">
                 <a:solidFill>
@@ -10596,11 +10761,10 @@
                 <a:latin typeface="Open Sans" panose="020B0606030504020204" pitchFamily="34" charset="0"/>
                 <a:ea typeface="Open Sans" panose="020B0606030504020204" pitchFamily="34" charset="0"/>
                 <a:cs typeface="Open Sans" panose="020B0606030504020204" pitchFamily="34" charset="0"/>
-                <a:hlinkClick r:id="rId2"/>
-              </a:rPr>
-              <a:t>SolarWinds Patch Manager 2.1</a:t>
-            </a:r>
-            <a:endParaRPr lang="en-AU" sz="3600" dirty="0" smtClean="0">
+              </a:rPr>
+              <a:t>Mitigate ability to be controlled as botnet zombie</a:t>
+            </a:r>
+            <a:endParaRPr lang="en-AU" sz="2600" dirty="0" smtClean="0">
               <a:solidFill>
                 <a:srgbClr val="111111"/>
               </a:solidFill>
@@ -10609,28 +10773,102 @@
               <a:cs typeface="Open Sans" panose="020B0606030504020204" pitchFamily="34" charset="0"/>
             </a:endParaRPr>
           </a:p>
-          <a:p>
-            <a:pPr marL="742950" lvl="1" indent="-285750">
-              <a:buFont typeface="Arial" panose="020B0604020202020204" pitchFamily="34" charset="0"/>
-              <a:buChar char="•"/>
-            </a:pPr>
-            <a:r>
-              <a:rPr lang="en-AU" sz="2600" dirty="0" smtClean="0">
-                <a:solidFill>
-                  <a:srgbClr val="111111"/>
-                </a:solidFill>
-                <a:latin typeface="Open Sans" panose="020B0606030504020204" pitchFamily="34" charset="0"/>
-                <a:ea typeface="Open Sans" panose="020B0606030504020204" pitchFamily="34" charset="0"/>
-                <a:cs typeface="Open Sans" panose="020B0606030504020204" pitchFamily="34" charset="0"/>
-              </a:rPr>
-              <a:t>Manage patching in large computer network</a:t>
-            </a:r>
+        </p:txBody>
+      </p:sp>
+      <p:pic>
+        <p:nvPicPr>
+          <p:cNvPr id="5" name="Picture 4"/>
+          <p:cNvPicPr>
+            <a:picLocks noChangeAspect="1"/>
+          </p:cNvPicPr>
+          <p:nvPr/>
+        </p:nvPicPr>
+        <p:blipFill>
+          <a:blip r:embed="rId2">
+            <a:extLst>
+              <a:ext uri="{28A0092B-C50C-407E-A947-70E740481C1C}">
+                <a14:useLocalDpi xmlns:a14="http://schemas.microsoft.com/office/drawing/2010/main" val="0"/>
+              </a:ext>
+            </a:extLst>
+          </a:blip>
+          <a:stretch>
+            <a:fillRect/>
+          </a:stretch>
+        </p:blipFill>
+        <p:spPr>
+          <a:xfrm>
+            <a:off x="1524000" y="3567289"/>
+            <a:ext cx="5882027" cy="3051713"/>
+          </a:xfrm>
+          <a:prstGeom prst="rect">
+            <a:avLst/>
+          </a:prstGeom>
+        </p:spPr>
+      </p:pic>
+      <p:sp>
+        <p:nvSpPr>
+          <p:cNvPr id="6" name="TextBox 5"/>
+          <p:cNvSpPr txBox="1"/>
+          <p:nvPr/>
+        </p:nvSpPr>
+        <p:spPr>
+          <a:xfrm>
+            <a:off x="7406027" y="4738656"/>
+            <a:ext cx="4785973" cy="708977"/>
+          </a:xfrm>
+          <a:prstGeom prst="rect">
+            <a:avLst/>
+          </a:prstGeom>
+          <a:noFill/>
+        </p:spPr>
+        <p:txBody>
+          <a:bodyPr wrap="square" lIns="180000" tIns="46800" rtlCol="0">
+            <a:spAutoFit/>
+          </a:bodyPr>
+          <a:lstStyle/>
+          <a:p>
+            <a:r>
+              <a:rPr lang="en-AU" sz="2000" dirty="0" smtClean="0">
+                <a:latin typeface="Open Sans" panose="020B0606030504020204" pitchFamily="34" charset="0"/>
+                <a:ea typeface="Open Sans" panose="020B0606030504020204" pitchFamily="34" charset="0"/>
+                <a:cs typeface="Open Sans" panose="020B0606030504020204" pitchFamily="34" charset="0"/>
+              </a:rPr>
+              <a:t>File sharing via IRC using</a:t>
+            </a:r>
+            <a:br>
+              <a:rPr lang="en-AU" sz="2000" dirty="0" smtClean="0">
+                <a:latin typeface="Open Sans" panose="020B0606030504020204" pitchFamily="34" charset="0"/>
+                <a:ea typeface="Open Sans" panose="020B0606030504020204" pitchFamily="34" charset="0"/>
+                <a:cs typeface="Open Sans" panose="020B0606030504020204" pitchFamily="34" charset="0"/>
+              </a:rPr>
+            </a:br>
+            <a:r>
+              <a:rPr lang="en-AU" sz="2000" dirty="0" smtClean="0">
+                <a:latin typeface="Open Sans" panose="020B0606030504020204" pitchFamily="34" charset="0"/>
+                <a:ea typeface="Open Sans" panose="020B0606030504020204" pitchFamily="34" charset="0"/>
+                <a:cs typeface="Open Sans" panose="020B0606030504020204" pitchFamily="34" charset="0"/>
+              </a:rPr>
+              <a:t>Blu</a:t>
+            </a:r>
+            <a:r>
+              <a:rPr lang="en-AU" sz="2000" dirty="0" smtClean="0">
+                <a:latin typeface="Open Sans" panose="020B0606030504020204" pitchFamily="34" charset="0"/>
+                <a:ea typeface="Open Sans" panose="020B0606030504020204" pitchFamily="34" charset="0"/>
+                <a:cs typeface="Open Sans" panose="020B0606030504020204" pitchFamily="34" charset="0"/>
+              </a:rPr>
+              <a:t>e Ink’s mIRC client in VM</a:t>
+            </a:r>
+            <a:endParaRPr lang="en-AU" sz="2000" dirty="0">
+              <a:latin typeface="Open Sans" panose="020B0606030504020204" pitchFamily="34" charset="0"/>
+              <a:ea typeface="Open Sans" panose="020B0606030504020204" pitchFamily="34" charset="0"/>
+              <a:cs typeface="Open Sans" panose="020B0606030504020204" pitchFamily="34" charset="0"/>
+            </a:endParaRPr>
           </a:p>
         </p:txBody>
       </p:sp>
       <p:sp>
         <p:nvSpPr>
-          <p:cNvPr id="5" name="Title 3"/>
+          <p:cNvPr id="8" name="Title 3"/>
           <p:cNvSpPr txBox="1">
             <a:spLocks/>
           </p:cNvSpPr>
@@ -10638,8 +10876,8 @@
         </p:nvSpPr>
         <p:spPr>
           <a:xfrm>
-            <a:off x="1524000" y="2344659"/>
-            <a:ext cx="9144000" cy="1446915"/>
+            <a:off x="1524000" y="-1470455"/>
+            <a:ext cx="9144000" cy="2917370"/>
           </a:xfrm>
           <a:prstGeom prst="rect">
             <a:avLst/>
@@ -10679,7 +10917,42 @@
                 <a:ea typeface="Open Sans" panose="020B0606030504020204" pitchFamily="34" charset="0"/>
                 <a:cs typeface="Open Sans" panose="020B0606030504020204" pitchFamily="34" charset="0"/>
               </a:rPr>
-              <a:t>Passwords</a:t>
+              <a:t/>
+            </a:r>
+            <a:br>
+              <a:rPr lang="en-AU" sz="3200" b="1" dirty="0" smtClean="0">
+                <a:solidFill>
+                  <a:srgbClr val="111111"/>
+                </a:solidFill>
+                <a:latin typeface="Open Sans" panose="020B0606030504020204" pitchFamily="34" charset="0"/>
+                <a:ea typeface="Open Sans" panose="020B0606030504020204" pitchFamily="34" charset="0"/>
+                <a:cs typeface="Open Sans" panose="020B0606030504020204" pitchFamily="34" charset="0"/>
+              </a:rPr>
+            </a:br>
+            <a:r>
+              <a:rPr lang="en-AU" sz="3200" b="1" dirty="0" smtClean="0">
+                <a:solidFill>
+                  <a:srgbClr val="00B050"/>
+                </a:solidFill>
+                <a:latin typeface="Open Sans" panose="020B0606030504020204" pitchFamily="34" charset="0"/>
+                <a:ea typeface="Open Sans" panose="020B0606030504020204" pitchFamily="34" charset="0"/>
+                <a:cs typeface="Open Sans" panose="020B0606030504020204" pitchFamily="34" charset="0"/>
+              </a:rPr>
+              <a:t>Recommend:</a:t>
+            </a:r>
+          </a:p>
+          <a:p>
+            <a:pPr algn="l"/>
+            <a:r>
+              <a:rPr lang="en-AU" sz="3200" b="1" dirty="0" smtClean="0">
+                <a:solidFill>
+                  <a:srgbClr val="111111"/>
+                </a:solidFill>
+                <a:latin typeface="Open Sans" panose="020B0606030504020204" pitchFamily="34" charset="0"/>
+                <a:ea typeface="Open Sans" panose="020B0606030504020204" pitchFamily="34" charset="0"/>
+                <a:cs typeface="Open Sans" panose="020B0606030504020204" pitchFamily="34" charset="0"/>
+              </a:rPr>
+              <a:t>Remove mIRC</a:t>
             </a:r>
             <a:endParaRPr lang="en-AU" sz="3200" dirty="0">
               <a:solidFill>
@@ -10692,109 +10965,10 @@
           </a:p>
         </p:txBody>
       </p:sp>
-      <p:sp>
-        <p:nvSpPr>
-          <p:cNvPr id="6" name="TextBox 5"/>
-          <p:cNvSpPr txBox="1"/>
-          <p:nvPr/>
-        </p:nvSpPr>
-        <p:spPr>
-          <a:xfrm>
-            <a:off x="1524000" y="4303204"/>
-            <a:ext cx="9144000" cy="2092881"/>
-          </a:xfrm>
-          <a:prstGeom prst="rect">
-            <a:avLst/>
-          </a:prstGeom>
-          <a:noFill/>
-        </p:spPr>
-        <p:txBody>
-          <a:bodyPr wrap="square" rtlCol="0">
-            <a:spAutoFit/>
-          </a:bodyPr>
-          <a:lstStyle/>
-          <a:p>
-            <a:pPr marL="285750" indent="-285750">
-              <a:buFont typeface="Arial" panose="020B0604020202020204" pitchFamily="34" charset="0"/>
-              <a:buChar char="•"/>
-            </a:pPr>
-            <a:r>
-              <a:rPr lang="en-AU" sz="2600" dirty="0" smtClean="0">
-                <a:solidFill>
-                  <a:srgbClr val="111111"/>
-                </a:solidFill>
-                <a:latin typeface="Open Sans" panose="020B0606030504020204" pitchFamily="34" charset="0"/>
-                <a:ea typeface="Open Sans" panose="020B0606030504020204" pitchFamily="34" charset="0"/>
-                <a:cs typeface="Open Sans" panose="020B0606030504020204" pitchFamily="34" charset="0"/>
-              </a:rPr>
-              <a:t>Configure users/groups with Active Directory</a:t>
-            </a:r>
-          </a:p>
-          <a:p>
-            <a:pPr marL="742950" lvl="1" indent="-285750">
-              <a:buFont typeface="Arial" panose="020B0604020202020204" pitchFamily="34" charset="0"/>
-              <a:buChar char="•"/>
-            </a:pPr>
-            <a:r>
-              <a:rPr lang="en-AU" sz="2600" dirty="0" smtClean="0">
-                <a:solidFill>
-                  <a:srgbClr val="111111"/>
-                </a:solidFill>
-                <a:latin typeface="Open Sans" panose="020B0606030504020204" pitchFamily="34" charset="0"/>
-                <a:ea typeface="Open Sans" panose="020B0606030504020204" pitchFamily="34" charset="0"/>
-                <a:cs typeface="Open Sans" panose="020B0606030504020204" pitchFamily="34" charset="0"/>
-              </a:rPr>
-              <a:t>Enforce passwords, password policy, screensaver lock, and account lockout after failed attempts</a:t>
-            </a:r>
-          </a:p>
-          <a:p>
-            <a:pPr marL="285750" indent="-285750">
-              <a:buFont typeface="Arial" panose="020B0604020202020204" pitchFamily="34" charset="0"/>
-              <a:buChar char="•"/>
-            </a:pPr>
-            <a:r>
-              <a:rPr lang="en-AU" sz="2600" dirty="0" smtClean="0">
-                <a:solidFill>
-                  <a:srgbClr val="111111"/>
-                </a:solidFill>
-                <a:latin typeface="Open Sans" panose="020B0606030504020204" pitchFamily="34" charset="0"/>
-                <a:ea typeface="Open Sans" panose="020B0606030504020204" pitchFamily="34" charset="0"/>
-                <a:cs typeface="Open Sans" panose="020B0606030504020204" pitchFamily="34" charset="0"/>
-              </a:rPr>
-              <a:t>Use passphrases for password policies</a:t>
-            </a:r>
-            <a:endParaRPr lang="en-AU" sz="3600" dirty="0" smtClean="0">
-              <a:solidFill>
-                <a:srgbClr val="111111"/>
-              </a:solidFill>
-              <a:latin typeface="Open Sans" panose="020B0606030504020204" pitchFamily="34" charset="0"/>
-              <a:ea typeface="Open Sans" panose="020B0606030504020204" pitchFamily="34" charset="0"/>
-              <a:cs typeface="Open Sans" panose="020B0606030504020204" pitchFamily="34" charset="0"/>
-            </a:endParaRPr>
-          </a:p>
-          <a:p>
-            <a:pPr marL="742950" lvl="1" indent="-285750">
-              <a:buFont typeface="Arial" panose="020B0604020202020204" pitchFamily="34" charset="0"/>
-              <a:buChar char="•"/>
-            </a:pPr>
-            <a:r>
-              <a:rPr lang="en-AU" sz="2600" dirty="0" smtClean="0">
-                <a:solidFill>
-                  <a:srgbClr val="111111"/>
-                </a:solidFill>
-                <a:latin typeface="Open Sans" panose="020B0606030504020204" pitchFamily="34" charset="0"/>
-                <a:ea typeface="Open Sans" panose="020B0606030504020204" pitchFamily="34" charset="0"/>
-                <a:cs typeface="Open Sans" panose="020B0606030504020204" pitchFamily="34" charset="0"/>
-              </a:rPr>
-              <a:t>Prevent users from writing passwords down</a:t>
-            </a:r>
-          </a:p>
-        </p:txBody>
-      </p:sp>
     </p:spTree>
     <p:extLst>
       <p:ext uri="{BB962C8B-B14F-4D97-AF65-F5344CB8AC3E}">
-        <p14:creationId xmlns:p14="http://schemas.microsoft.com/office/powerpoint/2010/main" val="587882714"/>
+        <p14:creationId xmlns:p14="http://schemas.microsoft.com/office/powerpoint/2010/main" val="850769826"/>
       </p:ext>
     </p:extLst>
   </p:cSld>
@@ -10843,29 +11017,28 @@
         </p:nvSpPr>
         <p:spPr>
           <a:xfrm>
-            <a:off x="1524000" y="-1"/>
-            <a:ext cx="9144000" cy="1446915"/>
+            <a:off x="1524000" y="0"/>
+            <a:ext cx="9144000" cy="6858000"/>
           </a:xfrm>
         </p:spPr>
         <p:txBody>
-          <a:bodyPr anchor="b">
+          <a:bodyPr anchor="ctr">
             <a:normAutofit/>
           </a:bodyPr>
           <a:lstStyle/>
           <a:p>
-            <a:pPr algn="l"/>
-            <a:r>
-              <a:rPr lang="en-AU" sz="3200" b="1" dirty="0" smtClean="0">
-                <a:solidFill>
-                  <a:srgbClr val="111111"/>
-                </a:solidFill>
-                <a:latin typeface="Open Sans" panose="020B0606030504020204" pitchFamily="34" charset="0"/>
-                <a:ea typeface="Open Sans" panose="020B0606030504020204" pitchFamily="34" charset="0"/>
-                <a:cs typeface="Open Sans" panose="020B0606030504020204" pitchFamily="34" charset="0"/>
-              </a:rPr>
-              <a:t>User practices</a:t>
-            </a:r>
-            <a:endParaRPr lang="en-AU" sz="3200" dirty="0">
+            <a:r>
+              <a:rPr lang="en-AU" sz="4400" b="1" dirty="0" smtClean="0">
+                <a:solidFill>
+                  <a:srgbClr val="111111"/>
+                </a:solidFill>
+                <a:latin typeface="Open Sans" panose="020B0606030504020204" pitchFamily="34" charset="0"/>
+                <a:ea typeface="Open Sans" panose="020B0606030504020204" pitchFamily="34" charset="0"/>
+                <a:cs typeface="Open Sans" panose="020B0606030504020204" pitchFamily="34" charset="0"/>
+              </a:rPr>
+              <a:t>Summary</a:t>
+            </a:r>
+            <a:endParaRPr lang="en-AU" sz="4400" b="1" dirty="0">
               <a:solidFill>
                 <a:srgbClr val="111111"/>
               </a:solidFill>
@@ -10876,221 +11049,10 @@
           </a:p>
         </p:txBody>
       </p:sp>
-      <p:sp>
-        <p:nvSpPr>
-          <p:cNvPr id="2" name="TextBox 1"/>
-          <p:cNvSpPr txBox="1"/>
-          <p:nvPr/>
-        </p:nvSpPr>
-        <p:spPr>
-          <a:xfrm>
-            <a:off x="1524000" y="1958544"/>
-            <a:ext cx="9144000" cy="1292662"/>
-          </a:xfrm>
-          <a:prstGeom prst="rect">
-            <a:avLst/>
-          </a:prstGeom>
-          <a:noFill/>
-        </p:spPr>
-        <p:txBody>
-          <a:bodyPr wrap="square" rtlCol="0">
-            <a:spAutoFit/>
-          </a:bodyPr>
-          <a:lstStyle/>
-          <a:p>
-            <a:pPr marL="285750" indent="-285750">
-              <a:buFont typeface="Arial" panose="020B0604020202020204" pitchFamily="34" charset="0"/>
-              <a:buChar char="•"/>
-            </a:pPr>
-            <a:r>
-              <a:rPr lang="en-AU" sz="2600" dirty="0" smtClean="0">
-                <a:solidFill>
-                  <a:srgbClr val="111111"/>
-                </a:solidFill>
-                <a:latin typeface="Open Sans" panose="020B0606030504020204" pitchFamily="34" charset="0"/>
-                <a:ea typeface="Open Sans" panose="020B0606030504020204" pitchFamily="34" charset="0"/>
-                <a:cs typeface="Open Sans" panose="020B0606030504020204" pitchFamily="34" charset="0"/>
-              </a:rPr>
-              <a:t>Do not store passwords in plaintext files or handwritten notes</a:t>
-            </a:r>
-          </a:p>
-          <a:p>
-            <a:pPr marL="285750" indent="-285750">
-              <a:buFont typeface="Arial" panose="020B0604020202020204" pitchFamily="34" charset="0"/>
-              <a:buChar char="•"/>
-            </a:pPr>
-            <a:r>
-              <a:rPr lang="en-AU" sz="2600" dirty="0" smtClean="0">
-                <a:solidFill>
-                  <a:srgbClr val="111111"/>
-                </a:solidFill>
-                <a:latin typeface="Open Sans" panose="020B0606030504020204" pitchFamily="34" charset="0"/>
-                <a:ea typeface="Open Sans" panose="020B0606030504020204" pitchFamily="34" charset="0"/>
-                <a:cs typeface="Open Sans" panose="020B0606030504020204" pitchFamily="34" charset="0"/>
-              </a:rPr>
-              <a:t>Remove mIRC to prevent malware propagation</a:t>
-            </a:r>
-            <a:endParaRPr lang="en-AU" sz="3600" dirty="0">
-              <a:solidFill>
-                <a:srgbClr val="111111"/>
-              </a:solidFill>
-              <a:latin typeface="Open Sans" panose="020B0606030504020204" pitchFamily="34" charset="0"/>
-              <a:ea typeface="Open Sans" panose="020B0606030504020204" pitchFamily="34" charset="0"/>
-              <a:cs typeface="Open Sans" panose="020B0606030504020204" pitchFamily="34" charset="0"/>
-            </a:endParaRPr>
-          </a:p>
-        </p:txBody>
-      </p:sp>
-      <p:sp>
-        <p:nvSpPr>
-          <p:cNvPr id="5" name="Title 3"/>
-          <p:cNvSpPr txBox="1">
-            <a:spLocks/>
-          </p:cNvSpPr>
-          <p:nvPr/>
-        </p:nvSpPr>
-        <p:spPr>
-          <a:xfrm>
-            <a:off x="1524000" y="2851096"/>
-            <a:ext cx="9144000" cy="1446915"/>
-          </a:xfrm>
-          <a:prstGeom prst="rect">
-            <a:avLst/>
-          </a:prstGeom>
-        </p:spPr>
-        <p:txBody>
-          <a:bodyPr vert="horz" lIns="91440" tIns="45720" rIns="91440" bIns="45720" rtlCol="0" anchor="b">
-            <a:normAutofit/>
-          </a:bodyPr>
-          <a:lstStyle>
-            <a:lvl1pPr algn="ctr" defTabSz="914400" rtl="0" eaLnBrk="1" latinLnBrk="0" hangingPunct="1">
-              <a:lnSpc>
-                <a:spcPct val="90000"/>
-              </a:lnSpc>
-              <a:spcBef>
-                <a:spcPct val="0"/>
-              </a:spcBef>
-              <a:buNone/>
-              <a:defRPr sz="6000" kern="1200">
-                <a:solidFill>
-                  <a:schemeClr val="tx1"/>
-                </a:solidFill>
-                <a:latin typeface="+mj-lt"/>
-                <a:ea typeface="+mj-ea"/>
-                <a:cs typeface="+mj-cs"/>
-              </a:defRPr>
-            </a:lvl1pPr>
-          </a:lstStyle>
-          <a:p>
-            <a:pPr algn="l"/>
-            <a:r>
-              <a:rPr lang="en-AU" sz="3200" b="1" dirty="0" smtClean="0">
-                <a:solidFill>
-                  <a:srgbClr val="111111"/>
-                </a:solidFill>
-                <a:latin typeface="Open Sans" panose="020B0606030504020204" pitchFamily="34" charset="0"/>
-                <a:ea typeface="Open Sans" panose="020B0606030504020204" pitchFamily="34" charset="0"/>
-                <a:cs typeface="Open Sans" panose="020B0606030504020204" pitchFamily="34" charset="0"/>
-              </a:rPr>
-              <a:t>User rights</a:t>
-            </a:r>
-            <a:endParaRPr lang="en-AU" sz="3200" dirty="0">
-              <a:solidFill>
-                <a:srgbClr val="111111"/>
-              </a:solidFill>
-              <a:latin typeface="Open Sans" panose="020B0606030504020204" pitchFamily="34" charset="0"/>
-              <a:ea typeface="Open Sans" panose="020B0606030504020204" pitchFamily="34" charset="0"/>
-              <a:cs typeface="Open Sans" panose="020B0606030504020204" pitchFamily="34" charset="0"/>
-            </a:endParaRPr>
-          </a:p>
-        </p:txBody>
-      </p:sp>
-      <p:sp>
-        <p:nvSpPr>
-          <p:cNvPr id="6" name="TextBox 5"/>
-          <p:cNvSpPr txBox="1"/>
-          <p:nvPr/>
-        </p:nvSpPr>
-        <p:spPr>
-          <a:xfrm>
-            <a:off x="1524000" y="4809641"/>
-            <a:ext cx="9144000" cy="1692771"/>
-          </a:xfrm>
-          <a:prstGeom prst="rect">
-            <a:avLst/>
-          </a:prstGeom>
-          <a:noFill/>
-        </p:spPr>
-        <p:txBody>
-          <a:bodyPr wrap="square" rtlCol="0">
-            <a:spAutoFit/>
-          </a:bodyPr>
-          <a:lstStyle/>
-          <a:p>
-            <a:pPr marL="285750" indent="-285750">
-              <a:buFont typeface="Arial" panose="020B0604020202020204" pitchFamily="34" charset="0"/>
-              <a:buChar char="•"/>
-            </a:pPr>
-            <a:r>
-              <a:rPr lang="en-AU" sz="2600" dirty="0" smtClean="0">
-                <a:solidFill>
-                  <a:srgbClr val="111111"/>
-                </a:solidFill>
-                <a:latin typeface="Open Sans" panose="020B0606030504020204" pitchFamily="34" charset="0"/>
-                <a:ea typeface="Open Sans" panose="020B0606030504020204" pitchFamily="34" charset="0"/>
-                <a:cs typeface="Open Sans" panose="020B0606030504020204" pitchFamily="34" charset="0"/>
-              </a:rPr>
-              <a:t>Configure Active Directory user groups with appropriate user rights</a:t>
-            </a:r>
-            <a:endParaRPr lang="en-AU" sz="3600" dirty="0" smtClean="0">
-              <a:solidFill>
-                <a:srgbClr val="111111"/>
-              </a:solidFill>
-              <a:latin typeface="Open Sans" panose="020B0606030504020204" pitchFamily="34" charset="0"/>
-              <a:ea typeface="Open Sans" panose="020B0606030504020204" pitchFamily="34" charset="0"/>
-              <a:cs typeface="Open Sans" panose="020B0606030504020204" pitchFamily="34" charset="0"/>
-            </a:endParaRPr>
-          </a:p>
-          <a:p>
-            <a:pPr marL="742950" lvl="1" indent="-285750">
-              <a:buFont typeface="Arial" panose="020B0604020202020204" pitchFamily="34" charset="0"/>
-              <a:buChar char="•"/>
-            </a:pPr>
-            <a:r>
-              <a:rPr lang="en-AU" sz="2600" dirty="0" smtClean="0">
-                <a:solidFill>
-                  <a:srgbClr val="111111"/>
-                </a:solidFill>
-                <a:latin typeface="Open Sans" panose="020B0606030504020204" pitchFamily="34" charset="0"/>
-                <a:ea typeface="Open Sans" panose="020B0606030504020204" pitchFamily="34" charset="0"/>
-                <a:cs typeface="Open Sans" panose="020B0606030504020204" pitchFamily="34" charset="0"/>
-              </a:rPr>
-              <a:t>Reserve admin rights for IT support staff</a:t>
-            </a:r>
-          </a:p>
-          <a:p>
-            <a:pPr marL="285750" indent="-285750">
-              <a:buFont typeface="Arial" panose="020B0604020202020204" pitchFamily="34" charset="0"/>
-              <a:buChar char="•"/>
-            </a:pPr>
-            <a:r>
-              <a:rPr lang="en-AU" sz="2600" dirty="0" smtClean="0">
-                <a:solidFill>
-                  <a:srgbClr val="111111"/>
-                </a:solidFill>
-                <a:latin typeface="Open Sans" panose="020B0606030504020204" pitchFamily="34" charset="0"/>
-                <a:ea typeface="Open Sans" panose="020B0606030504020204" pitchFamily="34" charset="0"/>
-                <a:cs typeface="Open Sans" panose="020B0606030504020204" pitchFamily="34" charset="0"/>
-              </a:rPr>
-              <a:t>Enforce UAC through Active Directory group policy</a:t>
-            </a:r>
-          </a:p>
-        </p:txBody>
-      </p:sp>
     </p:spTree>
     <p:extLst>
       <p:ext uri="{BB962C8B-B14F-4D97-AF65-F5344CB8AC3E}">
-        <p14:creationId xmlns:p14="http://schemas.microsoft.com/office/powerpoint/2010/main" val="2924220329"/>
+        <p14:creationId xmlns:p14="http://schemas.microsoft.com/office/powerpoint/2010/main" val="4049782558"/>
       </p:ext>
     </p:extLst>
   </p:cSld>
@@ -11139,8 +11101,8 @@
         </p:nvSpPr>
         <p:spPr>
           <a:xfrm>
-            <a:off x="1524000" y="-1"/>
-            <a:ext cx="9144000" cy="1446915"/>
+            <a:off x="1524000" y="0"/>
+            <a:ext cx="9144000" cy="1156377"/>
           </a:xfrm>
         </p:spPr>
         <p:txBody>
@@ -11159,7 +11121,7 @@
                 <a:ea typeface="Open Sans" panose="020B0606030504020204" pitchFamily="34" charset="0"/>
                 <a:cs typeface="Open Sans" panose="020B0606030504020204" pitchFamily="34" charset="0"/>
               </a:rPr>
-              <a:t>Anti-virus and network security</a:t>
+              <a:t>Anti-malware / patch management</a:t>
             </a:r>
             <a:endParaRPr lang="en-AU" sz="3200" dirty="0">
               <a:solidFill>
@@ -11180,8 +11142,8 @@
         </p:nvSpPr>
         <p:spPr>
           <a:xfrm>
-            <a:off x="1524000" y="1958544"/>
-            <a:ext cx="9144000" cy="2893100"/>
+            <a:off x="1524000" y="1458359"/>
+            <a:ext cx="9144000" cy="1692771"/>
           </a:xfrm>
           <a:prstGeom prst="rect">
             <a:avLst/>
@@ -11207,16 +11169,19 @@
                 <a:ea typeface="Open Sans" panose="020B0606030504020204" pitchFamily="34" charset="0"/>
                 <a:cs typeface="Open Sans" panose="020B0606030504020204" pitchFamily="34" charset="0"/>
               </a:rPr>
-              <a:t>Remove fake anti-virus</a:t>
-            </a:r>
-            <a:endParaRPr lang="en-AU" sz="2600" dirty="0">
-              <a:solidFill>
-                <a:srgbClr val="111111"/>
-              </a:solidFill>
-              <a:latin typeface="Open Sans" panose="020B0606030504020204" pitchFamily="34" charset="0"/>
-              <a:ea typeface="Open Sans" panose="020B0606030504020204" pitchFamily="34" charset="0"/>
-              <a:cs typeface="Open Sans" panose="020B0606030504020204" pitchFamily="34" charset="0"/>
-            </a:endParaRPr>
+              <a:t>Kaspersk</a:t>
+            </a:r>
+            <a:r>
+              <a:rPr lang="en-AU" sz="2600" dirty="0" smtClean="0">
+                <a:solidFill>
+                  <a:srgbClr val="111111"/>
+                </a:solidFill>
+                <a:latin typeface="Open Sans" panose="020B0606030504020204" pitchFamily="34" charset="0"/>
+                <a:ea typeface="Open Sans" panose="020B0606030504020204" pitchFamily="34" charset="0"/>
+                <a:cs typeface="Open Sans" panose="020B0606030504020204" pitchFamily="34" charset="0"/>
+              </a:rPr>
+              <a:t>y Endpoint Security for Business Advanced 10.2</a:t>
+            </a:r>
           </a:p>
           <a:p>
             <a:pPr marL="285750" indent="-285750">
@@ -11232,7 +11197,7 @@
                 <a:ea typeface="Open Sans" panose="020B0606030504020204" pitchFamily="34" charset="0"/>
                 <a:cs typeface="Open Sans" panose="020B0606030504020204" pitchFamily="34" charset="0"/>
               </a:rPr>
-              <a:t>Recommend </a:t>
+              <a:t>Both features scored highly </a:t>
             </a:r>
             <a:r>
               <a:rPr lang="en-AU" sz="2600" dirty="0" smtClean="0">
@@ -11242,9 +11207,25 @@
                 <a:latin typeface="Open Sans" panose="020B0606030504020204" pitchFamily="34" charset="0"/>
                 <a:ea typeface="Open Sans" panose="020B0606030504020204" pitchFamily="34" charset="0"/>
                 <a:cs typeface="Open Sans" panose="020B0606030504020204" pitchFamily="34" charset="0"/>
-                <a:hlinkClick r:id="rId2"/>
-              </a:rPr>
-              <a:t>Kaspersky End Point Security Select</a:t>
+              </a:rPr>
+              <a:t>in AV-TEST</a:t>
+            </a:r>
+          </a:p>
+          <a:p>
+            <a:pPr marL="285750" indent="-285750">
+              <a:buFont typeface="Arial" panose="020B0604020202020204" pitchFamily="34" charset="0"/>
+              <a:buChar char="•"/>
+            </a:pPr>
+            <a:r>
+              <a:rPr lang="en-AU" sz="2600" dirty="0" smtClean="0">
+                <a:solidFill>
+                  <a:srgbClr val="111111"/>
+                </a:solidFill>
+                <a:latin typeface="Open Sans" panose="020B0606030504020204" pitchFamily="34" charset="0"/>
+                <a:ea typeface="Open Sans" panose="020B0606030504020204" pitchFamily="34" charset="0"/>
+                <a:cs typeface="Open Sans" panose="020B0606030504020204" pitchFamily="34" charset="0"/>
+              </a:rPr>
+              <a:t>Anti-malware and patch management in one software solution</a:t>
             </a:r>
             <a:endParaRPr lang="en-AU" sz="2600" dirty="0" smtClean="0">
               <a:solidFill>
@@ -11255,6 +11236,93 @@
               <a:cs typeface="Open Sans" panose="020B0606030504020204" pitchFamily="34" charset="0"/>
             </a:endParaRPr>
           </a:p>
+        </p:txBody>
+      </p:sp>
+      <p:sp>
+        <p:nvSpPr>
+          <p:cNvPr id="13" name="Title 3"/>
+          <p:cNvSpPr txBox="1">
+            <a:spLocks/>
+          </p:cNvSpPr>
+          <p:nvPr/>
+        </p:nvSpPr>
+        <p:spPr>
+          <a:xfrm>
+            <a:off x="1524000" y="3151130"/>
+            <a:ext cx="9144000" cy="854395"/>
+          </a:xfrm>
+          <a:prstGeom prst="rect">
+            <a:avLst/>
+          </a:prstGeom>
+        </p:spPr>
+        <p:txBody>
+          <a:bodyPr vert="horz" lIns="91440" tIns="45720" rIns="91440" bIns="45720" rtlCol="0" anchor="b">
+            <a:normAutofit/>
+          </a:bodyPr>
+          <a:lstStyle>
+            <a:lvl1pPr algn="ctr" defTabSz="914400" rtl="0" eaLnBrk="1" latinLnBrk="0" hangingPunct="1">
+              <a:lnSpc>
+                <a:spcPct val="90000"/>
+              </a:lnSpc>
+              <a:spcBef>
+                <a:spcPct val="0"/>
+              </a:spcBef>
+              <a:buNone/>
+              <a:defRPr sz="6000" kern="1200">
+                <a:solidFill>
+                  <a:schemeClr val="tx1"/>
+                </a:solidFill>
+                <a:latin typeface="+mj-lt"/>
+                <a:ea typeface="+mj-ea"/>
+                <a:cs typeface="+mj-cs"/>
+              </a:defRPr>
+            </a:lvl1pPr>
+          </a:lstStyle>
+          <a:p>
+            <a:pPr algn="l"/>
+            <a:r>
+              <a:rPr lang="en-AU" sz="3200" b="1" dirty="0" smtClean="0">
+                <a:solidFill>
+                  <a:srgbClr val="111111"/>
+                </a:solidFill>
+                <a:latin typeface="Open Sans" panose="020B0606030504020204" pitchFamily="34" charset="0"/>
+                <a:ea typeface="Open Sans" panose="020B0606030504020204" pitchFamily="34" charset="0"/>
+                <a:cs typeface="Open Sans" panose="020B0606030504020204" pitchFamily="34" charset="0"/>
+              </a:rPr>
+              <a:t>User and device management</a:t>
+            </a:r>
+            <a:endParaRPr lang="en-AU" sz="3200" dirty="0">
+              <a:solidFill>
+                <a:srgbClr val="111111"/>
+              </a:solidFill>
+              <a:latin typeface="Open Sans" panose="020B0606030504020204" pitchFamily="34" charset="0"/>
+              <a:ea typeface="Open Sans" panose="020B0606030504020204" pitchFamily="34" charset="0"/>
+              <a:cs typeface="Open Sans" panose="020B0606030504020204" pitchFamily="34" charset="0"/>
+            </a:endParaRPr>
+          </a:p>
+        </p:txBody>
+      </p:sp>
+      <p:sp>
+        <p:nvSpPr>
+          <p:cNvPr id="14" name="TextBox 13"/>
+          <p:cNvSpPr txBox="1"/>
+          <p:nvPr/>
+        </p:nvSpPr>
+        <p:spPr>
+          <a:xfrm>
+            <a:off x="1524000" y="4307507"/>
+            <a:ext cx="9144000" cy="2092881"/>
+          </a:xfrm>
+          <a:prstGeom prst="rect">
+            <a:avLst/>
+          </a:prstGeom>
+          <a:noFill/>
+        </p:spPr>
+        <p:txBody>
+          <a:bodyPr wrap="square" rtlCol="0">
+            <a:spAutoFit/>
+          </a:bodyPr>
+          <a:lstStyle/>
           <a:p>
             <a:pPr marL="285750" indent="-285750">
               <a:buFont typeface="Arial" panose="020B0604020202020204" pitchFamily="34" charset="0"/>
@@ -11269,8 +11337,14 @@
                 <a:ea typeface="Open Sans" panose="020B0606030504020204" pitchFamily="34" charset="0"/>
                 <a:cs typeface="Open Sans" panose="020B0606030504020204" pitchFamily="34" charset="0"/>
               </a:rPr>
-              <a:t>Recommend </a:t>
-            </a:r>
+              <a:t>Active Directory Domain Services</a:t>
+            </a:r>
+          </a:p>
+          <a:p>
+            <a:pPr marL="285750" indent="-285750">
+              <a:buFont typeface="Arial" panose="020B0604020202020204" pitchFamily="34" charset="0"/>
+              <a:buChar char="•"/>
+            </a:pPr>
             <a:r>
               <a:rPr lang="en-AU" sz="2600" dirty="0" smtClean="0">
                 <a:solidFill>
@@ -11279,9 +11353,42 @@
                 <a:latin typeface="Open Sans" panose="020B0606030504020204" pitchFamily="34" charset="0"/>
                 <a:ea typeface="Open Sans" panose="020B0606030504020204" pitchFamily="34" charset="0"/>
                 <a:cs typeface="Open Sans" panose="020B0606030504020204" pitchFamily="34" charset="0"/>
-                <a:hlinkClick r:id="rId3"/>
-              </a:rPr>
-              <a:t>KFSensor honeypot system</a:t>
+              </a:rPr>
+              <a:t>Native to and included with Microsoft Server 20xx</a:t>
+            </a:r>
+          </a:p>
+          <a:p>
+            <a:pPr marL="285750" indent="-285750">
+              <a:buFont typeface="Arial" panose="020B0604020202020204" pitchFamily="34" charset="0"/>
+              <a:buChar char="•"/>
+            </a:pPr>
+            <a:r>
+              <a:rPr lang="en-AU" sz="2600" dirty="0" smtClean="0">
+                <a:solidFill>
+                  <a:srgbClr val="111111"/>
+                </a:solidFill>
+                <a:latin typeface="Open Sans" panose="020B0606030504020204" pitchFamily="34" charset="0"/>
+                <a:ea typeface="Open Sans" panose="020B0606030504020204" pitchFamily="34" charset="0"/>
+                <a:cs typeface="Open Sans" panose="020B0606030504020204" pitchFamily="34" charset="0"/>
+              </a:rPr>
+              <a:t>No need to purchase another software licence</a:t>
+            </a:r>
+          </a:p>
+          <a:p>
+            <a:pPr marL="285750" indent="-285750">
+              <a:buFont typeface="Arial" panose="020B0604020202020204" pitchFamily="34" charset="0"/>
+              <a:buChar char="•"/>
+            </a:pPr>
+            <a:r>
+              <a:rPr lang="en-AU" sz="2600" dirty="0" smtClean="0">
+                <a:solidFill>
+                  <a:srgbClr val="111111"/>
+                </a:solidFill>
+                <a:latin typeface="Open Sans" panose="020B0606030504020204" pitchFamily="34" charset="0"/>
+                <a:ea typeface="Open Sans" panose="020B0606030504020204" pitchFamily="34" charset="0"/>
+                <a:cs typeface="Open Sans" panose="020B0606030504020204" pitchFamily="34" charset="0"/>
+              </a:rPr>
+              <a:t>Manage security policies consistently across all devices/users</a:t>
             </a:r>
             <a:endParaRPr lang="en-AU" sz="2600" dirty="0" smtClean="0">
               <a:solidFill>
@@ -11292,74 +11399,12 @@
               <a:cs typeface="Open Sans" panose="020B0606030504020204" pitchFamily="34" charset="0"/>
             </a:endParaRPr>
           </a:p>
-          <a:p>
-            <a:pPr marL="742950" lvl="1" indent="-285750">
-              <a:buFont typeface="Arial" panose="020B0604020202020204" pitchFamily="34" charset="0"/>
-              <a:buChar char="•"/>
-            </a:pPr>
-            <a:r>
-              <a:rPr lang="en-AU" sz="2600" dirty="0">
-                <a:solidFill>
-                  <a:srgbClr val="111111"/>
-                </a:solidFill>
-                <a:latin typeface="Open Sans" panose="020B0606030504020204" pitchFamily="34" charset="0"/>
-                <a:ea typeface="Open Sans" panose="020B0606030504020204" pitchFamily="34" charset="0"/>
-                <a:cs typeface="Open Sans" panose="020B0606030504020204" pitchFamily="34" charset="0"/>
-              </a:rPr>
-              <a:t>Simulates vulnerable services to entice </a:t>
-            </a:r>
-            <a:r>
-              <a:rPr lang="en-AU" sz="2600" dirty="0" smtClean="0">
-                <a:solidFill>
-                  <a:srgbClr val="111111"/>
-                </a:solidFill>
-                <a:latin typeface="Open Sans" panose="020B0606030504020204" pitchFamily="34" charset="0"/>
-                <a:ea typeface="Open Sans" panose="020B0606030504020204" pitchFamily="34" charset="0"/>
-                <a:cs typeface="Open Sans" panose="020B0606030504020204" pitchFamily="34" charset="0"/>
-              </a:rPr>
-              <a:t>attacker</a:t>
-            </a:r>
-          </a:p>
-          <a:p>
-            <a:pPr marL="742950" lvl="1" indent="-285750">
-              <a:buFont typeface="Arial" panose="020B0604020202020204" pitchFamily="34" charset="0"/>
-              <a:buChar char="•"/>
-            </a:pPr>
-            <a:r>
-              <a:rPr lang="en-AU" sz="2600" dirty="0" smtClean="0">
-                <a:solidFill>
-                  <a:srgbClr val="111111"/>
-                </a:solidFill>
-                <a:latin typeface="Open Sans" panose="020B0606030504020204" pitchFamily="34" charset="0"/>
-                <a:ea typeface="Open Sans" panose="020B0606030504020204" pitchFamily="34" charset="0"/>
-                <a:cs typeface="Open Sans" panose="020B0606030504020204" pitchFamily="34" charset="0"/>
-              </a:rPr>
-              <a:t>Diverts attackers away from critical systems in the event an attacker compromises network</a:t>
-            </a:r>
-          </a:p>
-          <a:p>
-            <a:pPr marL="742950" lvl="1" indent="-285750">
-              <a:buFont typeface="Arial" panose="020B0604020202020204" pitchFamily="34" charset="0"/>
-              <a:buChar char="•"/>
-            </a:pPr>
-            <a:r>
-              <a:rPr lang="en-AU" sz="2600" dirty="0" smtClean="0">
-                <a:solidFill>
-                  <a:srgbClr val="111111"/>
-                </a:solidFill>
-                <a:latin typeface="Open Sans" panose="020B0606030504020204" pitchFamily="34" charset="0"/>
-                <a:ea typeface="Open Sans" panose="020B0606030504020204" pitchFamily="34" charset="0"/>
-                <a:cs typeface="Open Sans" panose="020B0606030504020204" pitchFamily="34" charset="0"/>
-              </a:rPr>
-              <a:t>Logs events</a:t>
-            </a:r>
-          </a:p>
         </p:txBody>
       </p:sp>
     </p:spTree>
     <p:extLst>
       <p:ext uri="{BB962C8B-B14F-4D97-AF65-F5344CB8AC3E}">
-        <p14:creationId xmlns:p14="http://schemas.microsoft.com/office/powerpoint/2010/main" val="402785050"/>
+        <p14:creationId xmlns:p14="http://schemas.microsoft.com/office/powerpoint/2010/main" val="587882714"/>
       </p:ext>
     </p:extLst>
   </p:cSld>
@@ -11696,8 +11741,8 @@
         </p:nvSpPr>
         <p:spPr>
           <a:xfrm>
-            <a:off x="338667" y="1"/>
-            <a:ext cx="9144000" cy="970843"/>
+            <a:off x="1524000" y="0"/>
+            <a:ext cx="9144000" cy="1156377"/>
           </a:xfrm>
         </p:spPr>
         <p:txBody>
@@ -11708,17 +11753,17 @@
           <a:p>
             <a:pPr algn="l"/>
             <a:r>
-              <a:rPr lang="en-AU" sz="3600" b="1" dirty="0" smtClean="0">
-                <a:solidFill>
-                  <a:srgbClr val="111111"/>
-                </a:solidFill>
-                <a:latin typeface="Open Sans" panose="020B0606030504020204" pitchFamily="34" charset="0"/>
-                <a:ea typeface="Open Sans" panose="020B0606030504020204" pitchFamily="34" charset="0"/>
-                <a:cs typeface="Open Sans" panose="020B0606030504020204" pitchFamily="34" charset="0"/>
-              </a:rPr>
-              <a:t>References</a:t>
-            </a:r>
-            <a:endParaRPr lang="en-AU" sz="3600" dirty="0">
+              <a:rPr lang="en-AU" sz="3200" b="1" dirty="0" smtClean="0">
+                <a:solidFill>
+                  <a:srgbClr val="111111"/>
+                </a:solidFill>
+                <a:latin typeface="Open Sans" panose="020B0606030504020204" pitchFamily="34" charset="0"/>
+                <a:ea typeface="Open Sans" panose="020B0606030504020204" pitchFamily="34" charset="0"/>
+                <a:cs typeface="Open Sans" panose="020B0606030504020204" pitchFamily="34" charset="0"/>
+              </a:rPr>
+              <a:t>User practices</a:t>
+            </a:r>
+            <a:endParaRPr lang="en-AU" sz="3200" dirty="0">
               <a:solidFill>
                 <a:srgbClr val="111111"/>
               </a:solidFill>
@@ -11731,119 +11776,82 @@
       </p:sp>
       <p:sp>
         <p:nvSpPr>
-          <p:cNvPr id="5" name="Title 3"/>
-          <p:cNvSpPr txBox="1">
-            <a:spLocks/>
-          </p:cNvSpPr>
+          <p:cNvPr id="2" name="TextBox 1"/>
+          <p:cNvSpPr txBox="1"/>
           <p:nvPr/>
         </p:nvSpPr>
         <p:spPr>
           <a:xfrm>
-            <a:off x="338667" y="1196622"/>
-            <a:ext cx="11514666" cy="5113867"/>
+            <a:off x="1524000" y="1458359"/>
+            <a:ext cx="9144000" cy="2092881"/>
           </a:xfrm>
           <a:prstGeom prst="rect">
             <a:avLst/>
           </a:prstGeom>
+          <a:noFill/>
         </p:spPr>
         <p:txBody>
-          <a:bodyPr vert="horz" lIns="91440" tIns="45720" rIns="91440" bIns="45720" rtlCol="0" anchor="t">
-            <a:normAutofit lnSpcReduction="10000"/>
+          <a:bodyPr wrap="square" rtlCol="0">
+            <a:spAutoFit/>
           </a:bodyPr>
-          <a:lstStyle>
-            <a:lvl1pPr algn="ctr" defTabSz="914400" rtl="0" eaLnBrk="1" latinLnBrk="0" hangingPunct="1">
-              <a:lnSpc>
-                <a:spcPct val="90000"/>
-              </a:lnSpc>
-              <a:spcBef>
-                <a:spcPct val="0"/>
-              </a:spcBef>
-              <a:buNone/>
-              <a:defRPr sz="6000" kern="1200">
-                <a:solidFill>
-                  <a:schemeClr val="tx1"/>
-                </a:solidFill>
-                <a:latin typeface="+mj-lt"/>
-                <a:ea typeface="+mj-ea"/>
-                <a:cs typeface="+mj-cs"/>
-              </a:defRPr>
-            </a:lvl1pPr>
-          </a:lstStyle>
-          <a:p>
-            <a:pPr marL="457200" indent="-457200" algn="l">
-              <a:lnSpc>
-                <a:spcPct val="100000"/>
-              </a:lnSpc>
+          <a:lstStyle/>
+          <a:p>
+            <a:pPr marL="285750" indent="-285750">
               <a:buFont typeface="Arial" panose="020B0604020202020204" pitchFamily="34" charset="0"/>
               <a:buChar char="•"/>
             </a:pPr>
             <a:r>
-              <a:rPr lang="en-AU" sz="1400" dirty="0">
-                <a:solidFill>
-                  <a:srgbClr val="111111"/>
-                </a:solidFill>
-                <a:latin typeface="Open Sans" panose="020B0606030504020204" pitchFamily="34" charset="0"/>
-                <a:ea typeface="Open Sans" panose="020B0606030504020204" pitchFamily="34" charset="0"/>
-                <a:cs typeface="Open Sans" panose="020B0606030504020204" pitchFamily="34" charset="0"/>
-              </a:rPr>
-              <a:t>Baker, W. H., Hylender, C. D., &amp; Valentine, J. A. (2008). 2008 Data Breach Investigations Report, 1–29</a:t>
-            </a:r>
-            <a:r>
-              <a:rPr lang="en-AU" sz="1400" dirty="0" smtClean="0">
-                <a:solidFill>
-                  <a:srgbClr val="111111"/>
-                </a:solidFill>
-                <a:latin typeface="Open Sans" panose="020B0606030504020204" pitchFamily="34" charset="0"/>
-                <a:ea typeface="Open Sans" panose="020B0606030504020204" pitchFamily="34" charset="0"/>
-                <a:cs typeface="Open Sans" panose="020B0606030504020204" pitchFamily="34" charset="0"/>
-              </a:rPr>
-              <a:t>.</a:t>
-            </a:r>
-          </a:p>
-          <a:p>
-            <a:pPr marL="457200" indent="-457200" algn="l">
-              <a:lnSpc>
-                <a:spcPct val="100000"/>
-              </a:lnSpc>
+              <a:rPr lang="en-AU" sz="2600" dirty="0" smtClean="0">
+                <a:solidFill>
+                  <a:srgbClr val="111111"/>
+                </a:solidFill>
+                <a:latin typeface="Open Sans" panose="020B0606030504020204" pitchFamily="34" charset="0"/>
+                <a:ea typeface="Open Sans" panose="020B0606030504020204" pitchFamily="34" charset="0"/>
+                <a:cs typeface="Open Sans" panose="020B0606030504020204" pitchFamily="34" charset="0"/>
+              </a:rPr>
+              <a:t>Never store password/s in plaintext files or on handwritten notes</a:t>
+            </a:r>
+          </a:p>
+          <a:p>
+            <a:pPr marL="285750" indent="-285750">
               <a:buFont typeface="Arial" panose="020B0604020202020204" pitchFamily="34" charset="0"/>
               <a:buChar char="•"/>
             </a:pPr>
             <a:r>
-              <a:rPr lang="en-AU" sz="1400" dirty="0">
-                <a:solidFill>
-                  <a:srgbClr val="111111"/>
-                </a:solidFill>
-                <a:latin typeface="Open Sans" panose="020B0606030504020204" pitchFamily="34" charset="0"/>
-                <a:ea typeface="Open Sans" panose="020B0606030504020204" pitchFamily="34" charset="0"/>
-                <a:cs typeface="Open Sans" panose="020B0606030504020204" pitchFamily="34" charset="0"/>
-              </a:rPr>
-              <a:t>Goodin, D. (2014). Stanford’s password policy shuns one-size-fits-all security | Ars Technica. Ars Technica. Retrieved April 30, 2015, from </a:t>
-            </a:r>
-            <a:r>
-              <a:rPr lang="en-AU" sz="1400" dirty="0">
-                <a:solidFill>
-                  <a:srgbClr val="111111"/>
-                </a:solidFill>
-                <a:latin typeface="Open Sans" panose="020B0606030504020204" pitchFamily="34" charset="0"/>
-                <a:ea typeface="Open Sans" panose="020B0606030504020204" pitchFamily="34" charset="0"/>
-                <a:cs typeface="Open Sans" panose="020B0606030504020204" pitchFamily="34" charset="0"/>
-                <a:hlinkClick r:id="rId2"/>
-              </a:rPr>
-              <a:t>http://arstechnica.com/security/2014/04/25/stanfords-password-policy-shuns-one-size-fits-all-security</a:t>
-            </a:r>
-            <a:r>
-              <a:rPr lang="en-AU" sz="1400" dirty="0" smtClean="0">
-                <a:solidFill>
-                  <a:srgbClr val="111111"/>
-                </a:solidFill>
-                <a:latin typeface="Open Sans" panose="020B0606030504020204" pitchFamily="34" charset="0"/>
-                <a:ea typeface="Open Sans" panose="020B0606030504020204" pitchFamily="34" charset="0"/>
-                <a:cs typeface="Open Sans" panose="020B0606030504020204" pitchFamily="34" charset="0"/>
-                <a:hlinkClick r:id="rId2"/>
-              </a:rPr>
-              <a:t>/</a:t>
-            </a:r>
-            <a:endParaRPr lang="en-AU" sz="1400" dirty="0" smtClean="0">
+              <a:rPr lang="en-AU" sz="2600" dirty="0" smtClean="0">
+                <a:solidFill>
+                  <a:srgbClr val="111111"/>
+                </a:solidFill>
+                <a:latin typeface="Open Sans" panose="020B0606030504020204" pitchFamily="34" charset="0"/>
+                <a:ea typeface="Open Sans" panose="020B0606030504020204" pitchFamily="34" charset="0"/>
+                <a:cs typeface="Open Sans" panose="020B0606030504020204" pitchFamily="34" charset="0"/>
+              </a:rPr>
+              <a:t>Use passphrases</a:t>
+            </a:r>
+          </a:p>
+          <a:p>
+            <a:pPr marL="285750" indent="-285750">
+              <a:buFont typeface="Arial" panose="020B0604020202020204" pitchFamily="34" charset="0"/>
+              <a:buChar char="•"/>
+            </a:pPr>
+            <a:r>
+              <a:rPr lang="en-AU" sz="2600" dirty="0" smtClean="0">
+                <a:solidFill>
+                  <a:srgbClr val="111111"/>
+                </a:solidFill>
+                <a:latin typeface="Open Sans" panose="020B0606030504020204" pitchFamily="34" charset="0"/>
+                <a:ea typeface="Open Sans" panose="020B0606030504020204" pitchFamily="34" charset="0"/>
+                <a:cs typeface="Open Sans" panose="020B0606030504020204" pitchFamily="34" charset="0"/>
+              </a:rPr>
+              <a:t>Uninstall mIRC</a:t>
+            </a:r>
+          </a:p>
+          <a:p>
+            <a:pPr marL="285750" indent="-285750">
+              <a:buFont typeface="Arial" panose="020B0604020202020204" pitchFamily="34" charset="0"/>
+              <a:buChar char="•"/>
+            </a:pPr>
+            <a:endParaRPr lang="en-AU" sz="2600" dirty="0" smtClean="0">
               <a:solidFill>
                 <a:srgbClr val="111111"/>
               </a:solidFill>
@@ -11852,635 +11860,12 @@
               <a:cs typeface="Open Sans" panose="020B0606030504020204" pitchFamily="34" charset="0"/>
             </a:endParaRPr>
           </a:p>
-          <a:p>
-            <a:pPr marL="457200" indent="-457200" algn="l">
-              <a:lnSpc>
-                <a:spcPct val="100000"/>
-              </a:lnSpc>
-              <a:buFont typeface="Arial" panose="020B0604020202020204" pitchFamily="34" charset="0"/>
-              <a:buChar char="•"/>
-            </a:pPr>
-            <a:r>
-              <a:rPr lang="en-AU" sz="1400" dirty="0">
-                <a:solidFill>
-                  <a:srgbClr val="111111"/>
-                </a:solidFill>
-                <a:latin typeface="Open Sans" panose="020B0606030504020204" pitchFamily="34" charset="0"/>
-                <a:ea typeface="Open Sans" panose="020B0606030504020204" pitchFamily="34" charset="0"/>
-                <a:cs typeface="Open Sans" panose="020B0606030504020204" pitchFamily="34" charset="0"/>
-              </a:rPr>
-              <a:t>Machkovech, S. (2015). Hacked French network exposed its own passwords during TV interview | Ars Technica. Ars Technica. Retrieved May 6, 2015, from </a:t>
-            </a:r>
-            <a:r>
-              <a:rPr lang="en-AU" sz="1400" dirty="0">
-                <a:solidFill>
-                  <a:srgbClr val="111111"/>
-                </a:solidFill>
-                <a:latin typeface="Open Sans" panose="020B0606030504020204" pitchFamily="34" charset="0"/>
-                <a:ea typeface="Open Sans" panose="020B0606030504020204" pitchFamily="34" charset="0"/>
-                <a:cs typeface="Open Sans" panose="020B0606030504020204" pitchFamily="34" charset="0"/>
-                <a:hlinkClick r:id="rId3"/>
-              </a:rPr>
-              <a:t>http://arstechnica.com/security/2015/04/09/hacked-french-network-exposed-its-own-passwords-during-tv-interview</a:t>
-            </a:r>
-            <a:r>
-              <a:rPr lang="en-AU" sz="1400" dirty="0" smtClean="0">
-                <a:solidFill>
-                  <a:srgbClr val="111111"/>
-                </a:solidFill>
-                <a:latin typeface="Open Sans" panose="020B0606030504020204" pitchFamily="34" charset="0"/>
-                <a:ea typeface="Open Sans" panose="020B0606030504020204" pitchFamily="34" charset="0"/>
-                <a:cs typeface="Open Sans" panose="020B0606030504020204" pitchFamily="34" charset="0"/>
-                <a:hlinkClick r:id="rId3"/>
-              </a:rPr>
-              <a:t>/</a:t>
-            </a:r>
-            <a:endParaRPr lang="en-AU" sz="1400" dirty="0" smtClean="0">
-              <a:solidFill>
-                <a:srgbClr val="111111"/>
-              </a:solidFill>
-              <a:latin typeface="Open Sans" panose="020B0606030504020204" pitchFamily="34" charset="0"/>
-              <a:ea typeface="Open Sans" panose="020B0606030504020204" pitchFamily="34" charset="0"/>
-              <a:cs typeface="Open Sans" panose="020B0606030504020204" pitchFamily="34" charset="0"/>
-            </a:endParaRPr>
-          </a:p>
-          <a:p>
-            <a:pPr marL="457200" indent="-457200" algn="l">
-              <a:lnSpc>
-                <a:spcPct val="100000"/>
-              </a:lnSpc>
-              <a:buFont typeface="Arial" panose="020B0604020202020204" pitchFamily="34" charset="0"/>
-              <a:buChar char="•"/>
-            </a:pPr>
-            <a:r>
-              <a:rPr lang="en-AU" sz="1400" dirty="0">
-                <a:solidFill>
-                  <a:srgbClr val="111111"/>
-                </a:solidFill>
-                <a:latin typeface="Open Sans" panose="020B0606030504020204" pitchFamily="34" charset="0"/>
-                <a:ea typeface="Open Sans" panose="020B0606030504020204" pitchFamily="34" charset="0"/>
-                <a:cs typeface="Open Sans" panose="020B0606030504020204" pitchFamily="34" charset="0"/>
-              </a:rPr>
-              <a:t>Microsoft. (</a:t>
-            </a:r>
-            <a:r>
-              <a:rPr lang="en-AU" sz="1400" dirty="0" smtClean="0">
-                <a:solidFill>
-                  <a:srgbClr val="111111"/>
-                </a:solidFill>
-                <a:latin typeface="Open Sans" panose="020B0606030504020204" pitchFamily="34" charset="0"/>
-                <a:ea typeface="Open Sans" panose="020B0606030504020204" pitchFamily="34" charset="0"/>
-                <a:cs typeface="Open Sans" panose="020B0606030504020204" pitchFamily="34" charset="0"/>
-              </a:rPr>
-              <a:t>2005a). </a:t>
-            </a:r>
-            <a:r>
-              <a:rPr lang="en-AU" sz="1400" dirty="0">
-                <a:solidFill>
-                  <a:srgbClr val="111111"/>
-                </a:solidFill>
-                <a:latin typeface="Open Sans" panose="020B0606030504020204" pitchFamily="34" charset="0"/>
-                <a:ea typeface="Open Sans" panose="020B0606030504020204" pitchFamily="34" charset="0"/>
-                <a:cs typeface="Open Sans" panose="020B0606030504020204" pitchFamily="34" charset="0"/>
-              </a:rPr>
-              <a:t>Apply or modify password policy: Logon and Authentication. Retrieved May 14, 2015, from </a:t>
-            </a:r>
-            <a:r>
-              <a:rPr lang="en-AU" sz="1400" dirty="0">
-                <a:solidFill>
-                  <a:srgbClr val="111111"/>
-                </a:solidFill>
-                <a:latin typeface="Open Sans" panose="020B0606030504020204" pitchFamily="34" charset="0"/>
-                <a:ea typeface="Open Sans" panose="020B0606030504020204" pitchFamily="34" charset="0"/>
-                <a:cs typeface="Open Sans" panose="020B0606030504020204" pitchFamily="34" charset="0"/>
-                <a:hlinkClick r:id="rId4"/>
-              </a:rPr>
-              <a:t>https://technet.microsoft.com/en-au/library/cc781633(v=ws.10).aspx?f=255&amp;MSPPError=-</a:t>
-            </a:r>
-            <a:r>
-              <a:rPr lang="en-AU" sz="1400" dirty="0" smtClean="0">
-                <a:solidFill>
-                  <a:srgbClr val="111111"/>
-                </a:solidFill>
-                <a:latin typeface="Open Sans" panose="020B0606030504020204" pitchFamily="34" charset="0"/>
-                <a:ea typeface="Open Sans" panose="020B0606030504020204" pitchFamily="34" charset="0"/>
-                <a:cs typeface="Open Sans" panose="020B0606030504020204" pitchFamily="34" charset="0"/>
-                <a:hlinkClick r:id="rId4"/>
-              </a:rPr>
-              <a:t>2147217396#BKMK_3</a:t>
-            </a:r>
-            <a:endParaRPr lang="en-AU" sz="1400" dirty="0" smtClean="0">
-              <a:solidFill>
-                <a:srgbClr val="111111"/>
-              </a:solidFill>
-              <a:latin typeface="Open Sans" panose="020B0606030504020204" pitchFamily="34" charset="0"/>
-              <a:ea typeface="Open Sans" panose="020B0606030504020204" pitchFamily="34" charset="0"/>
-              <a:cs typeface="Open Sans" panose="020B0606030504020204" pitchFamily="34" charset="0"/>
-            </a:endParaRPr>
-          </a:p>
-          <a:p>
-            <a:pPr marL="457200" indent="-457200" algn="l">
-              <a:lnSpc>
-                <a:spcPct val="100000"/>
-              </a:lnSpc>
-              <a:buFont typeface="Arial" panose="020B0604020202020204" pitchFamily="34" charset="0"/>
-              <a:buChar char="•"/>
-            </a:pPr>
-            <a:r>
-              <a:rPr lang="en-AU" sz="1400" dirty="0">
-                <a:solidFill>
-                  <a:srgbClr val="111111"/>
-                </a:solidFill>
-                <a:latin typeface="Open Sans" panose="020B0606030504020204" pitchFamily="34" charset="0"/>
-                <a:ea typeface="Open Sans" panose="020B0606030504020204" pitchFamily="34" charset="0"/>
-                <a:cs typeface="Open Sans" panose="020B0606030504020204" pitchFamily="34" charset="0"/>
-              </a:rPr>
-              <a:t>Microsoft. (</a:t>
-            </a:r>
-            <a:r>
-              <a:rPr lang="en-AU" sz="1400" dirty="0" smtClean="0">
-                <a:solidFill>
-                  <a:srgbClr val="111111"/>
-                </a:solidFill>
-                <a:latin typeface="Open Sans" panose="020B0606030504020204" pitchFamily="34" charset="0"/>
-                <a:ea typeface="Open Sans" panose="020B0606030504020204" pitchFamily="34" charset="0"/>
-                <a:cs typeface="Open Sans" panose="020B0606030504020204" pitchFamily="34" charset="0"/>
-              </a:rPr>
-              <a:t>2005b). </a:t>
-            </a:r>
-            <a:r>
-              <a:rPr lang="en-AU" sz="1400" dirty="0">
-                <a:solidFill>
-                  <a:srgbClr val="111111"/>
-                </a:solidFill>
-                <a:latin typeface="Open Sans" panose="020B0606030504020204" pitchFamily="34" charset="0"/>
-                <a:ea typeface="Open Sans" panose="020B0606030504020204" pitchFamily="34" charset="0"/>
-                <a:cs typeface="Open Sans" panose="020B0606030504020204" pitchFamily="34" charset="0"/>
-              </a:rPr>
-              <a:t>Assign user rights to a group in Active Directory: Active Directory. Retrieved May 14, 2015, from </a:t>
-            </a:r>
-            <a:r>
-              <a:rPr lang="en-AU" sz="1400" dirty="0">
-                <a:solidFill>
-                  <a:srgbClr val="111111"/>
-                </a:solidFill>
-                <a:latin typeface="Open Sans" panose="020B0606030504020204" pitchFamily="34" charset="0"/>
-                <a:ea typeface="Open Sans" panose="020B0606030504020204" pitchFamily="34" charset="0"/>
-                <a:cs typeface="Open Sans" panose="020B0606030504020204" pitchFamily="34" charset="0"/>
-                <a:hlinkClick r:id="rId5"/>
-              </a:rPr>
-              <a:t>https://technet.microsoft.com/en-au/library/cc786658(v=ws.10).</a:t>
-            </a:r>
-            <a:r>
-              <a:rPr lang="en-AU" sz="1400" dirty="0" smtClean="0">
-                <a:solidFill>
-                  <a:srgbClr val="111111"/>
-                </a:solidFill>
-                <a:latin typeface="Open Sans" panose="020B0606030504020204" pitchFamily="34" charset="0"/>
-                <a:ea typeface="Open Sans" panose="020B0606030504020204" pitchFamily="34" charset="0"/>
-                <a:cs typeface="Open Sans" panose="020B0606030504020204" pitchFamily="34" charset="0"/>
-                <a:hlinkClick r:id="rId5"/>
-              </a:rPr>
-              <a:t>aspx</a:t>
-            </a:r>
-            <a:endParaRPr lang="en-AU" sz="1400" dirty="0" smtClean="0">
-              <a:solidFill>
-                <a:srgbClr val="111111"/>
-              </a:solidFill>
-              <a:latin typeface="Open Sans" panose="020B0606030504020204" pitchFamily="34" charset="0"/>
-              <a:ea typeface="Open Sans" panose="020B0606030504020204" pitchFamily="34" charset="0"/>
-              <a:cs typeface="Open Sans" panose="020B0606030504020204" pitchFamily="34" charset="0"/>
-            </a:endParaRPr>
-          </a:p>
-          <a:p>
-            <a:pPr marL="457200" indent="-457200" algn="l">
-              <a:lnSpc>
-                <a:spcPct val="100000"/>
-              </a:lnSpc>
-              <a:buFont typeface="Arial" panose="020B0604020202020204" pitchFamily="34" charset="0"/>
-              <a:buChar char="•"/>
-            </a:pPr>
-            <a:r>
-              <a:rPr lang="en-AU" sz="1400" dirty="0" smtClean="0">
-                <a:solidFill>
-                  <a:srgbClr val="111111"/>
-                </a:solidFill>
-                <a:latin typeface="Open Sans" panose="020B0606030504020204" pitchFamily="34" charset="0"/>
-                <a:ea typeface="Open Sans" panose="020B0606030504020204" pitchFamily="34" charset="0"/>
-                <a:cs typeface="Open Sans" panose="020B0606030504020204" pitchFamily="34" charset="0"/>
-              </a:rPr>
-              <a:t>Microsoft</a:t>
-            </a:r>
-            <a:r>
-              <a:rPr lang="en-AU" sz="1400" dirty="0">
-                <a:solidFill>
-                  <a:srgbClr val="111111"/>
-                </a:solidFill>
-                <a:latin typeface="Open Sans" panose="020B0606030504020204" pitchFamily="34" charset="0"/>
-                <a:ea typeface="Open Sans" panose="020B0606030504020204" pitchFamily="34" charset="0"/>
-                <a:cs typeface="Open Sans" panose="020B0606030504020204" pitchFamily="34" charset="0"/>
-              </a:rPr>
-              <a:t>. (2007). Configure UAC settings via policy - Microsoft Reduce Customer Effort Center - Site Home - TechNet Blogs. Retrieved May 14, 2015, from </a:t>
-            </a:r>
-            <a:r>
-              <a:rPr lang="en-AU" sz="1400" dirty="0">
-                <a:solidFill>
-                  <a:srgbClr val="111111"/>
-                </a:solidFill>
-                <a:latin typeface="Open Sans" panose="020B0606030504020204" pitchFamily="34" charset="0"/>
-                <a:ea typeface="Open Sans" panose="020B0606030504020204" pitchFamily="34" charset="0"/>
-                <a:cs typeface="Open Sans" panose="020B0606030504020204" pitchFamily="34" charset="0"/>
-                <a:hlinkClick r:id="rId6"/>
-              </a:rPr>
-              <a:t>http://</a:t>
-            </a:r>
-            <a:r>
-              <a:rPr lang="en-AU" sz="1400" dirty="0" smtClean="0">
-                <a:solidFill>
-                  <a:srgbClr val="111111"/>
-                </a:solidFill>
-                <a:latin typeface="Open Sans" panose="020B0606030504020204" pitchFamily="34" charset="0"/>
-                <a:ea typeface="Open Sans" panose="020B0606030504020204" pitchFamily="34" charset="0"/>
-                <a:cs typeface="Open Sans" panose="020B0606030504020204" pitchFamily="34" charset="0"/>
-                <a:hlinkClick r:id="rId6"/>
-              </a:rPr>
-              <a:t>blogs.technet.com/b/asiasupp/archive/2007/02/08/configure-uac-settings-via-policy.aspx</a:t>
-            </a:r>
-            <a:endParaRPr lang="en-AU" sz="1400" dirty="0" smtClean="0">
-              <a:solidFill>
-                <a:srgbClr val="111111"/>
-              </a:solidFill>
-              <a:latin typeface="Open Sans" panose="020B0606030504020204" pitchFamily="34" charset="0"/>
-              <a:ea typeface="Open Sans" panose="020B0606030504020204" pitchFamily="34" charset="0"/>
-              <a:cs typeface="Open Sans" panose="020B0606030504020204" pitchFamily="34" charset="0"/>
-            </a:endParaRPr>
-          </a:p>
-          <a:p>
-            <a:pPr marL="457200" indent="-457200" algn="l">
-              <a:lnSpc>
-                <a:spcPct val="100000"/>
-              </a:lnSpc>
-              <a:buFont typeface="Arial" panose="020B0604020202020204" pitchFamily="34" charset="0"/>
-              <a:buChar char="•"/>
-            </a:pPr>
-            <a:r>
-              <a:rPr lang="en-AU" sz="1400" dirty="0">
-                <a:solidFill>
-                  <a:srgbClr val="111111"/>
-                </a:solidFill>
-                <a:latin typeface="Open Sans" panose="020B0606030504020204" pitchFamily="34" charset="0"/>
-                <a:ea typeface="Open Sans" panose="020B0606030504020204" pitchFamily="34" charset="0"/>
-                <a:cs typeface="Open Sans" panose="020B0606030504020204" pitchFamily="34" charset="0"/>
-              </a:rPr>
-              <a:t>Microsoft. (2012). Password must meet complexity requirements. Retrieved May 14, 2015, from </a:t>
-            </a:r>
-            <a:r>
-              <a:rPr lang="en-AU" sz="1400" dirty="0">
-                <a:solidFill>
-                  <a:srgbClr val="111111"/>
-                </a:solidFill>
-                <a:latin typeface="Open Sans" panose="020B0606030504020204" pitchFamily="34" charset="0"/>
-                <a:ea typeface="Open Sans" panose="020B0606030504020204" pitchFamily="34" charset="0"/>
-                <a:cs typeface="Open Sans" panose="020B0606030504020204" pitchFamily="34" charset="0"/>
-                <a:hlinkClick r:id="rId7"/>
-              </a:rPr>
-              <a:t>https://technet.microsoft.com/en-us/library/hh994562(v=ws.10).</a:t>
-            </a:r>
-            <a:r>
-              <a:rPr lang="en-AU" sz="1400" dirty="0" smtClean="0">
-                <a:solidFill>
-                  <a:srgbClr val="111111"/>
-                </a:solidFill>
-                <a:latin typeface="Open Sans" panose="020B0606030504020204" pitchFamily="34" charset="0"/>
-                <a:ea typeface="Open Sans" panose="020B0606030504020204" pitchFamily="34" charset="0"/>
-                <a:cs typeface="Open Sans" panose="020B0606030504020204" pitchFamily="34" charset="0"/>
-                <a:hlinkClick r:id="rId7"/>
-              </a:rPr>
-              <a:t>aspx</a:t>
-            </a:r>
-            <a:endParaRPr lang="en-AU" sz="1400" dirty="0" smtClean="0">
-              <a:solidFill>
-                <a:srgbClr val="111111"/>
-              </a:solidFill>
-              <a:latin typeface="Open Sans" panose="020B0606030504020204" pitchFamily="34" charset="0"/>
-              <a:ea typeface="Open Sans" panose="020B0606030504020204" pitchFamily="34" charset="0"/>
-              <a:cs typeface="Open Sans" panose="020B0606030504020204" pitchFamily="34" charset="0"/>
-            </a:endParaRPr>
-          </a:p>
-          <a:p>
-            <a:pPr marL="457200" indent="-457200" algn="l">
-              <a:lnSpc>
-                <a:spcPct val="100000"/>
-              </a:lnSpc>
-              <a:buFont typeface="Arial" panose="020B0604020202020204" pitchFamily="34" charset="0"/>
-              <a:buChar char="•"/>
-            </a:pPr>
-            <a:r>
-              <a:rPr lang="en-AU" sz="1400" dirty="0">
-                <a:solidFill>
-                  <a:srgbClr val="111111"/>
-                </a:solidFill>
-                <a:latin typeface="Open Sans" panose="020B0606030504020204" pitchFamily="34" charset="0"/>
-                <a:ea typeface="Open Sans" panose="020B0606030504020204" pitchFamily="34" charset="0"/>
-                <a:cs typeface="Open Sans" panose="020B0606030504020204" pitchFamily="34" charset="0"/>
-              </a:rPr>
-              <a:t>Microsoft. (n.d.-a). Screen Saver timeout. Retrieved May 14, 2015, from </a:t>
-            </a:r>
-            <a:r>
-              <a:rPr lang="en-AU" sz="1400" dirty="0">
-                <a:solidFill>
-                  <a:srgbClr val="111111"/>
-                </a:solidFill>
-                <a:latin typeface="Open Sans" panose="020B0606030504020204" pitchFamily="34" charset="0"/>
-                <a:ea typeface="Open Sans" panose="020B0606030504020204" pitchFamily="34" charset="0"/>
-                <a:cs typeface="Open Sans" panose="020B0606030504020204" pitchFamily="34" charset="0"/>
-                <a:hlinkClick r:id="rId8"/>
-              </a:rPr>
-              <a:t>https://</a:t>
-            </a:r>
-            <a:r>
-              <a:rPr lang="en-AU" sz="1400" dirty="0" smtClean="0">
-                <a:solidFill>
-                  <a:srgbClr val="111111"/>
-                </a:solidFill>
-                <a:latin typeface="Open Sans" panose="020B0606030504020204" pitchFamily="34" charset="0"/>
-                <a:ea typeface="Open Sans" panose="020B0606030504020204" pitchFamily="34" charset="0"/>
-                <a:cs typeface="Open Sans" panose="020B0606030504020204" pitchFamily="34" charset="0"/>
-                <a:hlinkClick r:id="rId8"/>
-              </a:rPr>
-              <a:t>technet.microsoft.com/en-us/library/cc961876.aspx</a:t>
-            </a:r>
-            <a:endParaRPr lang="en-AU" sz="1400" dirty="0" smtClean="0">
-              <a:solidFill>
-                <a:srgbClr val="111111"/>
-              </a:solidFill>
-              <a:latin typeface="Open Sans" panose="020B0606030504020204" pitchFamily="34" charset="0"/>
-              <a:ea typeface="Open Sans" panose="020B0606030504020204" pitchFamily="34" charset="0"/>
-              <a:cs typeface="Open Sans" panose="020B0606030504020204" pitchFamily="34" charset="0"/>
-            </a:endParaRPr>
-          </a:p>
-          <a:p>
-            <a:pPr marL="457200" indent="-457200" algn="l">
-              <a:lnSpc>
-                <a:spcPct val="100000"/>
-              </a:lnSpc>
-              <a:buFont typeface="Arial" panose="020B0604020202020204" pitchFamily="34" charset="0"/>
-              <a:buChar char="•"/>
-            </a:pPr>
-            <a:r>
-              <a:rPr lang="en-AU" sz="1400" dirty="0">
-                <a:solidFill>
-                  <a:srgbClr val="111111"/>
-                </a:solidFill>
-                <a:latin typeface="Open Sans" panose="020B0606030504020204" pitchFamily="34" charset="0"/>
-                <a:ea typeface="Open Sans" panose="020B0606030504020204" pitchFamily="34" charset="0"/>
-                <a:cs typeface="Open Sans" panose="020B0606030504020204" pitchFamily="34" charset="0"/>
-              </a:rPr>
-              <a:t>Microsoft. (n.d.-b). What is User Account Control? - Windows Help. Retrieved March 14, 2015, from </a:t>
-            </a:r>
-            <a:r>
-              <a:rPr lang="en-AU" sz="1400" dirty="0">
-                <a:solidFill>
-                  <a:srgbClr val="111111"/>
-                </a:solidFill>
-                <a:latin typeface="Open Sans" panose="020B0606030504020204" pitchFamily="34" charset="0"/>
-                <a:ea typeface="Open Sans" panose="020B0606030504020204" pitchFamily="34" charset="0"/>
-                <a:cs typeface="Open Sans" panose="020B0606030504020204" pitchFamily="34" charset="0"/>
-                <a:hlinkClick r:id="rId9"/>
-              </a:rPr>
-              <a:t>http://</a:t>
-            </a:r>
-            <a:r>
-              <a:rPr lang="en-AU" sz="1400" dirty="0" smtClean="0">
-                <a:solidFill>
-                  <a:srgbClr val="111111"/>
-                </a:solidFill>
-                <a:latin typeface="Open Sans" panose="020B0606030504020204" pitchFamily="34" charset="0"/>
-                <a:ea typeface="Open Sans" panose="020B0606030504020204" pitchFamily="34" charset="0"/>
-                <a:cs typeface="Open Sans" panose="020B0606030504020204" pitchFamily="34" charset="0"/>
-                <a:hlinkClick r:id="rId9"/>
-              </a:rPr>
-              <a:t>windows.microsoft.com/en-au/windows/what-is-user-account-control#1TC=windows-vista</a:t>
-            </a:r>
-            <a:endParaRPr lang="en-AU" sz="1400" dirty="0" smtClean="0">
-              <a:solidFill>
-                <a:srgbClr val="111111"/>
-              </a:solidFill>
-              <a:latin typeface="Open Sans" panose="020B0606030504020204" pitchFamily="34" charset="0"/>
-              <a:ea typeface="Open Sans" panose="020B0606030504020204" pitchFamily="34" charset="0"/>
-              <a:cs typeface="Open Sans" panose="020B0606030504020204" pitchFamily="34" charset="0"/>
-            </a:endParaRPr>
-          </a:p>
-          <a:p>
-            <a:pPr marL="457200" indent="-457200" algn="l">
-              <a:lnSpc>
-                <a:spcPct val="100000"/>
-              </a:lnSpc>
-              <a:buFont typeface="Arial" panose="020B0604020202020204" pitchFamily="34" charset="0"/>
-              <a:buChar char="•"/>
-            </a:pPr>
-            <a:r>
-              <a:rPr lang="en-AU" sz="1400" dirty="0">
-                <a:solidFill>
-                  <a:srgbClr val="111111"/>
-                </a:solidFill>
-                <a:latin typeface="Open Sans" panose="020B0606030504020204" pitchFamily="34" charset="0"/>
-                <a:ea typeface="Open Sans" panose="020B0606030504020204" pitchFamily="34" charset="0"/>
-                <a:cs typeface="Open Sans" panose="020B0606030504020204" pitchFamily="34" charset="0"/>
-              </a:rPr>
-              <a:t>O’Connor, E. (2008). BigAdmin Feature Article: Patch Management Best Practices. Retrieved May 13, 2015, from </a:t>
-            </a:r>
-            <a:r>
-              <a:rPr lang="en-AU" sz="1400" dirty="0">
-                <a:solidFill>
-                  <a:srgbClr val="111111"/>
-                </a:solidFill>
-                <a:latin typeface="Open Sans" panose="020B0606030504020204" pitchFamily="34" charset="0"/>
-                <a:ea typeface="Open Sans" panose="020B0606030504020204" pitchFamily="34" charset="0"/>
-                <a:cs typeface="Open Sans" panose="020B0606030504020204" pitchFamily="34" charset="0"/>
-                <a:hlinkClick r:id="rId10"/>
-              </a:rPr>
-              <a:t>http://</a:t>
-            </a:r>
-            <a:r>
-              <a:rPr lang="en-AU" sz="1400" dirty="0" smtClean="0">
-                <a:solidFill>
-                  <a:srgbClr val="111111"/>
-                </a:solidFill>
-                <a:latin typeface="Open Sans" panose="020B0606030504020204" pitchFamily="34" charset="0"/>
-                <a:ea typeface="Open Sans" panose="020B0606030504020204" pitchFamily="34" charset="0"/>
-                <a:cs typeface="Open Sans" panose="020B0606030504020204" pitchFamily="34" charset="0"/>
-                <a:hlinkClick r:id="rId10"/>
-              </a:rPr>
-              <a:t>www.oracle.com/technetwork/systems/articles/patch-management-jsp-135385.html</a:t>
-            </a:r>
-            <a:endParaRPr lang="en-AU" sz="1400" dirty="0" smtClean="0">
-              <a:solidFill>
-                <a:srgbClr val="111111"/>
-              </a:solidFill>
-              <a:latin typeface="Open Sans" panose="020B0606030504020204" pitchFamily="34" charset="0"/>
-              <a:ea typeface="Open Sans" panose="020B0606030504020204" pitchFamily="34" charset="0"/>
-              <a:cs typeface="Open Sans" panose="020B0606030504020204" pitchFamily="34" charset="0"/>
-            </a:endParaRPr>
-          </a:p>
-          <a:p>
-            <a:pPr marL="457200" indent="-457200" algn="l">
-              <a:lnSpc>
-                <a:spcPct val="100000"/>
-              </a:lnSpc>
-              <a:buFont typeface="Arial" panose="020B0604020202020204" pitchFamily="34" charset="0"/>
-              <a:buChar char="•"/>
-            </a:pPr>
-            <a:r>
-              <a:rPr lang="en-AU" sz="1400" dirty="0">
-                <a:solidFill>
-                  <a:srgbClr val="111111"/>
-                </a:solidFill>
-                <a:latin typeface="Open Sans" panose="020B0606030504020204" pitchFamily="34" charset="0"/>
-                <a:ea typeface="Open Sans" panose="020B0606030504020204" pitchFamily="34" charset="0"/>
-                <a:cs typeface="Open Sans" panose="020B0606030504020204" pitchFamily="34" charset="0"/>
-              </a:rPr>
-              <a:t>Oliver, J., &amp; Snowden, E. [LastWeekTonight]. (2015, April 9). Last Week Tonight with John Oliver: Edward Snowden on Passwords. Retrieved May 6, 2015, from </a:t>
-            </a:r>
-            <a:r>
-              <a:rPr lang="en-AU" sz="1400" dirty="0">
-                <a:solidFill>
-                  <a:srgbClr val="111111"/>
-                </a:solidFill>
-                <a:latin typeface="Open Sans" panose="020B0606030504020204" pitchFamily="34" charset="0"/>
-                <a:ea typeface="Open Sans" panose="020B0606030504020204" pitchFamily="34" charset="0"/>
-                <a:cs typeface="Open Sans" panose="020B0606030504020204" pitchFamily="34" charset="0"/>
-                <a:hlinkClick r:id="rId11"/>
-              </a:rPr>
-              <a:t>https://</a:t>
-            </a:r>
-            <a:r>
-              <a:rPr lang="en-AU" sz="1400" dirty="0" smtClean="0">
-                <a:solidFill>
-                  <a:srgbClr val="111111"/>
-                </a:solidFill>
-                <a:latin typeface="Open Sans" panose="020B0606030504020204" pitchFamily="34" charset="0"/>
-                <a:ea typeface="Open Sans" panose="020B0606030504020204" pitchFamily="34" charset="0"/>
-                <a:cs typeface="Open Sans" panose="020B0606030504020204" pitchFamily="34" charset="0"/>
-                <a:hlinkClick r:id="rId11"/>
-              </a:rPr>
-              <a:t>www.youtube.com/watch?v=yzGzB-yYKcc</a:t>
-            </a:r>
-            <a:endParaRPr lang="en-AU" sz="1400" dirty="0" smtClean="0">
-              <a:solidFill>
-                <a:srgbClr val="111111"/>
-              </a:solidFill>
-              <a:latin typeface="Open Sans" panose="020B0606030504020204" pitchFamily="34" charset="0"/>
-              <a:ea typeface="Open Sans" panose="020B0606030504020204" pitchFamily="34" charset="0"/>
-              <a:cs typeface="Open Sans" panose="020B0606030504020204" pitchFamily="34" charset="0"/>
-            </a:endParaRPr>
-          </a:p>
-          <a:p>
-            <a:pPr marL="457200" indent="-457200" algn="l">
-              <a:lnSpc>
-                <a:spcPct val="100000"/>
-              </a:lnSpc>
-              <a:buFont typeface="Arial" panose="020B0604020202020204" pitchFamily="34" charset="0"/>
-              <a:buChar char="•"/>
-            </a:pPr>
-            <a:r>
-              <a:rPr lang="en-AU" sz="1400" dirty="0">
-                <a:solidFill>
-                  <a:srgbClr val="111111"/>
-                </a:solidFill>
-                <a:latin typeface="Open Sans" panose="020B0606030504020204" pitchFamily="34" charset="0"/>
-                <a:ea typeface="Open Sans" panose="020B0606030504020204" pitchFamily="34" charset="0"/>
-                <a:cs typeface="Open Sans" panose="020B0606030504020204" pitchFamily="34" charset="0"/>
-              </a:rPr>
-              <a:t>Scarfone, K., &amp; Souppaya, M. (2013). Guide to Enterprise Patch Management Technologies NIST Special Publication 800-40 Guide to Enterprise Patch Management Technologies. NIST. </a:t>
-            </a:r>
-            <a:r>
-              <a:rPr lang="en-AU" sz="1400" dirty="0" smtClean="0">
-                <a:solidFill>
-                  <a:srgbClr val="111111"/>
-                </a:solidFill>
-                <a:latin typeface="Open Sans" panose="020B0606030504020204" pitchFamily="34" charset="0"/>
-                <a:ea typeface="Open Sans" panose="020B0606030504020204" pitchFamily="34" charset="0"/>
-                <a:cs typeface="Open Sans" panose="020B0606030504020204" pitchFamily="34" charset="0"/>
-              </a:rPr>
-              <a:t>doi:10.6028/NIST.SP.800-40r3</a:t>
-            </a:r>
-          </a:p>
-          <a:p>
-            <a:pPr marL="457200" indent="-457200" algn="l">
-              <a:lnSpc>
-                <a:spcPct val="100000"/>
-              </a:lnSpc>
-              <a:buFont typeface="Arial" panose="020B0604020202020204" pitchFamily="34" charset="0"/>
-              <a:buChar char="•"/>
-            </a:pPr>
-            <a:r>
-              <a:rPr lang="en-AU" sz="1400" dirty="0">
-                <a:solidFill>
-                  <a:srgbClr val="111111"/>
-                </a:solidFill>
-                <a:latin typeface="Open Sans" panose="020B0606030504020204" pitchFamily="34" charset="0"/>
-                <a:ea typeface="Open Sans" panose="020B0606030504020204" pitchFamily="34" charset="0"/>
-                <a:cs typeface="Open Sans" panose="020B0606030504020204" pitchFamily="34" charset="0"/>
-              </a:rPr>
-              <a:t>Tice, K. [solarwindsinc]. (2012, September 12)  Patch Manager Guided Tour. Retrieved May 14, 2015, from </a:t>
-            </a:r>
-            <a:r>
-              <a:rPr lang="en-AU" sz="1400" dirty="0">
-                <a:solidFill>
-                  <a:srgbClr val="111111"/>
-                </a:solidFill>
-                <a:latin typeface="Open Sans" panose="020B0606030504020204" pitchFamily="34" charset="0"/>
-                <a:ea typeface="Open Sans" panose="020B0606030504020204" pitchFamily="34" charset="0"/>
-                <a:cs typeface="Open Sans" panose="020B0606030504020204" pitchFamily="34" charset="0"/>
-                <a:hlinkClick r:id="rId12"/>
-              </a:rPr>
-              <a:t>https://www.youtube.com/watch?v=-</a:t>
-            </a:r>
-            <a:r>
-              <a:rPr lang="en-AU" sz="1400" dirty="0" smtClean="0">
-                <a:solidFill>
-                  <a:srgbClr val="111111"/>
-                </a:solidFill>
-                <a:latin typeface="Open Sans" panose="020B0606030504020204" pitchFamily="34" charset="0"/>
-                <a:ea typeface="Open Sans" panose="020B0606030504020204" pitchFamily="34" charset="0"/>
-                <a:cs typeface="Open Sans" panose="020B0606030504020204" pitchFamily="34" charset="0"/>
-                <a:hlinkClick r:id="rId12"/>
-              </a:rPr>
-              <a:t>DldViUL1d0</a:t>
-            </a:r>
-            <a:endParaRPr lang="en-AU" sz="1400" dirty="0" smtClean="0">
-              <a:solidFill>
-                <a:srgbClr val="111111"/>
-              </a:solidFill>
-              <a:latin typeface="Open Sans" panose="020B0606030504020204" pitchFamily="34" charset="0"/>
-              <a:ea typeface="Open Sans" panose="020B0606030504020204" pitchFamily="34" charset="0"/>
-              <a:cs typeface="Open Sans" panose="020B0606030504020204" pitchFamily="34" charset="0"/>
-            </a:endParaRPr>
-          </a:p>
-          <a:p>
-            <a:pPr marL="457200" indent="-457200" algn="l">
-              <a:lnSpc>
-                <a:spcPct val="100000"/>
-              </a:lnSpc>
-              <a:buFont typeface="Arial" panose="020B0604020202020204" pitchFamily="34" charset="0"/>
-              <a:buChar char="•"/>
-            </a:pPr>
-            <a:endParaRPr lang="en-AU" sz="1400" dirty="0" smtClean="0">
-              <a:solidFill>
-                <a:srgbClr val="111111"/>
-              </a:solidFill>
-              <a:latin typeface="Open Sans" panose="020B0606030504020204" pitchFamily="34" charset="0"/>
-              <a:ea typeface="Open Sans" panose="020B0606030504020204" pitchFamily="34" charset="0"/>
-              <a:cs typeface="Open Sans" panose="020B0606030504020204" pitchFamily="34" charset="0"/>
-            </a:endParaRPr>
-          </a:p>
         </p:txBody>
       </p:sp>
     </p:spTree>
     <p:extLst>
       <p:ext uri="{BB962C8B-B14F-4D97-AF65-F5344CB8AC3E}">
-        <p14:creationId xmlns:p14="http://schemas.microsoft.com/office/powerpoint/2010/main" val="636747076"/>
+        <p14:creationId xmlns:p14="http://schemas.microsoft.com/office/powerpoint/2010/main" val="2169123069"/>
       </p:ext>
     </p:extLst>
   </p:cSld>
@@ -12529,28 +11914,29 @@
         </p:nvSpPr>
         <p:spPr>
           <a:xfrm>
-            <a:off x="1524000" y="0"/>
-            <a:ext cx="9144000" cy="6858000"/>
+            <a:off x="338667" y="1"/>
+            <a:ext cx="9144000" cy="970843"/>
           </a:xfrm>
         </p:spPr>
         <p:txBody>
-          <a:bodyPr anchor="ctr">
+          <a:bodyPr anchor="b">
             <a:normAutofit/>
           </a:bodyPr>
           <a:lstStyle/>
           <a:p>
-            <a:r>
-              <a:rPr lang="en-AU" sz="4400" b="1" dirty="0" smtClean="0">
-                <a:solidFill>
-                  <a:srgbClr val="111111"/>
-                </a:solidFill>
-                <a:latin typeface="Open Sans" panose="020B0606030504020204" pitchFamily="34" charset="0"/>
-                <a:ea typeface="Open Sans" panose="020B0606030504020204" pitchFamily="34" charset="0"/>
-                <a:cs typeface="Open Sans" panose="020B0606030504020204" pitchFamily="34" charset="0"/>
-              </a:rPr>
-              <a:t>Intrusion detection system</a:t>
-            </a:r>
-            <a:endParaRPr lang="en-AU" sz="4400" b="1" dirty="0">
+            <a:pPr algn="l"/>
+            <a:r>
+              <a:rPr lang="en-AU" sz="3600" b="1" dirty="0" smtClean="0">
+                <a:solidFill>
+                  <a:srgbClr val="111111"/>
+                </a:solidFill>
+                <a:latin typeface="Open Sans" panose="020B0606030504020204" pitchFamily="34" charset="0"/>
+                <a:ea typeface="Open Sans" panose="020B0606030504020204" pitchFamily="34" charset="0"/>
+                <a:cs typeface="Open Sans" panose="020B0606030504020204" pitchFamily="34" charset="0"/>
+              </a:rPr>
+              <a:t>References</a:t>
+            </a:r>
+            <a:endParaRPr lang="en-AU" sz="3600" dirty="0">
               <a:solidFill>
                 <a:srgbClr val="111111"/>
               </a:solidFill>
@@ -12561,10 +11947,605 @@
           </a:p>
         </p:txBody>
       </p:sp>
+      <p:sp>
+        <p:nvSpPr>
+          <p:cNvPr id="5" name="Title 3"/>
+          <p:cNvSpPr txBox="1">
+            <a:spLocks/>
+          </p:cNvSpPr>
+          <p:nvPr/>
+        </p:nvSpPr>
+        <p:spPr>
+          <a:xfrm>
+            <a:off x="338667" y="1196622"/>
+            <a:ext cx="11514666" cy="5113867"/>
+          </a:xfrm>
+          <a:prstGeom prst="rect">
+            <a:avLst/>
+          </a:prstGeom>
+        </p:spPr>
+        <p:txBody>
+          <a:bodyPr vert="horz" lIns="91440" tIns="45720" rIns="91440" bIns="45720" rtlCol="0" anchor="t">
+            <a:noAutofit/>
+          </a:bodyPr>
+          <a:lstStyle>
+            <a:lvl1pPr algn="ctr" defTabSz="914400" rtl="0" eaLnBrk="1" latinLnBrk="0" hangingPunct="1">
+              <a:lnSpc>
+                <a:spcPct val="90000"/>
+              </a:lnSpc>
+              <a:spcBef>
+                <a:spcPct val="0"/>
+              </a:spcBef>
+              <a:buNone/>
+              <a:defRPr sz="6000" kern="1200">
+                <a:solidFill>
+                  <a:schemeClr val="tx1"/>
+                </a:solidFill>
+                <a:latin typeface="+mj-lt"/>
+                <a:ea typeface="+mj-ea"/>
+                <a:cs typeface="+mj-cs"/>
+              </a:defRPr>
+            </a:lvl1pPr>
+          </a:lstStyle>
+          <a:p>
+            <a:pPr marL="457200" indent="-457200" algn="l">
+              <a:lnSpc>
+                <a:spcPct val="100000"/>
+              </a:lnSpc>
+              <a:buFont typeface="Arial" panose="020B0604020202020204" pitchFamily="34" charset="0"/>
+              <a:buChar char="•"/>
+            </a:pPr>
+            <a:r>
+              <a:rPr lang="en-AU" sz="1600" dirty="0">
+                <a:solidFill>
+                  <a:srgbClr val="111111"/>
+                </a:solidFill>
+                <a:latin typeface="Open Sans" panose="020B0606030504020204" pitchFamily="34" charset="0"/>
+                <a:ea typeface="Open Sans" panose="020B0606030504020204" pitchFamily="34" charset="0"/>
+                <a:cs typeface="Open Sans" panose="020B0606030504020204" pitchFamily="34" charset="0"/>
+              </a:rPr>
+              <a:t>@pent0thal. (2015). Another password spotted in the wild... [Twitter post]. Retrieved May 16, 2015, from </a:t>
+            </a:r>
+            <a:r>
+              <a:rPr lang="en-AU" sz="1600" dirty="0">
+                <a:solidFill>
+                  <a:srgbClr val="111111"/>
+                </a:solidFill>
+                <a:latin typeface="Open Sans" panose="020B0606030504020204" pitchFamily="34" charset="0"/>
+                <a:ea typeface="Open Sans" panose="020B0606030504020204" pitchFamily="34" charset="0"/>
+                <a:cs typeface="Open Sans" panose="020B0606030504020204" pitchFamily="34" charset="0"/>
+                <a:hlinkClick r:id="rId2"/>
+              </a:rPr>
+              <a:t>https://</a:t>
+            </a:r>
+            <a:r>
+              <a:rPr lang="en-AU" sz="1600" dirty="0" smtClean="0">
+                <a:solidFill>
+                  <a:srgbClr val="111111"/>
+                </a:solidFill>
+                <a:latin typeface="Open Sans" panose="020B0606030504020204" pitchFamily="34" charset="0"/>
+                <a:ea typeface="Open Sans" panose="020B0606030504020204" pitchFamily="34" charset="0"/>
+                <a:cs typeface="Open Sans" panose="020B0606030504020204" pitchFamily="34" charset="0"/>
+                <a:hlinkClick r:id="rId2"/>
+              </a:rPr>
+              <a:t>twitter.com/pent0thal/status/586284074223984642</a:t>
+            </a:r>
+            <a:endParaRPr lang="en-AU" sz="1600" dirty="0" smtClean="0">
+              <a:solidFill>
+                <a:srgbClr val="111111"/>
+              </a:solidFill>
+              <a:latin typeface="Open Sans" panose="020B0606030504020204" pitchFamily="34" charset="0"/>
+              <a:ea typeface="Open Sans" panose="020B0606030504020204" pitchFamily="34" charset="0"/>
+              <a:cs typeface="Open Sans" panose="020B0606030504020204" pitchFamily="34" charset="0"/>
+            </a:endParaRPr>
+          </a:p>
+          <a:p>
+            <a:pPr marL="457200" indent="-457200" algn="l">
+              <a:lnSpc>
+                <a:spcPct val="100000"/>
+              </a:lnSpc>
+              <a:buFont typeface="Arial" panose="020B0604020202020204" pitchFamily="34" charset="0"/>
+              <a:buChar char="•"/>
+            </a:pPr>
+            <a:r>
+              <a:rPr lang="en-AU" sz="1600" dirty="0">
+                <a:solidFill>
+                  <a:srgbClr val="111111"/>
+                </a:solidFill>
+                <a:latin typeface="Open Sans" panose="020B0606030504020204" pitchFamily="34" charset="0"/>
+                <a:ea typeface="Open Sans" panose="020B0606030504020204" pitchFamily="34" charset="0"/>
+                <a:cs typeface="Open Sans" panose="020B0606030504020204" pitchFamily="34" charset="0"/>
+              </a:rPr>
+              <a:t>AV-TEST. (2013). Patch Management Solutions Test. Retrieved May 16, 2015, from </a:t>
+            </a:r>
+            <a:r>
+              <a:rPr lang="en-AU" sz="1600" dirty="0">
+                <a:solidFill>
+                  <a:srgbClr val="111111"/>
+                </a:solidFill>
+                <a:latin typeface="Open Sans" panose="020B0606030504020204" pitchFamily="34" charset="0"/>
+                <a:ea typeface="Open Sans" panose="020B0606030504020204" pitchFamily="34" charset="0"/>
+                <a:cs typeface="Open Sans" panose="020B0606030504020204" pitchFamily="34" charset="0"/>
+                <a:hlinkClick r:id="rId3"/>
+              </a:rPr>
+              <a:t>http://</a:t>
+            </a:r>
+            <a:r>
+              <a:rPr lang="en-AU" sz="1600" dirty="0" smtClean="0">
+                <a:solidFill>
+                  <a:srgbClr val="111111"/>
+                </a:solidFill>
+                <a:latin typeface="Open Sans" panose="020B0606030504020204" pitchFamily="34" charset="0"/>
+                <a:ea typeface="Open Sans" panose="020B0606030504020204" pitchFamily="34" charset="0"/>
+                <a:cs typeface="Open Sans" panose="020B0606030504020204" pitchFamily="34" charset="0"/>
+                <a:hlinkClick r:id="rId3"/>
+              </a:rPr>
+              <a:t>www.av-test.org/fileadmin/pdf/avtest_2013-07_patch_management_english.pdf</a:t>
+            </a:r>
+            <a:endParaRPr lang="en-AU" sz="1600" dirty="0" smtClean="0">
+              <a:solidFill>
+                <a:srgbClr val="111111"/>
+              </a:solidFill>
+              <a:latin typeface="Open Sans" panose="020B0606030504020204" pitchFamily="34" charset="0"/>
+              <a:ea typeface="Open Sans" panose="020B0606030504020204" pitchFamily="34" charset="0"/>
+              <a:cs typeface="Open Sans" panose="020B0606030504020204" pitchFamily="34" charset="0"/>
+            </a:endParaRPr>
+          </a:p>
+          <a:p>
+            <a:pPr marL="457200" indent="-457200" algn="l">
+              <a:lnSpc>
+                <a:spcPct val="100000"/>
+              </a:lnSpc>
+              <a:buFont typeface="Arial" panose="020B0604020202020204" pitchFamily="34" charset="0"/>
+              <a:buChar char="•"/>
+            </a:pPr>
+            <a:r>
+              <a:rPr lang="en-AU" sz="1600" dirty="0">
+                <a:solidFill>
+                  <a:srgbClr val="111111"/>
+                </a:solidFill>
+                <a:latin typeface="Open Sans" panose="020B0606030504020204" pitchFamily="34" charset="0"/>
+                <a:ea typeface="Open Sans" panose="020B0606030504020204" pitchFamily="34" charset="0"/>
+                <a:cs typeface="Open Sans" panose="020B0606030504020204" pitchFamily="34" charset="0"/>
+              </a:rPr>
+              <a:t>AV-TEST. (2014a). Test antivirus software for Windows 7 - December 2014 | AV-TEST. Retrieved May 16, 2015, from </a:t>
+            </a:r>
+            <a:r>
+              <a:rPr lang="en-AU" sz="1600" dirty="0">
+                <a:solidFill>
+                  <a:srgbClr val="111111"/>
+                </a:solidFill>
+                <a:latin typeface="Open Sans" panose="020B0606030504020204" pitchFamily="34" charset="0"/>
+                <a:ea typeface="Open Sans" panose="020B0606030504020204" pitchFamily="34" charset="0"/>
+                <a:cs typeface="Open Sans" panose="020B0606030504020204" pitchFamily="34" charset="0"/>
+                <a:hlinkClick r:id="rId4"/>
+              </a:rPr>
+              <a:t>http://www.av-test.org/en/antivirus/business-windows-client/windows-7</a:t>
+            </a:r>
+            <a:r>
+              <a:rPr lang="en-AU" sz="1600" dirty="0" smtClean="0">
+                <a:solidFill>
+                  <a:srgbClr val="111111"/>
+                </a:solidFill>
+                <a:latin typeface="Open Sans" panose="020B0606030504020204" pitchFamily="34" charset="0"/>
+                <a:ea typeface="Open Sans" panose="020B0606030504020204" pitchFamily="34" charset="0"/>
+                <a:cs typeface="Open Sans" panose="020B0606030504020204" pitchFamily="34" charset="0"/>
+                <a:hlinkClick r:id="rId4"/>
+              </a:rPr>
+              <a:t>/</a:t>
+            </a:r>
+            <a:endParaRPr lang="en-AU" sz="1600" dirty="0" smtClean="0">
+              <a:solidFill>
+                <a:srgbClr val="111111"/>
+              </a:solidFill>
+              <a:latin typeface="Open Sans" panose="020B0606030504020204" pitchFamily="34" charset="0"/>
+              <a:ea typeface="Open Sans" panose="020B0606030504020204" pitchFamily="34" charset="0"/>
+              <a:cs typeface="Open Sans" panose="020B0606030504020204" pitchFamily="34" charset="0"/>
+            </a:endParaRPr>
+          </a:p>
+          <a:p>
+            <a:pPr marL="457200" indent="-457200" algn="l">
+              <a:lnSpc>
+                <a:spcPct val="100000"/>
+              </a:lnSpc>
+              <a:buFont typeface="Arial" panose="020B0604020202020204" pitchFamily="34" charset="0"/>
+              <a:buChar char="•"/>
+            </a:pPr>
+            <a:r>
+              <a:rPr lang="en-AU" sz="1600" dirty="0">
+                <a:solidFill>
+                  <a:srgbClr val="111111"/>
+                </a:solidFill>
+                <a:latin typeface="Open Sans" panose="020B0606030504020204" pitchFamily="34" charset="0"/>
+                <a:ea typeface="Open Sans" panose="020B0606030504020204" pitchFamily="34" charset="0"/>
+                <a:cs typeface="Open Sans" panose="020B0606030504020204" pitchFamily="34" charset="0"/>
+              </a:rPr>
+              <a:t>AV-TEST. (2014b). Test Kaspersky Lab Endpoint Security for Windows 7 | AV-TEST. Retrieved May 16, 2015, from </a:t>
+            </a:r>
+            <a:r>
+              <a:rPr lang="en-AU" sz="1600" dirty="0">
+                <a:solidFill>
+                  <a:srgbClr val="111111"/>
+                </a:solidFill>
+                <a:latin typeface="Open Sans" panose="020B0606030504020204" pitchFamily="34" charset="0"/>
+                <a:ea typeface="Open Sans" panose="020B0606030504020204" pitchFamily="34" charset="0"/>
+                <a:cs typeface="Open Sans" panose="020B0606030504020204" pitchFamily="34" charset="0"/>
+                <a:hlinkClick r:id="rId5"/>
+              </a:rPr>
+              <a:t>http://www.av-test.org/en/antivirus/business-windows-client/windows-7/december-2014/kaspersky-lab-endpoint-security-10.2-145015</a:t>
+            </a:r>
+            <a:r>
+              <a:rPr lang="en-AU" sz="1600" dirty="0" smtClean="0">
+                <a:solidFill>
+                  <a:srgbClr val="111111"/>
+                </a:solidFill>
+                <a:latin typeface="Open Sans" panose="020B0606030504020204" pitchFamily="34" charset="0"/>
+                <a:ea typeface="Open Sans" panose="020B0606030504020204" pitchFamily="34" charset="0"/>
+                <a:cs typeface="Open Sans" panose="020B0606030504020204" pitchFamily="34" charset="0"/>
+                <a:hlinkClick r:id="rId5"/>
+              </a:rPr>
+              <a:t>/</a:t>
+            </a:r>
+            <a:endParaRPr lang="en-AU" sz="1600" dirty="0" smtClean="0">
+              <a:solidFill>
+                <a:srgbClr val="111111"/>
+              </a:solidFill>
+              <a:latin typeface="Open Sans" panose="020B0606030504020204" pitchFamily="34" charset="0"/>
+              <a:ea typeface="Open Sans" panose="020B0606030504020204" pitchFamily="34" charset="0"/>
+              <a:cs typeface="Open Sans" panose="020B0606030504020204" pitchFamily="34" charset="0"/>
+            </a:endParaRPr>
+          </a:p>
+          <a:p>
+            <a:pPr marL="457200" indent="-457200" algn="l">
+              <a:lnSpc>
+                <a:spcPct val="100000"/>
+              </a:lnSpc>
+              <a:buFont typeface="Arial" panose="020B0604020202020204" pitchFamily="34" charset="0"/>
+              <a:buChar char="•"/>
+            </a:pPr>
+            <a:r>
+              <a:rPr lang="en-AU" sz="1600" dirty="0">
+                <a:solidFill>
+                  <a:srgbClr val="111111"/>
+                </a:solidFill>
+                <a:latin typeface="Open Sans" panose="020B0606030504020204" pitchFamily="34" charset="0"/>
+                <a:ea typeface="Open Sans" panose="020B0606030504020204" pitchFamily="34" charset="0"/>
+                <a:cs typeface="Open Sans" panose="020B0606030504020204" pitchFamily="34" charset="0"/>
+              </a:rPr>
+              <a:t>Carrera, E. (2002). Linux.Devnull. Retrieved May 18, 2015, from </a:t>
+            </a:r>
+            <a:r>
+              <a:rPr lang="en-AU" sz="1600" dirty="0">
+                <a:solidFill>
+                  <a:srgbClr val="111111"/>
+                </a:solidFill>
+                <a:latin typeface="Open Sans" panose="020B0606030504020204" pitchFamily="34" charset="0"/>
+                <a:ea typeface="Open Sans" panose="020B0606030504020204" pitchFamily="34" charset="0"/>
+                <a:cs typeface="Open Sans" panose="020B0606030504020204" pitchFamily="34" charset="0"/>
+                <a:hlinkClick r:id="rId6"/>
+              </a:rPr>
+              <a:t>https://</a:t>
+            </a:r>
+            <a:r>
+              <a:rPr lang="en-AU" sz="1600" dirty="0" smtClean="0">
+                <a:solidFill>
+                  <a:srgbClr val="111111"/>
+                </a:solidFill>
+                <a:latin typeface="Open Sans" panose="020B0606030504020204" pitchFamily="34" charset="0"/>
+                <a:ea typeface="Open Sans" panose="020B0606030504020204" pitchFamily="34" charset="0"/>
+                <a:cs typeface="Open Sans" panose="020B0606030504020204" pitchFamily="34" charset="0"/>
+                <a:hlinkClick r:id="rId6"/>
+              </a:rPr>
+              <a:t>www.f-secure.com/v-descs/devnull.shtml</a:t>
+            </a:r>
+            <a:endParaRPr lang="en-AU" sz="1600" dirty="0" smtClean="0">
+              <a:solidFill>
+                <a:srgbClr val="111111"/>
+              </a:solidFill>
+              <a:latin typeface="Open Sans" panose="020B0606030504020204" pitchFamily="34" charset="0"/>
+              <a:ea typeface="Open Sans" panose="020B0606030504020204" pitchFamily="34" charset="0"/>
+              <a:cs typeface="Open Sans" panose="020B0606030504020204" pitchFamily="34" charset="0"/>
+            </a:endParaRPr>
+          </a:p>
+          <a:p>
+            <a:pPr marL="457200" indent="-457200" algn="l">
+              <a:lnSpc>
+                <a:spcPct val="100000"/>
+              </a:lnSpc>
+              <a:buFont typeface="Arial" panose="020B0604020202020204" pitchFamily="34" charset="0"/>
+              <a:buChar char="•"/>
+            </a:pPr>
+            <a:r>
+              <a:rPr lang="en-AU" sz="1600" dirty="0">
+                <a:solidFill>
+                  <a:srgbClr val="111111"/>
+                </a:solidFill>
+                <a:latin typeface="Open Sans" panose="020B0606030504020204" pitchFamily="34" charset="0"/>
+                <a:ea typeface="Open Sans" panose="020B0606030504020204" pitchFamily="34" charset="0"/>
+                <a:cs typeface="Open Sans" panose="020B0606030504020204" pitchFamily="34" charset="0"/>
+              </a:rPr>
+              <a:t>cohdra. (2005). 100_7363.JPG. Retrieved May 16, 2015, from </a:t>
+            </a:r>
+            <a:r>
+              <a:rPr lang="en-AU" sz="1600" dirty="0">
+                <a:solidFill>
+                  <a:srgbClr val="111111"/>
+                </a:solidFill>
+                <a:latin typeface="Open Sans" panose="020B0606030504020204" pitchFamily="34" charset="0"/>
+                <a:ea typeface="Open Sans" panose="020B0606030504020204" pitchFamily="34" charset="0"/>
+                <a:cs typeface="Open Sans" panose="020B0606030504020204" pitchFamily="34" charset="0"/>
+                <a:hlinkClick r:id="rId7"/>
+              </a:rPr>
+              <a:t>http://</a:t>
+            </a:r>
+            <a:r>
+              <a:rPr lang="en-AU" sz="1600" dirty="0" smtClean="0">
+                <a:solidFill>
+                  <a:srgbClr val="111111"/>
+                </a:solidFill>
+                <a:latin typeface="Open Sans" panose="020B0606030504020204" pitchFamily="34" charset="0"/>
+                <a:ea typeface="Open Sans" panose="020B0606030504020204" pitchFamily="34" charset="0"/>
+                <a:cs typeface="Open Sans" panose="020B0606030504020204" pitchFamily="34" charset="0"/>
+                <a:hlinkClick r:id="rId7"/>
+              </a:rPr>
+              <a:t>www.morguefile.com/archive/display/41812</a:t>
+            </a:r>
+            <a:endParaRPr lang="en-AU" sz="1600" dirty="0" smtClean="0">
+              <a:solidFill>
+                <a:srgbClr val="111111"/>
+              </a:solidFill>
+              <a:latin typeface="Open Sans" panose="020B0606030504020204" pitchFamily="34" charset="0"/>
+              <a:ea typeface="Open Sans" panose="020B0606030504020204" pitchFamily="34" charset="0"/>
+              <a:cs typeface="Open Sans" panose="020B0606030504020204" pitchFamily="34" charset="0"/>
+            </a:endParaRPr>
+          </a:p>
+          <a:p>
+            <a:pPr marL="457200" indent="-457200" algn="l">
+              <a:lnSpc>
+                <a:spcPct val="100000"/>
+              </a:lnSpc>
+              <a:buFont typeface="Arial" panose="020B0604020202020204" pitchFamily="34" charset="0"/>
+              <a:buChar char="•"/>
+            </a:pPr>
+            <a:r>
+              <a:rPr lang="en-AU" sz="1600" dirty="0">
+                <a:solidFill>
+                  <a:srgbClr val="111111"/>
+                </a:solidFill>
+                <a:latin typeface="Open Sans" panose="020B0606030504020204" pitchFamily="34" charset="0"/>
+                <a:ea typeface="Open Sans" panose="020B0606030504020204" pitchFamily="34" charset="0"/>
+                <a:cs typeface="Open Sans" panose="020B0606030504020204" pitchFamily="34" charset="0"/>
+              </a:rPr>
+              <a:t>ConceptDraw. (n.d.). COMPUTER-AND-NETWORKS-Active-Directory-Domain-Services-diagram-Sample.png (1115×788). Retrieved May 16, 2015, from </a:t>
+            </a:r>
+            <a:r>
+              <a:rPr lang="en-AU" sz="1600" dirty="0">
+                <a:solidFill>
+                  <a:srgbClr val="111111"/>
+                </a:solidFill>
+                <a:latin typeface="Open Sans" panose="020B0606030504020204" pitchFamily="34" charset="0"/>
+                <a:ea typeface="Open Sans" panose="020B0606030504020204" pitchFamily="34" charset="0"/>
+                <a:cs typeface="Open Sans" panose="020B0606030504020204" pitchFamily="34" charset="0"/>
+                <a:hlinkClick r:id="rId8"/>
+              </a:rPr>
+              <a:t>http://</a:t>
+            </a:r>
+            <a:r>
+              <a:rPr lang="en-AU" sz="1600" dirty="0" smtClean="0">
+                <a:solidFill>
+                  <a:srgbClr val="111111"/>
+                </a:solidFill>
+                <a:latin typeface="Open Sans" panose="020B0606030504020204" pitchFamily="34" charset="0"/>
+                <a:ea typeface="Open Sans" panose="020B0606030504020204" pitchFamily="34" charset="0"/>
+                <a:cs typeface="Open Sans" panose="020B0606030504020204" pitchFamily="34" charset="0"/>
+                <a:hlinkClick r:id="rId8"/>
+              </a:rPr>
+              <a:t>www.conceptdraw.com/solution-park/resource/images/solutions/active-directory-diagrams/COMPUTER-AND-NETWORKS-Active-Directory-Domain-Services-diagram-Sample.png</a:t>
+            </a:r>
+            <a:endParaRPr lang="en-AU" sz="1600" dirty="0" smtClean="0">
+              <a:solidFill>
+                <a:srgbClr val="111111"/>
+              </a:solidFill>
+              <a:latin typeface="Open Sans" panose="020B0606030504020204" pitchFamily="34" charset="0"/>
+              <a:ea typeface="Open Sans" panose="020B0606030504020204" pitchFamily="34" charset="0"/>
+              <a:cs typeface="Open Sans" panose="020B0606030504020204" pitchFamily="34" charset="0"/>
+            </a:endParaRPr>
+          </a:p>
+          <a:p>
+            <a:pPr marL="457200" indent="-457200" algn="l">
+              <a:lnSpc>
+                <a:spcPct val="100000"/>
+              </a:lnSpc>
+              <a:buFont typeface="Arial" panose="020B0604020202020204" pitchFamily="34" charset="0"/>
+              <a:buChar char="•"/>
+            </a:pPr>
+            <a:r>
+              <a:rPr lang="en-AU" sz="1600" dirty="0">
+                <a:solidFill>
+                  <a:srgbClr val="111111"/>
+                </a:solidFill>
+                <a:latin typeface="Open Sans" panose="020B0606030504020204" pitchFamily="34" charset="0"/>
+                <a:ea typeface="Open Sans" panose="020B0606030504020204" pitchFamily="34" charset="0"/>
+                <a:cs typeface="Open Sans" panose="020B0606030504020204" pitchFamily="34" charset="0"/>
+              </a:rPr>
+              <a:t>jppi. (2007). sw_locked_gate.jpg. Retrieved May 16, 2015, from </a:t>
+            </a:r>
+            <a:r>
+              <a:rPr lang="en-AU" sz="1600" dirty="0">
+                <a:solidFill>
+                  <a:srgbClr val="111111"/>
+                </a:solidFill>
+                <a:latin typeface="Open Sans" panose="020B0606030504020204" pitchFamily="34" charset="0"/>
+                <a:ea typeface="Open Sans" panose="020B0606030504020204" pitchFamily="34" charset="0"/>
+                <a:cs typeface="Open Sans" panose="020B0606030504020204" pitchFamily="34" charset="0"/>
+                <a:hlinkClick r:id="rId9"/>
+              </a:rPr>
+              <a:t>http://</a:t>
+            </a:r>
+            <a:r>
+              <a:rPr lang="en-AU" sz="1600" dirty="0" smtClean="0">
+                <a:solidFill>
+                  <a:srgbClr val="111111"/>
+                </a:solidFill>
+                <a:latin typeface="Open Sans" panose="020B0606030504020204" pitchFamily="34" charset="0"/>
+                <a:ea typeface="Open Sans" panose="020B0606030504020204" pitchFamily="34" charset="0"/>
+                <a:cs typeface="Open Sans" panose="020B0606030504020204" pitchFamily="34" charset="0"/>
+                <a:hlinkClick r:id="rId9"/>
+              </a:rPr>
+              <a:t>www.morguefile.com/archive/display/129268</a:t>
+            </a:r>
+            <a:endParaRPr lang="en-AU" sz="1600" dirty="0" smtClean="0">
+              <a:solidFill>
+                <a:srgbClr val="111111"/>
+              </a:solidFill>
+              <a:latin typeface="Open Sans" panose="020B0606030504020204" pitchFamily="34" charset="0"/>
+              <a:ea typeface="Open Sans" panose="020B0606030504020204" pitchFamily="34" charset="0"/>
+              <a:cs typeface="Open Sans" panose="020B0606030504020204" pitchFamily="34" charset="0"/>
+            </a:endParaRPr>
+          </a:p>
+          <a:p>
+            <a:pPr marL="457200" indent="-457200" algn="l">
+              <a:lnSpc>
+                <a:spcPct val="100000"/>
+              </a:lnSpc>
+              <a:buFont typeface="Arial" panose="020B0604020202020204" pitchFamily="34" charset="0"/>
+              <a:buChar char="•"/>
+            </a:pPr>
+            <a:r>
+              <a:rPr lang="en-AU" sz="1600" dirty="0" smtClean="0">
+                <a:solidFill>
+                  <a:srgbClr val="111111"/>
+                </a:solidFill>
+                <a:latin typeface="Open Sans" panose="020B0606030504020204" pitchFamily="34" charset="0"/>
+                <a:ea typeface="Open Sans" panose="020B0606030504020204" pitchFamily="34" charset="0"/>
+                <a:cs typeface="Open Sans" panose="020B0606030504020204" pitchFamily="34" charset="0"/>
+              </a:rPr>
+              <a:t>Kaspersky </a:t>
+            </a:r>
+            <a:r>
+              <a:rPr lang="en-AU" sz="1600" dirty="0">
+                <a:solidFill>
+                  <a:srgbClr val="111111"/>
+                </a:solidFill>
+                <a:latin typeface="Open Sans" panose="020B0606030504020204" pitchFamily="34" charset="0"/>
+                <a:ea typeface="Open Sans" panose="020B0606030504020204" pitchFamily="34" charset="0"/>
+                <a:cs typeface="Open Sans" panose="020B0606030504020204" pitchFamily="34" charset="0"/>
+              </a:rPr>
+              <a:t>Lab. (</a:t>
+            </a:r>
+            <a:r>
+              <a:rPr lang="en-AU" sz="1600" dirty="0" smtClean="0">
+                <a:solidFill>
+                  <a:srgbClr val="111111"/>
+                </a:solidFill>
+                <a:latin typeface="Open Sans" panose="020B0606030504020204" pitchFamily="34" charset="0"/>
+                <a:ea typeface="Open Sans" panose="020B0606030504020204" pitchFamily="34" charset="0"/>
+                <a:cs typeface="Open Sans" panose="020B0606030504020204" pitchFamily="34" charset="0"/>
+              </a:rPr>
+              <a:t>2013a). </a:t>
+            </a:r>
+            <a:r>
+              <a:rPr lang="en-AU" sz="1600" dirty="0">
+                <a:solidFill>
+                  <a:srgbClr val="111111"/>
+                </a:solidFill>
+                <a:latin typeface="Open Sans" panose="020B0606030504020204" pitchFamily="34" charset="0"/>
+                <a:ea typeface="Open Sans" panose="020B0606030504020204" pitchFamily="34" charset="0"/>
+                <a:cs typeface="Open Sans" panose="020B0606030504020204" pitchFamily="34" charset="0"/>
+              </a:rPr>
+              <a:t>About KASPERSKY ENDPOINT SECURITY FOR BUSINESS. Retrieved May 16, 2015, from </a:t>
+            </a:r>
+            <a:r>
+              <a:rPr lang="en-AU" sz="1600" dirty="0">
+                <a:solidFill>
+                  <a:srgbClr val="111111"/>
+                </a:solidFill>
+                <a:latin typeface="Open Sans" panose="020B0606030504020204" pitchFamily="34" charset="0"/>
+                <a:ea typeface="Open Sans" panose="020B0606030504020204" pitchFamily="34" charset="0"/>
+                <a:cs typeface="Open Sans" panose="020B0606030504020204" pitchFamily="34" charset="0"/>
+                <a:hlinkClick r:id="rId10"/>
+              </a:rPr>
+              <a:t>http://</a:t>
+            </a:r>
+            <a:r>
+              <a:rPr lang="en-AU" sz="1600" dirty="0" smtClean="0">
+                <a:solidFill>
+                  <a:srgbClr val="111111"/>
+                </a:solidFill>
+                <a:latin typeface="Open Sans" panose="020B0606030504020204" pitchFamily="34" charset="0"/>
+                <a:ea typeface="Open Sans" panose="020B0606030504020204" pitchFamily="34" charset="0"/>
+                <a:cs typeface="Open Sans" panose="020B0606030504020204" pitchFamily="34" charset="0"/>
+                <a:hlinkClick r:id="rId10"/>
+              </a:rPr>
+              <a:t>media.kaspersky.com/en/business-security/endpoint-overview.pdf</a:t>
+            </a:r>
+            <a:endParaRPr lang="en-AU" sz="1600" dirty="0" smtClean="0">
+              <a:solidFill>
+                <a:srgbClr val="111111"/>
+              </a:solidFill>
+              <a:latin typeface="Open Sans" panose="020B0606030504020204" pitchFamily="34" charset="0"/>
+              <a:ea typeface="Open Sans" panose="020B0606030504020204" pitchFamily="34" charset="0"/>
+              <a:cs typeface="Open Sans" panose="020B0606030504020204" pitchFamily="34" charset="0"/>
+            </a:endParaRPr>
+          </a:p>
+          <a:p>
+            <a:pPr marL="457200" indent="-457200" algn="l">
+              <a:lnSpc>
+                <a:spcPct val="100000"/>
+              </a:lnSpc>
+              <a:buFont typeface="Arial" panose="020B0604020202020204" pitchFamily="34" charset="0"/>
+              <a:buChar char="•"/>
+            </a:pPr>
+            <a:r>
+              <a:rPr lang="en-AU" sz="1600" dirty="0">
+                <a:solidFill>
+                  <a:srgbClr val="111111"/>
+                </a:solidFill>
+                <a:latin typeface="Open Sans" panose="020B0606030504020204" pitchFamily="34" charset="0"/>
+                <a:ea typeface="Open Sans" panose="020B0606030504020204" pitchFamily="34" charset="0"/>
+                <a:cs typeface="Open Sans" panose="020B0606030504020204" pitchFamily="34" charset="0"/>
+              </a:rPr>
+              <a:t>Kaspersky Lab [Kaspersky Lab]. (2013b). Introducing Kaspersky Endpoint Security for Business (Advanced). Retrieved May 16, 2015, from </a:t>
+            </a:r>
+            <a:r>
+              <a:rPr lang="en-AU" sz="1600" dirty="0">
+                <a:solidFill>
+                  <a:srgbClr val="111111"/>
+                </a:solidFill>
+                <a:latin typeface="Open Sans" panose="020B0606030504020204" pitchFamily="34" charset="0"/>
+                <a:ea typeface="Open Sans" panose="020B0606030504020204" pitchFamily="34" charset="0"/>
+                <a:cs typeface="Open Sans" panose="020B0606030504020204" pitchFamily="34" charset="0"/>
+                <a:hlinkClick r:id="rId11"/>
+              </a:rPr>
+              <a:t>https://</a:t>
+            </a:r>
+            <a:r>
+              <a:rPr lang="en-AU" sz="1600" dirty="0" smtClean="0">
+                <a:solidFill>
+                  <a:srgbClr val="111111"/>
+                </a:solidFill>
+                <a:latin typeface="Open Sans" panose="020B0606030504020204" pitchFamily="34" charset="0"/>
+                <a:ea typeface="Open Sans" panose="020B0606030504020204" pitchFamily="34" charset="0"/>
+                <a:cs typeface="Open Sans" panose="020B0606030504020204" pitchFamily="34" charset="0"/>
+                <a:hlinkClick r:id="rId11"/>
+              </a:rPr>
+              <a:t>www.youtube.com/watch?v=ctYWZxSVE-s</a:t>
+            </a:r>
+            <a:endParaRPr lang="en-AU" sz="1600" dirty="0">
+              <a:solidFill>
+                <a:srgbClr val="111111"/>
+              </a:solidFill>
+              <a:latin typeface="Open Sans" panose="020B0606030504020204" pitchFamily="34" charset="0"/>
+              <a:ea typeface="Open Sans" panose="020B0606030504020204" pitchFamily="34" charset="0"/>
+              <a:cs typeface="Open Sans" panose="020B0606030504020204" pitchFamily="34" charset="0"/>
+            </a:endParaRPr>
+          </a:p>
+        </p:txBody>
+      </p:sp>
     </p:spTree>
     <p:extLst>
       <p:ext uri="{BB962C8B-B14F-4D97-AF65-F5344CB8AC3E}">
-        <p14:creationId xmlns:p14="http://schemas.microsoft.com/office/powerpoint/2010/main" val="2136438796"/>
+        <p14:creationId xmlns:p14="http://schemas.microsoft.com/office/powerpoint/2010/main" val="2200414272"/>
       </p:ext>
     </p:extLst>
   </p:cSld>
@@ -12613,8 +12594,8 @@
         </p:nvSpPr>
         <p:spPr>
           <a:xfrm>
-            <a:off x="1524000" y="-1187268"/>
-            <a:ext cx="9144000" cy="2917370"/>
+            <a:off x="338667" y="1"/>
+            <a:ext cx="9144000" cy="970843"/>
           </a:xfrm>
         </p:spPr>
         <p:txBody>
@@ -12633,40 +12614,7 @@
                 <a:ea typeface="Open Sans" panose="020B0606030504020204" pitchFamily="34" charset="0"/>
                 <a:cs typeface="Open Sans" panose="020B0606030504020204" pitchFamily="34" charset="0"/>
               </a:rPr>
-              <a:t>Recommend:</a:t>
-            </a:r>
-            <a:r>
-              <a:rPr lang="en-AU" sz="3600" b="1" dirty="0">
-                <a:solidFill>
-                  <a:srgbClr val="111111"/>
-                </a:solidFill>
-                <a:latin typeface="Open Sans" panose="020B0606030504020204" pitchFamily="34" charset="0"/>
-                <a:ea typeface="Open Sans" panose="020B0606030504020204" pitchFamily="34" charset="0"/>
-                <a:cs typeface="Open Sans" panose="020B0606030504020204" pitchFamily="34" charset="0"/>
-              </a:rPr>
-              <a:t/>
-            </a:r>
-            <a:br>
-              <a:rPr lang="en-AU" sz="3600" b="1" dirty="0">
-                <a:solidFill>
-                  <a:srgbClr val="111111"/>
-                </a:solidFill>
-                <a:latin typeface="Open Sans" panose="020B0606030504020204" pitchFamily="34" charset="0"/>
-                <a:ea typeface="Open Sans" panose="020B0606030504020204" pitchFamily="34" charset="0"/>
-                <a:cs typeface="Open Sans" panose="020B0606030504020204" pitchFamily="34" charset="0"/>
-              </a:rPr>
-            </a:br>
-            <a:r>
-              <a:rPr lang="en-AU" sz="3600" b="1" dirty="0" smtClean="0">
-                <a:solidFill>
-                  <a:srgbClr val="111111"/>
-                </a:solidFill>
-                <a:latin typeface="Open Sans" panose="020B0606030504020204" pitchFamily="34" charset="0"/>
-                <a:ea typeface="Open Sans" panose="020B0606030504020204" pitchFamily="34" charset="0"/>
-                <a:cs typeface="Open Sans" panose="020B0606030504020204" pitchFamily="34" charset="0"/>
-                <a:hlinkClick r:id="rId2"/>
-              </a:rPr>
-              <a:t>KFSensor honeypot system</a:t>
+              <a:t>References</a:t>
             </a:r>
             <a:endParaRPr lang="en-AU" sz="3600" dirty="0">
               <a:solidFill>
@@ -12681,149 +12629,477 @@
       </p:sp>
       <p:sp>
         <p:nvSpPr>
-          <p:cNvPr id="2" name="TextBox 1"/>
-          <p:cNvSpPr txBox="1"/>
+          <p:cNvPr id="5" name="Title 3"/>
+          <p:cNvSpPr txBox="1">
+            <a:spLocks/>
+          </p:cNvSpPr>
           <p:nvPr/>
         </p:nvSpPr>
         <p:spPr>
           <a:xfrm>
-            <a:off x="1524000" y="2241731"/>
-            <a:ext cx="9144000" cy="3293209"/>
+            <a:off x="338667" y="1196622"/>
+            <a:ext cx="11514666" cy="5113867"/>
           </a:xfrm>
           <a:prstGeom prst="rect">
             <a:avLst/>
           </a:prstGeom>
-          <a:noFill/>
         </p:spPr>
         <p:txBody>
-          <a:bodyPr wrap="square" rtlCol="0">
-            <a:spAutoFit/>
+          <a:bodyPr vert="horz" lIns="91440" tIns="45720" rIns="91440" bIns="45720" rtlCol="0" anchor="t">
+            <a:noAutofit/>
           </a:bodyPr>
-          <a:lstStyle/>
-          <a:p>
-            <a:pPr marL="285750" indent="-285750">
+          <a:lstStyle>
+            <a:lvl1pPr algn="ctr" defTabSz="914400" rtl="0" eaLnBrk="1" latinLnBrk="0" hangingPunct="1">
+              <a:lnSpc>
+                <a:spcPct val="90000"/>
+              </a:lnSpc>
+              <a:spcBef>
+                <a:spcPct val="0"/>
+              </a:spcBef>
+              <a:buNone/>
+              <a:defRPr sz="6000" kern="1200">
+                <a:solidFill>
+                  <a:schemeClr val="tx1"/>
+                </a:solidFill>
+                <a:latin typeface="+mj-lt"/>
+                <a:ea typeface="+mj-ea"/>
+                <a:cs typeface="+mj-cs"/>
+              </a:defRPr>
+            </a:lvl1pPr>
+          </a:lstStyle>
+          <a:p>
+            <a:pPr marL="457200" indent="-457200" algn="l">
+              <a:lnSpc>
+                <a:spcPct val="100000"/>
+              </a:lnSpc>
               <a:buFont typeface="Arial" panose="020B0604020202020204" pitchFamily="34" charset="0"/>
               <a:buChar char="•"/>
             </a:pPr>
             <a:r>
-              <a:rPr lang="en-AU" sz="2600" dirty="0" smtClean="0">
-                <a:solidFill>
-                  <a:srgbClr val="111111"/>
-                </a:solidFill>
-                <a:latin typeface="Open Sans" panose="020B0606030504020204" pitchFamily="34" charset="0"/>
-                <a:ea typeface="Open Sans" panose="020B0606030504020204" pitchFamily="34" charset="0"/>
-                <a:cs typeface="Open Sans" panose="020B0606030504020204" pitchFamily="34" charset="0"/>
-              </a:rPr>
-              <a:t>Windows based honeypot Intrusion Detection System (IDS) designed for corporate environments</a:t>
-            </a:r>
-          </a:p>
-          <a:p>
-            <a:pPr marL="285750" indent="-285750">
+              <a:rPr lang="en-AU" sz="1600" dirty="0" smtClean="0">
+                <a:solidFill>
+                  <a:srgbClr val="111111"/>
+                </a:solidFill>
+                <a:latin typeface="Open Sans" panose="020B0606030504020204" pitchFamily="34" charset="0"/>
+                <a:ea typeface="Open Sans" panose="020B0606030504020204" pitchFamily="34" charset="0"/>
+                <a:cs typeface="Open Sans" panose="020B0606030504020204" pitchFamily="34" charset="0"/>
+              </a:rPr>
+              <a:t>Microsoft</a:t>
+            </a:r>
+            <a:r>
+              <a:rPr lang="en-AU" sz="1600" dirty="0">
+                <a:solidFill>
+                  <a:srgbClr val="111111"/>
+                </a:solidFill>
+                <a:latin typeface="Open Sans" panose="020B0606030504020204" pitchFamily="34" charset="0"/>
+                <a:ea typeface="Open Sans" panose="020B0606030504020204" pitchFamily="34" charset="0"/>
+                <a:cs typeface="Open Sans" panose="020B0606030504020204" pitchFamily="34" charset="0"/>
+              </a:rPr>
+              <a:t>. (2005a). Apply or modify password policy: Logon and Authentication. Retrieved May 14, 2015, from </a:t>
+            </a:r>
+            <a:r>
+              <a:rPr lang="en-AU" sz="1600" dirty="0">
+                <a:solidFill>
+                  <a:srgbClr val="111111"/>
+                </a:solidFill>
+                <a:latin typeface="Open Sans" panose="020B0606030504020204" pitchFamily="34" charset="0"/>
+                <a:ea typeface="Open Sans" panose="020B0606030504020204" pitchFamily="34" charset="0"/>
+                <a:cs typeface="Open Sans" panose="020B0606030504020204" pitchFamily="34" charset="0"/>
+                <a:hlinkClick r:id="rId2"/>
+              </a:rPr>
+              <a:t>https://technet.microsoft.com/en-au/library/cc781633(v=ws.10).aspx?f=255&amp;MSPPError=-</a:t>
+            </a:r>
+            <a:r>
+              <a:rPr lang="en-AU" sz="1600" dirty="0" smtClean="0">
+                <a:solidFill>
+                  <a:srgbClr val="111111"/>
+                </a:solidFill>
+                <a:latin typeface="Open Sans" panose="020B0606030504020204" pitchFamily="34" charset="0"/>
+                <a:ea typeface="Open Sans" panose="020B0606030504020204" pitchFamily="34" charset="0"/>
+                <a:cs typeface="Open Sans" panose="020B0606030504020204" pitchFamily="34" charset="0"/>
+                <a:hlinkClick r:id="rId2"/>
+              </a:rPr>
+              <a:t>2147217396#BKMK_3</a:t>
+            </a:r>
+            <a:endParaRPr lang="en-AU" sz="1600" dirty="0" smtClean="0">
+              <a:solidFill>
+                <a:srgbClr val="111111"/>
+              </a:solidFill>
+              <a:latin typeface="Open Sans" panose="020B0606030504020204" pitchFamily="34" charset="0"/>
+              <a:ea typeface="Open Sans" panose="020B0606030504020204" pitchFamily="34" charset="0"/>
+              <a:cs typeface="Open Sans" panose="020B0606030504020204" pitchFamily="34" charset="0"/>
+            </a:endParaRPr>
+          </a:p>
+          <a:p>
+            <a:pPr marL="457200" indent="-457200" algn="l">
+              <a:lnSpc>
+                <a:spcPct val="100000"/>
+              </a:lnSpc>
               <a:buFont typeface="Arial" panose="020B0604020202020204" pitchFamily="34" charset="0"/>
               <a:buChar char="•"/>
             </a:pPr>
             <a:r>
-              <a:rPr lang="en-AU" sz="2600" dirty="0" smtClean="0">
-                <a:solidFill>
-                  <a:srgbClr val="111111"/>
-                </a:solidFill>
-                <a:latin typeface="Open Sans" panose="020B0606030504020204" pitchFamily="34" charset="0"/>
-                <a:ea typeface="Open Sans" panose="020B0606030504020204" pitchFamily="34" charset="0"/>
-                <a:cs typeface="Open Sans" panose="020B0606030504020204" pitchFamily="34" charset="0"/>
-              </a:rPr>
-              <a:t>Acts as a decoy to attract attackers in the event the network is compromised</a:t>
-            </a:r>
-          </a:p>
-          <a:p>
-            <a:pPr marL="285750" indent="-285750">
+              <a:rPr lang="en-AU" sz="1600" dirty="0">
+                <a:solidFill>
+                  <a:srgbClr val="111111"/>
+                </a:solidFill>
+                <a:latin typeface="Open Sans" panose="020B0606030504020204" pitchFamily="34" charset="0"/>
+                <a:ea typeface="Open Sans" panose="020B0606030504020204" pitchFamily="34" charset="0"/>
+                <a:cs typeface="Open Sans" panose="020B0606030504020204" pitchFamily="34" charset="0"/>
+              </a:rPr>
+              <a:t>Microsoft. (2005b). Assign user rights to a group in Active Directory: Active Directory. Retrieved May 14, 2015, from </a:t>
+            </a:r>
+            <a:r>
+              <a:rPr lang="en-AU" sz="1600" dirty="0">
+                <a:solidFill>
+                  <a:srgbClr val="111111"/>
+                </a:solidFill>
+                <a:latin typeface="Open Sans" panose="020B0606030504020204" pitchFamily="34" charset="0"/>
+                <a:ea typeface="Open Sans" panose="020B0606030504020204" pitchFamily="34" charset="0"/>
+                <a:cs typeface="Open Sans" panose="020B0606030504020204" pitchFamily="34" charset="0"/>
+                <a:hlinkClick r:id="rId3"/>
+              </a:rPr>
+              <a:t>https://technet.microsoft.com/en-au/library/cc786658(v=ws.10).</a:t>
+            </a:r>
+            <a:r>
+              <a:rPr lang="en-AU" sz="1600" dirty="0" smtClean="0">
+                <a:solidFill>
+                  <a:srgbClr val="111111"/>
+                </a:solidFill>
+                <a:latin typeface="Open Sans" panose="020B0606030504020204" pitchFamily="34" charset="0"/>
+                <a:ea typeface="Open Sans" panose="020B0606030504020204" pitchFamily="34" charset="0"/>
+                <a:cs typeface="Open Sans" panose="020B0606030504020204" pitchFamily="34" charset="0"/>
+                <a:hlinkClick r:id="rId3"/>
+              </a:rPr>
+              <a:t>aspx</a:t>
+            </a:r>
+            <a:endParaRPr lang="en-AU" sz="1600" dirty="0" smtClean="0">
+              <a:solidFill>
+                <a:srgbClr val="111111"/>
+              </a:solidFill>
+              <a:latin typeface="Open Sans" panose="020B0606030504020204" pitchFamily="34" charset="0"/>
+              <a:ea typeface="Open Sans" panose="020B0606030504020204" pitchFamily="34" charset="0"/>
+              <a:cs typeface="Open Sans" panose="020B0606030504020204" pitchFamily="34" charset="0"/>
+            </a:endParaRPr>
+          </a:p>
+          <a:p>
+            <a:pPr marL="457200" indent="-457200" algn="l">
+              <a:lnSpc>
+                <a:spcPct val="100000"/>
+              </a:lnSpc>
               <a:buFont typeface="Arial" panose="020B0604020202020204" pitchFamily="34" charset="0"/>
               <a:buChar char="•"/>
             </a:pPr>
             <a:r>
-              <a:rPr lang="en-AU" sz="2600" dirty="0">
-                <a:solidFill>
-                  <a:srgbClr val="111111"/>
-                </a:solidFill>
-                <a:latin typeface="Open Sans" panose="020B0606030504020204" pitchFamily="34" charset="0"/>
-                <a:ea typeface="Open Sans" panose="020B0606030504020204" pitchFamily="34" charset="0"/>
-                <a:cs typeface="Open Sans" panose="020B0606030504020204" pitchFamily="34" charset="0"/>
-              </a:rPr>
-              <a:t>Simulates </a:t>
-            </a:r>
-            <a:r>
-              <a:rPr lang="en-AU" sz="2600" dirty="0" smtClean="0">
-                <a:solidFill>
-                  <a:srgbClr val="111111"/>
-                </a:solidFill>
-                <a:latin typeface="Open Sans" panose="020B0606030504020204" pitchFamily="34" charset="0"/>
-                <a:ea typeface="Open Sans" panose="020B0606030504020204" pitchFamily="34" charset="0"/>
-                <a:cs typeface="Open Sans" panose="020B0606030504020204" pitchFamily="34" charset="0"/>
-              </a:rPr>
-              <a:t>vulnerable FTP</a:t>
-            </a:r>
-            <a:r>
-              <a:rPr lang="en-AU" sz="2600" dirty="0">
-                <a:solidFill>
-                  <a:srgbClr val="111111"/>
-                </a:solidFill>
-                <a:latin typeface="Open Sans" panose="020B0606030504020204" pitchFamily="34" charset="0"/>
-                <a:ea typeface="Open Sans" panose="020B0606030504020204" pitchFamily="34" charset="0"/>
-                <a:cs typeface="Open Sans" panose="020B0606030504020204" pitchFamily="34" charset="0"/>
-              </a:rPr>
-              <a:t>, SMB, POP3, HTTP, Telnet, SMTP and </a:t>
-            </a:r>
-            <a:r>
-              <a:rPr lang="en-AU" sz="2600" dirty="0" smtClean="0">
-                <a:solidFill>
-                  <a:srgbClr val="111111"/>
-                </a:solidFill>
-                <a:latin typeface="Open Sans" panose="020B0606030504020204" pitchFamily="34" charset="0"/>
-                <a:ea typeface="Open Sans" panose="020B0606030504020204" pitchFamily="34" charset="0"/>
-                <a:cs typeface="Open Sans" panose="020B0606030504020204" pitchFamily="34" charset="0"/>
-              </a:rPr>
-              <a:t>SOCKS</a:t>
-            </a:r>
-          </a:p>
-          <a:p>
-            <a:pPr marL="285750" indent="-285750">
+              <a:rPr lang="en-AU" sz="1600" dirty="0">
+                <a:solidFill>
+                  <a:srgbClr val="111111"/>
+                </a:solidFill>
+                <a:latin typeface="Open Sans" panose="020B0606030504020204" pitchFamily="34" charset="0"/>
+                <a:ea typeface="Open Sans" panose="020B0606030504020204" pitchFamily="34" charset="0"/>
+                <a:cs typeface="Open Sans" panose="020B0606030504020204" pitchFamily="34" charset="0"/>
+              </a:rPr>
+              <a:t>Microsoft. (2007a). Active Directory Domain Services Overview. Retrieved May 18, 2015, from </a:t>
+            </a:r>
+            <a:r>
+              <a:rPr lang="en-AU" sz="1600" dirty="0">
+                <a:solidFill>
+                  <a:srgbClr val="111111"/>
+                </a:solidFill>
+                <a:latin typeface="Open Sans" panose="020B0606030504020204" pitchFamily="34" charset="0"/>
+                <a:ea typeface="Open Sans" panose="020B0606030504020204" pitchFamily="34" charset="0"/>
+                <a:cs typeface="Open Sans" panose="020B0606030504020204" pitchFamily="34" charset="0"/>
+                <a:hlinkClick r:id="rId4"/>
+              </a:rPr>
+              <a:t>https://technet.microsoft.com/en-us/library/cc731053(WS.10).</a:t>
+            </a:r>
+            <a:r>
+              <a:rPr lang="en-AU" sz="1600" dirty="0" smtClean="0">
+                <a:solidFill>
+                  <a:srgbClr val="111111"/>
+                </a:solidFill>
+                <a:latin typeface="Open Sans" panose="020B0606030504020204" pitchFamily="34" charset="0"/>
+                <a:ea typeface="Open Sans" panose="020B0606030504020204" pitchFamily="34" charset="0"/>
+                <a:cs typeface="Open Sans" panose="020B0606030504020204" pitchFamily="34" charset="0"/>
+                <a:hlinkClick r:id="rId4"/>
+              </a:rPr>
+              <a:t>aspx</a:t>
+            </a:r>
+            <a:endParaRPr lang="en-AU" sz="1600" dirty="0" smtClean="0">
+              <a:solidFill>
+                <a:srgbClr val="111111"/>
+              </a:solidFill>
+              <a:latin typeface="Open Sans" panose="020B0606030504020204" pitchFamily="34" charset="0"/>
+              <a:ea typeface="Open Sans" panose="020B0606030504020204" pitchFamily="34" charset="0"/>
+              <a:cs typeface="Open Sans" panose="020B0606030504020204" pitchFamily="34" charset="0"/>
+            </a:endParaRPr>
+          </a:p>
+          <a:p>
+            <a:pPr marL="457200" indent="-457200" algn="l">
+              <a:lnSpc>
+                <a:spcPct val="100000"/>
+              </a:lnSpc>
               <a:buFont typeface="Arial" panose="020B0604020202020204" pitchFamily="34" charset="0"/>
               <a:buChar char="•"/>
             </a:pPr>
             <a:r>
-              <a:rPr lang="en-AU" sz="2600" dirty="0" smtClean="0">
-                <a:solidFill>
-                  <a:srgbClr val="111111"/>
-                </a:solidFill>
-                <a:latin typeface="Open Sans" panose="020B0606030504020204" pitchFamily="34" charset="0"/>
-                <a:ea typeface="Open Sans" panose="020B0606030504020204" pitchFamily="34" charset="0"/>
-                <a:cs typeface="Open Sans" panose="020B0606030504020204" pitchFamily="34" charset="0"/>
-              </a:rPr>
-              <a:t>Diverts attacks away from critical areas of network</a:t>
-            </a:r>
-          </a:p>
-          <a:p>
-            <a:pPr marL="285750" indent="-285750">
+              <a:rPr lang="en-AU" sz="1600" dirty="0">
+                <a:solidFill>
+                  <a:srgbClr val="111111"/>
+                </a:solidFill>
+                <a:latin typeface="Open Sans" panose="020B0606030504020204" pitchFamily="34" charset="0"/>
+                <a:ea typeface="Open Sans" panose="020B0606030504020204" pitchFamily="34" charset="0"/>
+                <a:cs typeface="Open Sans" panose="020B0606030504020204" pitchFamily="34" charset="0"/>
+              </a:rPr>
+              <a:t>Microsoft. (2007b). Configure UAC settings via policy - Microsoft Reduce Customer Effort Center - Site Home - TechNet Blogs. Retrieved May 14, 2015, from </a:t>
+            </a:r>
+            <a:r>
+              <a:rPr lang="en-AU" sz="1600" dirty="0">
+                <a:solidFill>
+                  <a:srgbClr val="111111"/>
+                </a:solidFill>
+                <a:latin typeface="Open Sans" panose="020B0606030504020204" pitchFamily="34" charset="0"/>
+                <a:ea typeface="Open Sans" panose="020B0606030504020204" pitchFamily="34" charset="0"/>
+                <a:cs typeface="Open Sans" panose="020B0606030504020204" pitchFamily="34" charset="0"/>
+                <a:hlinkClick r:id="rId5"/>
+              </a:rPr>
+              <a:t>http://</a:t>
+            </a:r>
+            <a:r>
+              <a:rPr lang="en-AU" sz="1600" dirty="0" smtClean="0">
+                <a:solidFill>
+                  <a:srgbClr val="111111"/>
+                </a:solidFill>
+                <a:latin typeface="Open Sans" panose="020B0606030504020204" pitchFamily="34" charset="0"/>
+                <a:ea typeface="Open Sans" panose="020B0606030504020204" pitchFamily="34" charset="0"/>
+                <a:cs typeface="Open Sans" panose="020B0606030504020204" pitchFamily="34" charset="0"/>
+                <a:hlinkClick r:id="rId5"/>
+              </a:rPr>
+              <a:t>blogs.technet.com/b/asiasupp/archive/2007/02/08/configure-uac-settings-via-policy.aspx</a:t>
+            </a:r>
+            <a:endParaRPr lang="en-AU" sz="1600" dirty="0" smtClean="0">
+              <a:solidFill>
+                <a:srgbClr val="111111"/>
+              </a:solidFill>
+              <a:latin typeface="Open Sans" panose="020B0606030504020204" pitchFamily="34" charset="0"/>
+              <a:ea typeface="Open Sans" panose="020B0606030504020204" pitchFamily="34" charset="0"/>
+              <a:cs typeface="Open Sans" panose="020B0606030504020204" pitchFamily="34" charset="0"/>
+            </a:endParaRPr>
+          </a:p>
+          <a:p>
+            <a:pPr marL="457200" indent="-457200" algn="l">
+              <a:lnSpc>
+                <a:spcPct val="100000"/>
+              </a:lnSpc>
               <a:buFont typeface="Arial" panose="020B0604020202020204" pitchFamily="34" charset="0"/>
               <a:buChar char="•"/>
             </a:pPr>
             <a:r>
-              <a:rPr lang="en-AU" sz="2600" dirty="0" smtClean="0">
-                <a:solidFill>
-                  <a:srgbClr val="111111"/>
-                </a:solidFill>
-                <a:latin typeface="Open Sans" panose="020B0606030504020204" pitchFamily="34" charset="0"/>
-                <a:ea typeface="Open Sans" panose="020B0606030504020204" pitchFamily="34" charset="0"/>
-                <a:cs typeface="Open Sans" panose="020B0606030504020204" pitchFamily="34" charset="0"/>
-              </a:rPr>
-              <a:t>Identifies attack signatures and logs events</a:t>
-            </a:r>
+              <a:rPr lang="en-AU" sz="1600" dirty="0">
+                <a:solidFill>
+                  <a:srgbClr val="111111"/>
+                </a:solidFill>
+                <a:latin typeface="Open Sans" panose="020B0606030504020204" pitchFamily="34" charset="0"/>
+                <a:ea typeface="Open Sans" panose="020B0606030504020204" pitchFamily="34" charset="0"/>
+                <a:cs typeface="Open Sans" panose="020B0606030504020204" pitchFamily="34" charset="0"/>
+              </a:rPr>
+              <a:t>Microsoft. (2012). Password must meet complexity requirements. Retrieved May 14, 2015, from </a:t>
+            </a:r>
+            <a:r>
+              <a:rPr lang="en-AU" sz="1600" dirty="0">
+                <a:solidFill>
+                  <a:srgbClr val="111111"/>
+                </a:solidFill>
+                <a:latin typeface="Open Sans" panose="020B0606030504020204" pitchFamily="34" charset="0"/>
+                <a:ea typeface="Open Sans" panose="020B0606030504020204" pitchFamily="34" charset="0"/>
+                <a:cs typeface="Open Sans" panose="020B0606030504020204" pitchFamily="34" charset="0"/>
+                <a:hlinkClick r:id="rId6"/>
+              </a:rPr>
+              <a:t>https://technet.microsoft.com/en-us/library/hh994562(v=ws.10).</a:t>
+            </a:r>
+            <a:r>
+              <a:rPr lang="en-AU" sz="1600" dirty="0" smtClean="0">
+                <a:solidFill>
+                  <a:srgbClr val="111111"/>
+                </a:solidFill>
+                <a:latin typeface="Open Sans" panose="020B0606030504020204" pitchFamily="34" charset="0"/>
+                <a:ea typeface="Open Sans" panose="020B0606030504020204" pitchFamily="34" charset="0"/>
+                <a:cs typeface="Open Sans" panose="020B0606030504020204" pitchFamily="34" charset="0"/>
+                <a:hlinkClick r:id="rId6"/>
+              </a:rPr>
+              <a:t>aspx</a:t>
+            </a:r>
+            <a:endParaRPr lang="en-AU" sz="1600" dirty="0" smtClean="0">
+              <a:solidFill>
+                <a:srgbClr val="111111"/>
+              </a:solidFill>
+              <a:latin typeface="Open Sans" panose="020B0606030504020204" pitchFamily="34" charset="0"/>
+              <a:ea typeface="Open Sans" panose="020B0606030504020204" pitchFamily="34" charset="0"/>
+              <a:cs typeface="Open Sans" panose="020B0606030504020204" pitchFamily="34" charset="0"/>
+            </a:endParaRPr>
+          </a:p>
+          <a:p>
+            <a:pPr marL="457200" indent="-457200" algn="l">
+              <a:lnSpc>
+                <a:spcPct val="100000"/>
+              </a:lnSpc>
+              <a:buFont typeface="Arial" panose="020B0604020202020204" pitchFamily="34" charset="0"/>
+              <a:buChar char="•"/>
+            </a:pPr>
+            <a:r>
+              <a:rPr lang="en-AU" sz="1600" dirty="0">
+                <a:solidFill>
+                  <a:srgbClr val="111111"/>
+                </a:solidFill>
+                <a:latin typeface="Open Sans" panose="020B0606030504020204" pitchFamily="34" charset="0"/>
+                <a:ea typeface="Open Sans" panose="020B0606030504020204" pitchFamily="34" charset="0"/>
+                <a:cs typeface="Open Sans" panose="020B0606030504020204" pitchFamily="34" charset="0"/>
+              </a:rPr>
+              <a:t>Microsoft. (n.d.). Screen Saver timeout. Retrieved May 14, 2015, from </a:t>
+            </a:r>
+            <a:r>
+              <a:rPr lang="en-AU" sz="1600" dirty="0">
+                <a:solidFill>
+                  <a:srgbClr val="111111"/>
+                </a:solidFill>
+                <a:latin typeface="Open Sans" panose="020B0606030504020204" pitchFamily="34" charset="0"/>
+                <a:ea typeface="Open Sans" panose="020B0606030504020204" pitchFamily="34" charset="0"/>
+                <a:cs typeface="Open Sans" panose="020B0606030504020204" pitchFamily="34" charset="0"/>
+                <a:hlinkClick r:id="rId7"/>
+              </a:rPr>
+              <a:t>https://</a:t>
+            </a:r>
+            <a:r>
+              <a:rPr lang="en-AU" sz="1600" dirty="0" smtClean="0">
+                <a:solidFill>
+                  <a:srgbClr val="111111"/>
+                </a:solidFill>
+                <a:latin typeface="Open Sans" panose="020B0606030504020204" pitchFamily="34" charset="0"/>
+                <a:ea typeface="Open Sans" panose="020B0606030504020204" pitchFamily="34" charset="0"/>
+                <a:cs typeface="Open Sans" panose="020B0606030504020204" pitchFamily="34" charset="0"/>
+                <a:hlinkClick r:id="rId7"/>
+              </a:rPr>
+              <a:t>technet.microsoft.com/en-us/library/cc961876.aspx</a:t>
+            </a:r>
+            <a:endParaRPr lang="en-AU" sz="1600" dirty="0" smtClean="0">
+              <a:solidFill>
+                <a:srgbClr val="111111"/>
+              </a:solidFill>
+              <a:latin typeface="Open Sans" panose="020B0606030504020204" pitchFamily="34" charset="0"/>
+              <a:ea typeface="Open Sans" panose="020B0606030504020204" pitchFamily="34" charset="0"/>
+              <a:cs typeface="Open Sans" panose="020B0606030504020204" pitchFamily="34" charset="0"/>
+            </a:endParaRPr>
+          </a:p>
+          <a:p>
+            <a:pPr marL="457200" indent="-457200" algn="l">
+              <a:lnSpc>
+                <a:spcPct val="100000"/>
+              </a:lnSpc>
+              <a:buFont typeface="Arial" panose="020B0604020202020204" pitchFamily="34" charset="0"/>
+              <a:buChar char="•"/>
+            </a:pPr>
+            <a:r>
+              <a:rPr lang="en-AU" sz="1600" dirty="0">
+                <a:solidFill>
+                  <a:srgbClr val="111111"/>
+                </a:solidFill>
+                <a:latin typeface="Open Sans" panose="020B0606030504020204" pitchFamily="34" charset="0"/>
+                <a:ea typeface="Open Sans" panose="020B0606030504020204" pitchFamily="34" charset="0"/>
+                <a:cs typeface="Open Sans" panose="020B0606030504020204" pitchFamily="34" charset="0"/>
+              </a:rPr>
+              <a:t>Oliver, J., &amp; Snowden, E. [LastWeekTonight]. (2015). Last Week Tonight with John Oliver: Edward Snowden on Passwords. Retrieved May 6, 2015, from </a:t>
+            </a:r>
+            <a:r>
+              <a:rPr lang="en-AU" sz="1600" dirty="0">
+                <a:solidFill>
+                  <a:srgbClr val="111111"/>
+                </a:solidFill>
+                <a:latin typeface="Open Sans" panose="020B0606030504020204" pitchFamily="34" charset="0"/>
+                <a:ea typeface="Open Sans" panose="020B0606030504020204" pitchFamily="34" charset="0"/>
+                <a:cs typeface="Open Sans" panose="020B0606030504020204" pitchFamily="34" charset="0"/>
+                <a:hlinkClick r:id="rId8"/>
+              </a:rPr>
+              <a:t>https://</a:t>
+            </a:r>
+            <a:r>
+              <a:rPr lang="en-AU" sz="1600" dirty="0" smtClean="0">
+                <a:solidFill>
+                  <a:srgbClr val="111111"/>
+                </a:solidFill>
+                <a:latin typeface="Open Sans" panose="020B0606030504020204" pitchFamily="34" charset="0"/>
+                <a:ea typeface="Open Sans" panose="020B0606030504020204" pitchFamily="34" charset="0"/>
+                <a:cs typeface="Open Sans" panose="020B0606030504020204" pitchFamily="34" charset="0"/>
+                <a:hlinkClick r:id="rId8"/>
+              </a:rPr>
+              <a:t>www.youtube.com/watch?v=yzGzB-yYKcc</a:t>
+            </a:r>
+            <a:endParaRPr lang="en-AU" sz="1600" dirty="0" smtClean="0">
+              <a:solidFill>
+                <a:srgbClr val="111111"/>
+              </a:solidFill>
+              <a:latin typeface="Open Sans" panose="020B0606030504020204" pitchFamily="34" charset="0"/>
+              <a:ea typeface="Open Sans" panose="020B0606030504020204" pitchFamily="34" charset="0"/>
+              <a:cs typeface="Open Sans" panose="020B0606030504020204" pitchFamily="34" charset="0"/>
+            </a:endParaRPr>
+          </a:p>
+          <a:p>
+            <a:pPr marL="457200" indent="-457200" algn="l">
+              <a:lnSpc>
+                <a:spcPct val="100000"/>
+              </a:lnSpc>
+              <a:buFont typeface="Arial" panose="020B0604020202020204" pitchFamily="34" charset="0"/>
+              <a:buChar char="•"/>
+            </a:pPr>
+            <a:r>
+              <a:rPr lang="en-AU" sz="1600" dirty="0">
+                <a:solidFill>
+                  <a:srgbClr val="111111"/>
+                </a:solidFill>
+                <a:latin typeface="Open Sans" panose="020B0606030504020204" pitchFamily="34" charset="0"/>
+                <a:ea typeface="Open Sans" panose="020B0606030504020204" pitchFamily="34" charset="0"/>
+                <a:cs typeface="Open Sans" panose="020B0606030504020204" pitchFamily="34" charset="0"/>
+              </a:rPr>
+              <a:t>Pietroforte, M. (2006). The second worst new feature of Windows Vista - 4sysops. Retrieved May 18, 2015, from </a:t>
+            </a:r>
+            <a:r>
+              <a:rPr lang="en-AU" sz="1600" dirty="0">
+                <a:solidFill>
+                  <a:srgbClr val="111111"/>
+                </a:solidFill>
+                <a:latin typeface="Open Sans" panose="020B0606030504020204" pitchFamily="34" charset="0"/>
+                <a:ea typeface="Open Sans" panose="020B0606030504020204" pitchFamily="34" charset="0"/>
+                <a:cs typeface="Open Sans" panose="020B0606030504020204" pitchFamily="34" charset="0"/>
+                <a:hlinkClick r:id="rId9"/>
+              </a:rPr>
+              <a:t>https://4sysops.com/archives/the-second-worst-new-feature-of-windows-vista</a:t>
+            </a:r>
+            <a:r>
+              <a:rPr lang="en-AU" sz="1600" dirty="0" smtClean="0">
+                <a:solidFill>
+                  <a:srgbClr val="111111"/>
+                </a:solidFill>
+                <a:latin typeface="Open Sans" panose="020B0606030504020204" pitchFamily="34" charset="0"/>
+                <a:ea typeface="Open Sans" panose="020B0606030504020204" pitchFamily="34" charset="0"/>
+                <a:cs typeface="Open Sans" panose="020B0606030504020204" pitchFamily="34" charset="0"/>
+                <a:hlinkClick r:id="rId9"/>
+              </a:rPr>
+              <a:t>/</a:t>
+            </a:r>
+            <a:endParaRPr lang="en-AU" sz="1600" dirty="0" smtClean="0">
+              <a:solidFill>
+                <a:srgbClr val="111111"/>
+              </a:solidFill>
+              <a:latin typeface="Open Sans" panose="020B0606030504020204" pitchFamily="34" charset="0"/>
+              <a:ea typeface="Open Sans" panose="020B0606030504020204" pitchFamily="34" charset="0"/>
+              <a:cs typeface="Open Sans" panose="020B0606030504020204" pitchFamily="34" charset="0"/>
+            </a:endParaRPr>
           </a:p>
         </p:txBody>
       </p:sp>
     </p:spTree>
     <p:extLst>
       <p:ext uri="{BB962C8B-B14F-4D97-AF65-F5344CB8AC3E}">
-        <p14:creationId xmlns:p14="http://schemas.microsoft.com/office/powerpoint/2010/main" val="1865298560"/>
+        <p14:creationId xmlns:p14="http://schemas.microsoft.com/office/powerpoint/2010/main" val="636747076"/>
       </p:ext>
     </p:extLst>
   </p:cSld>

</xml_diff>

<commit_message>
CSI1101 A2: fixed some wording
</commit_message>
<xml_diff>
--- a/year_1/sem_2/CSI1101_computer_security/0b_assignment_2_[22MAY15_0900]/dev/CSI1101_PONCE_A2_v03.pptx
+++ b/year_1/sem_2/CSI1101_computer_security/0b_assignment_2_[22MAY15_0900]/dev/CSI1101_PONCE_A2_v03.pptx
@@ -42,16 +42,16 @@
   <p:notesSz cx="6858000" cy="9144000"/>
   <p:embeddedFontLst>
     <p:embeddedFont>
-      <p:font typeface="Calibri Light" panose="020F0302020204030204" pitchFamily="34" charset="0"/>
+      <p:font typeface="Open Sans" panose="020B0606030504020204" pitchFamily="34" charset="0"/>
       <p:regular r:id="rId34"/>
-      <p:italic r:id="rId35"/>
+      <p:bold r:id="rId35"/>
+      <p:italic r:id="rId36"/>
+      <p:boldItalic r:id="rId37"/>
     </p:embeddedFont>
     <p:embeddedFont>
-      <p:font typeface="Open Sans" panose="020B0606030504020204" pitchFamily="34" charset="0"/>
-      <p:regular r:id="rId36"/>
-      <p:bold r:id="rId37"/>
-      <p:italic r:id="rId38"/>
-      <p:boldItalic r:id="rId39"/>
+      <p:font typeface="Calibri Light" panose="020F0302020204030204" pitchFamily="34" charset="0"/>
+      <p:regular r:id="rId38"/>
+      <p:italic r:id="rId39"/>
     </p:embeddedFont>
     <p:embeddedFont>
       <p:font typeface="Calibri" panose="020F0502020204030204" pitchFamily="34" charset="0"/>
@@ -306,7 +306,7 @@
           <a:p>
             <a:fld id="{7B1A49F8-424C-43DF-ABBC-6BF9F0D68733}" type="datetimeFigureOut">
               <a:rPr lang="en-AU" smtClean="0"/>
-              <a:t>18/05/2015</a:t>
+              <a:t>21/05/2015</a:t>
             </a:fld>
             <a:endParaRPr lang="en-AU"/>
           </a:p>
@@ -476,7 +476,7 @@
           <a:p>
             <a:fld id="{7B1A49F8-424C-43DF-ABBC-6BF9F0D68733}" type="datetimeFigureOut">
               <a:rPr lang="en-AU" smtClean="0"/>
-              <a:t>18/05/2015</a:t>
+              <a:t>21/05/2015</a:t>
             </a:fld>
             <a:endParaRPr lang="en-AU"/>
           </a:p>
@@ -656,7 +656,7 @@
           <a:p>
             <a:fld id="{7B1A49F8-424C-43DF-ABBC-6BF9F0D68733}" type="datetimeFigureOut">
               <a:rPr lang="en-AU" smtClean="0"/>
-              <a:t>18/05/2015</a:t>
+              <a:t>21/05/2015</a:t>
             </a:fld>
             <a:endParaRPr lang="en-AU"/>
           </a:p>
@@ -826,7 +826,7 @@
           <a:p>
             <a:fld id="{7B1A49F8-424C-43DF-ABBC-6BF9F0D68733}" type="datetimeFigureOut">
               <a:rPr lang="en-AU" smtClean="0"/>
-              <a:t>18/05/2015</a:t>
+              <a:t>21/05/2015</a:t>
             </a:fld>
             <a:endParaRPr lang="en-AU"/>
           </a:p>
@@ -1072,7 +1072,7 @@
           <a:p>
             <a:fld id="{7B1A49F8-424C-43DF-ABBC-6BF9F0D68733}" type="datetimeFigureOut">
               <a:rPr lang="en-AU" smtClean="0"/>
-              <a:t>18/05/2015</a:t>
+              <a:t>21/05/2015</a:t>
             </a:fld>
             <a:endParaRPr lang="en-AU"/>
           </a:p>
@@ -1304,7 +1304,7 @@
           <a:p>
             <a:fld id="{7B1A49F8-424C-43DF-ABBC-6BF9F0D68733}" type="datetimeFigureOut">
               <a:rPr lang="en-AU" smtClean="0"/>
-              <a:t>18/05/2015</a:t>
+              <a:t>21/05/2015</a:t>
             </a:fld>
             <a:endParaRPr lang="en-AU"/>
           </a:p>
@@ -1671,7 +1671,7 @@
           <a:p>
             <a:fld id="{7B1A49F8-424C-43DF-ABBC-6BF9F0D68733}" type="datetimeFigureOut">
               <a:rPr lang="en-AU" smtClean="0"/>
-              <a:t>18/05/2015</a:t>
+              <a:t>21/05/2015</a:t>
             </a:fld>
             <a:endParaRPr lang="en-AU"/>
           </a:p>
@@ -1789,7 +1789,7 @@
           <a:p>
             <a:fld id="{7B1A49F8-424C-43DF-ABBC-6BF9F0D68733}" type="datetimeFigureOut">
               <a:rPr lang="en-AU" smtClean="0"/>
-              <a:t>18/05/2015</a:t>
+              <a:t>21/05/2015</a:t>
             </a:fld>
             <a:endParaRPr lang="en-AU"/>
           </a:p>
@@ -1884,7 +1884,7 @@
           <a:p>
             <a:fld id="{7B1A49F8-424C-43DF-ABBC-6BF9F0D68733}" type="datetimeFigureOut">
               <a:rPr lang="en-AU" smtClean="0"/>
-              <a:t>18/05/2015</a:t>
+              <a:t>21/05/2015</a:t>
             </a:fld>
             <a:endParaRPr lang="en-AU"/>
           </a:p>
@@ -2161,7 +2161,7 @@
           <a:p>
             <a:fld id="{7B1A49F8-424C-43DF-ABBC-6BF9F0D68733}" type="datetimeFigureOut">
               <a:rPr lang="en-AU" smtClean="0"/>
-              <a:t>18/05/2015</a:t>
+              <a:t>21/05/2015</a:t>
             </a:fld>
             <a:endParaRPr lang="en-AU"/>
           </a:p>
@@ -2414,7 +2414,7 @@
           <a:p>
             <a:fld id="{7B1A49F8-424C-43DF-ABBC-6BF9F0D68733}" type="datetimeFigureOut">
               <a:rPr lang="en-AU" smtClean="0"/>
-              <a:t>18/05/2015</a:t>
+              <a:t>21/05/2015</a:t>
             </a:fld>
             <a:endParaRPr lang="en-AU"/>
           </a:p>
@@ -2630,7 +2630,7 @@
           <a:p>
             <a:fld id="{7B1A49F8-424C-43DF-ABBC-6BF9F0D68733}" type="datetimeFigureOut">
               <a:rPr lang="en-AU" smtClean="0"/>
-              <a:t>18/05/2015</a:t>
+              <a:t>21/05/2015</a:t>
             </a:fld>
             <a:endParaRPr lang="en-AU"/>
           </a:p>
@@ -5463,25 +5463,7 @@
                 <a:cs typeface="Open Sans" panose="020B0606030504020204" pitchFamily="34" charset="0"/>
                 <a:hlinkClick r:id="rId2"/>
               </a:rPr>
-              <a:t>(AV-TEST, </a:t>
-            </a:r>
-            <a:r>
-              <a:rPr lang="en-AU" sz="2000" dirty="0" smtClean="0">
-                <a:latin typeface="Open Sans" panose="020B0606030504020204" pitchFamily="34" charset="0"/>
-                <a:ea typeface="Open Sans" panose="020B0606030504020204" pitchFamily="34" charset="0"/>
-                <a:cs typeface="Open Sans" panose="020B0606030504020204" pitchFamily="34" charset="0"/>
-                <a:hlinkClick r:id="rId2"/>
-              </a:rPr>
-              <a:t>2013, </a:t>
-            </a:r>
-            <a:r>
-              <a:rPr lang="en-AU" sz="2000" dirty="0" smtClean="0">
-                <a:latin typeface="Open Sans" panose="020B0606030504020204" pitchFamily="34" charset="0"/>
-                <a:ea typeface="Open Sans" panose="020B0606030504020204" pitchFamily="34" charset="0"/>
-                <a:cs typeface="Open Sans" panose="020B0606030504020204" pitchFamily="34" charset="0"/>
-                <a:hlinkClick r:id="rId2"/>
-              </a:rPr>
-              <a:t>p. 7)</a:t>
+              <a:t>(AV-TEST, 2013, p. 7)</a:t>
             </a:r>
             <a:endParaRPr lang="en-AU" sz="2000" dirty="0">
               <a:latin typeface="Open Sans" panose="020B0606030504020204" pitchFamily="34" charset="0"/>
@@ -7627,18 +7609,7 @@
                 <a:ea typeface="Open Sans" panose="020B0606030504020204" pitchFamily="34" charset="0"/>
                 <a:cs typeface="Open Sans" panose="020B0606030504020204" pitchFamily="34" charset="0"/>
               </a:rPr>
-              <a:t>Both features scored </a:t>
-            </a:r>
-            <a:r>
-              <a:rPr lang="en-AU" sz="2600" dirty="0" smtClean="0">
-                <a:solidFill>
-                  <a:srgbClr val="111111"/>
-                </a:solidFill>
-                <a:latin typeface="Open Sans" panose="020B0606030504020204" pitchFamily="34" charset="0"/>
-                <a:ea typeface="Open Sans" panose="020B0606030504020204" pitchFamily="34" charset="0"/>
-                <a:cs typeface="Open Sans" panose="020B0606030504020204" pitchFamily="34" charset="0"/>
-              </a:rPr>
-              <a:t>highly by AV-TEST</a:t>
+              <a:t>Both features scored highly by AV-TEST</a:t>
             </a:r>
           </a:p>
           <a:p>
@@ -7827,19 +7798,7 @@
                 <a:cs typeface="Open Sans" panose="020B0606030504020204" pitchFamily="34" charset="0"/>
                 <a:hlinkClick r:id="rId3"/>
               </a:rPr>
-              <a:t>(Kaspersky Lab, </a:t>
-            </a:r>
-            <a:r>
-              <a:rPr lang="en-AU" sz="2800" b="1" dirty="0" smtClean="0">
-                <a:solidFill>
-                  <a:srgbClr val="111111"/>
-                </a:solidFill>
-                <a:latin typeface="Open Sans" panose="020B0606030504020204" pitchFamily="34" charset="0"/>
-                <a:ea typeface="Open Sans" panose="020B0606030504020204" pitchFamily="34" charset="0"/>
-                <a:cs typeface="Open Sans" panose="020B0606030504020204" pitchFamily="34" charset="0"/>
-                <a:hlinkClick r:id="rId3"/>
-              </a:rPr>
-              <a:t>2013b)</a:t>
+              <a:t>(Kaspersky Lab, 2013b)</a:t>
             </a:r>
             <a:endParaRPr lang="en-AU" sz="2800" dirty="0">
               <a:solidFill>
@@ -8462,18 +8421,7 @@
                 <a:ea typeface="Open Sans" panose="020B0606030504020204" pitchFamily="34" charset="0"/>
                 <a:cs typeface="Open Sans" panose="020B0606030504020204" pitchFamily="34" charset="0"/>
               </a:rPr>
-              <a:t>Configure group access </a:t>
-            </a:r>
-            <a:r>
-              <a:rPr lang="en-AU" sz="2600" dirty="0" smtClean="0">
-                <a:solidFill>
-                  <a:srgbClr val="111111"/>
-                </a:solidFill>
-                <a:latin typeface="Open Sans" panose="020B0606030504020204" pitchFamily="34" charset="0"/>
-                <a:ea typeface="Open Sans" panose="020B0606030504020204" pitchFamily="34" charset="0"/>
-                <a:cs typeface="Open Sans" panose="020B0606030504020204" pitchFamily="34" charset="0"/>
-              </a:rPr>
-              <a:t>rights </a:t>
+              <a:t>Configure group access rights </a:t>
             </a:r>
             <a:r>
               <a:rPr lang="en-AU" sz="2600" dirty="0" smtClean="0">
@@ -10764,14 +10712,6 @@
               </a:rPr>
               <a:t>Mitigate ability to be controlled as botnet zombie</a:t>
             </a:r>
-            <a:endParaRPr lang="en-AU" sz="2600" dirty="0" smtClean="0">
-              <a:solidFill>
-                <a:srgbClr val="111111"/>
-              </a:solidFill>
-              <a:latin typeface="Open Sans" panose="020B0606030504020204" pitchFamily="34" charset="0"/>
-              <a:ea typeface="Open Sans" panose="020B0606030504020204" pitchFamily="34" charset="0"/>
-              <a:cs typeface="Open Sans" panose="020B0606030504020204" pitchFamily="34" charset="0"/>
-            </a:endParaRPr>
           </a:p>
         </p:txBody>
       </p:sp>
@@ -10848,15 +10788,7 @@
                 <a:ea typeface="Open Sans" panose="020B0606030504020204" pitchFamily="34" charset="0"/>
                 <a:cs typeface="Open Sans" panose="020B0606030504020204" pitchFamily="34" charset="0"/>
               </a:rPr>
-              <a:t>Blu</a:t>
-            </a:r>
-            <a:r>
-              <a:rPr lang="en-AU" sz="2000" dirty="0" smtClean="0">
-                <a:latin typeface="Open Sans" panose="020B0606030504020204" pitchFamily="34" charset="0"/>
-                <a:ea typeface="Open Sans" panose="020B0606030504020204" pitchFamily="34" charset="0"/>
-                <a:cs typeface="Open Sans" panose="020B0606030504020204" pitchFamily="34" charset="0"/>
-              </a:rPr>
-              <a:t>e Ink’s mIRC client in VM</a:t>
+              <a:t>Blue Ink’s mIRC client in VM</a:t>
             </a:r>
             <a:endParaRPr lang="en-AU" sz="2000" dirty="0">
               <a:latin typeface="Open Sans" panose="020B0606030504020204" pitchFamily="34" charset="0"/>
@@ -11169,18 +11101,7 @@
                 <a:ea typeface="Open Sans" panose="020B0606030504020204" pitchFamily="34" charset="0"/>
                 <a:cs typeface="Open Sans" panose="020B0606030504020204" pitchFamily="34" charset="0"/>
               </a:rPr>
-              <a:t>Kaspersk</a:t>
-            </a:r>
-            <a:r>
-              <a:rPr lang="en-AU" sz="2600" dirty="0" smtClean="0">
-                <a:solidFill>
-                  <a:srgbClr val="111111"/>
-                </a:solidFill>
-                <a:latin typeface="Open Sans" panose="020B0606030504020204" pitchFamily="34" charset="0"/>
-                <a:ea typeface="Open Sans" panose="020B0606030504020204" pitchFamily="34" charset="0"/>
-                <a:cs typeface="Open Sans" panose="020B0606030504020204" pitchFamily="34" charset="0"/>
-              </a:rPr>
-              <a:t>y Endpoint Security for Business Advanced 10.2</a:t>
+              <a:t>Kaspersky Endpoint Security for Business Advanced 10.2</a:t>
             </a:r>
           </a:p>
           <a:p>
@@ -11197,18 +11118,7 @@
                 <a:ea typeface="Open Sans" panose="020B0606030504020204" pitchFamily="34" charset="0"/>
                 <a:cs typeface="Open Sans" panose="020B0606030504020204" pitchFamily="34" charset="0"/>
               </a:rPr>
-              <a:t>Both features scored highly </a:t>
-            </a:r>
-            <a:r>
-              <a:rPr lang="en-AU" sz="2600" dirty="0" smtClean="0">
-                <a:solidFill>
-                  <a:srgbClr val="111111"/>
-                </a:solidFill>
-                <a:latin typeface="Open Sans" panose="020B0606030504020204" pitchFamily="34" charset="0"/>
-                <a:ea typeface="Open Sans" panose="020B0606030504020204" pitchFamily="34" charset="0"/>
-                <a:cs typeface="Open Sans" panose="020B0606030504020204" pitchFamily="34" charset="0"/>
-              </a:rPr>
-              <a:t>in AV-TEST</a:t>
+              <a:t>Both features scored highly in AV-TEST</a:t>
             </a:r>
           </a:p>
           <a:p>
@@ -11227,14 +11137,6 @@
               </a:rPr>
               <a:t>Anti-malware and patch management in one software solution</a:t>
             </a:r>
-            <a:endParaRPr lang="en-AU" sz="2600" dirty="0" smtClean="0">
-              <a:solidFill>
-                <a:srgbClr val="111111"/>
-              </a:solidFill>
-              <a:latin typeface="Open Sans" panose="020B0606030504020204" pitchFamily="34" charset="0"/>
-              <a:ea typeface="Open Sans" panose="020B0606030504020204" pitchFamily="34" charset="0"/>
-              <a:cs typeface="Open Sans" panose="020B0606030504020204" pitchFamily="34" charset="0"/>
-            </a:endParaRPr>
           </a:p>
         </p:txBody>
       </p:sp>
@@ -11390,14 +11292,6 @@
               </a:rPr>
               <a:t>Manage security policies consistently across all devices/users</a:t>
             </a:r>
-            <a:endParaRPr lang="en-AU" sz="2600" dirty="0" smtClean="0">
-              <a:solidFill>
-                <a:srgbClr val="111111"/>
-              </a:solidFill>
-              <a:latin typeface="Open Sans" panose="020B0606030504020204" pitchFamily="34" charset="0"/>
-              <a:ea typeface="Open Sans" panose="020B0606030504020204" pitchFamily="34" charset="0"/>
-              <a:cs typeface="Open Sans" panose="020B0606030504020204" pitchFamily="34" charset="0"/>
-            </a:endParaRPr>
           </a:p>
         </p:txBody>
       </p:sp>
@@ -13645,7 +13539,7 @@
         <p:spPr>
           <a:xfrm>
             <a:off x="1524000" y="2790371"/>
-            <a:ext cx="9144000" cy="2893100"/>
+            <a:ext cx="9144000" cy="3293209"/>
           </a:xfrm>
           <a:prstGeom prst="rect">
             <a:avLst/>
@@ -13728,8 +13622,27 @@
                 <a:ea typeface="Open Sans" panose="020B0606030504020204" pitchFamily="34" charset="0"/>
                 <a:cs typeface="Open Sans" panose="020B0606030504020204" pitchFamily="34" charset="0"/>
               </a:rPr>
-              <a:t> Tests for Windows Vista not available</a:t>
-            </a:r>
+              <a:t> Tests for Windows Vista not </a:t>
+            </a:r>
+            <a:r>
+              <a:rPr lang="en-AU" sz="2600" dirty="0" smtClean="0">
+                <a:solidFill>
+                  <a:srgbClr val="111111"/>
+                </a:solidFill>
+                <a:latin typeface="Open Sans" panose="020B0606030504020204" pitchFamily="34" charset="0"/>
+                <a:ea typeface="Open Sans" panose="020B0606030504020204" pitchFamily="34" charset="0"/>
+                <a:cs typeface="Open Sans" panose="020B0606030504020204" pitchFamily="34" charset="0"/>
+              </a:rPr>
+              <a:t>available, although is compatible</a:t>
+            </a:r>
+            <a:endParaRPr lang="en-AU" sz="2600" dirty="0" smtClean="0">
+              <a:solidFill>
+                <a:srgbClr val="111111"/>
+              </a:solidFill>
+              <a:latin typeface="Open Sans" panose="020B0606030504020204" pitchFamily="34" charset="0"/>
+              <a:ea typeface="Open Sans" panose="020B0606030504020204" pitchFamily="34" charset="0"/>
+              <a:cs typeface="Open Sans" panose="020B0606030504020204" pitchFamily="34" charset="0"/>
+            </a:endParaRPr>
           </a:p>
           <a:p>
             <a:pPr marL="742950" lvl="1" indent="-285750">

</xml_diff>

<commit_message>
CSI1101 A2: fixed some wording, ready for submission
</commit_message>
<xml_diff>
--- a/year_1/sem_2/CSI1101_computer_security/0b_assignment_2_[22MAY15_0900]/dev/CSI1101_PONCE_A2_v03.pptx
+++ b/year_1/sem_2/CSI1101_computer_security/0b_assignment_2_[22MAY15_0900]/dev/CSI1101_PONCE_A2_v03.pptx
@@ -42,23 +42,23 @@
   <p:notesSz cx="6858000" cy="9144000"/>
   <p:embeddedFontLst>
     <p:embeddedFont>
-      <p:font typeface="Open Sans" panose="020B0606030504020204" pitchFamily="34" charset="0"/>
+      <p:font typeface="Calibri" panose="020F0502020204030204" pitchFamily="34" charset="0"/>
       <p:regular r:id="rId34"/>
       <p:bold r:id="rId35"/>
       <p:italic r:id="rId36"/>
       <p:boldItalic r:id="rId37"/>
     </p:embeddedFont>
     <p:embeddedFont>
-      <p:font typeface="Calibri Light" panose="020F0302020204030204" pitchFamily="34" charset="0"/>
+      <p:font typeface="Open Sans" panose="020B0606030504020204" pitchFamily="34" charset="0"/>
       <p:regular r:id="rId38"/>
-      <p:italic r:id="rId39"/>
+      <p:bold r:id="rId39"/>
+      <p:italic r:id="rId40"/>
+      <p:boldItalic r:id="rId41"/>
     </p:embeddedFont>
     <p:embeddedFont>
-      <p:font typeface="Calibri" panose="020F0502020204030204" pitchFamily="34" charset="0"/>
-      <p:regular r:id="rId40"/>
-      <p:bold r:id="rId41"/>
-      <p:italic r:id="rId42"/>
-      <p:boldItalic r:id="rId43"/>
+      <p:font typeface="Calibri Light" panose="020F0302020204030204" pitchFamily="34" charset="0"/>
+      <p:regular r:id="rId42"/>
+      <p:italic r:id="rId43"/>
     </p:embeddedFont>
   </p:embeddedFontLst>
   <p:defaultTextStyle>
@@ -10486,7 +10486,29 @@
                 <a:ea typeface="Open Sans" panose="020B0606030504020204" pitchFamily="34" charset="0"/>
                 <a:cs typeface="Open Sans" panose="020B0606030504020204" pitchFamily="34" charset="0"/>
               </a:rPr>
-              <a:t>Used to control zombie hosts in botnet</a:t>
+              <a:t>Can also be u</a:t>
+            </a:r>
+            <a:r>
+              <a:rPr lang="en-AU" sz="2600" dirty="0" smtClean="0">
+                <a:solidFill>
+                  <a:srgbClr val="111111"/>
+                </a:solidFill>
+                <a:latin typeface="Open Sans" panose="020B0606030504020204" pitchFamily="34" charset="0"/>
+                <a:ea typeface="Open Sans" panose="020B0606030504020204" pitchFamily="34" charset="0"/>
+                <a:cs typeface="Open Sans" panose="020B0606030504020204" pitchFamily="34" charset="0"/>
+              </a:rPr>
+              <a:t>sed </a:t>
+            </a:r>
+            <a:r>
+              <a:rPr lang="en-AU" sz="2600" dirty="0" smtClean="0">
+                <a:solidFill>
+                  <a:srgbClr val="111111"/>
+                </a:solidFill>
+                <a:latin typeface="Open Sans" panose="020B0606030504020204" pitchFamily="34" charset="0"/>
+                <a:ea typeface="Open Sans" panose="020B0606030504020204" pitchFamily="34" charset="0"/>
+                <a:cs typeface="Open Sans" panose="020B0606030504020204" pitchFamily="34" charset="0"/>
+              </a:rPr>
+              <a:t>to control zombie hosts in botnet</a:t>
             </a:r>
             <a:endParaRPr lang="en-AU" sz="2600" dirty="0">
               <a:solidFill>
@@ -13622,27 +13644,8 @@
                 <a:ea typeface="Open Sans" panose="020B0606030504020204" pitchFamily="34" charset="0"/>
                 <a:cs typeface="Open Sans" panose="020B0606030504020204" pitchFamily="34" charset="0"/>
               </a:rPr>
-              <a:t> Tests for Windows Vista not </a:t>
-            </a:r>
-            <a:r>
-              <a:rPr lang="en-AU" sz="2600" dirty="0" smtClean="0">
-                <a:solidFill>
-                  <a:srgbClr val="111111"/>
-                </a:solidFill>
-                <a:latin typeface="Open Sans" panose="020B0606030504020204" pitchFamily="34" charset="0"/>
-                <a:ea typeface="Open Sans" panose="020B0606030504020204" pitchFamily="34" charset="0"/>
-                <a:cs typeface="Open Sans" panose="020B0606030504020204" pitchFamily="34" charset="0"/>
-              </a:rPr>
-              <a:t>available, although is compatible</a:t>
-            </a:r>
-            <a:endParaRPr lang="en-AU" sz="2600" dirty="0" smtClean="0">
-              <a:solidFill>
-                <a:srgbClr val="111111"/>
-              </a:solidFill>
-              <a:latin typeface="Open Sans" panose="020B0606030504020204" pitchFamily="34" charset="0"/>
-              <a:ea typeface="Open Sans" panose="020B0606030504020204" pitchFamily="34" charset="0"/>
-              <a:cs typeface="Open Sans" panose="020B0606030504020204" pitchFamily="34" charset="0"/>
-            </a:endParaRPr>
+              <a:t> Tests for Windows Vista not available, although is compatible</a:t>
+            </a:r>
           </a:p>
           <a:p>
             <a:pPr marL="742950" lvl="1" indent="-285750">

</xml_diff>